<commit_message>
Update README.md and docs
</commit_message>
<xml_diff>
--- a/docs/SecureBLE.pptx
+++ b/docs/SecureBLE.pptx
@@ -764,7 +764,7 @@
           <a:p>
             <a:fld id="{0F0D3872-5191-4810-AACA-0D61B05C29C6}" type="datetimeFigureOut">
               <a:rPr lang="hr-HR" smtClean="0"/>
-              <a:t>26.12.2018.</a:t>
+              <a:t>4.1.2019.</a:t>
             </a:fld>
             <a:endParaRPr lang="hr-HR"/>
           </a:p>
@@ -934,7 +934,7 @@
           <a:p>
             <a:fld id="{0F0D3872-5191-4810-AACA-0D61B05C29C6}" type="datetimeFigureOut">
               <a:rPr lang="hr-HR" smtClean="0"/>
-              <a:t>26.12.2018.</a:t>
+              <a:t>4.1.2019.</a:t>
             </a:fld>
             <a:endParaRPr lang="hr-HR"/>
           </a:p>
@@ -1114,7 +1114,7 @@
           <a:p>
             <a:fld id="{0F0D3872-5191-4810-AACA-0D61B05C29C6}" type="datetimeFigureOut">
               <a:rPr lang="hr-HR" smtClean="0"/>
-              <a:t>26.12.2018.</a:t>
+              <a:t>4.1.2019.</a:t>
             </a:fld>
             <a:endParaRPr lang="hr-HR"/>
           </a:p>
@@ -1284,7 +1284,7 @@
           <a:p>
             <a:fld id="{0F0D3872-5191-4810-AACA-0D61B05C29C6}" type="datetimeFigureOut">
               <a:rPr lang="hr-HR" smtClean="0"/>
-              <a:t>26.12.2018.</a:t>
+              <a:t>4.1.2019.</a:t>
             </a:fld>
             <a:endParaRPr lang="hr-HR"/>
           </a:p>
@@ -1530,7 +1530,7 @@
           <a:p>
             <a:fld id="{0F0D3872-5191-4810-AACA-0D61B05C29C6}" type="datetimeFigureOut">
               <a:rPr lang="hr-HR" smtClean="0"/>
-              <a:t>26.12.2018.</a:t>
+              <a:t>4.1.2019.</a:t>
             </a:fld>
             <a:endParaRPr lang="hr-HR"/>
           </a:p>
@@ -1762,7 +1762,7 @@
           <a:p>
             <a:fld id="{0F0D3872-5191-4810-AACA-0D61B05C29C6}" type="datetimeFigureOut">
               <a:rPr lang="hr-HR" smtClean="0"/>
-              <a:t>26.12.2018.</a:t>
+              <a:t>4.1.2019.</a:t>
             </a:fld>
             <a:endParaRPr lang="hr-HR"/>
           </a:p>
@@ -2129,7 +2129,7 @@
           <a:p>
             <a:fld id="{0F0D3872-5191-4810-AACA-0D61B05C29C6}" type="datetimeFigureOut">
               <a:rPr lang="hr-HR" smtClean="0"/>
-              <a:t>26.12.2018.</a:t>
+              <a:t>4.1.2019.</a:t>
             </a:fld>
             <a:endParaRPr lang="hr-HR"/>
           </a:p>
@@ -2247,7 +2247,7 @@
           <a:p>
             <a:fld id="{0F0D3872-5191-4810-AACA-0D61B05C29C6}" type="datetimeFigureOut">
               <a:rPr lang="hr-HR" smtClean="0"/>
-              <a:t>26.12.2018.</a:t>
+              <a:t>4.1.2019.</a:t>
             </a:fld>
             <a:endParaRPr lang="hr-HR"/>
           </a:p>
@@ -2342,7 +2342,7 @@
           <a:p>
             <a:fld id="{0F0D3872-5191-4810-AACA-0D61B05C29C6}" type="datetimeFigureOut">
               <a:rPr lang="hr-HR" smtClean="0"/>
-              <a:t>26.12.2018.</a:t>
+              <a:t>4.1.2019.</a:t>
             </a:fld>
             <a:endParaRPr lang="hr-HR"/>
           </a:p>
@@ -2619,7 +2619,7 @@
           <a:p>
             <a:fld id="{0F0D3872-5191-4810-AACA-0D61B05C29C6}" type="datetimeFigureOut">
               <a:rPr lang="hr-HR" smtClean="0"/>
-              <a:t>26.12.2018.</a:t>
+              <a:t>4.1.2019.</a:t>
             </a:fld>
             <a:endParaRPr lang="hr-HR"/>
           </a:p>
@@ -2872,7 +2872,7 @@
           <a:p>
             <a:fld id="{0F0D3872-5191-4810-AACA-0D61B05C29C6}" type="datetimeFigureOut">
               <a:rPr lang="hr-HR" smtClean="0"/>
-              <a:t>26.12.2018.</a:t>
+              <a:t>4.1.2019.</a:t>
             </a:fld>
             <a:endParaRPr lang="hr-HR"/>
           </a:p>
@@ -3085,7 +3085,7 @@
           <a:p>
             <a:fld id="{0F0D3872-5191-4810-AACA-0D61B05C29C6}" type="datetimeFigureOut">
               <a:rPr lang="hr-HR" smtClean="0"/>
-              <a:t>26.12.2018.</a:t>
+              <a:t>4.1.2019.</a:t>
             </a:fld>
             <a:endParaRPr lang="hr-HR"/>
           </a:p>
@@ -3987,7 +3987,7 @@
           <p:cNvPr id="5" name="Picture 5" descr="A close up of a logo&#10;&#10;Description generated with high confidence">
             <a:extLst>
               <a:ext uri="{FF2B5EF4-FFF2-40B4-BE49-F238E27FC236}">
-                <a16:creationId xmlns="" xmlns:a16="http://schemas.microsoft.com/office/drawing/2014/main" id="{8427AAF0-6F2C-4D3F-9F8C-420281031ECF}"/>
+                <a16:creationId xmlns:a16="http://schemas.microsoft.com/office/drawing/2014/main" xmlns="" id="{8427AAF0-6F2C-4D3F-9F8C-420281031ECF}"/>
               </a:ext>
             </a:extLst>
           </p:cNvPr>
@@ -4017,7 +4017,7 @@
           <p:cNvPr id="7" name="Picture 7">
             <a:extLst>
               <a:ext uri="{FF2B5EF4-FFF2-40B4-BE49-F238E27FC236}">
-                <a16:creationId xmlns="" xmlns:a16="http://schemas.microsoft.com/office/drawing/2014/main" id="{2FEE3424-9F51-4A3B-A6EF-8BB9144B9192}"/>
+                <a16:creationId xmlns:a16="http://schemas.microsoft.com/office/drawing/2014/main" xmlns="" id="{2FEE3424-9F51-4A3B-A6EF-8BB9144B9192}"/>
               </a:ext>
             </a:extLst>
           </p:cNvPr>
@@ -4047,7 +4047,7 @@
           <p:cNvPr id="13" name="Straight Arrow Connector 12">
             <a:extLst>
               <a:ext uri="{FF2B5EF4-FFF2-40B4-BE49-F238E27FC236}">
-                <a16:creationId xmlns="" xmlns:a16="http://schemas.microsoft.com/office/drawing/2014/main" id="{64C25ECC-DCCA-4CAD-8ECA-A99B71733BFD}"/>
+                <a16:creationId xmlns:a16="http://schemas.microsoft.com/office/drawing/2014/main" xmlns="" id="{64C25ECC-DCCA-4CAD-8ECA-A99B71733BFD}"/>
               </a:ext>
             </a:extLst>
           </p:cNvPr>
@@ -4083,7 +4083,7 @@
           <p:cNvPr id="14" name="Straight Arrow Connector 13">
             <a:extLst>
               <a:ext uri="{FF2B5EF4-FFF2-40B4-BE49-F238E27FC236}">
-                <a16:creationId xmlns="" xmlns:a16="http://schemas.microsoft.com/office/drawing/2014/main" id="{85DBE647-BED5-427F-BFC8-2D43A02663E2}"/>
+                <a16:creationId xmlns:a16="http://schemas.microsoft.com/office/drawing/2014/main" xmlns="" id="{85DBE647-BED5-427F-BFC8-2D43A02663E2}"/>
               </a:ext>
             </a:extLst>
           </p:cNvPr>
@@ -4121,7 +4121,7 @@
           <p:cNvPr id="3" name="Arc 2">
             <a:extLst>
               <a:ext uri="{FF2B5EF4-FFF2-40B4-BE49-F238E27FC236}">
-                <a16:creationId xmlns="" xmlns:a16="http://schemas.microsoft.com/office/drawing/2014/main" id="{55925465-D369-43E0-8FC2-B2E10857C791}"/>
+                <a16:creationId xmlns:a16="http://schemas.microsoft.com/office/drawing/2014/main" xmlns="" id="{55925465-D369-43E0-8FC2-B2E10857C791}"/>
               </a:ext>
             </a:extLst>
           </p:cNvPr>
@@ -4166,7 +4166,7 @@
           <p:cNvPr id="11" name="Arc 10">
             <a:extLst>
               <a:ext uri="{FF2B5EF4-FFF2-40B4-BE49-F238E27FC236}">
-                <a16:creationId xmlns="" xmlns:a16="http://schemas.microsoft.com/office/drawing/2014/main" id="{0A124C9F-7217-482D-A951-3035B2F7964F}"/>
+                <a16:creationId xmlns:a16="http://schemas.microsoft.com/office/drawing/2014/main" xmlns="" id="{0A124C9F-7217-482D-A951-3035B2F7964F}"/>
               </a:ext>
             </a:extLst>
           </p:cNvPr>
@@ -4211,7 +4211,7 @@
           <p:cNvPr id="16" name="Arc 15">
             <a:extLst>
               <a:ext uri="{FF2B5EF4-FFF2-40B4-BE49-F238E27FC236}">
-                <a16:creationId xmlns="" xmlns:a16="http://schemas.microsoft.com/office/drawing/2014/main" id="{785B7A92-35CA-4A04-B1E3-ECF4030ECB45}"/>
+                <a16:creationId xmlns:a16="http://schemas.microsoft.com/office/drawing/2014/main" xmlns="" id="{785B7A92-35CA-4A04-B1E3-ECF4030ECB45}"/>
               </a:ext>
             </a:extLst>
           </p:cNvPr>
@@ -4256,7 +4256,7 @@
           <p:cNvPr id="12" name="Oval 11">
             <a:extLst>
               <a:ext uri="{FF2B5EF4-FFF2-40B4-BE49-F238E27FC236}">
-                <a16:creationId xmlns="" xmlns:a16="http://schemas.microsoft.com/office/drawing/2014/main" id="{3C1CCF33-65C1-4E0C-B0DB-0A65F4CA9DBA}"/>
+                <a16:creationId xmlns:a16="http://schemas.microsoft.com/office/drawing/2014/main" xmlns="" id="{3C1CCF33-65C1-4E0C-B0DB-0A65F4CA9DBA}"/>
               </a:ext>
             </a:extLst>
           </p:cNvPr>
@@ -4315,7 +4315,7 @@
           <p:cNvPr id="15" name="Picture 15" descr="A circuit board&#10;&#10;Description generated with very high confidence">
             <a:extLst>
               <a:ext uri="{FF2B5EF4-FFF2-40B4-BE49-F238E27FC236}">
-                <a16:creationId xmlns="" xmlns:a16="http://schemas.microsoft.com/office/drawing/2014/main" id="{EA62634C-E70F-4AEF-AAF5-EE9DB7F9672B}"/>
+                <a16:creationId xmlns:a16="http://schemas.microsoft.com/office/drawing/2014/main" xmlns="" id="{EA62634C-E70F-4AEF-AAF5-EE9DB7F9672B}"/>
               </a:ext>
             </a:extLst>
           </p:cNvPr>
@@ -4345,7 +4345,7 @@
           <p:cNvPr id="4" name="TextBox 3">
             <a:extLst>
               <a:ext uri="{FF2B5EF4-FFF2-40B4-BE49-F238E27FC236}">
-                <a16:creationId xmlns="" xmlns:a16="http://schemas.microsoft.com/office/drawing/2014/main" id="{4746383C-EB29-4DB6-AF3A-1876F6A78DF2}"/>
+                <a16:creationId xmlns:a16="http://schemas.microsoft.com/office/drawing/2014/main" xmlns="" id="{4746383C-EB29-4DB6-AF3A-1876F6A78DF2}"/>
               </a:ext>
             </a:extLst>
           </p:cNvPr>
@@ -4446,7 +4446,7 @@
           <p:cNvPr id="6" name="TextBox 5">
             <a:extLst>
               <a:ext uri="{FF2B5EF4-FFF2-40B4-BE49-F238E27FC236}">
-                <a16:creationId xmlns="" xmlns:a16="http://schemas.microsoft.com/office/drawing/2014/main" id="{DFB61460-4A0C-4662-B6D0-88F0BCEC799C}"/>
+                <a16:creationId xmlns:a16="http://schemas.microsoft.com/office/drawing/2014/main" xmlns="" id="{DFB61460-4A0C-4662-B6D0-88F0BCEC799C}"/>
               </a:ext>
             </a:extLst>
           </p:cNvPr>
@@ -4505,7 +4505,7 @@
           <p:cNvPr id="17" name="TextBox 16">
             <a:extLst>
               <a:ext uri="{FF2B5EF4-FFF2-40B4-BE49-F238E27FC236}">
-                <a16:creationId xmlns="" xmlns:a16="http://schemas.microsoft.com/office/drawing/2014/main" id="{C2A2B99B-918D-4BD3-BB30-A333DBD034B9}"/>
+                <a16:creationId xmlns:a16="http://schemas.microsoft.com/office/drawing/2014/main" xmlns="" id="{C2A2B99B-918D-4BD3-BB30-A333DBD034B9}"/>
               </a:ext>
             </a:extLst>
           </p:cNvPr>
@@ -4954,8 +4954,8 @@
           </a:p>
         </p:txBody>
       </p:sp>
-      <mc:AlternateContent xmlns:mc="http://schemas.openxmlformats.org/markup-compatibility/2006" xmlns:a14="http://schemas.microsoft.com/office/drawing/2010/main">
-        <mc:Choice Requires="a14">
+      <mc:AlternateContent xmlns:mc="http://schemas.openxmlformats.org/markup-compatibility/2006">
+        <mc:Choice xmlns:a14="http://schemas.microsoft.com/office/drawing/2010/main" Requires="a14">
           <p:sp>
             <p:nvSpPr>
               <p:cNvPr id="13" name="TextBox 12"/>
@@ -4964,8 +4964,8 @@
             </p:nvSpPr>
             <p:spPr>
               <a:xfrm>
-                <a:off x="3235616" y="3567475"/>
-                <a:ext cx="1013739" cy="523220"/>
+                <a:off x="3308422" y="3775993"/>
+                <a:ext cx="868123" cy="314702"/>
               </a:xfrm>
               <a:prstGeom prst="rect">
                 <a:avLst/>
@@ -4979,27 +4979,14 @@
               <a:lstStyle/>
               <a:p>
                 <a:pPr algn="ctr"/>
-                <a:r>
-                  <a:rPr lang="en-GB" sz="1400" b="1" smtClean="0">
-                    <a:solidFill>
-                      <a:schemeClr val="accent1">
-                        <a:lumMod val="75000"/>
-                      </a:schemeClr>
-                    </a:solidFill>
-                  </a:rPr>
-                  <a:t>Private key</a:t>
-                </a:r>
-              </a:p>
-              <a:p>
-                <a:pPr algn="ctr"/>
                 <a14:m>
                   <m:oMathPara xmlns:m="http://schemas.openxmlformats.org/officeDocument/2006/math">
                     <m:oMathParaPr>
-                      <m:jc m:val="centerGroup"/>
+                      <m:jc m:val="center"/>
                     </m:oMathParaPr>
                     <m:oMath xmlns:m="http://schemas.openxmlformats.org/officeDocument/2006/math">
-                      <m:sSub>
-                        <m:sSubPr>
+                      <m:sSup>
+                        <m:sSupPr>
                           <m:ctrlPr>
                             <a:rPr lang="en-GB" sz="1400" i="1" smtClean="0">
                               <a:solidFill>
@@ -5008,36 +4995,39 @@
                                 </a:schemeClr>
                               </a:solidFill>
                               <a:latin typeface="Cambria Math" panose="02040503050406030204" pitchFamily="18" charset="0"/>
+                              <a:ea typeface="Cambria Math" panose="02040503050406030204" pitchFamily="18" charset="0"/>
                             </a:rPr>
                           </m:ctrlPr>
-                        </m:sSubPr>
+                        </m:sSupPr>
                         <m:e>
                           <m:r>
-                            <a:rPr lang="en-GB" sz="1400" b="0" i="1" smtClean="0">
+                            <a:rPr lang="en-US" sz="1400" b="0" i="1" smtClean="0">
                               <a:solidFill>
                                 <a:schemeClr val="accent1">
                                   <a:lumMod val="75000"/>
                                 </a:schemeClr>
                               </a:solidFill>
                               <a:latin typeface="Cambria Math" panose="02040503050406030204" pitchFamily="18" charset="0"/>
+                              <a:ea typeface="Cambria Math" panose="02040503050406030204" pitchFamily="18" charset="0"/>
                             </a:rPr>
-                            <m:t>𝑃𝑅</m:t>
+                            <m:t>𝑛</m:t>
                           </m:r>
                         </m:e>
-                        <m:sub>
+                        <m:sup>
                           <m:r>
-                            <a:rPr lang="en-GB" sz="1400" b="0" i="1" smtClean="0">
+                            <a:rPr lang="en-US" sz="1400" b="0" i="1" smtClean="0">
                               <a:solidFill>
                                 <a:schemeClr val="accent1">
                                   <a:lumMod val="75000"/>
                                 </a:schemeClr>
                               </a:solidFill>
                               <a:latin typeface="Cambria Math" panose="02040503050406030204" pitchFamily="18" charset="0"/>
+                              <a:ea typeface="Cambria Math" panose="02040503050406030204" pitchFamily="18" charset="0"/>
                             </a:rPr>
                             <m:t>𝑎𝑟𝑑𝑢𝑖𝑛𝑜</m:t>
                           </m:r>
-                        </m:sub>
-                      </m:sSub>
+                        </m:sup>
+                      </m:sSup>
                     </m:oMath>
                   </m:oMathPara>
                 </a14:m>
@@ -5052,7 +5042,7 @@
             </p:txBody>
           </p:sp>
         </mc:Choice>
-        <mc:Fallback xmlns="">
+        <mc:Fallback>
           <p:sp>
             <p:nvSpPr>
               <p:cNvPr id="13" name="TextBox 12"/>
@@ -5063,8 +5053,8 @@
             </p:nvSpPr>
             <p:spPr>
               <a:xfrm>
-                <a:off x="3235616" y="3567475"/>
-                <a:ext cx="1013739" cy="523220"/>
+                <a:off x="3308422" y="3775993"/>
+                <a:ext cx="868123" cy="314702"/>
               </a:xfrm>
               <a:prstGeom prst="rect">
                 <a:avLst/>
@@ -5072,7 +5062,7 @@
               <a:blipFill rotWithShape="0">
                 <a:blip r:embed="rId4"/>
                 <a:stretch>
-                  <a:fillRect l="-1205" t="-1163" r="-1205"/>
+                  <a:fillRect/>
                 </a:stretch>
               </a:blipFill>
             </p:spPr>
@@ -5091,8 +5081,8 @@
           </p:sp>
         </mc:Fallback>
       </mc:AlternateContent>
-      <mc:AlternateContent xmlns:mc="http://schemas.openxmlformats.org/markup-compatibility/2006" xmlns:a14="http://schemas.microsoft.com/office/drawing/2010/main">
-        <mc:Choice Requires="a14">
+      <mc:AlternateContent xmlns:mc="http://schemas.openxmlformats.org/markup-compatibility/2006">
+        <mc:Choice xmlns:a14="http://schemas.microsoft.com/office/drawing/2010/main" Requires="a14">
           <p:sp>
             <p:nvSpPr>
               <p:cNvPr id="14" name="TextBox 13"/>
@@ -5101,8 +5091,8 @@
             </p:nvSpPr>
             <p:spPr>
               <a:xfrm>
-                <a:off x="7942860" y="3567475"/>
-                <a:ext cx="1013546" cy="523220"/>
+                <a:off x="8015731" y="3775993"/>
+                <a:ext cx="867802" cy="314702"/>
               </a:xfrm>
               <a:prstGeom prst="rect">
                 <a:avLst/>
@@ -5116,27 +5106,14 @@
               <a:lstStyle/>
               <a:p>
                 <a:pPr algn="ctr"/>
-                <a:r>
-                  <a:rPr lang="en-GB" sz="1400" b="1" smtClean="0">
-                    <a:solidFill>
-                      <a:schemeClr val="accent1">
-                        <a:lumMod val="75000"/>
-                      </a:schemeClr>
-                    </a:solidFill>
-                  </a:rPr>
-                  <a:t>Private key</a:t>
-                </a:r>
-              </a:p>
-              <a:p>
-                <a:pPr algn="ctr"/>
                 <a14:m>
                   <m:oMathPara xmlns:m="http://schemas.openxmlformats.org/officeDocument/2006/math">
                     <m:oMathParaPr>
-                      <m:jc m:val="centerGroup"/>
+                      <m:jc m:val="center"/>
                     </m:oMathParaPr>
                     <m:oMath xmlns:m="http://schemas.openxmlformats.org/officeDocument/2006/math">
-                      <m:sSub>
-                        <m:sSubPr>
+                      <m:sSup>
+                        <m:sSupPr>
                           <m:ctrlPr>
                             <a:rPr lang="en-GB" sz="1400" i="1" smtClean="0">
                               <a:solidFill>
@@ -5145,36 +5122,51 @@
                                 </a:schemeClr>
                               </a:solidFill>
                               <a:latin typeface="Cambria Math" panose="02040503050406030204" pitchFamily="18" charset="0"/>
+                              <a:ea typeface="Cambria Math" panose="02040503050406030204" pitchFamily="18" charset="0"/>
                             </a:rPr>
                           </m:ctrlPr>
-                        </m:sSubPr>
+                        </m:sSupPr>
                         <m:e>
                           <m:r>
-                            <a:rPr lang="en-GB" sz="1400" b="0" i="1" smtClean="0">
+                            <a:rPr lang="en-US" sz="1400" i="1">
                               <a:solidFill>
                                 <a:schemeClr val="accent1">
                                   <a:lumMod val="75000"/>
                                 </a:schemeClr>
                               </a:solidFill>
                               <a:latin typeface="Cambria Math" panose="02040503050406030204" pitchFamily="18" charset="0"/>
+                              <a:ea typeface="Cambria Math" panose="02040503050406030204" pitchFamily="18" charset="0"/>
                             </a:rPr>
-                            <m:t>𝑃𝑅</m:t>
+                            <m:t>𝑛</m:t>
                           </m:r>
                         </m:e>
-                        <m:sub>
+                        <m:sup>
                           <m:r>
-                            <a:rPr lang="en-GB" sz="1400" b="0" i="1" smtClean="0">
+                            <a:rPr lang="en-US" sz="1400" i="1">
                               <a:solidFill>
                                 <a:schemeClr val="accent1">
                                   <a:lumMod val="75000"/>
                                 </a:schemeClr>
                               </a:solidFill>
                               <a:latin typeface="Cambria Math" panose="02040503050406030204" pitchFamily="18" charset="0"/>
+                              <a:ea typeface="Cambria Math" panose="02040503050406030204" pitchFamily="18" charset="0"/>
                             </a:rPr>
-                            <m:t>𝑎𝑛𝑑𝑟𝑜𝑖𝑑</m:t>
+                            <m:t>𝑎</m:t>
                           </m:r>
-                        </m:sub>
-                      </m:sSub>
+                          <m:r>
+                            <a:rPr lang="en-US" sz="1400" b="0" i="1" smtClean="0">
+                              <a:solidFill>
+                                <a:schemeClr val="accent1">
+                                  <a:lumMod val="75000"/>
+                                </a:schemeClr>
+                              </a:solidFill>
+                              <a:latin typeface="Cambria Math" panose="02040503050406030204" pitchFamily="18" charset="0"/>
+                              <a:ea typeface="Cambria Math" panose="02040503050406030204" pitchFamily="18" charset="0"/>
+                            </a:rPr>
+                            <m:t>𝑛𝑑𝑟𝑜𝑖𝑑</m:t>
+                          </m:r>
+                        </m:sup>
+                      </m:sSup>
                     </m:oMath>
                   </m:oMathPara>
                 </a14:m>
@@ -5189,7 +5181,7 @@
             </p:txBody>
           </p:sp>
         </mc:Choice>
-        <mc:Fallback xmlns="">
+        <mc:Fallback>
           <p:sp>
             <p:nvSpPr>
               <p:cNvPr id="14" name="TextBox 13"/>
@@ -5200,8 +5192,8 @@
             </p:nvSpPr>
             <p:spPr>
               <a:xfrm>
-                <a:off x="7942860" y="3567475"/>
-                <a:ext cx="1013546" cy="523220"/>
+                <a:off x="8015731" y="3775993"/>
+                <a:ext cx="867802" cy="314702"/>
               </a:xfrm>
               <a:prstGeom prst="rect">
                 <a:avLst/>
@@ -5209,7 +5201,7 @@
               <a:blipFill rotWithShape="0">
                 <a:blip r:embed="rId5"/>
                 <a:stretch>
-                  <a:fillRect l="-1205" t="-1163" r="-1205"/>
+                  <a:fillRect/>
                 </a:stretch>
               </a:blipFill>
             </p:spPr>
@@ -5228,8 +5220,8 @@
           </p:sp>
         </mc:Fallback>
       </mc:AlternateContent>
-      <mc:AlternateContent xmlns:mc="http://schemas.openxmlformats.org/markup-compatibility/2006" xmlns:a14="http://schemas.microsoft.com/office/drawing/2010/main">
-        <mc:Choice Requires="a14">
+      <mc:AlternateContent xmlns:mc="http://schemas.openxmlformats.org/markup-compatibility/2006">
+        <mc:Choice xmlns:a14="http://schemas.microsoft.com/office/drawing/2010/main" Requires="a14">
           <p:sp>
             <p:nvSpPr>
               <p:cNvPr id="15" name="TextBox 14"/>
@@ -5238,8 +5230,8 @@
             </p:nvSpPr>
             <p:spPr>
               <a:xfrm>
-                <a:off x="3133699" y="4395999"/>
-                <a:ext cx="1234825" cy="954107"/>
+                <a:off x="3258348" y="4347844"/>
+                <a:ext cx="985526" cy="1002262"/>
               </a:xfrm>
               <a:prstGeom prst="rect">
                 <a:avLst/>
@@ -5363,21 +5355,9 @@
                       <m:jc m:val="centerGroup"/>
                     </m:oMathParaPr>
                     <m:oMath xmlns:m="http://schemas.openxmlformats.org/officeDocument/2006/math">
-                      <m:sSub>
-                        <m:sSubPr>
+                      <m:sSup>
+                        <m:sSupPr>
                           <m:ctrlPr>
-                            <a:rPr lang="en-GB" sz="1400" i="1" smtClean="0">
-                              <a:solidFill>
-                                <a:schemeClr val="accent1">
-                                  <a:lumMod val="75000"/>
-                                </a:schemeClr>
-                              </a:solidFill>
-                              <a:latin typeface="Cambria Math" panose="02040503050406030204" pitchFamily="18" charset="0"/>
-                            </a:rPr>
-                          </m:ctrlPr>
-                        </m:sSubPr>
-                        <m:e>
-                          <m:r>
                             <a:rPr lang="en-GB" sz="1400" b="0" i="1" smtClean="0">
                               <a:solidFill>
                                 <a:schemeClr val="accent1">
@@ -5385,59 +5365,70 @@
                                 </a:schemeClr>
                               </a:solidFill>
                               <a:latin typeface="Cambria Math" panose="02040503050406030204" pitchFamily="18" charset="0"/>
+                              <a:ea typeface="Cambria Math" panose="02040503050406030204" pitchFamily="18" charset="0"/>
                             </a:rPr>
-                            <m:t>𝑛</m:t>
-                          </m:r>
-                        </m:e>
-                        <m:sub>
+                          </m:ctrlPr>
+                        </m:sSupPr>
+                        <m:e>
                           <m:r>
-                            <a:rPr lang="en-GB" sz="1400" b="0" i="1" smtClean="0">
+                            <a:rPr lang="en-US" sz="1400" b="0" i="1" smtClean="0">
                               <a:solidFill>
                                 <a:schemeClr val="accent1">
                                   <a:lumMod val="75000"/>
                                 </a:schemeClr>
                               </a:solidFill>
                               <a:latin typeface="Cambria Math" panose="02040503050406030204" pitchFamily="18" charset="0"/>
+                              <a:ea typeface="Cambria Math" panose="02040503050406030204" pitchFamily="18" charset="0"/>
                             </a:rPr>
-                            <m:t>𝑎𝑟𝑑𝑢𝑖𝑛𝑜</m:t>
+                            <m:t>𝐺</m:t>
                           </m:r>
-                        </m:sub>
-                      </m:sSub>
-                      <m:r>
-                        <a:rPr lang="en-GB" sz="1400" b="0" i="1" smtClean="0">
-                          <a:solidFill>
-                            <a:schemeClr val="accent1">
-                              <a:lumMod val="75000"/>
-                            </a:schemeClr>
-                          </a:solidFill>
-                          <a:latin typeface="Cambria Math" panose="02040503050406030204" pitchFamily="18" charset="0"/>
-                        </a:rPr>
-                        <m:t> </m:t>
-                      </m:r>
-                      <m:r>
-                        <a:rPr lang="en-GB" sz="1400" b="0" i="1" smtClean="0">
-                          <a:solidFill>
-                            <a:schemeClr val="accent1">
-                              <a:lumMod val="75000"/>
-                            </a:schemeClr>
-                          </a:solidFill>
-                          <a:latin typeface="Cambria Math" panose="02040503050406030204" pitchFamily="18" charset="0"/>
-                          <a:ea typeface="Cambria Math" panose="02040503050406030204" pitchFamily="18" charset="0"/>
-                        </a:rPr>
-                        <m:t>×</m:t>
-                      </m:r>
-                      <m:r>
-                        <a:rPr lang="en-GB" sz="1400" b="0" i="1" smtClean="0">
-                          <a:solidFill>
-                            <a:schemeClr val="accent1">
-                              <a:lumMod val="75000"/>
-                            </a:schemeClr>
-                          </a:solidFill>
-                          <a:latin typeface="Cambria Math" panose="02040503050406030204" pitchFamily="18" charset="0"/>
-                          <a:ea typeface="Cambria Math" panose="02040503050406030204" pitchFamily="18" charset="0"/>
-                        </a:rPr>
-                        <m:t>𝐺</m:t>
-                      </m:r>
+                        </m:e>
+                        <m:sup>
+                          <m:sSup>
+                            <m:sSupPr>
+                              <m:ctrlPr>
+                                <a:rPr lang="en-GB" sz="1400" b="0" i="1" smtClean="0">
+                                  <a:solidFill>
+                                    <a:schemeClr val="accent1">
+                                      <a:lumMod val="75000"/>
+                                    </a:schemeClr>
+                                  </a:solidFill>
+                                  <a:latin typeface="Cambria Math" panose="02040503050406030204" pitchFamily="18" charset="0"/>
+                                  <a:ea typeface="Cambria Math" panose="02040503050406030204" pitchFamily="18" charset="0"/>
+                                </a:rPr>
+                              </m:ctrlPr>
+                            </m:sSupPr>
+                            <m:e>
+                              <m:r>
+                                <a:rPr lang="en-US" sz="1400" b="0" i="1" smtClean="0">
+                                  <a:solidFill>
+                                    <a:schemeClr val="accent1">
+                                      <a:lumMod val="75000"/>
+                                    </a:schemeClr>
+                                  </a:solidFill>
+                                  <a:latin typeface="Cambria Math" panose="02040503050406030204" pitchFamily="18" charset="0"/>
+                                  <a:ea typeface="Cambria Math" panose="02040503050406030204" pitchFamily="18" charset="0"/>
+                                </a:rPr>
+                                <m:t>𝑛</m:t>
+                              </m:r>
+                            </m:e>
+                            <m:sup>
+                              <m:r>
+                                <a:rPr lang="en-US" sz="1400" b="0" i="1" smtClean="0">
+                                  <a:solidFill>
+                                    <a:schemeClr val="accent1">
+                                      <a:lumMod val="75000"/>
+                                    </a:schemeClr>
+                                  </a:solidFill>
+                                  <a:latin typeface="Cambria Math" panose="02040503050406030204" pitchFamily="18" charset="0"/>
+                                  <a:ea typeface="Cambria Math" panose="02040503050406030204" pitchFamily="18" charset="0"/>
+                                </a:rPr>
+                                <m:t>𝑎𝑟𝑑𝑢𝑖𝑛𝑜</m:t>
+                              </m:r>
+                            </m:sup>
+                          </m:sSup>
+                        </m:sup>
+                      </m:sSup>
                     </m:oMath>
                   </m:oMathPara>
                 </a14:m>
@@ -5452,7 +5443,7 @@
             </p:txBody>
           </p:sp>
         </mc:Choice>
-        <mc:Fallback xmlns="">
+        <mc:Fallback>
           <p:sp>
             <p:nvSpPr>
               <p:cNvPr id="15" name="TextBox 14"/>
@@ -5463,8 +5454,8 @@
             </p:nvSpPr>
             <p:spPr>
               <a:xfrm>
-                <a:off x="3133699" y="4395999"/>
-                <a:ext cx="1234825" cy="954107"/>
+                <a:off x="3258348" y="4347844"/>
+                <a:ext cx="985526" cy="1002262"/>
               </a:xfrm>
               <a:prstGeom prst="rect">
                 <a:avLst/>
@@ -5491,8 +5482,8 @@
           </p:sp>
         </mc:Fallback>
       </mc:AlternateContent>
-      <mc:AlternateContent xmlns:mc="http://schemas.openxmlformats.org/markup-compatibility/2006" xmlns:a14="http://schemas.microsoft.com/office/drawing/2010/main">
-        <mc:Choice Requires="a14">
+      <mc:AlternateContent xmlns:mc="http://schemas.openxmlformats.org/markup-compatibility/2006">
+        <mc:Choice xmlns:a14="http://schemas.microsoft.com/office/drawing/2010/main" Requires="a14">
           <p:sp>
             <p:nvSpPr>
               <p:cNvPr id="16" name="TextBox 15"/>
@@ -5501,8 +5492,8 @@
             </p:nvSpPr>
             <p:spPr>
               <a:xfrm>
-                <a:off x="7832381" y="4395999"/>
-                <a:ext cx="1234505" cy="954107"/>
+                <a:off x="7957031" y="4354962"/>
+                <a:ext cx="985205" cy="995144"/>
               </a:xfrm>
               <a:prstGeom prst="rect">
                 <a:avLst/>
@@ -5626,81 +5617,92 @@
                       <m:jc m:val="centerGroup"/>
                     </m:oMathParaPr>
                     <m:oMath xmlns:m="http://schemas.openxmlformats.org/officeDocument/2006/math">
-                      <m:sSub>
-                        <m:sSubPr>
+                      <m:sSup>
+                        <m:sSupPr>
                           <m:ctrlPr>
-                            <a:rPr lang="en-GB" sz="1400" i="1" smtClean="0">
+                            <a:rPr lang="en-GB" sz="1400" i="1">
                               <a:solidFill>
                                 <a:schemeClr val="accent1">
                                   <a:lumMod val="75000"/>
                                 </a:schemeClr>
                               </a:solidFill>
                               <a:latin typeface="Cambria Math" panose="02040503050406030204" pitchFamily="18" charset="0"/>
+                              <a:ea typeface="Cambria Math" panose="02040503050406030204" pitchFamily="18" charset="0"/>
                             </a:rPr>
                           </m:ctrlPr>
-                        </m:sSubPr>
+                        </m:sSupPr>
                         <m:e>
                           <m:r>
-                            <a:rPr lang="en-GB" sz="1400" b="0" i="1" smtClean="0">
+                            <a:rPr lang="en-US" sz="1400" i="1">
                               <a:solidFill>
                                 <a:schemeClr val="accent1">
                                   <a:lumMod val="75000"/>
                                 </a:schemeClr>
                               </a:solidFill>
                               <a:latin typeface="Cambria Math" panose="02040503050406030204" pitchFamily="18" charset="0"/>
+                              <a:ea typeface="Cambria Math" panose="02040503050406030204" pitchFamily="18" charset="0"/>
                             </a:rPr>
-                            <m:t>𝑛</m:t>
+                            <m:t>𝐺</m:t>
                           </m:r>
                         </m:e>
-                        <m:sub>
-                          <m:r>
-                            <a:rPr lang="en-GB" sz="1400" b="0" i="1" smtClean="0">
-                              <a:solidFill>
-                                <a:schemeClr val="accent1">
-                                  <a:lumMod val="75000"/>
-                                </a:schemeClr>
-                              </a:solidFill>
-                              <a:latin typeface="Cambria Math" panose="02040503050406030204" pitchFamily="18" charset="0"/>
-                            </a:rPr>
-                            <m:t>𝑎𝑛𝑑𝑟𝑜𝑖𝑑</m:t>
-                          </m:r>
-                        </m:sub>
-                      </m:sSub>
-                      <m:r>
-                        <a:rPr lang="en-GB" sz="1400" b="0" i="1" smtClean="0">
-                          <a:solidFill>
-                            <a:schemeClr val="accent1">
-                              <a:lumMod val="75000"/>
-                            </a:schemeClr>
-                          </a:solidFill>
-                          <a:latin typeface="Cambria Math" panose="02040503050406030204" pitchFamily="18" charset="0"/>
-                        </a:rPr>
-                        <m:t> </m:t>
-                      </m:r>
-                      <m:r>
-                        <a:rPr lang="en-GB" sz="1400" b="0" i="1" smtClean="0">
-                          <a:solidFill>
-                            <a:schemeClr val="accent1">
-                              <a:lumMod val="75000"/>
-                            </a:schemeClr>
-                          </a:solidFill>
-                          <a:latin typeface="Cambria Math" panose="02040503050406030204" pitchFamily="18" charset="0"/>
-                          <a:ea typeface="Cambria Math" panose="02040503050406030204" pitchFamily="18" charset="0"/>
-                        </a:rPr>
-                        <m:t>×</m:t>
-                      </m:r>
-                      <m:r>
-                        <a:rPr lang="en-GB" sz="1400" b="0" i="1" smtClean="0">
-                          <a:solidFill>
-                            <a:schemeClr val="accent1">
-                              <a:lumMod val="75000"/>
-                            </a:schemeClr>
-                          </a:solidFill>
-                          <a:latin typeface="Cambria Math" panose="02040503050406030204" pitchFamily="18" charset="0"/>
-                          <a:ea typeface="Cambria Math" panose="02040503050406030204" pitchFamily="18" charset="0"/>
-                        </a:rPr>
-                        <m:t>𝐺</m:t>
-                      </m:r>
+                        <m:sup>
+                          <m:sSup>
+                            <m:sSupPr>
+                              <m:ctrlPr>
+                                <a:rPr lang="en-GB" sz="1400" i="1">
+                                  <a:solidFill>
+                                    <a:schemeClr val="accent1">
+                                      <a:lumMod val="75000"/>
+                                    </a:schemeClr>
+                                  </a:solidFill>
+                                  <a:latin typeface="Cambria Math" panose="02040503050406030204" pitchFamily="18" charset="0"/>
+                                  <a:ea typeface="Cambria Math" panose="02040503050406030204" pitchFamily="18" charset="0"/>
+                                </a:rPr>
+                              </m:ctrlPr>
+                            </m:sSupPr>
+                            <m:e>
+                              <m:r>
+                                <a:rPr lang="en-US" sz="1400" i="1">
+                                  <a:solidFill>
+                                    <a:schemeClr val="accent1">
+                                      <a:lumMod val="75000"/>
+                                    </a:schemeClr>
+                                  </a:solidFill>
+                                  <a:latin typeface="Cambria Math" panose="02040503050406030204" pitchFamily="18" charset="0"/>
+                                  <a:ea typeface="Cambria Math" panose="02040503050406030204" pitchFamily="18" charset="0"/>
+                                </a:rPr>
+                                <m:t>𝑛</m:t>
+                              </m:r>
+                            </m:e>
+                            <m:sup>
+                              <m:r>
+                                <a:rPr lang="en-US" sz="1400" i="1">
+                                  <a:solidFill>
+                                    <a:schemeClr val="accent1">
+                                      <a:lumMod val="75000"/>
+                                    </a:schemeClr>
+                                  </a:solidFill>
+                                  <a:latin typeface="Cambria Math" panose="02040503050406030204" pitchFamily="18" charset="0"/>
+                                  <a:ea typeface="Cambria Math" panose="02040503050406030204" pitchFamily="18" charset="0"/>
+                                </a:rPr>
+                                <m:t>𝑎</m:t>
+                              </m:r>
+                              <m:r>
+                                <a:rPr lang="en-US" sz="1400" b="0" i="1" smtClean="0">
+                                  <a:solidFill>
+                                    <a:schemeClr val="accent1">
+                                      <a:lumMod val="75000"/>
+                                    </a:schemeClr>
+                                  </a:solidFill>
+                                  <a:latin typeface="Cambria Math" panose="02040503050406030204" pitchFamily="18" charset="0"/>
+                                  <a:ea typeface="Cambria Math" panose="02040503050406030204" pitchFamily="18" charset="0"/>
+                                </a:rPr>
+                                <m:t>𝑛𝑑𝑟𝑜𝑖𝑑</m:t>
+                              </m:r>
+                            </m:sup>
+                          </m:sSup>
+                        </m:sup>
+                      </m:sSup>
                     </m:oMath>
                   </m:oMathPara>
                 </a14:m>
@@ -5715,7 +5717,7 @@
             </p:txBody>
           </p:sp>
         </mc:Choice>
-        <mc:Fallback xmlns="">
+        <mc:Fallback>
           <p:sp>
             <p:nvSpPr>
               <p:cNvPr id="16" name="TextBox 15"/>
@@ -5726,8 +5728,8 @@
             </p:nvSpPr>
             <p:spPr>
               <a:xfrm>
-                <a:off x="7832381" y="4395999"/>
-                <a:ext cx="1234505" cy="954107"/>
+                <a:off x="7957031" y="4354962"/>
+                <a:ext cx="985205" cy="995144"/>
               </a:xfrm>
               <a:prstGeom prst="rect">
                 <a:avLst/>
@@ -5754,8 +5756,8 @@
           </p:sp>
         </mc:Fallback>
       </mc:AlternateContent>
-      <mc:AlternateContent xmlns:mc="http://schemas.openxmlformats.org/markup-compatibility/2006" xmlns:a14="http://schemas.microsoft.com/office/drawing/2010/main">
-        <mc:Choice Requires="a14">
+      <mc:AlternateContent xmlns:mc="http://schemas.openxmlformats.org/markup-compatibility/2006">
+        <mc:Choice xmlns:a14="http://schemas.microsoft.com/office/drawing/2010/main" Requires="a14">
           <p:sp>
             <p:nvSpPr>
               <p:cNvPr id="17" name="TextBox 16"/>
@@ -5764,8 +5766,8 @@
             </p:nvSpPr>
             <p:spPr>
               <a:xfrm>
-                <a:off x="7512998" y="5574944"/>
-                <a:ext cx="1873270" cy="954107"/>
+                <a:off x="7675190" y="5520313"/>
+                <a:ext cx="1548886" cy="1008738"/>
               </a:xfrm>
               <a:prstGeom prst="rect">
                 <a:avLst/>
@@ -5860,73 +5862,10 @@
                       <m:jc m:val="centerGroup"/>
                     </m:oMathParaPr>
                     <m:oMath xmlns:m="http://schemas.openxmlformats.org/officeDocument/2006/math">
-                      <m:sSub>
-                        <m:sSubPr>
+                      <m:sSup>
+                        <m:sSupPr>
                           <m:ctrlPr>
-                            <a:rPr lang="en-GB" sz="1400" i="1" smtClean="0">
-                              <a:solidFill>
-                                <a:schemeClr val="accent1">
-                                  <a:lumMod val="75000"/>
-                                </a:schemeClr>
-                              </a:solidFill>
-                              <a:latin typeface="Cambria Math" panose="02040503050406030204" pitchFamily="18" charset="0"/>
-                            </a:rPr>
-                          </m:ctrlPr>
-                        </m:sSubPr>
-                        <m:e>
-                          <m:r>
-                            <a:rPr lang="en-GB" sz="1400" b="0" i="1" smtClean="0">
-                              <a:solidFill>
-                                <a:schemeClr val="accent1">
-                                  <a:lumMod val="75000"/>
-                                </a:schemeClr>
-                              </a:solidFill>
-                              <a:latin typeface="Cambria Math" panose="02040503050406030204" pitchFamily="18" charset="0"/>
-                            </a:rPr>
-                            <m:t>𝑛</m:t>
-                          </m:r>
-                        </m:e>
-                        <m:sub>
-                          <m:r>
-                            <a:rPr lang="en-GB" sz="1400" b="0" i="1" smtClean="0">
-                              <a:solidFill>
-                                <a:schemeClr val="accent1">
-                                  <a:lumMod val="75000"/>
-                                </a:schemeClr>
-                              </a:solidFill>
-                              <a:latin typeface="Cambria Math" panose="02040503050406030204" pitchFamily="18" charset="0"/>
-                            </a:rPr>
-                            <m:t>𝑎𝑛𝑑𝑟𝑜𝑖𝑑</m:t>
-                          </m:r>
-                        </m:sub>
-                      </m:sSub>
-                      <m:r>
-                        <a:rPr lang="en-GB" sz="1400" b="0" i="1" smtClean="0">
-                          <a:solidFill>
-                            <a:schemeClr val="accent1">
-                              <a:lumMod val="75000"/>
-                            </a:schemeClr>
-                          </a:solidFill>
-                          <a:latin typeface="Cambria Math" panose="02040503050406030204" pitchFamily="18" charset="0"/>
-                        </a:rPr>
-                        <m:t> </m:t>
-                      </m:r>
-                      <m:r>
-                        <a:rPr lang="en-GB" sz="1400" b="0" i="1" smtClean="0">
-                          <a:solidFill>
-                            <a:schemeClr val="accent1">
-                              <a:lumMod val="75000"/>
-                            </a:schemeClr>
-                          </a:solidFill>
-                          <a:latin typeface="Cambria Math" panose="02040503050406030204" pitchFamily="18" charset="0"/>
-                          <a:ea typeface="Cambria Math" panose="02040503050406030204" pitchFamily="18" charset="0"/>
-                        </a:rPr>
-                        <m:t>×</m:t>
-                      </m:r>
-                      <m:sSub>
-                        <m:sSubPr>
-                          <m:ctrlPr>
-                            <a:rPr lang="en-GB" sz="1400" b="0" i="1" smtClean="0">
+                            <a:rPr lang="en-GB" sz="1400" i="1">
                               <a:solidFill>
                                 <a:schemeClr val="accent1">
                                   <a:lumMod val="75000"/>
@@ -5936,36 +5875,122 @@
                               <a:ea typeface="Cambria Math" panose="02040503050406030204" pitchFamily="18" charset="0"/>
                             </a:rPr>
                           </m:ctrlPr>
-                        </m:sSubPr>
+                        </m:sSupPr>
                         <m:e>
-                          <m:r>
-                            <a:rPr lang="en-GB" sz="1400" b="0" i="1" smtClean="0">
-                              <a:solidFill>
-                                <a:schemeClr val="accent1">
-                                  <a:lumMod val="75000"/>
-                                </a:schemeClr>
-                              </a:solidFill>
-                              <a:latin typeface="Cambria Math" panose="02040503050406030204" pitchFamily="18" charset="0"/>
-                              <a:ea typeface="Cambria Math" panose="02040503050406030204" pitchFamily="18" charset="0"/>
-                            </a:rPr>
-                            <m:t>𝑃𝑈</m:t>
-                          </m:r>
+                          <m:sSub>
+                            <m:sSubPr>
+                              <m:ctrlPr>
+                                <a:rPr lang="en-GB" sz="1400" i="1">
+                                  <a:solidFill>
+                                    <a:schemeClr val="accent1">
+                                      <a:lumMod val="75000"/>
+                                    </a:schemeClr>
+                                  </a:solidFill>
+                                  <a:latin typeface="Cambria Math" panose="02040503050406030204" pitchFamily="18" charset="0"/>
+                                  <a:ea typeface="Cambria Math" panose="02040503050406030204" pitchFamily="18" charset="0"/>
+                                </a:rPr>
+                              </m:ctrlPr>
+                            </m:sSubPr>
+                            <m:e>
+                              <m:r>
+                                <a:rPr lang="en-US" sz="1400" i="1">
+                                  <a:solidFill>
+                                    <a:schemeClr val="accent1">
+                                      <a:lumMod val="75000"/>
+                                    </a:schemeClr>
+                                  </a:solidFill>
+                                  <a:latin typeface="Cambria Math" panose="02040503050406030204" pitchFamily="18" charset="0"/>
+                                  <a:ea typeface="Cambria Math" panose="02040503050406030204" pitchFamily="18" charset="0"/>
+                                </a:rPr>
+                                <m:t>𝑃𝑈</m:t>
+                              </m:r>
+                            </m:e>
+                            <m:sub>
+                              <m:r>
+                                <a:rPr lang="en-US" sz="1400" i="1">
+                                  <a:solidFill>
+                                    <a:schemeClr val="accent1">
+                                      <a:lumMod val="75000"/>
+                                    </a:schemeClr>
+                                  </a:solidFill>
+                                  <a:latin typeface="Cambria Math" panose="02040503050406030204" pitchFamily="18" charset="0"/>
+                                  <a:ea typeface="Cambria Math" panose="02040503050406030204" pitchFamily="18" charset="0"/>
+                                </a:rPr>
+                                <m:t>𝑎</m:t>
+                              </m:r>
+                              <m:r>
+                                <a:rPr lang="en-US" sz="1400" b="0" i="1" smtClean="0">
+                                  <a:solidFill>
+                                    <a:schemeClr val="accent1">
+                                      <a:lumMod val="75000"/>
+                                    </a:schemeClr>
+                                  </a:solidFill>
+                                  <a:latin typeface="Cambria Math" panose="02040503050406030204" pitchFamily="18" charset="0"/>
+                                  <a:ea typeface="Cambria Math" panose="02040503050406030204" pitchFamily="18" charset="0"/>
+                                </a:rPr>
+                                <m:t>𝑟𝑑𝑢𝑖𝑛𝑜</m:t>
+                              </m:r>
+                            </m:sub>
+                          </m:sSub>
                         </m:e>
-                        <m:sub>
-                          <m:r>
-                            <a:rPr lang="en-GB" sz="1400" b="0" i="1" smtClean="0">
-                              <a:solidFill>
-                                <a:schemeClr val="accent1">
-                                  <a:lumMod val="75000"/>
-                                </a:schemeClr>
-                              </a:solidFill>
-                              <a:latin typeface="Cambria Math" panose="02040503050406030204" pitchFamily="18" charset="0"/>
-                              <a:ea typeface="Cambria Math" panose="02040503050406030204" pitchFamily="18" charset="0"/>
-                            </a:rPr>
-                            <m:t>𝑎𝑛𝑑𝑟𝑜𝑖𝑑</m:t>
-                          </m:r>
-                        </m:sub>
-                      </m:sSub>
+                        <m:sup>
+                          <m:sSup>
+                            <m:sSupPr>
+                              <m:ctrlPr>
+                                <a:rPr lang="en-GB" sz="1400" i="1">
+                                  <a:solidFill>
+                                    <a:schemeClr val="accent1">
+                                      <a:lumMod val="75000"/>
+                                    </a:schemeClr>
+                                  </a:solidFill>
+                                  <a:latin typeface="Cambria Math" panose="02040503050406030204" pitchFamily="18" charset="0"/>
+                                  <a:ea typeface="Cambria Math" panose="02040503050406030204" pitchFamily="18" charset="0"/>
+                                </a:rPr>
+                              </m:ctrlPr>
+                            </m:sSupPr>
+                            <m:e>
+                              <m:r>
+                                <a:rPr lang="en-US" sz="1400" i="1">
+                                  <a:solidFill>
+                                    <a:schemeClr val="accent1">
+                                      <a:lumMod val="75000"/>
+                                    </a:schemeClr>
+                                  </a:solidFill>
+                                  <a:latin typeface="Cambria Math" panose="02040503050406030204" pitchFamily="18" charset="0"/>
+                                  <a:ea typeface="Cambria Math" panose="02040503050406030204" pitchFamily="18" charset="0"/>
+                                </a:rPr>
+                                <m:t>𝑛</m:t>
+                              </m:r>
+                            </m:e>
+                            <m:sup>
+                              <m:r>
+                                <a:rPr lang="en-US" sz="1400" i="1">
+                                  <a:solidFill>
+                                    <a:schemeClr val="accent1">
+                                      <a:lumMod val="75000"/>
+                                    </a:schemeClr>
+                                  </a:solidFill>
+                                  <a:latin typeface="Cambria Math" panose="02040503050406030204" pitchFamily="18" charset="0"/>
+                                  <a:ea typeface="Cambria Math" panose="02040503050406030204" pitchFamily="18" charset="0"/>
+                                </a:rPr>
+                                <m:t>𝑎</m:t>
+                              </m:r>
+                              <m:r>
+                                <a:rPr lang="en-US" sz="1400" b="0" i="1" smtClean="0">
+                                  <a:solidFill>
+                                    <a:schemeClr val="accent1">
+                                      <a:lumMod val="75000"/>
+                                    </a:schemeClr>
+                                  </a:solidFill>
+                                  <a:latin typeface="Cambria Math" panose="02040503050406030204" pitchFamily="18" charset="0"/>
+                                  <a:ea typeface="Cambria Math" panose="02040503050406030204" pitchFamily="18" charset="0"/>
+                                </a:rPr>
+                                <m:t>𝑛𝑑𝑟𝑜𝑖𝑑</m:t>
+                              </m:r>
+                            </m:sup>
+                          </m:sSup>
+                        </m:sup>
+                      </m:sSup>
                     </m:oMath>
                   </m:oMathPara>
                 </a14:m>
@@ -5980,7 +6005,7 @@
             </p:txBody>
           </p:sp>
         </mc:Choice>
-        <mc:Fallback xmlns="">
+        <mc:Fallback>
           <p:sp>
             <p:nvSpPr>
               <p:cNvPr id="17" name="TextBox 16"/>
@@ -5991,8 +6016,8 @@
             </p:nvSpPr>
             <p:spPr>
               <a:xfrm>
-                <a:off x="7512998" y="5574944"/>
-                <a:ext cx="1873270" cy="954107"/>
+                <a:off x="7675190" y="5520313"/>
+                <a:ext cx="1548886" cy="1008738"/>
               </a:xfrm>
               <a:prstGeom prst="rect">
                 <a:avLst/>
@@ -6000,7 +6025,7 @@
               <a:blipFill rotWithShape="0">
                 <a:blip r:embed="rId8"/>
                 <a:stretch>
-                  <a:fillRect t="-641"/>
+                  <a:fillRect t="-606"/>
                 </a:stretch>
               </a:blipFill>
             </p:spPr>
@@ -6019,8 +6044,8 @@
           </p:sp>
         </mc:Fallback>
       </mc:AlternateContent>
-      <mc:AlternateContent xmlns:mc="http://schemas.openxmlformats.org/markup-compatibility/2006" xmlns:a14="http://schemas.microsoft.com/office/drawing/2010/main">
-        <mc:Choice Requires="a14">
+      <mc:AlternateContent xmlns:mc="http://schemas.openxmlformats.org/markup-compatibility/2006">
+        <mc:Choice xmlns:a14="http://schemas.microsoft.com/office/drawing/2010/main" Requires="a14">
           <p:sp>
             <p:nvSpPr>
               <p:cNvPr id="18" name="TextBox 17"/>
@@ -6029,8 +6054,8 @@
             </p:nvSpPr>
             <p:spPr>
               <a:xfrm>
-                <a:off x="2805532" y="5574944"/>
-                <a:ext cx="1873910" cy="954107"/>
+                <a:off x="2967404" y="5520313"/>
+                <a:ext cx="1550168" cy="1008738"/>
               </a:xfrm>
               <a:prstGeom prst="rect">
                 <a:avLst/>
@@ -6125,73 +6150,10 @@
                       <m:jc m:val="centerGroup"/>
                     </m:oMathParaPr>
                     <m:oMath xmlns:m="http://schemas.openxmlformats.org/officeDocument/2006/math">
-                      <m:sSub>
-                        <m:sSubPr>
+                      <m:sSup>
+                        <m:sSupPr>
                           <m:ctrlPr>
-                            <a:rPr lang="en-GB" sz="1400" i="1" smtClean="0">
-                              <a:solidFill>
-                                <a:schemeClr val="accent1">
-                                  <a:lumMod val="75000"/>
-                                </a:schemeClr>
-                              </a:solidFill>
-                              <a:latin typeface="Cambria Math" panose="02040503050406030204" pitchFamily="18" charset="0"/>
-                            </a:rPr>
-                          </m:ctrlPr>
-                        </m:sSubPr>
-                        <m:e>
-                          <m:r>
-                            <a:rPr lang="en-GB" sz="1400" b="0" i="1" smtClean="0">
-                              <a:solidFill>
-                                <a:schemeClr val="accent1">
-                                  <a:lumMod val="75000"/>
-                                </a:schemeClr>
-                              </a:solidFill>
-                              <a:latin typeface="Cambria Math" panose="02040503050406030204" pitchFamily="18" charset="0"/>
-                            </a:rPr>
-                            <m:t>𝑛</m:t>
-                          </m:r>
-                        </m:e>
-                        <m:sub>
-                          <m:r>
-                            <a:rPr lang="en-US" sz="1400" b="0" i="1" smtClean="0">
-                              <a:solidFill>
-                                <a:schemeClr val="accent1">
-                                  <a:lumMod val="75000"/>
-                                </a:schemeClr>
-                              </a:solidFill>
-                              <a:latin typeface="Cambria Math" panose="02040503050406030204" pitchFamily="18" charset="0"/>
-                            </a:rPr>
-                            <m:t>𝑎𝑟𝑑𝑢𝑖𝑛𝑜</m:t>
-                          </m:r>
-                        </m:sub>
-                      </m:sSub>
-                      <m:r>
-                        <a:rPr lang="en-GB" sz="1400" b="0" i="1" smtClean="0">
-                          <a:solidFill>
-                            <a:schemeClr val="accent1">
-                              <a:lumMod val="75000"/>
-                            </a:schemeClr>
-                          </a:solidFill>
-                          <a:latin typeface="Cambria Math" panose="02040503050406030204" pitchFamily="18" charset="0"/>
-                        </a:rPr>
-                        <m:t> </m:t>
-                      </m:r>
-                      <m:r>
-                        <a:rPr lang="en-GB" sz="1400" b="0" i="1" smtClean="0">
-                          <a:solidFill>
-                            <a:schemeClr val="accent1">
-                              <a:lumMod val="75000"/>
-                            </a:schemeClr>
-                          </a:solidFill>
-                          <a:latin typeface="Cambria Math" panose="02040503050406030204" pitchFamily="18" charset="0"/>
-                          <a:ea typeface="Cambria Math" panose="02040503050406030204" pitchFamily="18" charset="0"/>
-                        </a:rPr>
-                        <m:t>×</m:t>
-                      </m:r>
-                      <m:sSub>
-                        <m:sSubPr>
-                          <m:ctrlPr>
-                            <a:rPr lang="en-GB" sz="1400" b="0" i="1" smtClean="0">
+                            <a:rPr lang="en-GB" sz="1400" i="1">
                               <a:solidFill>
                                 <a:schemeClr val="accent1">
                                   <a:lumMod val="75000"/>
@@ -6201,36 +6163,98 @@
                               <a:ea typeface="Cambria Math" panose="02040503050406030204" pitchFamily="18" charset="0"/>
                             </a:rPr>
                           </m:ctrlPr>
-                        </m:sSubPr>
+                        </m:sSupPr>
                         <m:e>
-                          <m:r>
-                            <a:rPr lang="en-GB" sz="1400" b="0" i="1" smtClean="0">
-                              <a:solidFill>
-                                <a:schemeClr val="accent1">
-                                  <a:lumMod val="75000"/>
-                                </a:schemeClr>
-                              </a:solidFill>
-                              <a:latin typeface="Cambria Math" panose="02040503050406030204" pitchFamily="18" charset="0"/>
-                              <a:ea typeface="Cambria Math" panose="02040503050406030204" pitchFamily="18" charset="0"/>
-                            </a:rPr>
-                            <m:t>𝑃𝑈</m:t>
-                          </m:r>
+                          <m:sSub>
+                            <m:sSubPr>
+                              <m:ctrlPr>
+                                <a:rPr lang="en-GB" sz="1400" i="1" smtClean="0">
+                                  <a:solidFill>
+                                    <a:schemeClr val="accent1">
+                                      <a:lumMod val="75000"/>
+                                    </a:schemeClr>
+                                  </a:solidFill>
+                                  <a:latin typeface="Cambria Math" panose="02040503050406030204" pitchFamily="18" charset="0"/>
+                                  <a:ea typeface="Cambria Math" panose="02040503050406030204" pitchFamily="18" charset="0"/>
+                                </a:rPr>
+                              </m:ctrlPr>
+                            </m:sSubPr>
+                            <m:e>
+                              <m:r>
+                                <a:rPr lang="en-US" sz="1400" b="0" i="1" smtClean="0">
+                                  <a:solidFill>
+                                    <a:schemeClr val="accent1">
+                                      <a:lumMod val="75000"/>
+                                    </a:schemeClr>
+                                  </a:solidFill>
+                                  <a:latin typeface="Cambria Math" panose="02040503050406030204" pitchFamily="18" charset="0"/>
+                                  <a:ea typeface="Cambria Math" panose="02040503050406030204" pitchFamily="18" charset="0"/>
+                                </a:rPr>
+                                <m:t>𝑃𝑈</m:t>
+                              </m:r>
+                            </m:e>
+                            <m:sub>
+                              <m:r>
+                                <a:rPr lang="en-US" sz="1400" b="0" i="1" smtClean="0">
+                                  <a:solidFill>
+                                    <a:schemeClr val="accent1">
+                                      <a:lumMod val="75000"/>
+                                    </a:schemeClr>
+                                  </a:solidFill>
+                                  <a:latin typeface="Cambria Math" panose="02040503050406030204" pitchFamily="18" charset="0"/>
+                                  <a:ea typeface="Cambria Math" panose="02040503050406030204" pitchFamily="18" charset="0"/>
+                                </a:rPr>
+                                <m:t>𝑎𝑛𝑑𝑟𝑜𝑖𝑑</m:t>
+                              </m:r>
+                            </m:sub>
+                          </m:sSub>
                         </m:e>
-                        <m:sub>
-                          <m:r>
-                            <a:rPr lang="en-US" sz="1400" b="0" i="1" smtClean="0">
-                              <a:solidFill>
-                                <a:schemeClr val="accent1">
-                                  <a:lumMod val="75000"/>
-                                </a:schemeClr>
-                              </a:solidFill>
-                              <a:latin typeface="Cambria Math" panose="02040503050406030204" pitchFamily="18" charset="0"/>
-                              <a:ea typeface="Cambria Math" panose="02040503050406030204" pitchFamily="18" charset="0"/>
-                            </a:rPr>
-                            <m:t>𝑎𝑟𝑑𝑢𝑖𝑛𝑜</m:t>
-                          </m:r>
-                        </m:sub>
-                      </m:sSub>
+                        <m:sup>
+                          <m:sSup>
+                            <m:sSupPr>
+                              <m:ctrlPr>
+                                <a:rPr lang="en-GB" sz="1400" i="1">
+                                  <a:solidFill>
+                                    <a:schemeClr val="accent1">
+                                      <a:lumMod val="75000"/>
+                                    </a:schemeClr>
+                                  </a:solidFill>
+                                  <a:latin typeface="Cambria Math" panose="02040503050406030204" pitchFamily="18" charset="0"/>
+                                  <a:ea typeface="Cambria Math" panose="02040503050406030204" pitchFamily="18" charset="0"/>
+                                </a:rPr>
+                              </m:ctrlPr>
+                            </m:sSupPr>
+                            <m:e>
+                              <m:r>
+                                <a:rPr lang="en-US" sz="1400" i="1">
+                                  <a:solidFill>
+                                    <a:schemeClr val="accent1">
+                                      <a:lumMod val="75000"/>
+                                    </a:schemeClr>
+                                  </a:solidFill>
+                                  <a:latin typeface="Cambria Math" panose="02040503050406030204" pitchFamily="18" charset="0"/>
+                                  <a:ea typeface="Cambria Math" panose="02040503050406030204" pitchFamily="18" charset="0"/>
+                                </a:rPr>
+                                <m:t>𝑛</m:t>
+                              </m:r>
+                            </m:e>
+                            <m:sup>
+                              <m:r>
+                                <a:rPr lang="en-US" sz="1400" i="1">
+                                  <a:solidFill>
+                                    <a:schemeClr val="accent1">
+                                      <a:lumMod val="75000"/>
+                                    </a:schemeClr>
+                                  </a:solidFill>
+                                  <a:latin typeface="Cambria Math" panose="02040503050406030204" pitchFamily="18" charset="0"/>
+                                  <a:ea typeface="Cambria Math" panose="02040503050406030204" pitchFamily="18" charset="0"/>
+                                </a:rPr>
+                                <m:t>𝑎𝑟𝑑𝑢𝑖𝑛𝑜</m:t>
+                              </m:r>
+                            </m:sup>
+                          </m:sSup>
+                        </m:sup>
+                      </m:sSup>
                     </m:oMath>
                   </m:oMathPara>
                 </a14:m>
@@ -6245,7 +6269,7 @@
             </p:txBody>
           </p:sp>
         </mc:Choice>
-        <mc:Fallback xmlns="">
+        <mc:Fallback>
           <p:sp>
             <p:nvSpPr>
               <p:cNvPr id="18" name="TextBox 17"/>
@@ -6256,8 +6280,8 @@
             </p:nvSpPr>
             <p:spPr>
               <a:xfrm>
-                <a:off x="2805532" y="5574944"/>
-                <a:ext cx="1873910" cy="954107"/>
+                <a:off x="2967404" y="5520313"/>
+                <a:ext cx="1550168" cy="1008738"/>
               </a:xfrm>
               <a:prstGeom prst="rect">
                 <a:avLst/>
@@ -6265,7 +6289,7 @@
               <a:blipFill rotWithShape="0">
                 <a:blip r:embed="rId9"/>
                 <a:stretch>
-                  <a:fillRect t="-641"/>
+                  <a:fillRect t="-606"/>
                 </a:stretch>
               </a:blipFill>
             </p:spPr>
@@ -6832,7 +6856,7 @@
           <p:cNvPr id="3" name="Rectangle 2">
             <a:extLst>
               <a:ext uri="{FF2B5EF4-FFF2-40B4-BE49-F238E27FC236}">
-                <a16:creationId xmlns="" xmlns:a16="http://schemas.microsoft.com/office/drawing/2014/main" id="{2BE7543D-CCC8-4831-A846-606881F98C72}"/>
+                <a16:creationId xmlns:a16="http://schemas.microsoft.com/office/drawing/2014/main" xmlns="" id="{2BE7543D-CCC8-4831-A846-606881F98C72}"/>
               </a:ext>
             </a:extLst>
           </p:cNvPr>
@@ -6896,7 +6920,7 @@
           <p:cNvPr id="11" name="Rectangle 10">
             <a:extLst>
               <a:ext uri="{FF2B5EF4-FFF2-40B4-BE49-F238E27FC236}">
-                <a16:creationId xmlns="" xmlns:a16="http://schemas.microsoft.com/office/drawing/2014/main" id="{904D0617-3170-4DBA-BE06-1A63276F7156}"/>
+                <a16:creationId xmlns:a16="http://schemas.microsoft.com/office/drawing/2014/main" xmlns="" id="{904D0617-3170-4DBA-BE06-1A63276F7156}"/>
               </a:ext>
             </a:extLst>
           </p:cNvPr>
@@ -6953,7 +6977,7 @@
           <p:cNvPr id="16" name="Rectangle 15">
             <a:extLst>
               <a:ext uri="{FF2B5EF4-FFF2-40B4-BE49-F238E27FC236}">
-                <a16:creationId xmlns="" xmlns:a16="http://schemas.microsoft.com/office/drawing/2014/main" id="{39FE6B16-7C55-4C09-96DE-303A30E47EC7}"/>
+                <a16:creationId xmlns:a16="http://schemas.microsoft.com/office/drawing/2014/main" xmlns="" id="{39FE6B16-7C55-4C09-96DE-303A30E47EC7}"/>
               </a:ext>
             </a:extLst>
           </p:cNvPr>
@@ -7010,7 +7034,7 @@
           <p:cNvPr id="17" name="Rectangle 16">
             <a:extLst>
               <a:ext uri="{FF2B5EF4-FFF2-40B4-BE49-F238E27FC236}">
-                <a16:creationId xmlns="" xmlns:a16="http://schemas.microsoft.com/office/drawing/2014/main" id="{5F575371-9DFD-4915-8768-C90EE57FB26B}"/>
+                <a16:creationId xmlns:a16="http://schemas.microsoft.com/office/drawing/2014/main" xmlns="" id="{5F575371-9DFD-4915-8768-C90EE57FB26B}"/>
               </a:ext>
             </a:extLst>
           </p:cNvPr>
@@ -7067,7 +7091,7 @@
           <p:cNvPr id="21" name="TextBox 20">
             <a:extLst>
               <a:ext uri="{FF2B5EF4-FFF2-40B4-BE49-F238E27FC236}">
-                <a16:creationId xmlns="" xmlns:a16="http://schemas.microsoft.com/office/drawing/2014/main" id="{A4B2A663-4E21-4E52-85D3-648DF4AD88D1}"/>
+                <a16:creationId xmlns:a16="http://schemas.microsoft.com/office/drawing/2014/main" xmlns="" id="{A4B2A663-4E21-4E52-85D3-648DF4AD88D1}"/>
               </a:ext>
             </a:extLst>
           </p:cNvPr>
@@ -7112,7 +7136,7 @@
           <p:cNvPr id="22" name="TextBox 21">
             <a:extLst>
               <a:ext uri="{FF2B5EF4-FFF2-40B4-BE49-F238E27FC236}">
-                <a16:creationId xmlns="" xmlns:a16="http://schemas.microsoft.com/office/drawing/2014/main" id="{6F958FF2-654B-4355-B1D6-41C87C9E460F}"/>
+                <a16:creationId xmlns:a16="http://schemas.microsoft.com/office/drawing/2014/main" xmlns="" id="{6F958FF2-654B-4355-B1D6-41C87C9E460F}"/>
               </a:ext>
             </a:extLst>
           </p:cNvPr>
@@ -7157,7 +7181,7 @@
           <p:cNvPr id="23" name="TextBox 22">
             <a:extLst>
               <a:ext uri="{FF2B5EF4-FFF2-40B4-BE49-F238E27FC236}">
-                <a16:creationId xmlns="" xmlns:a16="http://schemas.microsoft.com/office/drawing/2014/main" id="{F49638AE-1F8C-4D3E-88B6-1599715BDC0C}"/>
+                <a16:creationId xmlns:a16="http://schemas.microsoft.com/office/drawing/2014/main" xmlns="" id="{F49638AE-1F8C-4D3E-88B6-1599715BDC0C}"/>
               </a:ext>
             </a:extLst>
           </p:cNvPr>
@@ -7202,7 +7226,7 @@
           <p:cNvPr id="29" name="TextBox 28">
             <a:extLst>
               <a:ext uri="{FF2B5EF4-FFF2-40B4-BE49-F238E27FC236}">
-                <a16:creationId xmlns="" xmlns:a16="http://schemas.microsoft.com/office/drawing/2014/main" id="{107FD947-D600-419E-B606-BAE6A5D5D7F6}"/>
+                <a16:creationId xmlns:a16="http://schemas.microsoft.com/office/drawing/2014/main" xmlns="" id="{107FD947-D600-419E-B606-BAE6A5D5D7F6}"/>
               </a:ext>
             </a:extLst>
           </p:cNvPr>
@@ -7247,7 +7271,7 @@
           <p:cNvPr id="34" name="TextBox 33">
             <a:extLst>
               <a:ext uri="{FF2B5EF4-FFF2-40B4-BE49-F238E27FC236}">
-                <a16:creationId xmlns="" xmlns:a16="http://schemas.microsoft.com/office/drawing/2014/main" id="{22931BBA-07C1-4622-8ADE-C9E87C0864D4}"/>
+                <a16:creationId xmlns:a16="http://schemas.microsoft.com/office/drawing/2014/main" xmlns="" id="{22931BBA-07C1-4622-8ADE-C9E87C0864D4}"/>
               </a:ext>
             </a:extLst>
           </p:cNvPr>
@@ -7292,7 +7316,7 @@
           <p:cNvPr id="7" name="Title 1">
             <a:extLst>
               <a:ext uri="{FF2B5EF4-FFF2-40B4-BE49-F238E27FC236}">
-                <a16:creationId xmlns="" xmlns:a16="http://schemas.microsoft.com/office/drawing/2014/main" id="{F3F19207-56E3-41C1-B35F-1C329A479D6C}"/>
+                <a16:creationId xmlns:a16="http://schemas.microsoft.com/office/drawing/2014/main" xmlns="" id="{F3F19207-56E3-41C1-B35F-1C329A479D6C}"/>
               </a:ext>
             </a:extLst>
           </p:cNvPr>
@@ -7348,7 +7372,7 @@
           <p:cNvPr id="8" name="Straight Connector 7">
             <a:extLst>
               <a:ext uri="{FF2B5EF4-FFF2-40B4-BE49-F238E27FC236}">
-                <a16:creationId xmlns="" xmlns:a16="http://schemas.microsoft.com/office/drawing/2014/main" id="{F5AD3098-4B9E-4C8B-910B-1DD3F084C040}"/>
+                <a16:creationId xmlns:a16="http://schemas.microsoft.com/office/drawing/2014/main" xmlns="" id="{F5AD3098-4B9E-4C8B-910B-1DD3F084C040}"/>
               </a:ext>
             </a:extLst>
           </p:cNvPr>
@@ -7718,7 +7742,7 @@
           <p:cNvPr id="7" name="Title 1">
             <a:extLst>
               <a:ext uri="{FF2B5EF4-FFF2-40B4-BE49-F238E27FC236}">
-                <a16:creationId xmlns="" xmlns:a16="http://schemas.microsoft.com/office/drawing/2014/main" id="{F3F19207-56E3-41C1-B35F-1C329A479D6C}"/>
+                <a16:creationId xmlns:a16="http://schemas.microsoft.com/office/drawing/2014/main" xmlns="" id="{F3F19207-56E3-41C1-B35F-1C329A479D6C}"/>
               </a:ext>
             </a:extLst>
           </p:cNvPr>
@@ -7774,7 +7798,7 @@
           <p:cNvPr id="8" name="Straight Connector 7">
             <a:extLst>
               <a:ext uri="{FF2B5EF4-FFF2-40B4-BE49-F238E27FC236}">
-                <a16:creationId xmlns="" xmlns:a16="http://schemas.microsoft.com/office/drawing/2014/main" id="{F5AD3098-4B9E-4C8B-910B-1DD3F084C040}"/>
+                <a16:creationId xmlns:a16="http://schemas.microsoft.com/office/drawing/2014/main" xmlns="" id="{F5AD3098-4B9E-4C8B-910B-1DD3F084C040}"/>
               </a:ext>
             </a:extLst>
           </p:cNvPr>
@@ -8085,215 +8109,131 @@
           </a:p>
         </p:txBody>
       </p:sp>
-      <mc:AlternateContent xmlns:mc="http://schemas.openxmlformats.org/markup-compatibility/2006" xmlns:a14="http://schemas.microsoft.com/office/drawing/2010/main">
-        <mc:Choice Requires="a14">
-          <p:sp>
-            <p:nvSpPr>
-              <p:cNvPr id="32" name="TextBox 31"/>
-              <p:cNvSpPr txBox="1"/>
-              <p:nvPr/>
-            </p:nvSpPr>
-            <p:spPr>
-              <a:xfrm>
-                <a:off x="1866060" y="4567112"/>
-                <a:ext cx="1555362" cy="961032"/>
-              </a:xfrm>
-              <a:prstGeom prst="rect">
-                <a:avLst/>
-              </a:prstGeom>
-              <a:noFill/>
-            </p:spPr>
-            <p:txBody>
-              <a:bodyPr wrap="none" rtlCol="0" anchor="b">
-                <a:spAutoFit/>
-              </a:bodyPr>
-              <a:lstStyle/>
-              <a:p>
-                <a:pPr algn="ctr"/>
-                <a:r>
-                  <a:rPr lang="en-GB" sz="1400" b="1" smtClean="0">
-                    <a:solidFill>
-                      <a:schemeClr val="accent1">
-                        <a:lumMod val="75000"/>
-                      </a:schemeClr>
-                    </a:solidFill>
-                  </a:rPr>
-                  <a:t>Symmetric key</a:t>
-                </a:r>
-              </a:p>
-              <a:p>
-                <a:pPr algn="ctr"/>
-                <a:r>
-                  <a:rPr lang="en-GB" sz="1400" i="1" smtClean="0">
-                    <a:solidFill>
-                      <a:schemeClr val="accent1">
-                        <a:lumMod val="75000"/>
-                      </a:schemeClr>
-                    </a:solidFill>
-                    <a:latin typeface="Cambria Math" panose="02040503050406030204" pitchFamily="18" charset="0"/>
-                  </a:rPr>
-                  <a:t>K</a:t>
-                </a:r>
-              </a:p>
-              <a:p>
-                <a:pPr algn="ctr"/>
-                <a:r>
-                  <a:rPr lang="en-GB" sz="1400" i="1" smtClean="0">
-                    <a:solidFill>
-                      <a:schemeClr val="accent1">
-                        <a:lumMod val="75000"/>
-                      </a:schemeClr>
-                    </a:solidFill>
-                    <a:latin typeface="Cambria Math" panose="02040503050406030204" pitchFamily="18" charset="0"/>
-                  </a:rPr>
-                  <a:t>=</a:t>
-                </a:r>
-              </a:p>
-              <a:p>
-                <a:pPr algn="ctr"/>
-                <a14:m>
-                  <m:oMathPara xmlns:m="http://schemas.openxmlformats.org/officeDocument/2006/math">
-                    <m:oMathParaPr>
-                      <m:jc m:val="centerGroup"/>
-                    </m:oMathParaPr>
-                    <m:oMath xmlns:m="http://schemas.openxmlformats.org/officeDocument/2006/math">
-                      <m:sSup>
-                        <m:sSupPr>
-                          <m:ctrlPr>
-                            <a:rPr lang="en-GB" sz="1400" i="1">
-                              <a:solidFill>
-                                <a:schemeClr val="accent1">
-                                  <a:lumMod val="75000"/>
-                                </a:schemeClr>
-                              </a:solidFill>
-                              <a:latin typeface="Cambria Math" panose="02040503050406030204" pitchFamily="18" charset="0"/>
-                            </a:rPr>
-                          </m:ctrlPr>
-                        </m:sSupPr>
-                        <m:e>
-                          <m:r>
-                            <a:rPr lang="en-US" sz="1400" i="1">
-                              <a:solidFill>
-                                <a:schemeClr val="accent1">
-                                  <a:lumMod val="75000"/>
-                                </a:schemeClr>
-                              </a:solidFill>
-                              <a:latin typeface="Cambria Math" panose="02040503050406030204" pitchFamily="18" charset="0"/>
-                            </a:rPr>
-                            <m:t>𝐺</m:t>
-                          </m:r>
-                        </m:e>
-                        <m:sup>
-                          <m:r>
-                            <a:rPr lang="en-US" sz="1400" i="1">
-                              <a:solidFill>
-                                <a:schemeClr val="accent1">
-                                  <a:lumMod val="75000"/>
-                                </a:schemeClr>
-                              </a:solidFill>
-                              <a:latin typeface="Cambria Math" panose="02040503050406030204" pitchFamily="18" charset="0"/>
-                            </a:rPr>
-                            <m:t>𝑎𝑟𝑑𝑢𝑖𝑛𝑜</m:t>
-                          </m:r>
-                          <m:r>
-                            <a:rPr lang="en-US" sz="1400" b="0" i="1" smtClean="0">
-                              <a:solidFill>
-                                <a:schemeClr val="accent1">
-                                  <a:lumMod val="75000"/>
-                                </a:schemeClr>
-                              </a:solidFill>
-                              <a:latin typeface="Cambria Math" panose="02040503050406030204" pitchFamily="18" charset="0"/>
-                            </a:rPr>
-                            <m:t> </m:t>
-                          </m:r>
-                          <m:r>
-                            <a:rPr lang="en-US" sz="1400" b="0" i="1" smtClean="0">
-                              <a:solidFill>
-                                <a:schemeClr val="accent1">
-                                  <a:lumMod val="75000"/>
-                                </a:schemeClr>
-                              </a:solidFill>
-                              <a:latin typeface="Cambria Math" panose="02040503050406030204" pitchFamily="18" charset="0"/>
-                            </a:rPr>
-                            <m:t>𝑥</m:t>
-                          </m:r>
-                          <m:r>
-                            <a:rPr lang="en-US" sz="1400" b="0" i="1" smtClean="0">
-                              <a:solidFill>
-                                <a:schemeClr val="accent1">
-                                  <a:lumMod val="75000"/>
-                                </a:schemeClr>
-                              </a:solidFill>
-                              <a:latin typeface="Cambria Math" panose="02040503050406030204" pitchFamily="18" charset="0"/>
-                            </a:rPr>
-                            <m:t> </m:t>
-                          </m:r>
-                          <m:r>
-                            <a:rPr lang="en-US" sz="1400" b="0" i="1" smtClean="0">
-                              <a:solidFill>
-                                <a:schemeClr val="accent1">
-                                  <a:lumMod val="75000"/>
-                                </a:schemeClr>
-                              </a:solidFill>
-                              <a:latin typeface="Cambria Math" panose="02040503050406030204" pitchFamily="18" charset="0"/>
-                            </a:rPr>
-                            <m:t>𝑎𝑛𝑑𝑟𝑜𝑖𝑑</m:t>
-                          </m:r>
-                        </m:sup>
-                      </m:sSup>
-                    </m:oMath>
-                  </m:oMathPara>
-                </a14:m>
-                <a:endParaRPr lang="hr-HR" sz="1400">
-                  <a:solidFill>
-                    <a:schemeClr val="accent1">
-                      <a:lumMod val="75000"/>
-                    </a:schemeClr>
-                  </a:solidFill>
-                </a:endParaRPr>
-              </a:p>
-            </p:txBody>
-          </p:sp>
-        </mc:Choice>
-        <mc:Fallback xmlns="">
-          <p:sp>
-            <p:nvSpPr>
-              <p:cNvPr id="32" name="TextBox 31"/>
-              <p:cNvSpPr txBox="1">
-                <a:spLocks noRot="1" noChangeAspect="1" noMove="1" noResize="1" noEditPoints="1" noAdjustHandles="1" noChangeArrowheads="1" noChangeShapeType="1" noTextEdit="1"/>
-              </p:cNvSpPr>
-              <p:nvPr/>
-            </p:nvSpPr>
-            <p:spPr>
-              <a:xfrm>
-                <a:off x="1866060" y="4567112"/>
-                <a:ext cx="1555362" cy="961032"/>
-              </a:xfrm>
-              <a:prstGeom prst="rect">
-                <a:avLst/>
-              </a:prstGeom>
-              <a:blipFill rotWithShape="0">
-                <a:blip r:embed="rId4"/>
-                <a:stretch>
-                  <a:fillRect/>
-                </a:stretch>
-              </a:blipFill>
-            </p:spPr>
-            <p:txBody>
-              <a:bodyPr/>
-              <a:lstStyle/>
-              <a:p>
-                <a:r>
-                  <a:rPr lang="hr-HR">
-                    <a:noFill/>
-                  </a:rPr>
-                  <a:t> </a:t>
-                </a:r>
-              </a:p>
-            </p:txBody>
-          </p:sp>
-        </mc:Fallback>
-      </mc:AlternateContent>
+      <p:sp>
+        <p:nvSpPr>
+          <p:cNvPr id="32" name="TextBox 31"/>
+          <p:cNvSpPr txBox="1"/>
+          <p:nvPr/>
+        </p:nvSpPr>
+        <p:spPr>
+          <a:xfrm>
+            <a:off x="1972792" y="4574037"/>
+            <a:ext cx="1341907" cy="954107"/>
+          </a:xfrm>
+          <a:prstGeom prst="rect">
+            <a:avLst/>
+          </a:prstGeom>
+          <a:noFill/>
+        </p:spPr>
+        <p:txBody>
+          <a:bodyPr wrap="none" rtlCol="0" anchor="b">
+            <a:spAutoFit/>
+          </a:bodyPr>
+          <a:lstStyle/>
+          <a:p>
+            <a:pPr algn="ctr"/>
+            <a:r>
+              <a:rPr lang="en-GB" sz="1400" b="1" smtClean="0">
+                <a:solidFill>
+                  <a:schemeClr val="accent1">
+                    <a:lumMod val="75000"/>
+                  </a:schemeClr>
+                </a:solidFill>
+              </a:rPr>
+              <a:t>Symmetric key</a:t>
+            </a:r>
+          </a:p>
+          <a:p>
+            <a:pPr algn="ctr"/>
+            <a:r>
+              <a:rPr lang="en-GB" sz="1400" i="1" smtClean="0">
+                <a:solidFill>
+                  <a:schemeClr val="accent1">
+                    <a:lumMod val="75000"/>
+                  </a:schemeClr>
+                </a:solidFill>
+                <a:latin typeface="Cambria Math" panose="02040503050406030204" pitchFamily="18" charset="0"/>
+              </a:rPr>
+              <a:t>K</a:t>
+            </a:r>
+            <a:r>
+              <a:rPr lang="en-US" sz="1400">
+                <a:solidFill>
+                  <a:schemeClr val="accent1">
+                    <a:lumMod val="75000"/>
+                  </a:schemeClr>
+                </a:solidFill>
+              </a:rPr>
+              <a:t> </a:t>
+            </a:r>
+            <a:endParaRPr lang="en-US" sz="1400" smtClean="0">
+              <a:solidFill>
+                <a:schemeClr val="accent1">
+                  <a:lumMod val="75000"/>
+                </a:schemeClr>
+              </a:solidFill>
+            </a:endParaRPr>
+          </a:p>
+          <a:p>
+            <a:pPr algn="ctr"/>
+            <a:r>
+              <a:rPr lang="en-US" sz="1400" i="1">
+                <a:solidFill>
+                  <a:schemeClr val="accent1">
+                    <a:lumMod val="75000"/>
+                  </a:schemeClr>
+                </a:solidFill>
+                <a:latin typeface="Cambria Math" panose="02040503050406030204" pitchFamily="18" charset="0"/>
+              </a:rPr>
+              <a:t>i</a:t>
+            </a:r>
+            <a:r>
+              <a:rPr lang="en-US" sz="1400" i="1" smtClean="0">
+                <a:solidFill>
+                  <a:schemeClr val="accent1">
+                    <a:lumMod val="75000"/>
+                  </a:schemeClr>
+                </a:solidFill>
+                <a:latin typeface="Cambria Math" panose="02040503050406030204" pitchFamily="18" charset="0"/>
+              </a:rPr>
+              <a:t>s derived from</a:t>
+            </a:r>
+          </a:p>
+          <a:p>
+            <a:pPr algn="ctr"/>
+            <a:r>
+              <a:rPr lang="en-US" sz="1400" i="1">
+                <a:solidFill>
+                  <a:schemeClr val="accent1">
+                    <a:lumMod val="75000"/>
+                  </a:schemeClr>
+                </a:solidFill>
+                <a:latin typeface="Cambria Math" panose="02040503050406030204" pitchFamily="18" charset="0"/>
+              </a:rPr>
+              <a:t>s</a:t>
+            </a:r>
+            <a:r>
+              <a:rPr lang="en-US" sz="1400" i="1" smtClean="0">
+                <a:solidFill>
+                  <a:schemeClr val="accent1">
+                    <a:lumMod val="75000"/>
+                  </a:schemeClr>
+                </a:solidFill>
+                <a:latin typeface="Cambria Math" panose="02040503050406030204" pitchFamily="18" charset="0"/>
+              </a:rPr>
+              <a:t>hared secret</a:t>
+            </a:r>
+            <a:endParaRPr lang="en-GB" sz="1400" i="1" smtClean="0">
+              <a:solidFill>
+                <a:schemeClr val="accent1">
+                  <a:lumMod val="75000"/>
+                </a:schemeClr>
+              </a:solidFill>
+              <a:latin typeface="Cambria Math" panose="02040503050406030204" pitchFamily="18" charset="0"/>
+            </a:endParaRPr>
+          </a:p>
+        </p:txBody>
+      </p:sp>
       <p:sp>
         <p:nvSpPr>
           <p:cNvPr id="41" name="Rectangle 40"/>
@@ -8418,8 +8358,8 @@
           </a:fontRef>
         </p:style>
       </p:cxnSp>
-      <mc:AlternateContent xmlns:mc="http://schemas.openxmlformats.org/markup-compatibility/2006" xmlns:a14="http://schemas.microsoft.com/office/drawing/2010/main">
-        <mc:Choice Requires="a14">
+      <mc:AlternateContent xmlns:mc="http://schemas.openxmlformats.org/markup-compatibility/2006">
+        <mc:Choice xmlns:a14="http://schemas.microsoft.com/office/drawing/2010/main" Requires="a14">
           <p:sp>
             <p:nvSpPr>
               <p:cNvPr id="46" name="TextBox 45"/>
@@ -8428,8 +8368,8 @@
             </p:nvSpPr>
             <p:spPr>
               <a:xfrm>
-                <a:off x="4283334" y="4577406"/>
-                <a:ext cx="3692870" cy="378245"/>
+                <a:off x="4106715" y="4596730"/>
+                <a:ext cx="4046108" cy="369332"/>
               </a:xfrm>
               <a:prstGeom prst="rect">
                 <a:avLst/>
@@ -8442,15 +8382,14 @@
               </a:bodyPr>
               <a:lstStyle/>
               <a:p>
-                <a:pPr/>
                 <a14:m>
                   <m:oMathPara xmlns:m="http://schemas.openxmlformats.org/officeDocument/2006/math">
                     <m:oMathParaPr>
                       <m:jc m:val="centerGroup"/>
                     </m:oMathParaPr>
                     <m:oMath xmlns:m="http://schemas.openxmlformats.org/officeDocument/2006/math">
-                      <m:sSup>
-                        <m:sSupPr>
+                      <m:sSub>
+                        <m:sSubPr>
                           <m:ctrlPr>
                             <a:rPr lang="en-GB" i="1" smtClean="0">
                               <a:solidFill>
@@ -8461,10 +8400,10 @@
                               <a:latin typeface="Cambria Math" panose="02040503050406030204" pitchFamily="18" charset="0"/>
                             </a:rPr>
                           </m:ctrlPr>
-                        </m:sSupPr>
+                        </m:sSubPr>
                         <m:e>
                           <m:r>
-                            <a:rPr lang="en-US" i="1">
+                            <a:rPr lang="en-GB" i="1">
                               <a:solidFill>
                                 <a:schemeClr val="accent1">
                                   <a:lumMod val="75000"/>
@@ -8472,12 +8411,12 @@
                               </a:solidFill>
                               <a:latin typeface="Cambria Math" panose="02040503050406030204" pitchFamily="18" charset="0"/>
                             </a:rPr>
-                            <m:t>𝐺</m:t>
+                            <m:t>𝑃𝑈</m:t>
                           </m:r>
                         </m:e>
-                        <m:sup>
+                        <m:sub>
                           <m:r>
-                            <a:rPr lang="en-US" i="1">
+                            <a:rPr lang="en-GB" i="1" smtClean="0">
                               <a:solidFill>
                                 <a:schemeClr val="accent1">
                                   <a:lumMod val="75000"/>
@@ -8498,8 +8437,8 @@
                             </a:rPr>
                             <m:t>𝑛𝑑𝑟𝑜𝑖𝑑</m:t>
                           </m:r>
-                        </m:sup>
-                      </m:sSup>
+                        </m:sub>
+                      </m:sSub>
                       <m:r>
                         <a:rPr lang="en-US" b="0" i="1" smtClean="0">
                           <a:solidFill>
@@ -8547,8 +8486,8 @@
                             </a:rPr>
                             <m:t>(</m:t>
                           </m:r>
-                          <m:sSup>
-                            <m:sSupPr>
+                          <m:sSub>
+                            <m:sSubPr>
                               <m:ctrlPr>
                                 <a:rPr lang="en-GB" i="1">
                                   <a:solidFill>
@@ -8559,10 +8498,10 @@
                                   <a:latin typeface="Cambria Math" panose="02040503050406030204" pitchFamily="18" charset="0"/>
                                 </a:rPr>
                               </m:ctrlPr>
-                            </m:sSupPr>
+                            </m:sSubPr>
                             <m:e>
                               <m:r>
-                                <a:rPr lang="en-US" i="1">
+                                <a:rPr lang="en-GB" i="1">
                                   <a:solidFill>
                                     <a:schemeClr val="accent1">
                                       <a:lumMod val="75000"/>
@@ -8570,12 +8509,12 @@
                                   </a:solidFill>
                                   <a:latin typeface="Cambria Math" panose="02040503050406030204" pitchFamily="18" charset="0"/>
                                 </a:rPr>
-                                <m:t>𝐺</m:t>
+                                <m:t>𝑃𝑈</m:t>
                               </m:r>
                             </m:e>
-                            <m:sup>
+                            <m:sub>
                               <m:r>
-                                <a:rPr lang="en-US" i="1">
+                                <a:rPr lang="en-GB" i="1">
                                   <a:solidFill>
                                     <a:schemeClr val="accent1">
                                       <a:lumMod val="75000"/>
@@ -8583,10 +8522,21 @@
                                   </a:solidFill>
                                   <a:latin typeface="Cambria Math" panose="02040503050406030204" pitchFamily="18" charset="0"/>
                                 </a:rPr>
-                                <m:t>𝑎𝑛𝑑𝑟𝑜𝑖𝑑</m:t>
+                                <m:t>𝑎</m:t>
                               </m:r>
-                            </m:sup>
-                          </m:sSup>
+                              <m:r>
+                                <a:rPr lang="en-US" b="0" i="1" smtClean="0">
+                                  <a:solidFill>
+                                    <a:schemeClr val="accent1">
+                                      <a:lumMod val="75000"/>
+                                    </a:schemeClr>
+                                  </a:solidFill>
+                                  <a:latin typeface="Cambria Math" panose="02040503050406030204" pitchFamily="18" charset="0"/>
+                                </a:rPr>
+                                <m:t>𝑟𝑑𝑢𝑖𝑛𝑜</m:t>
+                              </m:r>
+                            </m:sub>
+                          </m:sSub>
                           <m:r>
                             <a:rPr lang="en-US" b="0" i="1" smtClean="0">
                               <a:solidFill>
@@ -8598,8 +8548,8 @@
                             </a:rPr>
                             <m:t>,</m:t>
                           </m:r>
-                          <m:sSup>
-                            <m:sSupPr>
+                          <m:sSub>
+                            <m:sSubPr>
                               <m:ctrlPr>
                                 <a:rPr lang="en-GB" i="1">
                                   <a:solidFill>
@@ -8610,8 +8560,32 @@
                                   <a:latin typeface="Cambria Math" panose="02040503050406030204" pitchFamily="18" charset="0"/>
                                 </a:rPr>
                               </m:ctrlPr>
-                            </m:sSupPr>
+                            </m:sSubPr>
                             <m:e>
+                              <m:r>
+                                <a:rPr lang="en-GB" i="1">
+                                  <a:solidFill>
+                                    <a:schemeClr val="accent1">
+                                      <a:lumMod val="75000"/>
+                                    </a:schemeClr>
+                                  </a:solidFill>
+                                  <a:latin typeface="Cambria Math" panose="02040503050406030204" pitchFamily="18" charset="0"/>
+                                </a:rPr>
+                                <m:t>𝑃𝑈</m:t>
+                              </m:r>
+                            </m:e>
+                            <m:sub>
+                              <m:r>
+                                <a:rPr lang="en-GB" i="1">
+                                  <a:solidFill>
+                                    <a:schemeClr val="accent1">
+                                      <a:lumMod val="75000"/>
+                                    </a:schemeClr>
+                                  </a:solidFill>
+                                  <a:latin typeface="Cambria Math" panose="02040503050406030204" pitchFamily="18" charset="0"/>
+                                </a:rPr>
+                                <m:t>𝑎</m:t>
+                              </m:r>
                               <m:r>
                                 <a:rPr lang="en-US" i="1">
                                   <a:solidFill>
@@ -8621,23 +8595,10 @@
                                   </a:solidFill>
                                   <a:latin typeface="Cambria Math" panose="02040503050406030204" pitchFamily="18" charset="0"/>
                                 </a:rPr>
-                                <m:t>𝐺</m:t>
+                                <m:t>𝑛𝑑𝑟𝑜𝑖𝑑</m:t>
                               </m:r>
-                            </m:e>
-                            <m:sup>
-                              <m:r>
-                                <a:rPr lang="en-US" i="1">
-                                  <a:solidFill>
-                                    <a:schemeClr val="accent1">
-                                      <a:lumMod val="75000"/>
-                                    </a:schemeClr>
-                                  </a:solidFill>
-                                  <a:latin typeface="Cambria Math" panose="02040503050406030204" pitchFamily="18" charset="0"/>
-                                </a:rPr>
-                                <m:t>𝑎𝑟𝑑𝑢𝑖𝑛𝑜</m:t>
-                              </m:r>
-                            </m:sup>
-                          </m:sSup>
+                            </m:sub>
+                          </m:sSub>
                           <m:r>
                             <a:rPr lang="en-US" b="0" i="1" smtClean="0">
                               <a:solidFill>
@@ -8678,7 +8639,7 @@
             </p:txBody>
           </p:sp>
         </mc:Choice>
-        <mc:Fallback xmlns="">
+        <mc:Fallback>
           <p:sp>
             <p:nvSpPr>
               <p:cNvPr id="46" name="TextBox 45"/>
@@ -8689,16 +8650,16 @@
             </p:nvSpPr>
             <p:spPr>
               <a:xfrm>
-                <a:off x="4283334" y="4577406"/>
-                <a:ext cx="3692870" cy="378245"/>
+                <a:off x="4106715" y="4596730"/>
+                <a:ext cx="4046108" cy="369332"/>
               </a:xfrm>
               <a:prstGeom prst="rect">
                 <a:avLst/>
               </a:prstGeom>
               <a:blipFill rotWithShape="0">
-                <a:blip r:embed="rId5"/>
+                <a:blip r:embed="rId4"/>
                 <a:stretch>
-                  <a:fillRect b="-12903"/>
+                  <a:fillRect b="-13115"/>
                 </a:stretch>
               </a:blipFill>
             </p:spPr>
@@ -8717,8 +8678,8 @@
           </p:sp>
         </mc:Fallback>
       </mc:AlternateContent>
-      <mc:AlternateContent xmlns:mc="http://schemas.openxmlformats.org/markup-compatibility/2006" xmlns:a14="http://schemas.microsoft.com/office/drawing/2010/main">
-        <mc:Choice Requires="a14">
+      <mc:AlternateContent xmlns:mc="http://schemas.openxmlformats.org/markup-compatibility/2006">
+        <mc:Choice xmlns:a14="http://schemas.microsoft.com/office/drawing/2010/main" Requires="a14">
           <p:sp>
             <p:nvSpPr>
               <p:cNvPr id="47" name="TextBox 46"/>
@@ -8728,7 +8689,7 @@
             <p:spPr>
               <a:xfrm>
                 <a:off x="5520885" y="3656899"/>
-                <a:ext cx="1090491" cy="378245"/>
+                <a:ext cx="1217769" cy="369332"/>
               </a:xfrm>
               <a:prstGeom prst="rect">
                 <a:avLst/>
@@ -8748,10 +8709,10 @@
                       <m:jc m:val="centerGroup"/>
                     </m:oMathParaPr>
                     <m:oMath xmlns:m="http://schemas.openxmlformats.org/officeDocument/2006/math">
-                      <m:sSup>
-                        <m:sSupPr>
+                      <m:sSub>
+                        <m:sSubPr>
                           <m:ctrlPr>
-                            <a:rPr lang="en-GB" i="1" smtClean="0">
+                            <a:rPr lang="en-GB" i="1">
                               <a:solidFill>
                                 <a:schemeClr val="accent1">
                                   <a:lumMod val="75000"/>
@@ -8760,10 +8721,10 @@
                               <a:latin typeface="Cambria Math" panose="02040503050406030204" pitchFamily="18" charset="0"/>
                             </a:rPr>
                           </m:ctrlPr>
-                        </m:sSupPr>
+                        </m:sSubPr>
                         <m:e>
                           <m:r>
-                            <a:rPr lang="en-US" b="0" i="1" smtClean="0">
+                            <a:rPr lang="en-GB" i="1">
                               <a:solidFill>
                                 <a:schemeClr val="accent1">
                                   <a:lumMod val="75000"/>
@@ -8771,12 +8732,12 @@
                               </a:solidFill>
                               <a:latin typeface="Cambria Math" panose="02040503050406030204" pitchFamily="18" charset="0"/>
                             </a:rPr>
-                            <m:t>𝐺</m:t>
+                            <m:t>𝑃𝑈</m:t>
                           </m:r>
                         </m:e>
-                        <m:sup>
+                        <m:sub>
                           <m:r>
-                            <a:rPr lang="en-US" b="0" i="1" smtClean="0">
+                            <a:rPr lang="en-GB" i="1">
                               <a:solidFill>
                                 <a:schemeClr val="accent1">
                                   <a:lumMod val="75000"/>
@@ -8786,8 +8747,8 @@
                             </a:rPr>
                             <m:t>𝑎𝑟𝑑𝑢𝑖𝑛𝑜</m:t>
                           </m:r>
-                        </m:sup>
-                      </m:sSup>
+                        </m:sub>
+                      </m:sSub>
                     </m:oMath>
                   </m:oMathPara>
                 </a14:m>
@@ -8802,7 +8763,7 @@
             </p:txBody>
           </p:sp>
         </mc:Choice>
-        <mc:Fallback xmlns="">
+        <mc:Fallback>
           <p:sp>
             <p:nvSpPr>
               <p:cNvPr id="47" name="TextBox 46"/>
@@ -8814,15 +8775,15 @@
             <p:spPr>
               <a:xfrm>
                 <a:off x="5520885" y="3656899"/>
-                <a:ext cx="1090491" cy="378245"/>
+                <a:ext cx="1217769" cy="369332"/>
               </a:xfrm>
               <a:prstGeom prst="rect">
                 <a:avLst/>
               </a:prstGeom>
               <a:blipFill rotWithShape="0">
-                <a:blip r:embed="rId6"/>
+                <a:blip r:embed="rId5"/>
                 <a:stretch>
-                  <a:fillRect/>
+                  <a:fillRect b="-1667"/>
                 </a:stretch>
               </a:blipFill>
             </p:spPr>
@@ -8841,215 +8802,102 @@
           </p:sp>
         </mc:Fallback>
       </mc:AlternateContent>
-      <mc:AlternateContent xmlns:mc="http://schemas.openxmlformats.org/markup-compatibility/2006" xmlns:a14="http://schemas.microsoft.com/office/drawing/2010/main">
-        <mc:Choice Requires="a14">
-          <p:sp>
-            <p:nvSpPr>
-              <p:cNvPr id="51" name="TextBox 50"/>
-              <p:cNvSpPr txBox="1"/>
-              <p:nvPr/>
-            </p:nvSpPr>
-            <p:spPr>
-              <a:xfrm>
-                <a:off x="8740251" y="4567112"/>
-                <a:ext cx="1555362" cy="961032"/>
-              </a:xfrm>
-              <a:prstGeom prst="rect">
-                <a:avLst/>
-              </a:prstGeom>
-              <a:noFill/>
-            </p:spPr>
-            <p:txBody>
-              <a:bodyPr wrap="none" rtlCol="0" anchor="b">
-                <a:spAutoFit/>
-              </a:bodyPr>
-              <a:lstStyle/>
-              <a:p>
-                <a:pPr algn="ctr"/>
-                <a:r>
-                  <a:rPr lang="en-GB" sz="1400" b="1" smtClean="0">
-                    <a:solidFill>
-                      <a:schemeClr val="accent1">
-                        <a:lumMod val="75000"/>
-                      </a:schemeClr>
-                    </a:solidFill>
-                  </a:rPr>
-                  <a:t>Symmetric key</a:t>
-                </a:r>
-              </a:p>
-              <a:p>
-                <a:pPr algn="ctr"/>
-                <a:r>
-                  <a:rPr lang="en-GB" sz="1400" i="1" smtClean="0">
-                    <a:solidFill>
-                      <a:schemeClr val="accent1">
-                        <a:lumMod val="75000"/>
-                      </a:schemeClr>
-                    </a:solidFill>
-                    <a:latin typeface="Cambria Math" panose="02040503050406030204" pitchFamily="18" charset="0"/>
-                  </a:rPr>
-                  <a:t>K</a:t>
-                </a:r>
-              </a:p>
-              <a:p>
-                <a:pPr algn="ctr"/>
-                <a:r>
-                  <a:rPr lang="en-GB" sz="1400" i="1" smtClean="0">
-                    <a:solidFill>
-                      <a:schemeClr val="accent1">
-                        <a:lumMod val="75000"/>
-                      </a:schemeClr>
-                    </a:solidFill>
-                    <a:latin typeface="Cambria Math" panose="02040503050406030204" pitchFamily="18" charset="0"/>
-                  </a:rPr>
-                  <a:t>=</a:t>
-                </a:r>
-              </a:p>
-              <a:p>
-                <a:pPr algn="ctr"/>
-                <a14:m>
-                  <m:oMathPara xmlns:m="http://schemas.openxmlformats.org/officeDocument/2006/math">
-                    <m:oMathParaPr>
-                      <m:jc m:val="centerGroup"/>
-                    </m:oMathParaPr>
-                    <m:oMath xmlns:m="http://schemas.openxmlformats.org/officeDocument/2006/math">
-                      <m:sSup>
-                        <m:sSupPr>
-                          <m:ctrlPr>
-                            <a:rPr lang="en-GB" sz="1400" i="1">
-                              <a:solidFill>
-                                <a:schemeClr val="accent1">
-                                  <a:lumMod val="75000"/>
-                                </a:schemeClr>
-                              </a:solidFill>
-                              <a:latin typeface="Cambria Math" panose="02040503050406030204" pitchFamily="18" charset="0"/>
-                            </a:rPr>
-                          </m:ctrlPr>
-                        </m:sSupPr>
-                        <m:e>
-                          <m:r>
-                            <a:rPr lang="en-US" sz="1400" i="1">
-                              <a:solidFill>
-                                <a:schemeClr val="accent1">
-                                  <a:lumMod val="75000"/>
-                                </a:schemeClr>
-                              </a:solidFill>
-                              <a:latin typeface="Cambria Math" panose="02040503050406030204" pitchFamily="18" charset="0"/>
-                            </a:rPr>
-                            <m:t>𝐺</m:t>
-                          </m:r>
-                        </m:e>
-                        <m:sup>
-                          <m:r>
-                            <a:rPr lang="en-US" sz="1400" i="1">
-                              <a:solidFill>
-                                <a:schemeClr val="accent1">
-                                  <a:lumMod val="75000"/>
-                                </a:schemeClr>
-                              </a:solidFill>
-                              <a:latin typeface="Cambria Math" panose="02040503050406030204" pitchFamily="18" charset="0"/>
-                            </a:rPr>
-                            <m:t>𝑎𝑟𝑑𝑢𝑖𝑛𝑜</m:t>
-                          </m:r>
-                          <m:r>
-                            <a:rPr lang="en-US" sz="1400" b="0" i="1" smtClean="0">
-                              <a:solidFill>
-                                <a:schemeClr val="accent1">
-                                  <a:lumMod val="75000"/>
-                                </a:schemeClr>
-                              </a:solidFill>
-                              <a:latin typeface="Cambria Math" panose="02040503050406030204" pitchFamily="18" charset="0"/>
-                            </a:rPr>
-                            <m:t> </m:t>
-                          </m:r>
-                          <m:r>
-                            <a:rPr lang="en-US" sz="1400" b="0" i="1" smtClean="0">
-                              <a:solidFill>
-                                <a:schemeClr val="accent1">
-                                  <a:lumMod val="75000"/>
-                                </a:schemeClr>
-                              </a:solidFill>
-                              <a:latin typeface="Cambria Math" panose="02040503050406030204" pitchFamily="18" charset="0"/>
-                            </a:rPr>
-                            <m:t>𝑥</m:t>
-                          </m:r>
-                          <m:r>
-                            <a:rPr lang="en-US" sz="1400" b="0" i="1" smtClean="0">
-                              <a:solidFill>
-                                <a:schemeClr val="accent1">
-                                  <a:lumMod val="75000"/>
-                                </a:schemeClr>
-                              </a:solidFill>
-                              <a:latin typeface="Cambria Math" panose="02040503050406030204" pitchFamily="18" charset="0"/>
-                            </a:rPr>
-                            <m:t> </m:t>
-                          </m:r>
-                          <m:r>
-                            <a:rPr lang="en-US" sz="1400" b="0" i="1" smtClean="0">
-                              <a:solidFill>
-                                <a:schemeClr val="accent1">
-                                  <a:lumMod val="75000"/>
-                                </a:schemeClr>
-                              </a:solidFill>
-                              <a:latin typeface="Cambria Math" panose="02040503050406030204" pitchFamily="18" charset="0"/>
-                            </a:rPr>
-                            <m:t>𝑎𝑛𝑑𝑟𝑜𝑖𝑑</m:t>
-                          </m:r>
-                        </m:sup>
-                      </m:sSup>
-                    </m:oMath>
-                  </m:oMathPara>
-                </a14:m>
-                <a:endParaRPr lang="hr-HR" sz="1400">
-                  <a:solidFill>
-                    <a:schemeClr val="accent1">
-                      <a:lumMod val="75000"/>
-                    </a:schemeClr>
-                  </a:solidFill>
-                </a:endParaRPr>
-              </a:p>
-            </p:txBody>
-          </p:sp>
-        </mc:Choice>
-        <mc:Fallback xmlns="">
-          <p:sp>
-            <p:nvSpPr>
-              <p:cNvPr id="51" name="TextBox 50"/>
-              <p:cNvSpPr txBox="1">
-                <a:spLocks noRot="1" noChangeAspect="1" noMove="1" noResize="1" noEditPoints="1" noAdjustHandles="1" noChangeArrowheads="1" noChangeShapeType="1" noTextEdit="1"/>
-              </p:cNvSpPr>
-              <p:nvPr/>
-            </p:nvSpPr>
-            <p:spPr>
-              <a:xfrm>
-                <a:off x="8740251" y="4567112"/>
-                <a:ext cx="1555362" cy="961032"/>
-              </a:xfrm>
-              <a:prstGeom prst="rect">
-                <a:avLst/>
-              </a:prstGeom>
-              <a:blipFill rotWithShape="0">
-                <a:blip r:embed="rId4"/>
-                <a:stretch>
-                  <a:fillRect/>
-                </a:stretch>
-              </a:blipFill>
-            </p:spPr>
-            <p:txBody>
-              <a:bodyPr/>
-              <a:lstStyle/>
-              <a:p>
-                <a:r>
-                  <a:rPr lang="hr-HR">
-                    <a:noFill/>
-                  </a:rPr>
-                  <a:t> </a:t>
-                </a:r>
-              </a:p>
-            </p:txBody>
-          </p:sp>
-        </mc:Fallback>
-      </mc:AlternateContent>
+      <p:sp>
+        <p:nvSpPr>
+          <p:cNvPr id="51" name="TextBox 50"/>
+          <p:cNvSpPr txBox="1"/>
+          <p:nvPr/>
+        </p:nvSpPr>
+        <p:spPr>
+          <a:xfrm>
+            <a:off x="8846979" y="4574037"/>
+            <a:ext cx="1341906" cy="954107"/>
+          </a:xfrm>
+          <a:prstGeom prst="rect">
+            <a:avLst/>
+          </a:prstGeom>
+          <a:noFill/>
+        </p:spPr>
+        <p:txBody>
+          <a:bodyPr wrap="none" rtlCol="0" anchor="b">
+            <a:spAutoFit/>
+          </a:bodyPr>
+          <a:lstStyle/>
+          <a:p>
+            <a:pPr algn="ctr"/>
+            <a:r>
+              <a:rPr lang="en-GB" sz="1400" b="1">
+                <a:solidFill>
+                  <a:schemeClr val="accent1">
+                    <a:lumMod val="75000"/>
+                  </a:schemeClr>
+                </a:solidFill>
+              </a:rPr>
+              <a:t>Symmetric key</a:t>
+            </a:r>
+          </a:p>
+          <a:p>
+            <a:pPr algn="ctr"/>
+            <a:r>
+              <a:rPr lang="en-GB" sz="1400" i="1">
+                <a:solidFill>
+                  <a:schemeClr val="accent1">
+                    <a:lumMod val="75000"/>
+                  </a:schemeClr>
+                </a:solidFill>
+                <a:latin typeface="Cambria Math" panose="02040503050406030204" pitchFamily="18" charset="0"/>
+              </a:rPr>
+              <a:t>K</a:t>
+            </a:r>
+            <a:r>
+              <a:rPr lang="en-US" sz="1400">
+                <a:solidFill>
+                  <a:schemeClr val="accent1">
+                    <a:lumMod val="75000"/>
+                  </a:schemeClr>
+                </a:solidFill>
+              </a:rPr>
+              <a:t> </a:t>
+            </a:r>
+          </a:p>
+          <a:p>
+            <a:pPr algn="ctr"/>
+            <a:r>
+              <a:rPr lang="en-US" sz="1400" i="1">
+                <a:solidFill>
+                  <a:schemeClr val="accent1">
+                    <a:lumMod val="75000"/>
+                  </a:schemeClr>
+                </a:solidFill>
+                <a:latin typeface="Cambria Math" panose="02040503050406030204" pitchFamily="18" charset="0"/>
+              </a:rPr>
+              <a:t>is derived from</a:t>
+            </a:r>
+          </a:p>
+          <a:p>
+            <a:pPr algn="ctr"/>
+            <a:r>
+              <a:rPr lang="en-US" sz="1400" i="1">
+                <a:solidFill>
+                  <a:schemeClr val="accent1">
+                    <a:lumMod val="75000"/>
+                  </a:schemeClr>
+                </a:solidFill>
+                <a:latin typeface="Cambria Math" panose="02040503050406030204" pitchFamily="18" charset="0"/>
+              </a:rPr>
+              <a:t>shared secret</a:t>
+            </a:r>
+            <a:endParaRPr lang="en-GB" sz="1400" i="1">
+              <a:solidFill>
+                <a:schemeClr val="accent1">
+                  <a:lumMod val="75000"/>
+                </a:schemeClr>
+              </a:solidFill>
+              <a:latin typeface="Cambria Math" panose="02040503050406030204" pitchFamily="18" charset="0"/>
+            </a:endParaRPr>
+          </a:p>
+        </p:txBody>
+      </p:sp>
       <p:cxnSp>
         <p:nvCxnSpPr>
           <p:cNvPr id="52" name="Straight Arrow Connector 51"/>
@@ -9088,8 +8936,8 @@
           </a:fontRef>
         </p:style>
       </p:cxnSp>
-      <mc:AlternateContent xmlns:mc="http://schemas.openxmlformats.org/markup-compatibility/2006" xmlns:a14="http://schemas.microsoft.com/office/drawing/2010/main">
-        <mc:Choice Requires="a14">
+      <mc:AlternateContent xmlns:mc="http://schemas.openxmlformats.org/markup-compatibility/2006">
+        <mc:Choice xmlns:a14="http://schemas.microsoft.com/office/drawing/2010/main" Requires="a14">
           <p:sp>
             <p:nvSpPr>
               <p:cNvPr id="53" name="TextBox 52"/>
@@ -9098,8 +8946,8 @@
             </p:nvSpPr>
             <p:spPr>
               <a:xfrm>
-                <a:off x="4703737" y="5553714"/>
-                <a:ext cx="2724785" cy="378245"/>
+                <a:off x="4602631" y="5599691"/>
+                <a:ext cx="2979342" cy="369332"/>
               </a:xfrm>
               <a:prstGeom prst="rect">
                 <a:avLst/>
@@ -9155,8 +9003,8 @@
                             </a:rPr>
                             <m:t>(</m:t>
                           </m:r>
-                          <m:sSup>
-                            <m:sSupPr>
+                          <m:sSub>
+                            <m:sSubPr>
                               <m:ctrlPr>
                                 <a:rPr lang="en-GB" i="1">
                                   <a:solidFill>
@@ -9167,8 +9015,32 @@
                                   <a:latin typeface="Cambria Math" panose="02040503050406030204" pitchFamily="18" charset="0"/>
                                 </a:rPr>
                               </m:ctrlPr>
-                            </m:sSupPr>
+                            </m:sSubPr>
                             <m:e>
+                              <m:r>
+                                <a:rPr lang="en-GB" i="1">
+                                  <a:solidFill>
+                                    <a:schemeClr val="accent1">
+                                      <a:lumMod val="75000"/>
+                                    </a:schemeClr>
+                                  </a:solidFill>
+                                  <a:latin typeface="Cambria Math" panose="02040503050406030204" pitchFamily="18" charset="0"/>
+                                </a:rPr>
+                                <m:t>𝑃𝑈</m:t>
+                              </m:r>
+                            </m:e>
+                            <m:sub>
+                              <m:r>
+                                <a:rPr lang="en-GB" i="1">
+                                  <a:solidFill>
+                                    <a:schemeClr val="accent1">
+                                      <a:lumMod val="75000"/>
+                                    </a:schemeClr>
+                                  </a:solidFill>
+                                  <a:latin typeface="Cambria Math" panose="02040503050406030204" pitchFamily="18" charset="0"/>
+                                </a:rPr>
+                                <m:t>𝑎</m:t>
+                              </m:r>
                               <m:r>
                                 <a:rPr lang="en-US" i="1">
                                   <a:solidFill>
@@ -9178,25 +9050,12 @@
                                   </a:solidFill>
                                   <a:latin typeface="Cambria Math" panose="02040503050406030204" pitchFamily="18" charset="0"/>
                                 </a:rPr>
-                                <m:t>𝐺</m:t>
+                                <m:t>𝑟𝑑𝑢𝑖𝑛𝑜</m:t>
                               </m:r>
-                            </m:e>
-                            <m:sup>
-                              <m:r>
-                                <a:rPr lang="en-US" b="0" i="1" smtClean="0">
-                                  <a:solidFill>
-                                    <a:schemeClr val="accent1">
-                                      <a:lumMod val="75000"/>
-                                    </a:schemeClr>
-                                  </a:solidFill>
-                                  <a:latin typeface="Cambria Math" panose="02040503050406030204" pitchFamily="18" charset="0"/>
-                                </a:rPr>
-                                <m:t>𝑎𝑟𝑑𝑢𝑖𝑛𝑜</m:t>
-                              </m:r>
-                            </m:sup>
-                          </m:sSup>
+                            </m:sub>
+                          </m:sSub>
                           <m:r>
-                            <a:rPr lang="en-US" b="0" i="1" smtClean="0">
+                            <a:rPr lang="en-US" i="1">
                               <a:solidFill>
                                 <a:schemeClr val="accent1">
                                   <a:lumMod val="75000"/>
@@ -9206,8 +9065,8 @@
                             </a:rPr>
                             <m:t>,</m:t>
                           </m:r>
-                          <m:sSup>
-                            <m:sSupPr>
+                          <m:sSub>
+                            <m:sSubPr>
                               <m:ctrlPr>
                                 <a:rPr lang="en-GB" i="1">
                                   <a:solidFill>
@@ -9218,8 +9077,32 @@
                                   <a:latin typeface="Cambria Math" panose="02040503050406030204" pitchFamily="18" charset="0"/>
                                 </a:rPr>
                               </m:ctrlPr>
-                            </m:sSupPr>
+                            </m:sSubPr>
                             <m:e>
+                              <m:r>
+                                <a:rPr lang="en-GB" i="1">
+                                  <a:solidFill>
+                                    <a:schemeClr val="accent1">
+                                      <a:lumMod val="75000"/>
+                                    </a:schemeClr>
+                                  </a:solidFill>
+                                  <a:latin typeface="Cambria Math" panose="02040503050406030204" pitchFamily="18" charset="0"/>
+                                </a:rPr>
+                                <m:t>𝑃𝑈</m:t>
+                              </m:r>
+                            </m:e>
+                            <m:sub>
+                              <m:r>
+                                <a:rPr lang="en-GB" i="1">
+                                  <a:solidFill>
+                                    <a:schemeClr val="accent1">
+                                      <a:lumMod val="75000"/>
+                                    </a:schemeClr>
+                                  </a:solidFill>
+                                  <a:latin typeface="Cambria Math" panose="02040503050406030204" pitchFamily="18" charset="0"/>
+                                </a:rPr>
+                                <m:t>𝑎</m:t>
+                              </m:r>
                               <m:r>
                                 <a:rPr lang="en-US" i="1">
                                   <a:solidFill>
@@ -9229,23 +9112,10 @@
                                   </a:solidFill>
                                   <a:latin typeface="Cambria Math" panose="02040503050406030204" pitchFamily="18" charset="0"/>
                                 </a:rPr>
-                                <m:t>𝐺</m:t>
+                                <m:t>𝑛𝑑𝑟𝑜𝑖𝑑</m:t>
                               </m:r>
-                            </m:e>
-                            <m:sup>
-                              <m:r>
-                                <a:rPr lang="en-US" b="0" i="1" smtClean="0">
-                                  <a:solidFill>
-                                    <a:schemeClr val="accent1">
-                                      <a:lumMod val="75000"/>
-                                    </a:schemeClr>
-                                  </a:solidFill>
-                                  <a:latin typeface="Cambria Math" panose="02040503050406030204" pitchFamily="18" charset="0"/>
-                                </a:rPr>
-                                <m:t>𝑎𝑛𝑑𝑟𝑜𝑖𝑑</m:t>
-                              </m:r>
-                            </m:sup>
-                          </m:sSup>
+                            </m:sub>
+                          </m:sSub>
                           <m:r>
                             <a:rPr lang="en-US" b="0" i="1" smtClean="0">
                               <a:solidFill>
@@ -9286,7 +9156,7 @@
             </p:txBody>
           </p:sp>
         </mc:Choice>
-        <mc:Fallback xmlns="">
+        <mc:Fallback>
           <p:sp>
             <p:nvSpPr>
               <p:cNvPr id="53" name="TextBox 52"/>
@@ -9297,16 +9167,16 @@
             </p:nvSpPr>
             <p:spPr>
               <a:xfrm>
-                <a:off x="4703737" y="5553714"/>
-                <a:ext cx="2724785" cy="378245"/>
+                <a:off x="4602631" y="5599691"/>
+                <a:ext cx="2979342" cy="369332"/>
               </a:xfrm>
               <a:prstGeom prst="rect">
                 <a:avLst/>
               </a:prstGeom>
               <a:blipFill rotWithShape="0">
-                <a:blip r:embed="rId7"/>
+                <a:blip r:embed="rId6"/>
                 <a:stretch>
-                  <a:fillRect b="-14516"/>
+                  <a:fillRect b="-13333"/>
                 </a:stretch>
               </a:blipFill>
             </p:spPr>
@@ -9506,7 +9376,7 @@
           <p:cNvPr id="7" name="Title 1">
             <a:extLst>
               <a:ext uri="{FF2B5EF4-FFF2-40B4-BE49-F238E27FC236}">
-                <a16:creationId xmlns="" xmlns:a16="http://schemas.microsoft.com/office/drawing/2014/main" id="{F3F19207-56E3-41C1-B35F-1C329A479D6C}"/>
+                <a16:creationId xmlns:a16="http://schemas.microsoft.com/office/drawing/2014/main" xmlns="" id="{F3F19207-56E3-41C1-B35F-1C329A479D6C}"/>
               </a:ext>
             </a:extLst>
           </p:cNvPr>
@@ -9562,7 +9432,7 @@
           <p:cNvPr id="8" name="Straight Connector 7">
             <a:extLst>
               <a:ext uri="{FF2B5EF4-FFF2-40B4-BE49-F238E27FC236}">
-                <a16:creationId xmlns="" xmlns:a16="http://schemas.microsoft.com/office/drawing/2014/main" id="{F5AD3098-4B9E-4C8B-910B-1DD3F084C040}"/>
+                <a16:creationId xmlns:a16="http://schemas.microsoft.com/office/drawing/2014/main" xmlns="" id="{F5AD3098-4B9E-4C8B-910B-1DD3F084C040}"/>
               </a:ext>
             </a:extLst>
           </p:cNvPr>

</xml_diff>

<commit_message>
Add STS class and update state machine with STS protocol
</commit_message>
<xml_diff>
--- a/docs/SecureBLE.pptx
+++ b/docs/SecureBLE.pptx
@@ -9,8 +9,8 @@
     <p:sldId id="257" r:id="rId3"/>
     <p:sldId id="258" r:id="rId4"/>
     <p:sldId id="259" r:id="rId5"/>
-    <p:sldId id="260" r:id="rId6"/>
-    <p:sldId id="261" r:id="rId7"/>
+    <p:sldId id="261" r:id="rId6"/>
+    <p:sldId id="260" r:id="rId7"/>
     <p:sldId id="262" r:id="rId8"/>
     <p:sldId id="263" r:id="rId9"/>
   </p:sldIdLst>
@@ -3987,7 +3987,7 @@
           <p:cNvPr id="5" name="Picture 5" descr="A close up of a logo&#10;&#10;Description generated with high confidence">
             <a:extLst>
               <a:ext uri="{FF2B5EF4-FFF2-40B4-BE49-F238E27FC236}">
-                <a16:creationId xmlns:a16="http://schemas.microsoft.com/office/drawing/2014/main" xmlns="" id="{8427AAF0-6F2C-4D3F-9F8C-420281031ECF}"/>
+                <a16:creationId xmlns="" xmlns:a16="http://schemas.microsoft.com/office/drawing/2014/main" id="{8427AAF0-6F2C-4D3F-9F8C-420281031ECF}"/>
               </a:ext>
             </a:extLst>
           </p:cNvPr>
@@ -4017,7 +4017,7 @@
           <p:cNvPr id="7" name="Picture 7">
             <a:extLst>
               <a:ext uri="{FF2B5EF4-FFF2-40B4-BE49-F238E27FC236}">
-                <a16:creationId xmlns:a16="http://schemas.microsoft.com/office/drawing/2014/main" xmlns="" id="{2FEE3424-9F51-4A3B-A6EF-8BB9144B9192}"/>
+                <a16:creationId xmlns="" xmlns:a16="http://schemas.microsoft.com/office/drawing/2014/main" id="{2FEE3424-9F51-4A3B-A6EF-8BB9144B9192}"/>
               </a:ext>
             </a:extLst>
           </p:cNvPr>
@@ -4047,7 +4047,7 @@
           <p:cNvPr id="13" name="Straight Arrow Connector 12">
             <a:extLst>
               <a:ext uri="{FF2B5EF4-FFF2-40B4-BE49-F238E27FC236}">
-                <a16:creationId xmlns:a16="http://schemas.microsoft.com/office/drawing/2014/main" xmlns="" id="{64C25ECC-DCCA-4CAD-8ECA-A99B71733BFD}"/>
+                <a16:creationId xmlns="" xmlns:a16="http://schemas.microsoft.com/office/drawing/2014/main" id="{64C25ECC-DCCA-4CAD-8ECA-A99B71733BFD}"/>
               </a:ext>
             </a:extLst>
           </p:cNvPr>
@@ -4083,7 +4083,7 @@
           <p:cNvPr id="14" name="Straight Arrow Connector 13">
             <a:extLst>
               <a:ext uri="{FF2B5EF4-FFF2-40B4-BE49-F238E27FC236}">
-                <a16:creationId xmlns:a16="http://schemas.microsoft.com/office/drawing/2014/main" xmlns="" id="{85DBE647-BED5-427F-BFC8-2D43A02663E2}"/>
+                <a16:creationId xmlns="" xmlns:a16="http://schemas.microsoft.com/office/drawing/2014/main" id="{85DBE647-BED5-427F-BFC8-2D43A02663E2}"/>
               </a:ext>
             </a:extLst>
           </p:cNvPr>
@@ -4121,7 +4121,7 @@
           <p:cNvPr id="3" name="Arc 2">
             <a:extLst>
               <a:ext uri="{FF2B5EF4-FFF2-40B4-BE49-F238E27FC236}">
-                <a16:creationId xmlns:a16="http://schemas.microsoft.com/office/drawing/2014/main" xmlns="" id="{55925465-D369-43E0-8FC2-B2E10857C791}"/>
+                <a16:creationId xmlns="" xmlns:a16="http://schemas.microsoft.com/office/drawing/2014/main" id="{55925465-D369-43E0-8FC2-B2E10857C791}"/>
               </a:ext>
             </a:extLst>
           </p:cNvPr>
@@ -4166,7 +4166,7 @@
           <p:cNvPr id="11" name="Arc 10">
             <a:extLst>
               <a:ext uri="{FF2B5EF4-FFF2-40B4-BE49-F238E27FC236}">
-                <a16:creationId xmlns:a16="http://schemas.microsoft.com/office/drawing/2014/main" xmlns="" id="{0A124C9F-7217-482D-A951-3035B2F7964F}"/>
+                <a16:creationId xmlns="" xmlns:a16="http://schemas.microsoft.com/office/drawing/2014/main" id="{0A124C9F-7217-482D-A951-3035B2F7964F}"/>
               </a:ext>
             </a:extLst>
           </p:cNvPr>
@@ -4211,7 +4211,7 @@
           <p:cNvPr id="16" name="Arc 15">
             <a:extLst>
               <a:ext uri="{FF2B5EF4-FFF2-40B4-BE49-F238E27FC236}">
-                <a16:creationId xmlns:a16="http://schemas.microsoft.com/office/drawing/2014/main" xmlns="" id="{785B7A92-35CA-4A04-B1E3-ECF4030ECB45}"/>
+                <a16:creationId xmlns="" xmlns:a16="http://schemas.microsoft.com/office/drawing/2014/main" id="{785B7A92-35CA-4A04-B1E3-ECF4030ECB45}"/>
               </a:ext>
             </a:extLst>
           </p:cNvPr>
@@ -4256,7 +4256,7 @@
           <p:cNvPr id="12" name="Oval 11">
             <a:extLst>
               <a:ext uri="{FF2B5EF4-FFF2-40B4-BE49-F238E27FC236}">
-                <a16:creationId xmlns:a16="http://schemas.microsoft.com/office/drawing/2014/main" xmlns="" id="{3C1CCF33-65C1-4E0C-B0DB-0A65F4CA9DBA}"/>
+                <a16:creationId xmlns="" xmlns:a16="http://schemas.microsoft.com/office/drawing/2014/main" id="{3C1CCF33-65C1-4E0C-B0DB-0A65F4CA9DBA}"/>
               </a:ext>
             </a:extLst>
           </p:cNvPr>
@@ -4315,7 +4315,7 @@
           <p:cNvPr id="15" name="Picture 15" descr="A circuit board&#10;&#10;Description generated with very high confidence">
             <a:extLst>
               <a:ext uri="{FF2B5EF4-FFF2-40B4-BE49-F238E27FC236}">
-                <a16:creationId xmlns:a16="http://schemas.microsoft.com/office/drawing/2014/main" xmlns="" id="{EA62634C-E70F-4AEF-AAF5-EE9DB7F9672B}"/>
+                <a16:creationId xmlns="" xmlns:a16="http://schemas.microsoft.com/office/drawing/2014/main" id="{EA62634C-E70F-4AEF-AAF5-EE9DB7F9672B}"/>
               </a:ext>
             </a:extLst>
           </p:cNvPr>
@@ -4345,7 +4345,7 @@
           <p:cNvPr id="4" name="TextBox 3">
             <a:extLst>
               <a:ext uri="{FF2B5EF4-FFF2-40B4-BE49-F238E27FC236}">
-                <a16:creationId xmlns:a16="http://schemas.microsoft.com/office/drawing/2014/main" xmlns="" id="{4746383C-EB29-4DB6-AF3A-1876F6A78DF2}"/>
+                <a16:creationId xmlns="" xmlns:a16="http://schemas.microsoft.com/office/drawing/2014/main" id="{4746383C-EB29-4DB6-AF3A-1876F6A78DF2}"/>
               </a:ext>
             </a:extLst>
           </p:cNvPr>
@@ -4446,7 +4446,7 @@
           <p:cNvPr id="6" name="TextBox 5">
             <a:extLst>
               <a:ext uri="{FF2B5EF4-FFF2-40B4-BE49-F238E27FC236}">
-                <a16:creationId xmlns:a16="http://schemas.microsoft.com/office/drawing/2014/main" xmlns="" id="{DFB61460-4A0C-4662-B6D0-88F0BCEC799C}"/>
+                <a16:creationId xmlns="" xmlns:a16="http://schemas.microsoft.com/office/drawing/2014/main" id="{DFB61460-4A0C-4662-B6D0-88F0BCEC799C}"/>
               </a:ext>
             </a:extLst>
           </p:cNvPr>
@@ -4505,7 +4505,7 @@
           <p:cNvPr id="17" name="TextBox 16">
             <a:extLst>
               <a:ext uri="{FF2B5EF4-FFF2-40B4-BE49-F238E27FC236}">
-                <a16:creationId xmlns:a16="http://schemas.microsoft.com/office/drawing/2014/main" xmlns="" id="{C2A2B99B-918D-4BD3-BB30-A333DBD034B9}"/>
+                <a16:creationId xmlns="" xmlns:a16="http://schemas.microsoft.com/office/drawing/2014/main" id="{C2A2B99B-918D-4BD3-BB30-A333DBD034B9}"/>
               </a:ext>
             </a:extLst>
           </p:cNvPr>
@@ -4954,8 +4954,8 @@
           </a:p>
         </p:txBody>
       </p:sp>
-      <mc:AlternateContent xmlns:mc="http://schemas.openxmlformats.org/markup-compatibility/2006">
-        <mc:Choice xmlns:a14="http://schemas.microsoft.com/office/drawing/2010/main" Requires="a14">
+      <mc:AlternateContent xmlns:mc="http://schemas.openxmlformats.org/markup-compatibility/2006" xmlns:a14="http://schemas.microsoft.com/office/drawing/2010/main">
+        <mc:Choice Requires="a14">
           <p:sp>
             <p:nvSpPr>
               <p:cNvPr id="13" name="TextBox 12"/>
@@ -5042,7 +5042,7 @@
             </p:txBody>
           </p:sp>
         </mc:Choice>
-        <mc:Fallback>
+        <mc:Fallback xmlns="">
           <p:sp>
             <p:nvSpPr>
               <p:cNvPr id="13" name="TextBox 12"/>
@@ -5081,8 +5081,8 @@
           </p:sp>
         </mc:Fallback>
       </mc:AlternateContent>
-      <mc:AlternateContent xmlns:mc="http://schemas.openxmlformats.org/markup-compatibility/2006">
-        <mc:Choice xmlns:a14="http://schemas.microsoft.com/office/drawing/2010/main" Requires="a14">
+      <mc:AlternateContent xmlns:mc="http://schemas.openxmlformats.org/markup-compatibility/2006" xmlns:a14="http://schemas.microsoft.com/office/drawing/2010/main">
+        <mc:Choice Requires="a14">
           <p:sp>
             <p:nvSpPr>
               <p:cNvPr id="14" name="TextBox 13"/>
@@ -5181,7 +5181,7 @@
             </p:txBody>
           </p:sp>
         </mc:Choice>
-        <mc:Fallback>
+        <mc:Fallback xmlns="">
           <p:sp>
             <p:nvSpPr>
               <p:cNvPr id="14" name="TextBox 13"/>
@@ -5220,8 +5220,8 @@
           </p:sp>
         </mc:Fallback>
       </mc:AlternateContent>
-      <mc:AlternateContent xmlns:mc="http://schemas.openxmlformats.org/markup-compatibility/2006">
-        <mc:Choice xmlns:a14="http://schemas.microsoft.com/office/drawing/2010/main" Requires="a14">
+      <mc:AlternateContent xmlns:mc="http://schemas.openxmlformats.org/markup-compatibility/2006" xmlns:a14="http://schemas.microsoft.com/office/drawing/2010/main">
+        <mc:Choice Requires="a14">
           <p:sp>
             <p:nvSpPr>
               <p:cNvPr id="15" name="TextBox 14"/>
@@ -5443,7 +5443,7 @@
             </p:txBody>
           </p:sp>
         </mc:Choice>
-        <mc:Fallback>
+        <mc:Fallback xmlns="">
           <p:sp>
             <p:nvSpPr>
               <p:cNvPr id="15" name="TextBox 14"/>
@@ -5482,8 +5482,8 @@
           </p:sp>
         </mc:Fallback>
       </mc:AlternateContent>
-      <mc:AlternateContent xmlns:mc="http://schemas.openxmlformats.org/markup-compatibility/2006">
-        <mc:Choice xmlns:a14="http://schemas.microsoft.com/office/drawing/2010/main" Requires="a14">
+      <mc:AlternateContent xmlns:mc="http://schemas.openxmlformats.org/markup-compatibility/2006" xmlns:a14="http://schemas.microsoft.com/office/drawing/2010/main">
+        <mc:Choice Requires="a14">
           <p:sp>
             <p:nvSpPr>
               <p:cNvPr id="16" name="TextBox 15"/>
@@ -5717,7 +5717,7 @@
             </p:txBody>
           </p:sp>
         </mc:Choice>
-        <mc:Fallback>
+        <mc:Fallback xmlns="">
           <p:sp>
             <p:nvSpPr>
               <p:cNvPr id="16" name="TextBox 15"/>
@@ -5756,8 +5756,8 @@
           </p:sp>
         </mc:Fallback>
       </mc:AlternateContent>
-      <mc:AlternateContent xmlns:mc="http://schemas.openxmlformats.org/markup-compatibility/2006">
-        <mc:Choice xmlns:a14="http://schemas.microsoft.com/office/drawing/2010/main" Requires="a14">
+      <mc:AlternateContent xmlns:mc="http://schemas.openxmlformats.org/markup-compatibility/2006" xmlns:a14="http://schemas.microsoft.com/office/drawing/2010/main">
+        <mc:Choice Requires="a14">
           <p:sp>
             <p:nvSpPr>
               <p:cNvPr id="17" name="TextBox 16"/>
@@ -6005,7 +6005,7 @@
             </p:txBody>
           </p:sp>
         </mc:Choice>
-        <mc:Fallback>
+        <mc:Fallback xmlns="">
           <p:sp>
             <p:nvSpPr>
               <p:cNvPr id="17" name="TextBox 16"/>
@@ -6044,8 +6044,8 @@
           </p:sp>
         </mc:Fallback>
       </mc:AlternateContent>
-      <mc:AlternateContent xmlns:mc="http://schemas.openxmlformats.org/markup-compatibility/2006">
-        <mc:Choice xmlns:a14="http://schemas.microsoft.com/office/drawing/2010/main" Requires="a14">
+      <mc:AlternateContent xmlns:mc="http://schemas.openxmlformats.org/markup-compatibility/2006" xmlns:a14="http://schemas.microsoft.com/office/drawing/2010/main">
+        <mc:Choice Requires="a14">
           <p:sp>
             <p:nvSpPr>
               <p:cNvPr id="18" name="TextBox 17"/>
@@ -6269,7 +6269,7 @@
             </p:txBody>
           </p:sp>
         </mc:Choice>
-        <mc:Fallback>
+        <mc:Fallback xmlns="">
           <p:sp>
             <p:nvSpPr>
               <p:cNvPr id="18" name="TextBox 17"/>
@@ -6853,470 +6853,10 @@
       </p:grpSpPr>
       <p:sp>
         <p:nvSpPr>
-          <p:cNvPr id="3" name="Rectangle 2">
-            <a:extLst>
-              <a:ext uri="{FF2B5EF4-FFF2-40B4-BE49-F238E27FC236}">
-                <a16:creationId xmlns:a16="http://schemas.microsoft.com/office/drawing/2014/main" xmlns="" id="{2BE7543D-CCC8-4831-A846-606881F98C72}"/>
-              </a:ext>
-            </a:extLst>
-          </p:cNvPr>
-          <p:cNvSpPr/>
-          <p:nvPr/>
-        </p:nvSpPr>
-        <p:spPr>
-          <a:xfrm>
-            <a:off x="4942652" y="1979318"/>
-            <a:ext cx="2287881" cy="425215"/>
-          </a:xfrm>
-          <a:prstGeom prst="rect">
-            <a:avLst/>
-          </a:prstGeom>
-          <a:solidFill>
-            <a:schemeClr val="accent1">
-              <a:lumMod val="75000"/>
-            </a:schemeClr>
-          </a:solidFill>
-          <a:ln>
-            <a:solidFill>
-              <a:schemeClr val="accent1">
-                <a:lumMod val="75000"/>
-              </a:schemeClr>
-            </a:solidFill>
-          </a:ln>
-        </p:spPr>
-        <p:style>
-          <a:lnRef idx="2">
-            <a:schemeClr val="accent1">
-              <a:shade val="50000"/>
-            </a:schemeClr>
-          </a:lnRef>
-          <a:fillRef idx="1">
-            <a:schemeClr val="accent1"/>
-          </a:fillRef>
-          <a:effectRef idx="0">
-            <a:schemeClr val="accent1"/>
-          </a:effectRef>
-          <a:fontRef idx="minor">
-            <a:schemeClr val="lt1"/>
-          </a:fontRef>
-        </p:style>
-        <p:txBody>
-          <a:bodyPr rtlCol="0" anchor="ctr"/>
-          <a:lstStyle/>
-          <a:p>
-            <a:pPr algn="ctr"/>
-            <a:r>
-              <a:rPr lang="en-US" dirty="0">
-                <a:cs typeface="Calibri"/>
-              </a:rPr>
-              <a:t>STATE_START</a:t>
-            </a:r>
-            <a:endParaRPr lang="en-US" dirty="0"/>
-          </a:p>
-        </p:txBody>
-      </p:sp>
-      <p:sp>
-        <p:nvSpPr>
-          <p:cNvPr id="11" name="Rectangle 10">
-            <a:extLst>
-              <a:ext uri="{FF2B5EF4-FFF2-40B4-BE49-F238E27FC236}">
-                <a16:creationId xmlns:a16="http://schemas.microsoft.com/office/drawing/2014/main" xmlns="" id="{904D0617-3170-4DBA-BE06-1A63276F7156}"/>
-              </a:ext>
-            </a:extLst>
-          </p:cNvPr>
-          <p:cNvSpPr/>
-          <p:nvPr/>
-        </p:nvSpPr>
-        <p:spPr>
-          <a:xfrm>
-            <a:off x="4735689" y="3221095"/>
-            <a:ext cx="2701806" cy="425215"/>
-          </a:xfrm>
-          <a:prstGeom prst="rect">
-            <a:avLst/>
-          </a:prstGeom>
-          <a:solidFill>
-            <a:schemeClr val="accent1">
-              <a:lumMod val="75000"/>
-            </a:schemeClr>
-          </a:solidFill>
-        </p:spPr>
-        <p:style>
-          <a:lnRef idx="2">
-            <a:schemeClr val="accent1">
-              <a:shade val="50000"/>
-            </a:schemeClr>
-          </a:lnRef>
-          <a:fillRef idx="1">
-            <a:schemeClr val="accent1"/>
-          </a:fillRef>
-          <a:effectRef idx="0">
-            <a:schemeClr val="accent1"/>
-          </a:effectRef>
-          <a:fontRef idx="minor">
-            <a:schemeClr val="lt1"/>
-          </a:fontRef>
-        </p:style>
-        <p:txBody>
-          <a:bodyPr rtlCol="0" anchor="ctr"/>
-          <a:lstStyle/>
-          <a:p>
-            <a:pPr algn="ctr"/>
-            <a:r>
-              <a:rPr lang="en-US" dirty="0">
-                <a:cs typeface="Calibri"/>
-              </a:rPr>
-              <a:t>STATE_KEYS_GENERATION</a:t>
-            </a:r>
-            <a:endParaRPr lang="en-US" dirty="0"/>
-          </a:p>
-        </p:txBody>
-      </p:sp>
-      <p:sp>
-        <p:nvSpPr>
-          <p:cNvPr id="16" name="Rectangle 15">
-            <a:extLst>
-              <a:ext uri="{FF2B5EF4-FFF2-40B4-BE49-F238E27FC236}">
-                <a16:creationId xmlns:a16="http://schemas.microsoft.com/office/drawing/2014/main" xmlns="" id="{39FE6B16-7C55-4C09-96DE-303A30E47EC7}"/>
-              </a:ext>
-            </a:extLst>
-          </p:cNvPr>
-          <p:cNvSpPr/>
-          <p:nvPr/>
-        </p:nvSpPr>
-        <p:spPr>
-          <a:xfrm>
-            <a:off x="4086578" y="4462872"/>
-            <a:ext cx="4009435" cy="425215"/>
-          </a:xfrm>
-          <a:prstGeom prst="rect">
-            <a:avLst/>
-          </a:prstGeom>
-          <a:solidFill>
-            <a:schemeClr val="accent1">
-              <a:lumMod val="75000"/>
-            </a:schemeClr>
-          </a:solidFill>
-        </p:spPr>
-        <p:style>
-          <a:lnRef idx="2">
-            <a:schemeClr val="accent1">
-              <a:shade val="50000"/>
-            </a:schemeClr>
-          </a:lnRef>
-          <a:fillRef idx="1">
-            <a:schemeClr val="accent1"/>
-          </a:fillRef>
-          <a:effectRef idx="0">
-            <a:schemeClr val="accent1"/>
-          </a:effectRef>
-          <a:fontRef idx="minor">
-            <a:schemeClr val="lt1"/>
-          </a:fontRef>
-        </p:style>
-        <p:txBody>
-          <a:bodyPr rtlCol="0" anchor="ctr"/>
-          <a:lstStyle/>
-          <a:p>
-            <a:pPr algn="ctr"/>
-            <a:r>
-              <a:rPr lang="en-US" dirty="0">
-                <a:cs typeface="Calibri"/>
-              </a:rPr>
-              <a:t>STATE_SHARED_SECRET_GENERATION</a:t>
-            </a:r>
-            <a:endParaRPr lang="en-US" dirty="0"/>
-          </a:p>
-        </p:txBody>
-      </p:sp>
-      <p:sp>
-        <p:nvSpPr>
-          <p:cNvPr id="17" name="Rectangle 16">
-            <a:extLst>
-              <a:ext uri="{FF2B5EF4-FFF2-40B4-BE49-F238E27FC236}">
-                <a16:creationId xmlns:a16="http://schemas.microsoft.com/office/drawing/2014/main" xmlns="" id="{5F575371-9DFD-4915-8768-C90EE57FB26B}"/>
-              </a:ext>
-            </a:extLst>
-          </p:cNvPr>
-          <p:cNvSpPr/>
-          <p:nvPr/>
-        </p:nvSpPr>
-        <p:spPr>
-          <a:xfrm>
-            <a:off x="4086578" y="5704649"/>
-            <a:ext cx="4009435" cy="425215"/>
-          </a:xfrm>
-          <a:prstGeom prst="rect">
-            <a:avLst/>
-          </a:prstGeom>
-          <a:solidFill>
-            <a:schemeClr val="accent1">
-              <a:lumMod val="75000"/>
-            </a:schemeClr>
-          </a:solidFill>
-        </p:spPr>
-        <p:style>
-          <a:lnRef idx="2">
-            <a:schemeClr val="accent1">
-              <a:shade val="50000"/>
-            </a:schemeClr>
-          </a:lnRef>
-          <a:fillRef idx="1">
-            <a:schemeClr val="accent1"/>
-          </a:fillRef>
-          <a:effectRef idx="0">
-            <a:schemeClr val="accent1"/>
-          </a:effectRef>
-          <a:fontRef idx="minor">
-            <a:schemeClr val="lt1"/>
-          </a:fontRef>
-        </p:style>
-        <p:txBody>
-          <a:bodyPr rtlCol="0" anchor="ctr"/>
-          <a:lstStyle/>
-          <a:p>
-            <a:pPr algn="ctr"/>
-            <a:r>
-              <a:rPr lang="en-US" dirty="0">
-                <a:cs typeface="Calibri"/>
-              </a:rPr>
-              <a:t>STATE_ENCRYPTED_CONNECTION</a:t>
-            </a:r>
-            <a:endParaRPr lang="en-US" dirty="0"/>
-          </a:p>
-        </p:txBody>
-      </p:sp>
-      <p:sp>
-        <p:nvSpPr>
-          <p:cNvPr id="21" name="TextBox 20">
-            <a:extLst>
-              <a:ext uri="{FF2B5EF4-FFF2-40B4-BE49-F238E27FC236}">
-                <a16:creationId xmlns:a16="http://schemas.microsoft.com/office/drawing/2014/main" xmlns="" id="{A4B2A663-4E21-4E52-85D3-648DF4AD88D1}"/>
-              </a:ext>
-            </a:extLst>
-          </p:cNvPr>
-          <p:cNvSpPr txBox="1"/>
-          <p:nvPr/>
-        </p:nvSpPr>
-        <p:spPr>
-          <a:xfrm>
-            <a:off x="6088474" y="2650066"/>
-            <a:ext cx="2009423" cy="307777"/>
-          </a:xfrm>
-          <a:prstGeom prst="rect">
-            <a:avLst/>
-          </a:prstGeom>
-        </p:spPr>
-        <p:txBody>
-          <a:bodyPr rot="0" spcFirstLastPara="0" vertOverflow="overflow" horzOverflow="overflow" vert="horz" wrap="square" lIns="91440" tIns="45720" rIns="91440" bIns="45720" numCol="1" spcCol="0" rtlCol="0" fromWordArt="0" anchor="t" anchorCtr="0" forceAA="0" compatLnSpc="1">
-            <a:prstTxWarp prst="textNoShape">
-              <a:avLst/>
-            </a:prstTxWarp>
-            <a:spAutoFit/>
-          </a:bodyPr>
-          <a:lstStyle/>
-          <a:p>
-            <a:pPr algn="ctr"/>
-            <a:r>
-              <a:rPr lang="en-US" sz="1400" dirty="0">
-                <a:solidFill>
-                  <a:schemeClr val="accent1">
-                    <a:lumMod val="75000"/>
-                  </a:schemeClr>
-                </a:solidFill>
-                <a:cs typeface="Calibri"/>
-              </a:rPr>
-              <a:t>EVENT_CONNECT_REQ</a:t>
-            </a:r>
-          </a:p>
-        </p:txBody>
-      </p:sp>
-      <p:sp>
-        <p:nvSpPr>
-          <p:cNvPr id="22" name="TextBox 21">
-            <a:extLst>
-              <a:ext uri="{FF2B5EF4-FFF2-40B4-BE49-F238E27FC236}">
-                <a16:creationId xmlns:a16="http://schemas.microsoft.com/office/drawing/2014/main" xmlns="" id="{6F958FF2-654B-4355-B1D6-41C87C9E460F}"/>
-              </a:ext>
-            </a:extLst>
-          </p:cNvPr>
-          <p:cNvSpPr txBox="1"/>
-          <p:nvPr/>
-        </p:nvSpPr>
-        <p:spPr>
-          <a:xfrm>
-            <a:off x="6107289" y="3891844"/>
-            <a:ext cx="2235201" cy="307777"/>
-          </a:xfrm>
-          <a:prstGeom prst="rect">
-            <a:avLst/>
-          </a:prstGeom>
-        </p:spPr>
-        <p:txBody>
-          <a:bodyPr rot="0" spcFirstLastPara="0" vertOverflow="overflow" horzOverflow="overflow" vert="horz" wrap="square" lIns="91440" tIns="45720" rIns="91440" bIns="45720" numCol="1" spcCol="0" rtlCol="0" fromWordArt="0" anchor="t" anchorCtr="0" forceAA="0" compatLnSpc="1">
-            <a:prstTxWarp prst="textNoShape">
-              <a:avLst/>
-            </a:prstTxWarp>
-            <a:spAutoFit/>
-          </a:bodyPr>
-          <a:lstStyle/>
-          <a:p>
-            <a:pPr algn="ctr"/>
-            <a:r>
-              <a:rPr lang="en-US" sz="1400" dirty="0">
-                <a:solidFill>
-                  <a:schemeClr val="accent1">
-                    <a:lumMod val="75000"/>
-                  </a:schemeClr>
-                </a:solidFill>
-                <a:cs typeface="Calibri"/>
-              </a:rPr>
-              <a:t>EVENT_PU_KEY_RECEIVED</a:t>
-            </a:r>
-          </a:p>
-        </p:txBody>
-      </p:sp>
-      <p:sp>
-        <p:nvSpPr>
-          <p:cNvPr id="23" name="TextBox 22">
-            <a:extLst>
-              <a:ext uri="{FF2B5EF4-FFF2-40B4-BE49-F238E27FC236}">
-                <a16:creationId xmlns:a16="http://schemas.microsoft.com/office/drawing/2014/main" xmlns="" id="{F49638AE-1F8C-4D3E-88B6-1599715BDC0C}"/>
-              </a:ext>
-            </a:extLst>
-          </p:cNvPr>
-          <p:cNvSpPr txBox="1"/>
-          <p:nvPr/>
-        </p:nvSpPr>
-        <p:spPr>
-          <a:xfrm>
-            <a:off x="6088474" y="5133622"/>
-            <a:ext cx="2752608" cy="307777"/>
-          </a:xfrm>
-          <a:prstGeom prst="rect">
-            <a:avLst/>
-          </a:prstGeom>
-        </p:spPr>
-        <p:txBody>
-          <a:bodyPr rot="0" spcFirstLastPara="0" vertOverflow="overflow" horzOverflow="overflow" vert="horz" wrap="square" lIns="91440" tIns="45720" rIns="91440" bIns="45720" numCol="1" spcCol="0" rtlCol="0" fromWordArt="0" anchor="t" anchorCtr="0" forceAA="0" compatLnSpc="1">
-            <a:prstTxWarp prst="textNoShape">
-              <a:avLst/>
-            </a:prstTxWarp>
-            <a:spAutoFit/>
-          </a:bodyPr>
-          <a:lstStyle/>
-          <a:p>
-            <a:pPr algn="ctr"/>
-            <a:r>
-              <a:rPr lang="en-US" sz="1400" dirty="0">
-                <a:solidFill>
-                  <a:schemeClr val="accent1">
-                    <a:lumMod val="75000"/>
-                  </a:schemeClr>
-                </a:solidFill>
-                <a:cs typeface="Calibri"/>
-              </a:rPr>
-              <a:t>EVENT_SHARED_SECRET_SUCCESS</a:t>
-            </a:r>
-          </a:p>
-        </p:txBody>
-      </p:sp>
-      <p:sp>
-        <p:nvSpPr>
-          <p:cNvPr id="29" name="TextBox 28">
-            <a:extLst>
-              <a:ext uri="{FF2B5EF4-FFF2-40B4-BE49-F238E27FC236}">
-                <a16:creationId xmlns:a16="http://schemas.microsoft.com/office/drawing/2014/main" xmlns="" id="{107FD947-D600-419E-B606-BAE6A5D5D7F6}"/>
-              </a:ext>
-            </a:extLst>
-          </p:cNvPr>
-          <p:cNvSpPr txBox="1"/>
-          <p:nvPr/>
-        </p:nvSpPr>
-        <p:spPr>
-          <a:xfrm>
-            <a:off x="10331215" y="3863621"/>
-            <a:ext cx="1266239" cy="307777"/>
-          </a:xfrm>
-          <a:prstGeom prst="rect">
-            <a:avLst/>
-          </a:prstGeom>
-        </p:spPr>
-        <p:txBody>
-          <a:bodyPr rot="0" spcFirstLastPara="0" vertOverflow="overflow" horzOverflow="overflow" vert="horz" wrap="square" lIns="91440" tIns="45720" rIns="91440" bIns="45720" numCol="1" spcCol="0" rtlCol="0" fromWordArt="0" anchor="t" anchorCtr="0" forceAA="0" compatLnSpc="1">
-            <a:prstTxWarp prst="textNoShape">
-              <a:avLst/>
-            </a:prstTxWarp>
-            <a:spAutoFit/>
-          </a:bodyPr>
-          <a:lstStyle/>
-          <a:p>
-            <a:pPr algn="ctr"/>
-            <a:r>
-              <a:rPr lang="en-US" sz="1400" dirty="0">
-                <a:solidFill>
-                  <a:schemeClr val="accent1">
-                    <a:lumMod val="75000"/>
-                  </a:schemeClr>
-                </a:solidFill>
-                <a:cs typeface="Calibri"/>
-              </a:rPr>
-              <a:t>EVENT_RESET</a:t>
-            </a:r>
-          </a:p>
-        </p:txBody>
-      </p:sp>
-      <p:sp>
-        <p:nvSpPr>
-          <p:cNvPr id="34" name="TextBox 33">
-            <a:extLst>
-              <a:ext uri="{FF2B5EF4-FFF2-40B4-BE49-F238E27FC236}">
-                <a16:creationId xmlns:a16="http://schemas.microsoft.com/office/drawing/2014/main" xmlns="" id="{22931BBA-07C1-4622-8ADE-C9E87C0864D4}"/>
-              </a:ext>
-            </a:extLst>
-          </p:cNvPr>
-          <p:cNvSpPr txBox="1"/>
-          <p:nvPr/>
-        </p:nvSpPr>
-        <p:spPr>
-          <a:xfrm>
-            <a:off x="547510" y="3289770"/>
-            <a:ext cx="2686756" cy="307777"/>
-          </a:xfrm>
-          <a:prstGeom prst="rect">
-            <a:avLst/>
-          </a:prstGeom>
-        </p:spPr>
-        <p:txBody>
-          <a:bodyPr rot="0" spcFirstLastPara="0" vertOverflow="overflow" horzOverflow="overflow" vert="horz" wrap="square" lIns="91440" tIns="45720" rIns="91440" bIns="45720" numCol="1" spcCol="0" rtlCol="0" fromWordArt="0" anchor="t" anchorCtr="0" forceAA="0" compatLnSpc="1">
-            <a:prstTxWarp prst="textNoShape">
-              <a:avLst/>
-            </a:prstTxWarp>
-            <a:spAutoFit/>
-          </a:bodyPr>
-          <a:lstStyle/>
-          <a:p>
-            <a:pPr algn="ctr"/>
-            <a:r>
-              <a:rPr lang="en-US" sz="1400" dirty="0">
-                <a:solidFill>
-                  <a:schemeClr val="accent1">
-                    <a:lumMod val="75000"/>
-                  </a:schemeClr>
-                </a:solidFill>
-                <a:cs typeface="Calibri"/>
-              </a:rPr>
-              <a:t>EVENT_SHARED_SECRET_FAILURE</a:t>
-            </a:r>
-          </a:p>
-        </p:txBody>
-      </p:sp>
-      <p:sp>
-        <p:nvSpPr>
           <p:cNvPr id="7" name="Title 1">
             <a:extLst>
               <a:ext uri="{FF2B5EF4-FFF2-40B4-BE49-F238E27FC236}">
-                <a16:creationId xmlns:a16="http://schemas.microsoft.com/office/drawing/2014/main" xmlns="" id="{F3F19207-56E3-41C1-B35F-1C329A479D6C}"/>
+                <a16:creationId xmlns="" xmlns:a16="http://schemas.microsoft.com/office/drawing/2014/main" id="{F3F19207-56E3-41C1-B35F-1C329A479D6C}"/>
               </a:ext>
             </a:extLst>
           </p:cNvPr>
@@ -7360,8 +6900,8 @@
           <a:p>
             <a:pPr algn="ctr"/>
             <a:r>
-              <a:rPr lang="en-US" sz="3600" dirty="0"/>
-              <a:t>PRIVACY</a:t>
+              <a:rPr lang="en-US" sz="3600" smtClean="0"/>
+              <a:t>AUTHENTICATION</a:t>
             </a:r>
             <a:endParaRPr lang="en-US" dirty="0"/>
           </a:p>
@@ -7372,433 +6912,7 @@
           <p:cNvPr id="8" name="Straight Connector 7">
             <a:extLst>
               <a:ext uri="{FF2B5EF4-FFF2-40B4-BE49-F238E27FC236}">
-                <a16:creationId xmlns:a16="http://schemas.microsoft.com/office/drawing/2014/main" xmlns="" id="{F5AD3098-4B9E-4C8B-910B-1DD3F084C040}"/>
-              </a:ext>
-            </a:extLst>
-          </p:cNvPr>
-          <p:cNvCxnSpPr/>
-          <p:nvPr/>
-        </p:nvCxnSpPr>
-        <p:spPr>
-          <a:xfrm>
-            <a:off x="3385507" y="1431982"/>
-            <a:ext cx="5420984" cy="9943"/>
-          </a:xfrm>
-          <a:prstGeom prst="line">
-            <a:avLst/>
-          </a:prstGeom>
-          <a:ln w="28575">
-            <a:solidFill>
-              <a:schemeClr val="accent1">
-                <a:lumMod val="75000"/>
-              </a:schemeClr>
-            </a:solidFill>
-          </a:ln>
-        </p:spPr>
-        <p:style>
-          <a:lnRef idx="1">
-            <a:schemeClr val="accent1"/>
-          </a:lnRef>
-          <a:fillRef idx="0">
-            <a:schemeClr val="accent1"/>
-          </a:fillRef>
-          <a:effectRef idx="0">
-            <a:schemeClr val="accent1"/>
-          </a:effectRef>
-          <a:fontRef idx="minor">
-            <a:schemeClr val="tx1"/>
-          </a:fontRef>
-        </p:style>
-      </p:cxnSp>
-      <p:cxnSp>
-        <p:nvCxnSpPr>
-          <p:cNvPr id="5" name="Elbow Connector 4"/>
-          <p:cNvCxnSpPr>
-            <a:stCxn id="16" idx="1"/>
-            <a:endCxn id="3" idx="1"/>
-          </p:cNvCxnSpPr>
-          <p:nvPr/>
-        </p:nvCxnSpPr>
-        <p:spPr>
-          <a:xfrm rot="10800000" flipH="1">
-            <a:off x="4086578" y="2191926"/>
-            <a:ext cx="856074" cy="2483554"/>
-          </a:xfrm>
-          <a:prstGeom prst="bentConnector3">
-            <a:avLst>
-              <a:gd name="adj1" fmla="val -86156"/>
-            </a:avLst>
-          </a:prstGeom>
-          <a:ln w="12700">
-            <a:solidFill>
-              <a:schemeClr val="accent1">
-                <a:lumMod val="75000"/>
-              </a:schemeClr>
-            </a:solidFill>
-            <a:tailEnd type="triangle"/>
-          </a:ln>
-        </p:spPr>
-        <p:style>
-          <a:lnRef idx="1">
-            <a:schemeClr val="accent1"/>
-          </a:lnRef>
-          <a:fillRef idx="0">
-            <a:schemeClr val="accent1"/>
-          </a:fillRef>
-          <a:effectRef idx="0">
-            <a:schemeClr val="accent1"/>
-          </a:effectRef>
-          <a:fontRef idx="minor">
-            <a:schemeClr val="tx1"/>
-          </a:fontRef>
-        </p:style>
-      </p:cxnSp>
-      <p:cxnSp>
-        <p:nvCxnSpPr>
-          <p:cNvPr id="12" name="Straight Arrow Connector 11"/>
-          <p:cNvCxnSpPr>
-            <a:stCxn id="3" idx="2"/>
-            <a:endCxn id="11" idx="0"/>
-          </p:cNvCxnSpPr>
-          <p:nvPr/>
-        </p:nvCxnSpPr>
-        <p:spPr>
-          <a:xfrm flipH="1">
-            <a:off x="6086592" y="2404533"/>
-            <a:ext cx="1" cy="816562"/>
-          </a:xfrm>
-          <a:prstGeom prst="straightConnector1">
-            <a:avLst/>
-          </a:prstGeom>
-          <a:ln w="12700">
-            <a:solidFill>
-              <a:schemeClr val="accent1">
-                <a:lumMod val="75000"/>
-              </a:schemeClr>
-            </a:solidFill>
-            <a:tailEnd type="triangle"/>
-          </a:ln>
-        </p:spPr>
-        <p:style>
-          <a:lnRef idx="1">
-            <a:schemeClr val="accent1"/>
-          </a:lnRef>
-          <a:fillRef idx="0">
-            <a:schemeClr val="accent1"/>
-          </a:fillRef>
-          <a:effectRef idx="0">
-            <a:schemeClr val="accent1"/>
-          </a:effectRef>
-          <a:fontRef idx="minor">
-            <a:schemeClr val="tx1"/>
-          </a:fontRef>
-        </p:style>
-      </p:cxnSp>
-      <p:cxnSp>
-        <p:nvCxnSpPr>
-          <p:cNvPr id="30" name="Straight Arrow Connector 29"/>
-          <p:cNvCxnSpPr>
-            <a:stCxn id="11" idx="2"/>
-            <a:endCxn id="16" idx="0"/>
-          </p:cNvCxnSpPr>
-          <p:nvPr/>
-        </p:nvCxnSpPr>
-        <p:spPr>
-          <a:xfrm>
-            <a:off x="6086592" y="3646310"/>
-            <a:ext cx="4704" cy="816562"/>
-          </a:xfrm>
-          <a:prstGeom prst="straightConnector1">
-            <a:avLst/>
-          </a:prstGeom>
-          <a:ln w="12700">
-            <a:solidFill>
-              <a:schemeClr val="accent1">
-                <a:lumMod val="75000"/>
-              </a:schemeClr>
-            </a:solidFill>
-            <a:tailEnd type="triangle"/>
-          </a:ln>
-        </p:spPr>
-        <p:style>
-          <a:lnRef idx="1">
-            <a:schemeClr val="accent1"/>
-          </a:lnRef>
-          <a:fillRef idx="0">
-            <a:schemeClr val="accent1"/>
-          </a:fillRef>
-          <a:effectRef idx="0">
-            <a:schemeClr val="accent1"/>
-          </a:effectRef>
-          <a:fontRef idx="minor">
-            <a:schemeClr val="tx1"/>
-          </a:fontRef>
-        </p:style>
-      </p:cxnSp>
-      <p:cxnSp>
-        <p:nvCxnSpPr>
-          <p:cNvPr id="35" name="Straight Arrow Connector 34"/>
-          <p:cNvCxnSpPr>
-            <a:stCxn id="16" idx="2"/>
-            <a:endCxn id="17" idx="0"/>
-          </p:cNvCxnSpPr>
-          <p:nvPr/>
-        </p:nvCxnSpPr>
-        <p:spPr>
-          <a:xfrm>
-            <a:off x="6091296" y="4888087"/>
-            <a:ext cx="0" cy="816562"/>
-          </a:xfrm>
-          <a:prstGeom prst="straightConnector1">
-            <a:avLst/>
-          </a:prstGeom>
-          <a:ln w="12700">
-            <a:solidFill>
-              <a:schemeClr val="accent1">
-                <a:lumMod val="75000"/>
-              </a:schemeClr>
-            </a:solidFill>
-            <a:tailEnd type="triangle"/>
-          </a:ln>
-        </p:spPr>
-        <p:style>
-          <a:lnRef idx="1">
-            <a:schemeClr val="accent1"/>
-          </a:lnRef>
-          <a:fillRef idx="0">
-            <a:schemeClr val="accent1"/>
-          </a:fillRef>
-          <a:effectRef idx="0">
-            <a:schemeClr val="accent1"/>
-          </a:effectRef>
-          <a:fontRef idx="minor">
-            <a:schemeClr val="tx1"/>
-          </a:fontRef>
-        </p:style>
-      </p:cxnSp>
-      <p:cxnSp>
-        <p:nvCxnSpPr>
-          <p:cNvPr id="37" name="Elbow Connector 36"/>
-          <p:cNvCxnSpPr>
-            <a:stCxn id="17" idx="3"/>
-            <a:endCxn id="3" idx="3"/>
-          </p:cNvCxnSpPr>
-          <p:nvPr/>
-        </p:nvCxnSpPr>
-        <p:spPr>
-          <a:xfrm flipH="1" flipV="1">
-            <a:off x="7230533" y="2191926"/>
-            <a:ext cx="865480" cy="3725331"/>
-          </a:xfrm>
-          <a:prstGeom prst="bentConnector3">
-            <a:avLst>
-              <a:gd name="adj1" fmla="val -235724"/>
-            </a:avLst>
-          </a:prstGeom>
-          <a:ln w="12700">
-            <a:solidFill>
-              <a:schemeClr val="accent1">
-                <a:lumMod val="75000"/>
-              </a:schemeClr>
-            </a:solidFill>
-            <a:tailEnd type="triangle"/>
-          </a:ln>
-        </p:spPr>
-        <p:style>
-          <a:lnRef idx="1">
-            <a:schemeClr val="accent1"/>
-          </a:lnRef>
-          <a:fillRef idx="0">
-            <a:schemeClr val="accent1"/>
-          </a:fillRef>
-          <a:effectRef idx="0">
-            <a:schemeClr val="accent1"/>
-          </a:effectRef>
-          <a:fontRef idx="minor">
-            <a:schemeClr val="tx1"/>
-          </a:fontRef>
-        </p:style>
-      </p:cxnSp>
-      <p:cxnSp>
-        <p:nvCxnSpPr>
-          <p:cNvPr id="42" name="Straight Connector 41"/>
-          <p:cNvCxnSpPr>
-            <a:stCxn id="11" idx="3"/>
-          </p:cNvCxnSpPr>
-          <p:nvPr/>
-        </p:nvCxnSpPr>
-        <p:spPr>
-          <a:xfrm>
-            <a:off x="7437495" y="3433703"/>
-            <a:ext cx="2698543" cy="0"/>
-          </a:xfrm>
-          <a:prstGeom prst="line">
-            <a:avLst/>
-          </a:prstGeom>
-          <a:ln w="12700">
-            <a:solidFill>
-              <a:schemeClr val="accent1">
-                <a:lumMod val="75000"/>
-              </a:schemeClr>
-            </a:solidFill>
-          </a:ln>
-        </p:spPr>
-        <p:style>
-          <a:lnRef idx="1">
-            <a:schemeClr val="accent1"/>
-          </a:lnRef>
-          <a:fillRef idx="0">
-            <a:schemeClr val="accent1"/>
-          </a:fillRef>
-          <a:effectRef idx="0">
-            <a:schemeClr val="accent1"/>
-          </a:effectRef>
-          <a:fontRef idx="minor">
-            <a:schemeClr val="tx1"/>
-          </a:fontRef>
-        </p:style>
-      </p:cxnSp>
-      <p:cxnSp>
-        <p:nvCxnSpPr>
-          <p:cNvPr id="44" name="Straight Connector 43"/>
-          <p:cNvCxnSpPr>
-            <a:stCxn id="16" idx="3"/>
-          </p:cNvCxnSpPr>
-          <p:nvPr/>
-        </p:nvCxnSpPr>
-        <p:spPr>
-          <a:xfrm flipV="1">
-            <a:off x="8096013" y="4675479"/>
-            <a:ext cx="2040025" cy="1"/>
-          </a:xfrm>
-          <a:prstGeom prst="line">
-            <a:avLst/>
-          </a:prstGeom>
-          <a:ln w="12700">
-            <a:solidFill>
-              <a:schemeClr val="accent1">
-                <a:lumMod val="75000"/>
-              </a:schemeClr>
-            </a:solidFill>
-          </a:ln>
-        </p:spPr>
-        <p:style>
-          <a:lnRef idx="1">
-            <a:schemeClr val="accent1"/>
-          </a:lnRef>
-          <a:fillRef idx="0">
-            <a:schemeClr val="accent1"/>
-          </a:fillRef>
-          <a:effectRef idx="0">
-            <a:schemeClr val="accent1"/>
-          </a:effectRef>
-          <a:fontRef idx="minor">
-            <a:schemeClr val="tx1"/>
-          </a:fontRef>
-        </p:style>
-      </p:cxnSp>
-    </p:spTree>
-    <p:extLst>
-      <p:ext uri="{BB962C8B-B14F-4D97-AF65-F5344CB8AC3E}">
-        <p14:creationId xmlns:p14="http://schemas.microsoft.com/office/powerpoint/2010/main" val="1558927861"/>
-      </p:ext>
-    </p:extLst>
-  </p:cSld>
-  <p:clrMapOvr>
-    <a:masterClrMapping/>
-  </p:clrMapOvr>
-  <p:transition spd="slow">
-    <p:push dir="u"/>
-  </p:transition>
-  <p:timing>
-    <p:tnLst>
-      <p:par>
-        <p:cTn id="1" dur="indefinite" restart="never" nodeType="tmRoot"/>
-      </p:par>
-    </p:tnLst>
-  </p:timing>
-</p:sld>
-</file>
-
-<file path=ppt/slides/slide6.xml><?xml version="1.0" encoding="utf-8"?>
-<p:sld xmlns:a="http://schemas.openxmlformats.org/drawingml/2006/main" xmlns:r="http://schemas.openxmlformats.org/officeDocument/2006/relationships" xmlns:p="http://schemas.openxmlformats.org/presentationml/2006/main">
-  <p:cSld>
-    <p:spTree>
-      <p:nvGrpSpPr>
-        <p:cNvPr id="1" name=""/>
-        <p:cNvGrpSpPr/>
-        <p:nvPr/>
-      </p:nvGrpSpPr>
-      <p:grpSpPr>
-        <a:xfrm>
-          <a:off x="0" y="0"/>
-          <a:ext cx="0" cy="0"/>
-          <a:chOff x="0" y="0"/>
-          <a:chExt cx="0" cy="0"/>
-        </a:xfrm>
-      </p:grpSpPr>
-      <p:sp>
-        <p:nvSpPr>
-          <p:cNvPr id="7" name="Title 1">
-            <a:extLst>
-              <a:ext uri="{FF2B5EF4-FFF2-40B4-BE49-F238E27FC236}">
-                <a16:creationId xmlns:a16="http://schemas.microsoft.com/office/drawing/2014/main" xmlns="" id="{F3F19207-56E3-41C1-B35F-1C329A479D6C}"/>
-              </a:ext>
-            </a:extLst>
-          </p:cNvPr>
-          <p:cNvSpPr txBox="1">
-            <a:spLocks/>
-          </p:cNvSpPr>
-          <p:nvPr/>
-        </p:nvSpPr>
-        <p:spPr>
-          <a:xfrm>
-            <a:off x="3431515" y="491705"/>
-            <a:ext cx="5328968" cy="940277"/>
-          </a:xfrm>
-          <a:prstGeom prst="rect">
-            <a:avLst/>
-          </a:prstGeom>
-        </p:spPr>
-        <p:txBody>
-          <a:bodyPr vert="horz" lIns="91440" tIns="45720" rIns="91440" bIns="45720" rtlCol="0" anchor="ctr">
-            <a:normAutofit/>
-          </a:bodyPr>
-          <a:lstStyle>
-            <a:lvl1pPr algn="l" defTabSz="914400" rtl="0" eaLnBrk="1" latinLnBrk="0" hangingPunct="1">
-              <a:lnSpc>
-                <a:spcPct val="90000"/>
-              </a:lnSpc>
-              <a:spcBef>
-                <a:spcPct val="0"/>
-              </a:spcBef>
-              <a:buNone/>
-              <a:defRPr sz="4400" kern="1200">
-                <a:solidFill>
-                  <a:schemeClr val="tx1"/>
-                </a:solidFill>
-                <a:latin typeface="+mj-lt"/>
-                <a:ea typeface="+mj-ea"/>
-                <a:cs typeface="+mj-cs"/>
-              </a:defRPr>
-            </a:lvl1pPr>
-          </a:lstStyle>
-          <a:p>
-            <a:pPr algn="ctr"/>
-            <a:r>
-              <a:rPr lang="en-US" sz="3600" smtClean="0"/>
-              <a:t>AUTHENTICATION</a:t>
-            </a:r>
-            <a:endParaRPr lang="en-US" dirty="0"/>
-          </a:p>
-        </p:txBody>
-      </p:sp>
-      <p:cxnSp>
-        <p:nvCxnSpPr>
-          <p:cNvPr id="8" name="Straight Connector 7">
-            <a:extLst>
-              <a:ext uri="{FF2B5EF4-FFF2-40B4-BE49-F238E27FC236}">
-                <a16:creationId xmlns:a16="http://schemas.microsoft.com/office/drawing/2014/main" xmlns="" id="{F5AD3098-4B9E-4C8B-910B-1DD3F084C040}"/>
+                <a16:creationId xmlns="" xmlns:a16="http://schemas.microsoft.com/office/drawing/2014/main" id="{F5AD3098-4B9E-4C8B-910B-1DD3F084C040}"/>
               </a:ext>
             </a:extLst>
           </p:cNvPr>
@@ -8358,8 +7472,8 @@
           </a:fontRef>
         </p:style>
       </p:cxnSp>
-      <mc:AlternateContent xmlns:mc="http://schemas.openxmlformats.org/markup-compatibility/2006">
-        <mc:Choice xmlns:a14="http://schemas.microsoft.com/office/drawing/2010/main" Requires="a14">
+      <mc:AlternateContent xmlns:mc="http://schemas.openxmlformats.org/markup-compatibility/2006" xmlns:a14="http://schemas.microsoft.com/office/drawing/2010/main">
+        <mc:Choice Requires="a14">
           <p:sp>
             <p:nvSpPr>
               <p:cNvPr id="46" name="TextBox 45"/>
@@ -8382,6 +7496,7 @@
               </a:bodyPr>
               <a:lstStyle/>
               <a:p>
+                <a:pPr/>
                 <a14:m>
                   <m:oMathPara xmlns:m="http://schemas.openxmlformats.org/officeDocument/2006/math">
                     <m:oMathParaPr>
@@ -8639,7 +7754,7 @@
             </p:txBody>
           </p:sp>
         </mc:Choice>
-        <mc:Fallback>
+        <mc:Fallback xmlns="">
           <p:sp>
             <p:nvSpPr>
               <p:cNvPr id="46" name="TextBox 45"/>
@@ -8678,8 +7793,8 @@
           </p:sp>
         </mc:Fallback>
       </mc:AlternateContent>
-      <mc:AlternateContent xmlns:mc="http://schemas.openxmlformats.org/markup-compatibility/2006">
-        <mc:Choice xmlns:a14="http://schemas.microsoft.com/office/drawing/2010/main" Requires="a14">
+      <mc:AlternateContent xmlns:mc="http://schemas.openxmlformats.org/markup-compatibility/2006" xmlns:a14="http://schemas.microsoft.com/office/drawing/2010/main">
+        <mc:Choice Requires="a14">
           <p:sp>
             <p:nvSpPr>
               <p:cNvPr id="47" name="TextBox 46"/>
@@ -8763,7 +7878,7 @@
             </p:txBody>
           </p:sp>
         </mc:Choice>
-        <mc:Fallback>
+        <mc:Fallback xmlns="">
           <p:sp>
             <p:nvSpPr>
               <p:cNvPr id="47" name="TextBox 46"/>
@@ -8936,8 +8051,8 @@
           </a:fontRef>
         </p:style>
       </p:cxnSp>
-      <mc:AlternateContent xmlns:mc="http://schemas.openxmlformats.org/markup-compatibility/2006">
-        <mc:Choice xmlns:a14="http://schemas.microsoft.com/office/drawing/2010/main" Requires="a14">
+      <mc:AlternateContent xmlns:mc="http://schemas.openxmlformats.org/markup-compatibility/2006" xmlns:a14="http://schemas.microsoft.com/office/drawing/2010/main">
+        <mc:Choice Requires="a14">
           <p:sp>
             <p:nvSpPr>
               <p:cNvPr id="53" name="TextBox 52"/>
@@ -9156,7 +8271,7 @@
             </p:txBody>
           </p:sp>
         </mc:Choice>
-        <mc:Fallback>
+        <mc:Fallback xmlns="">
           <p:sp>
             <p:nvSpPr>
               <p:cNvPr id="53" name="TextBox 52"/>
@@ -9246,6 +8361,1186 @@
     <p:extLst>
       <p:ext uri="{BB962C8B-B14F-4D97-AF65-F5344CB8AC3E}">
         <p14:creationId xmlns:p14="http://schemas.microsoft.com/office/powerpoint/2010/main" val="3751376381"/>
+      </p:ext>
+    </p:extLst>
+  </p:cSld>
+  <p:clrMapOvr>
+    <a:masterClrMapping/>
+  </p:clrMapOvr>
+  <p:transition spd="slow">
+    <p:push dir="u"/>
+  </p:transition>
+  <p:timing>
+    <p:tnLst>
+      <p:par>
+        <p:cTn id="1" dur="indefinite" restart="never" nodeType="tmRoot"/>
+      </p:par>
+    </p:tnLst>
+  </p:timing>
+</p:sld>
+</file>
+
+<file path=ppt/slides/slide6.xml><?xml version="1.0" encoding="utf-8"?>
+<p:sld xmlns:a="http://schemas.openxmlformats.org/drawingml/2006/main" xmlns:r="http://schemas.openxmlformats.org/officeDocument/2006/relationships" xmlns:p="http://schemas.openxmlformats.org/presentationml/2006/main">
+  <p:cSld>
+    <p:spTree>
+      <p:nvGrpSpPr>
+        <p:cNvPr id="1" name=""/>
+        <p:cNvGrpSpPr/>
+        <p:nvPr/>
+      </p:nvGrpSpPr>
+      <p:grpSpPr>
+        <a:xfrm>
+          <a:off x="0" y="0"/>
+          <a:ext cx="0" cy="0"/>
+          <a:chOff x="0" y="0"/>
+          <a:chExt cx="0" cy="0"/>
+        </a:xfrm>
+      </p:grpSpPr>
+      <p:sp>
+        <p:nvSpPr>
+          <p:cNvPr id="3" name="Rectangle 2">
+            <a:extLst>
+              <a:ext uri="{FF2B5EF4-FFF2-40B4-BE49-F238E27FC236}">
+                <a16:creationId xmlns="" xmlns:a16="http://schemas.microsoft.com/office/drawing/2014/main" id="{2BE7543D-CCC8-4831-A846-606881F98C72}"/>
+              </a:ext>
+            </a:extLst>
+          </p:cNvPr>
+          <p:cNvSpPr/>
+          <p:nvPr/>
+        </p:nvSpPr>
+        <p:spPr>
+          <a:xfrm>
+            <a:off x="4942652" y="1789543"/>
+            <a:ext cx="2287881" cy="425215"/>
+          </a:xfrm>
+          <a:prstGeom prst="rect">
+            <a:avLst/>
+          </a:prstGeom>
+          <a:solidFill>
+            <a:schemeClr val="accent1">
+              <a:lumMod val="75000"/>
+            </a:schemeClr>
+          </a:solidFill>
+          <a:ln>
+            <a:solidFill>
+              <a:schemeClr val="accent1">
+                <a:lumMod val="75000"/>
+              </a:schemeClr>
+            </a:solidFill>
+          </a:ln>
+        </p:spPr>
+        <p:style>
+          <a:lnRef idx="2">
+            <a:schemeClr val="accent1">
+              <a:shade val="50000"/>
+            </a:schemeClr>
+          </a:lnRef>
+          <a:fillRef idx="1">
+            <a:schemeClr val="accent1"/>
+          </a:fillRef>
+          <a:effectRef idx="0">
+            <a:schemeClr val="accent1"/>
+          </a:effectRef>
+          <a:fontRef idx="minor">
+            <a:schemeClr val="lt1"/>
+          </a:fontRef>
+        </p:style>
+        <p:txBody>
+          <a:bodyPr rtlCol="0" anchor="ctr"/>
+          <a:lstStyle/>
+          <a:p>
+            <a:pPr algn="ctr"/>
+            <a:r>
+              <a:rPr lang="en-US" dirty="0">
+                <a:cs typeface="Calibri"/>
+              </a:rPr>
+              <a:t>STATE_START</a:t>
+            </a:r>
+            <a:endParaRPr lang="en-US" dirty="0"/>
+          </a:p>
+        </p:txBody>
+      </p:sp>
+      <p:sp>
+        <p:nvSpPr>
+          <p:cNvPr id="11" name="Rectangle 10">
+            <a:extLst>
+              <a:ext uri="{FF2B5EF4-FFF2-40B4-BE49-F238E27FC236}">
+                <a16:creationId xmlns="" xmlns:a16="http://schemas.microsoft.com/office/drawing/2014/main" id="{904D0617-3170-4DBA-BE06-1A63276F7156}"/>
+              </a:ext>
+            </a:extLst>
+          </p:cNvPr>
+          <p:cNvSpPr/>
+          <p:nvPr/>
+        </p:nvSpPr>
+        <p:spPr>
+          <a:xfrm>
+            <a:off x="4739611" y="2840460"/>
+            <a:ext cx="2701806" cy="425215"/>
+          </a:xfrm>
+          <a:prstGeom prst="rect">
+            <a:avLst/>
+          </a:prstGeom>
+          <a:solidFill>
+            <a:schemeClr val="accent1">
+              <a:lumMod val="75000"/>
+            </a:schemeClr>
+          </a:solidFill>
+        </p:spPr>
+        <p:style>
+          <a:lnRef idx="2">
+            <a:schemeClr val="accent1">
+              <a:shade val="50000"/>
+            </a:schemeClr>
+          </a:lnRef>
+          <a:fillRef idx="1">
+            <a:schemeClr val="accent1"/>
+          </a:fillRef>
+          <a:effectRef idx="0">
+            <a:schemeClr val="accent1"/>
+          </a:effectRef>
+          <a:fontRef idx="minor">
+            <a:schemeClr val="lt1"/>
+          </a:fontRef>
+        </p:style>
+        <p:txBody>
+          <a:bodyPr rtlCol="0" anchor="ctr"/>
+          <a:lstStyle/>
+          <a:p>
+            <a:pPr algn="ctr"/>
+            <a:r>
+              <a:rPr lang="en-US" dirty="0">
+                <a:cs typeface="Calibri"/>
+              </a:rPr>
+              <a:t>STATE_KEYS_GENERATION</a:t>
+            </a:r>
+            <a:endParaRPr lang="en-US" dirty="0"/>
+          </a:p>
+        </p:txBody>
+      </p:sp>
+      <p:sp>
+        <p:nvSpPr>
+          <p:cNvPr id="16" name="Rectangle 15">
+            <a:extLst>
+              <a:ext uri="{FF2B5EF4-FFF2-40B4-BE49-F238E27FC236}">
+                <a16:creationId xmlns="" xmlns:a16="http://schemas.microsoft.com/office/drawing/2014/main" id="{39FE6B16-7C55-4C09-96DE-303A30E47EC7}"/>
+              </a:ext>
+            </a:extLst>
+          </p:cNvPr>
+          <p:cNvSpPr/>
+          <p:nvPr/>
+        </p:nvSpPr>
+        <p:spPr>
+          <a:xfrm>
+            <a:off x="4086578" y="4954566"/>
+            <a:ext cx="4009435" cy="425215"/>
+          </a:xfrm>
+          <a:prstGeom prst="rect">
+            <a:avLst/>
+          </a:prstGeom>
+          <a:solidFill>
+            <a:schemeClr val="accent1">
+              <a:lumMod val="75000"/>
+            </a:schemeClr>
+          </a:solidFill>
+        </p:spPr>
+        <p:style>
+          <a:lnRef idx="2">
+            <a:schemeClr val="accent1">
+              <a:shade val="50000"/>
+            </a:schemeClr>
+          </a:lnRef>
+          <a:fillRef idx="1">
+            <a:schemeClr val="accent1"/>
+          </a:fillRef>
+          <a:effectRef idx="0">
+            <a:schemeClr val="accent1"/>
+          </a:effectRef>
+          <a:fontRef idx="minor">
+            <a:schemeClr val="lt1"/>
+          </a:fontRef>
+        </p:style>
+        <p:txBody>
+          <a:bodyPr rtlCol="0" anchor="ctr"/>
+          <a:lstStyle/>
+          <a:p>
+            <a:pPr algn="ctr"/>
+            <a:r>
+              <a:rPr lang="en-US" smtClean="0">
+                <a:cs typeface="Calibri"/>
+              </a:rPr>
+              <a:t>STATE_SIGNATURE_VERIFICATION</a:t>
+            </a:r>
+            <a:endParaRPr lang="en-US"/>
+          </a:p>
+        </p:txBody>
+      </p:sp>
+      <p:sp>
+        <p:nvSpPr>
+          <p:cNvPr id="17" name="Rectangle 16">
+            <a:extLst>
+              <a:ext uri="{FF2B5EF4-FFF2-40B4-BE49-F238E27FC236}">
+                <a16:creationId xmlns="" xmlns:a16="http://schemas.microsoft.com/office/drawing/2014/main" id="{5F575371-9DFD-4915-8768-C90EE57FB26B}"/>
+              </a:ext>
+            </a:extLst>
+          </p:cNvPr>
+          <p:cNvSpPr/>
+          <p:nvPr/>
+        </p:nvSpPr>
+        <p:spPr>
+          <a:xfrm>
+            <a:off x="4086578" y="6049701"/>
+            <a:ext cx="4009435" cy="425215"/>
+          </a:xfrm>
+          <a:prstGeom prst="rect">
+            <a:avLst/>
+          </a:prstGeom>
+          <a:solidFill>
+            <a:schemeClr val="accent1">
+              <a:lumMod val="75000"/>
+            </a:schemeClr>
+          </a:solidFill>
+        </p:spPr>
+        <p:style>
+          <a:lnRef idx="2">
+            <a:schemeClr val="accent1">
+              <a:shade val="50000"/>
+            </a:schemeClr>
+          </a:lnRef>
+          <a:fillRef idx="1">
+            <a:schemeClr val="accent1"/>
+          </a:fillRef>
+          <a:effectRef idx="0">
+            <a:schemeClr val="accent1"/>
+          </a:effectRef>
+          <a:fontRef idx="minor">
+            <a:schemeClr val="lt1"/>
+          </a:fontRef>
+        </p:style>
+        <p:txBody>
+          <a:bodyPr rtlCol="0" anchor="ctr"/>
+          <a:lstStyle/>
+          <a:p>
+            <a:pPr algn="ctr"/>
+            <a:r>
+              <a:rPr lang="en-US" dirty="0">
+                <a:cs typeface="Calibri"/>
+              </a:rPr>
+              <a:t>STATE_ENCRYPTED_CONNECTION</a:t>
+            </a:r>
+            <a:endParaRPr lang="en-US" dirty="0"/>
+          </a:p>
+        </p:txBody>
+      </p:sp>
+      <p:sp>
+        <p:nvSpPr>
+          <p:cNvPr id="21" name="TextBox 20">
+            <a:extLst>
+              <a:ext uri="{FF2B5EF4-FFF2-40B4-BE49-F238E27FC236}">
+                <a16:creationId xmlns="" xmlns:a16="http://schemas.microsoft.com/office/drawing/2014/main" id="{A4B2A663-4E21-4E52-85D3-648DF4AD88D1}"/>
+              </a:ext>
+            </a:extLst>
+          </p:cNvPr>
+          <p:cNvSpPr txBox="1"/>
+          <p:nvPr/>
+        </p:nvSpPr>
+        <p:spPr>
+          <a:xfrm>
+            <a:off x="6086590" y="2396054"/>
+            <a:ext cx="2009423" cy="307777"/>
+          </a:xfrm>
+          <a:prstGeom prst="rect">
+            <a:avLst/>
+          </a:prstGeom>
+        </p:spPr>
+        <p:txBody>
+          <a:bodyPr rot="0" spcFirstLastPara="0" vertOverflow="overflow" horzOverflow="overflow" vert="horz" wrap="square" lIns="91440" tIns="45720" rIns="91440" bIns="45720" numCol="1" spcCol="0" rtlCol="0" fromWordArt="0" anchor="t" anchorCtr="0" forceAA="0" compatLnSpc="1">
+            <a:prstTxWarp prst="textNoShape">
+              <a:avLst/>
+            </a:prstTxWarp>
+            <a:spAutoFit/>
+          </a:bodyPr>
+          <a:lstStyle/>
+          <a:p>
+            <a:pPr algn="ctr"/>
+            <a:r>
+              <a:rPr lang="en-US" sz="1400" dirty="0">
+                <a:solidFill>
+                  <a:schemeClr val="accent1">
+                    <a:lumMod val="75000"/>
+                  </a:schemeClr>
+                </a:solidFill>
+                <a:cs typeface="Calibri"/>
+              </a:rPr>
+              <a:t>EVENT_CONNECT_REQ</a:t>
+            </a:r>
+          </a:p>
+        </p:txBody>
+      </p:sp>
+      <p:sp>
+        <p:nvSpPr>
+          <p:cNvPr id="22" name="TextBox 21">
+            <a:extLst>
+              <a:ext uri="{FF2B5EF4-FFF2-40B4-BE49-F238E27FC236}">
+                <a16:creationId xmlns="" xmlns:a16="http://schemas.microsoft.com/office/drawing/2014/main" id="{6F958FF2-654B-4355-B1D6-41C87C9E460F}"/>
+              </a:ext>
+            </a:extLst>
+          </p:cNvPr>
+          <p:cNvSpPr txBox="1"/>
+          <p:nvPr/>
+        </p:nvSpPr>
+        <p:spPr>
+          <a:xfrm>
+            <a:off x="6093097" y="3402140"/>
+            <a:ext cx="2235201" cy="307777"/>
+          </a:xfrm>
+          <a:prstGeom prst="rect">
+            <a:avLst/>
+          </a:prstGeom>
+        </p:spPr>
+        <p:txBody>
+          <a:bodyPr rot="0" spcFirstLastPara="0" vertOverflow="overflow" horzOverflow="overflow" vert="horz" wrap="square" lIns="91440" tIns="45720" rIns="91440" bIns="45720" numCol="1" spcCol="0" rtlCol="0" fromWordArt="0" anchor="t" anchorCtr="0" forceAA="0" compatLnSpc="1">
+            <a:prstTxWarp prst="textNoShape">
+              <a:avLst/>
+            </a:prstTxWarp>
+            <a:spAutoFit/>
+          </a:bodyPr>
+          <a:lstStyle/>
+          <a:p>
+            <a:pPr algn="ctr"/>
+            <a:r>
+              <a:rPr lang="en-US" sz="1400" dirty="0">
+                <a:solidFill>
+                  <a:schemeClr val="accent1">
+                    <a:lumMod val="75000"/>
+                  </a:schemeClr>
+                </a:solidFill>
+                <a:cs typeface="Calibri"/>
+              </a:rPr>
+              <a:t>EVENT_PU_KEY_RECEIVED</a:t>
+            </a:r>
+          </a:p>
+        </p:txBody>
+      </p:sp>
+      <p:sp>
+        <p:nvSpPr>
+          <p:cNvPr id="29" name="TextBox 28">
+            <a:extLst>
+              <a:ext uri="{FF2B5EF4-FFF2-40B4-BE49-F238E27FC236}">
+                <a16:creationId xmlns="" xmlns:a16="http://schemas.microsoft.com/office/drawing/2014/main" id="{107FD947-D600-419E-B606-BAE6A5D5D7F6}"/>
+              </a:ext>
+            </a:extLst>
+          </p:cNvPr>
+          <p:cNvSpPr txBox="1"/>
+          <p:nvPr/>
+        </p:nvSpPr>
+        <p:spPr>
+          <a:xfrm>
+            <a:off x="10331215" y="3863621"/>
+            <a:ext cx="1266239" cy="307777"/>
+          </a:xfrm>
+          <a:prstGeom prst="rect">
+            <a:avLst/>
+          </a:prstGeom>
+        </p:spPr>
+        <p:txBody>
+          <a:bodyPr rot="0" spcFirstLastPara="0" vertOverflow="overflow" horzOverflow="overflow" vert="horz" wrap="square" lIns="91440" tIns="45720" rIns="91440" bIns="45720" numCol="1" spcCol="0" rtlCol="0" fromWordArt="0" anchor="t" anchorCtr="0" forceAA="0" compatLnSpc="1">
+            <a:prstTxWarp prst="textNoShape">
+              <a:avLst/>
+            </a:prstTxWarp>
+            <a:spAutoFit/>
+          </a:bodyPr>
+          <a:lstStyle/>
+          <a:p>
+            <a:pPr algn="ctr"/>
+            <a:r>
+              <a:rPr lang="en-US" sz="1400" dirty="0">
+                <a:solidFill>
+                  <a:schemeClr val="accent1">
+                    <a:lumMod val="75000"/>
+                  </a:schemeClr>
+                </a:solidFill>
+                <a:cs typeface="Calibri"/>
+              </a:rPr>
+              <a:t>EVENT_RESET</a:t>
+            </a:r>
+          </a:p>
+        </p:txBody>
+      </p:sp>
+      <p:sp>
+        <p:nvSpPr>
+          <p:cNvPr id="34" name="TextBox 33">
+            <a:extLst>
+              <a:ext uri="{FF2B5EF4-FFF2-40B4-BE49-F238E27FC236}">
+                <a16:creationId xmlns="" xmlns:a16="http://schemas.microsoft.com/office/drawing/2014/main" id="{22931BBA-07C1-4622-8ADE-C9E87C0864D4}"/>
+              </a:ext>
+            </a:extLst>
+          </p:cNvPr>
+          <p:cNvSpPr txBox="1"/>
+          <p:nvPr/>
+        </p:nvSpPr>
+        <p:spPr>
+          <a:xfrm>
+            <a:off x="480877" y="2867857"/>
+            <a:ext cx="2686756" cy="307777"/>
+          </a:xfrm>
+          <a:prstGeom prst="rect">
+            <a:avLst/>
+          </a:prstGeom>
+        </p:spPr>
+        <p:txBody>
+          <a:bodyPr rot="0" spcFirstLastPara="0" vertOverflow="overflow" horzOverflow="overflow" vert="horz" wrap="square" lIns="91440" tIns="45720" rIns="91440" bIns="45720" numCol="1" spcCol="0" rtlCol="0" fromWordArt="0" anchor="t" anchorCtr="0" forceAA="0" compatLnSpc="1">
+            <a:prstTxWarp prst="textNoShape">
+              <a:avLst/>
+            </a:prstTxWarp>
+            <a:spAutoFit/>
+          </a:bodyPr>
+          <a:lstStyle/>
+          <a:p>
+            <a:pPr algn="ctr"/>
+            <a:r>
+              <a:rPr lang="en-US" sz="1400" dirty="0">
+                <a:solidFill>
+                  <a:schemeClr val="accent1">
+                    <a:lumMod val="75000"/>
+                  </a:schemeClr>
+                </a:solidFill>
+                <a:cs typeface="Calibri"/>
+              </a:rPr>
+              <a:t>EVENT_SHARED_SECRET_FAILURE</a:t>
+            </a:r>
+          </a:p>
+        </p:txBody>
+      </p:sp>
+      <p:sp>
+        <p:nvSpPr>
+          <p:cNvPr id="7" name="Title 1">
+            <a:extLst>
+              <a:ext uri="{FF2B5EF4-FFF2-40B4-BE49-F238E27FC236}">
+                <a16:creationId xmlns="" xmlns:a16="http://schemas.microsoft.com/office/drawing/2014/main" id="{F3F19207-56E3-41C1-B35F-1C329A479D6C}"/>
+              </a:ext>
+            </a:extLst>
+          </p:cNvPr>
+          <p:cNvSpPr txBox="1">
+            <a:spLocks/>
+          </p:cNvSpPr>
+          <p:nvPr/>
+        </p:nvSpPr>
+        <p:spPr>
+          <a:xfrm>
+            <a:off x="3431515" y="491705"/>
+            <a:ext cx="5328968" cy="940277"/>
+          </a:xfrm>
+          <a:prstGeom prst="rect">
+            <a:avLst/>
+          </a:prstGeom>
+        </p:spPr>
+        <p:txBody>
+          <a:bodyPr vert="horz" lIns="91440" tIns="45720" rIns="91440" bIns="45720" rtlCol="0" anchor="ctr">
+            <a:normAutofit/>
+          </a:bodyPr>
+          <a:lstStyle>
+            <a:lvl1pPr algn="l" defTabSz="914400" rtl="0" eaLnBrk="1" latinLnBrk="0" hangingPunct="1">
+              <a:lnSpc>
+                <a:spcPct val="90000"/>
+              </a:lnSpc>
+              <a:spcBef>
+                <a:spcPct val="0"/>
+              </a:spcBef>
+              <a:buNone/>
+              <a:defRPr sz="4400" kern="1200">
+                <a:solidFill>
+                  <a:schemeClr val="tx1"/>
+                </a:solidFill>
+                <a:latin typeface="+mj-lt"/>
+                <a:ea typeface="+mj-ea"/>
+                <a:cs typeface="+mj-cs"/>
+              </a:defRPr>
+            </a:lvl1pPr>
+          </a:lstStyle>
+          <a:p>
+            <a:pPr algn="ctr"/>
+            <a:r>
+              <a:rPr lang="en-US" smtClean="0"/>
+              <a:t>STATE MACHINE</a:t>
+            </a:r>
+            <a:endParaRPr lang="en-US" dirty="0"/>
+          </a:p>
+        </p:txBody>
+      </p:sp>
+      <p:cxnSp>
+        <p:nvCxnSpPr>
+          <p:cNvPr id="8" name="Straight Connector 7">
+            <a:extLst>
+              <a:ext uri="{FF2B5EF4-FFF2-40B4-BE49-F238E27FC236}">
+                <a16:creationId xmlns="" xmlns:a16="http://schemas.microsoft.com/office/drawing/2014/main" id="{F5AD3098-4B9E-4C8B-910B-1DD3F084C040}"/>
+              </a:ext>
+            </a:extLst>
+          </p:cNvPr>
+          <p:cNvCxnSpPr/>
+          <p:nvPr/>
+        </p:nvCxnSpPr>
+        <p:spPr>
+          <a:xfrm>
+            <a:off x="3385507" y="1431982"/>
+            <a:ext cx="5420984" cy="9943"/>
+          </a:xfrm>
+          <a:prstGeom prst="line">
+            <a:avLst/>
+          </a:prstGeom>
+          <a:ln w="28575">
+            <a:solidFill>
+              <a:schemeClr val="accent1">
+                <a:lumMod val="75000"/>
+              </a:schemeClr>
+            </a:solidFill>
+          </a:ln>
+        </p:spPr>
+        <p:style>
+          <a:lnRef idx="1">
+            <a:schemeClr val="accent1"/>
+          </a:lnRef>
+          <a:fillRef idx="0">
+            <a:schemeClr val="accent1"/>
+          </a:fillRef>
+          <a:effectRef idx="0">
+            <a:schemeClr val="accent1"/>
+          </a:effectRef>
+          <a:fontRef idx="minor">
+            <a:schemeClr val="tx1"/>
+          </a:fontRef>
+        </p:style>
+      </p:cxnSp>
+      <p:cxnSp>
+        <p:nvCxnSpPr>
+          <p:cNvPr id="5" name="Elbow Connector 4"/>
+          <p:cNvCxnSpPr>
+            <a:stCxn id="20" idx="1"/>
+            <a:endCxn id="3" idx="1"/>
+          </p:cNvCxnSpPr>
+          <p:nvPr/>
+        </p:nvCxnSpPr>
+        <p:spPr>
+          <a:xfrm rot="10800000" flipH="1">
+            <a:off x="4086576" y="2002151"/>
+            <a:ext cx="856075" cy="2039190"/>
+          </a:xfrm>
+          <a:prstGeom prst="bentConnector3">
+            <a:avLst>
+              <a:gd name="adj1" fmla="val -108324"/>
+            </a:avLst>
+          </a:prstGeom>
+          <a:ln w="12700">
+            <a:solidFill>
+              <a:schemeClr val="accent1">
+                <a:lumMod val="75000"/>
+              </a:schemeClr>
+            </a:solidFill>
+            <a:tailEnd type="triangle"/>
+          </a:ln>
+        </p:spPr>
+        <p:style>
+          <a:lnRef idx="1">
+            <a:schemeClr val="accent1"/>
+          </a:lnRef>
+          <a:fillRef idx="0">
+            <a:schemeClr val="accent1"/>
+          </a:fillRef>
+          <a:effectRef idx="0">
+            <a:schemeClr val="accent1"/>
+          </a:effectRef>
+          <a:fontRef idx="minor">
+            <a:schemeClr val="tx1"/>
+          </a:fontRef>
+        </p:style>
+      </p:cxnSp>
+      <p:cxnSp>
+        <p:nvCxnSpPr>
+          <p:cNvPr id="12" name="Straight Arrow Connector 11"/>
+          <p:cNvCxnSpPr>
+            <a:stCxn id="3" idx="2"/>
+            <a:endCxn id="11" idx="0"/>
+          </p:cNvCxnSpPr>
+          <p:nvPr/>
+        </p:nvCxnSpPr>
+        <p:spPr>
+          <a:xfrm>
+            <a:off x="6086593" y="2214758"/>
+            <a:ext cx="3921" cy="625702"/>
+          </a:xfrm>
+          <a:prstGeom prst="straightConnector1">
+            <a:avLst/>
+          </a:prstGeom>
+          <a:ln w="12700">
+            <a:solidFill>
+              <a:schemeClr val="accent1">
+                <a:lumMod val="75000"/>
+              </a:schemeClr>
+            </a:solidFill>
+            <a:tailEnd type="triangle"/>
+          </a:ln>
+        </p:spPr>
+        <p:style>
+          <a:lnRef idx="1">
+            <a:schemeClr val="accent1"/>
+          </a:lnRef>
+          <a:fillRef idx="0">
+            <a:schemeClr val="accent1"/>
+          </a:fillRef>
+          <a:effectRef idx="0">
+            <a:schemeClr val="accent1"/>
+          </a:effectRef>
+          <a:fontRef idx="minor">
+            <a:schemeClr val="tx1"/>
+          </a:fontRef>
+        </p:style>
+      </p:cxnSp>
+      <p:cxnSp>
+        <p:nvCxnSpPr>
+          <p:cNvPr id="30" name="Straight Arrow Connector 29"/>
+          <p:cNvCxnSpPr>
+            <a:stCxn id="11" idx="2"/>
+            <a:endCxn id="20" idx="0"/>
+          </p:cNvCxnSpPr>
+          <p:nvPr/>
+        </p:nvCxnSpPr>
+        <p:spPr>
+          <a:xfrm>
+            <a:off x="6090514" y="3265675"/>
+            <a:ext cx="781" cy="563058"/>
+          </a:xfrm>
+          <a:prstGeom prst="straightConnector1">
+            <a:avLst/>
+          </a:prstGeom>
+          <a:ln w="12700">
+            <a:solidFill>
+              <a:schemeClr val="accent1">
+                <a:lumMod val="75000"/>
+              </a:schemeClr>
+            </a:solidFill>
+            <a:tailEnd type="triangle"/>
+          </a:ln>
+        </p:spPr>
+        <p:style>
+          <a:lnRef idx="1">
+            <a:schemeClr val="accent1"/>
+          </a:lnRef>
+          <a:fillRef idx="0">
+            <a:schemeClr val="accent1"/>
+          </a:fillRef>
+          <a:effectRef idx="0">
+            <a:schemeClr val="accent1"/>
+          </a:effectRef>
+          <a:fontRef idx="minor">
+            <a:schemeClr val="tx1"/>
+          </a:fontRef>
+        </p:style>
+      </p:cxnSp>
+      <p:cxnSp>
+        <p:nvCxnSpPr>
+          <p:cNvPr id="35" name="Straight Arrow Connector 34"/>
+          <p:cNvCxnSpPr>
+            <a:stCxn id="16" idx="2"/>
+            <a:endCxn id="17" idx="0"/>
+          </p:cNvCxnSpPr>
+          <p:nvPr/>
+        </p:nvCxnSpPr>
+        <p:spPr>
+          <a:xfrm>
+            <a:off x="6091296" y="5379781"/>
+            <a:ext cx="0" cy="669920"/>
+          </a:xfrm>
+          <a:prstGeom prst="straightConnector1">
+            <a:avLst/>
+          </a:prstGeom>
+          <a:ln w="12700">
+            <a:solidFill>
+              <a:schemeClr val="accent1">
+                <a:lumMod val="75000"/>
+              </a:schemeClr>
+            </a:solidFill>
+            <a:tailEnd type="triangle"/>
+          </a:ln>
+        </p:spPr>
+        <p:style>
+          <a:lnRef idx="1">
+            <a:schemeClr val="accent1"/>
+          </a:lnRef>
+          <a:fillRef idx="0">
+            <a:schemeClr val="accent1"/>
+          </a:fillRef>
+          <a:effectRef idx="0">
+            <a:schemeClr val="accent1"/>
+          </a:effectRef>
+          <a:fontRef idx="minor">
+            <a:schemeClr val="tx1"/>
+          </a:fontRef>
+        </p:style>
+      </p:cxnSp>
+      <p:cxnSp>
+        <p:nvCxnSpPr>
+          <p:cNvPr id="37" name="Elbow Connector 36"/>
+          <p:cNvCxnSpPr>
+            <a:stCxn id="17" idx="3"/>
+            <a:endCxn id="3" idx="3"/>
+          </p:cNvCxnSpPr>
+          <p:nvPr/>
+        </p:nvCxnSpPr>
+        <p:spPr>
+          <a:xfrm flipH="1" flipV="1">
+            <a:off x="7230533" y="2002151"/>
+            <a:ext cx="865480" cy="4260158"/>
+          </a:xfrm>
+          <a:prstGeom prst="bentConnector3">
+            <a:avLst>
+              <a:gd name="adj1" fmla="val -235724"/>
+            </a:avLst>
+          </a:prstGeom>
+          <a:ln w="12700">
+            <a:solidFill>
+              <a:schemeClr val="accent1">
+                <a:lumMod val="75000"/>
+              </a:schemeClr>
+            </a:solidFill>
+            <a:tailEnd type="triangle"/>
+          </a:ln>
+        </p:spPr>
+        <p:style>
+          <a:lnRef idx="1">
+            <a:schemeClr val="accent1"/>
+          </a:lnRef>
+          <a:fillRef idx="0">
+            <a:schemeClr val="accent1"/>
+          </a:fillRef>
+          <a:effectRef idx="0">
+            <a:schemeClr val="accent1"/>
+          </a:effectRef>
+          <a:fontRef idx="minor">
+            <a:schemeClr val="tx1"/>
+          </a:fontRef>
+        </p:style>
+      </p:cxnSp>
+      <p:cxnSp>
+        <p:nvCxnSpPr>
+          <p:cNvPr id="42" name="Straight Connector 41"/>
+          <p:cNvCxnSpPr>
+            <a:stCxn id="11" idx="3"/>
+          </p:cNvCxnSpPr>
+          <p:nvPr/>
+        </p:nvCxnSpPr>
+        <p:spPr>
+          <a:xfrm>
+            <a:off x="7441417" y="3053068"/>
+            <a:ext cx="2698543" cy="0"/>
+          </a:xfrm>
+          <a:prstGeom prst="line">
+            <a:avLst/>
+          </a:prstGeom>
+          <a:ln w="12700">
+            <a:solidFill>
+              <a:schemeClr val="accent1">
+                <a:lumMod val="75000"/>
+              </a:schemeClr>
+            </a:solidFill>
+          </a:ln>
+        </p:spPr>
+        <p:style>
+          <a:lnRef idx="1">
+            <a:schemeClr val="accent1"/>
+          </a:lnRef>
+          <a:fillRef idx="0">
+            <a:schemeClr val="accent1"/>
+          </a:fillRef>
+          <a:effectRef idx="0">
+            <a:schemeClr val="accent1"/>
+          </a:effectRef>
+          <a:fontRef idx="minor">
+            <a:schemeClr val="tx1"/>
+          </a:fontRef>
+        </p:style>
+      </p:cxnSp>
+      <p:cxnSp>
+        <p:nvCxnSpPr>
+          <p:cNvPr id="44" name="Straight Connector 43"/>
+          <p:cNvCxnSpPr>
+            <a:stCxn id="16" idx="3"/>
+          </p:cNvCxnSpPr>
+          <p:nvPr/>
+        </p:nvCxnSpPr>
+        <p:spPr>
+          <a:xfrm flipV="1">
+            <a:off x="8096013" y="5167173"/>
+            <a:ext cx="2040025" cy="1"/>
+          </a:xfrm>
+          <a:prstGeom prst="line">
+            <a:avLst/>
+          </a:prstGeom>
+          <a:ln w="12700">
+            <a:solidFill>
+              <a:schemeClr val="accent1">
+                <a:lumMod val="75000"/>
+              </a:schemeClr>
+            </a:solidFill>
+          </a:ln>
+        </p:spPr>
+        <p:style>
+          <a:lnRef idx="1">
+            <a:schemeClr val="accent1"/>
+          </a:lnRef>
+          <a:fillRef idx="0">
+            <a:schemeClr val="accent1"/>
+          </a:fillRef>
+          <a:effectRef idx="0">
+            <a:schemeClr val="accent1"/>
+          </a:effectRef>
+          <a:fontRef idx="minor">
+            <a:schemeClr val="tx1"/>
+          </a:fontRef>
+        </p:style>
+      </p:cxnSp>
+      <p:sp>
+        <p:nvSpPr>
+          <p:cNvPr id="20" name="Rectangle 19">
+            <a:extLst>
+              <a:ext uri="{FF2B5EF4-FFF2-40B4-BE49-F238E27FC236}">
+                <a16:creationId xmlns="" xmlns:a16="http://schemas.microsoft.com/office/drawing/2014/main" id="{39FE6B16-7C55-4C09-96DE-303A30E47EC7}"/>
+              </a:ext>
+            </a:extLst>
+          </p:cNvPr>
+          <p:cNvSpPr/>
+          <p:nvPr/>
+        </p:nvSpPr>
+        <p:spPr>
+          <a:xfrm>
+            <a:off x="4086577" y="3828733"/>
+            <a:ext cx="4009436" cy="425215"/>
+          </a:xfrm>
+          <a:prstGeom prst="rect">
+            <a:avLst/>
+          </a:prstGeom>
+          <a:solidFill>
+            <a:schemeClr val="accent1">
+              <a:lumMod val="75000"/>
+            </a:schemeClr>
+          </a:solidFill>
+        </p:spPr>
+        <p:style>
+          <a:lnRef idx="2">
+            <a:schemeClr val="accent1">
+              <a:shade val="50000"/>
+            </a:schemeClr>
+          </a:lnRef>
+          <a:fillRef idx="1">
+            <a:schemeClr val="accent1"/>
+          </a:fillRef>
+          <a:effectRef idx="0">
+            <a:schemeClr val="accent1"/>
+          </a:effectRef>
+          <a:fontRef idx="minor">
+            <a:schemeClr val="lt1"/>
+          </a:fontRef>
+        </p:style>
+        <p:txBody>
+          <a:bodyPr rtlCol="0" anchor="ctr"/>
+          <a:lstStyle/>
+          <a:p>
+            <a:pPr algn="ctr"/>
+            <a:r>
+              <a:rPr lang="en-US" smtClean="0">
+                <a:cs typeface="Calibri"/>
+              </a:rPr>
+              <a:t>STATE_SHARED_SECRET_GENERATION</a:t>
+            </a:r>
+            <a:endParaRPr lang="en-US" dirty="0"/>
+          </a:p>
+        </p:txBody>
+      </p:sp>
+      <p:cxnSp>
+        <p:nvCxnSpPr>
+          <p:cNvPr id="31" name="Straight Connector 30"/>
+          <p:cNvCxnSpPr>
+            <a:stCxn id="20" idx="3"/>
+          </p:cNvCxnSpPr>
+          <p:nvPr/>
+        </p:nvCxnSpPr>
+        <p:spPr>
+          <a:xfrm flipV="1">
+            <a:off x="8096013" y="4041340"/>
+            <a:ext cx="2040025" cy="1"/>
+          </a:xfrm>
+          <a:prstGeom prst="line">
+            <a:avLst/>
+          </a:prstGeom>
+          <a:ln w="12700">
+            <a:solidFill>
+              <a:schemeClr val="accent1">
+                <a:lumMod val="75000"/>
+              </a:schemeClr>
+            </a:solidFill>
+          </a:ln>
+        </p:spPr>
+        <p:style>
+          <a:lnRef idx="1">
+            <a:schemeClr val="accent1"/>
+          </a:lnRef>
+          <a:fillRef idx="0">
+            <a:schemeClr val="accent1"/>
+          </a:fillRef>
+          <a:effectRef idx="0">
+            <a:schemeClr val="accent1"/>
+          </a:effectRef>
+          <a:fontRef idx="minor">
+            <a:schemeClr val="tx1"/>
+          </a:fontRef>
+        </p:style>
+      </p:cxnSp>
+      <p:cxnSp>
+        <p:nvCxnSpPr>
+          <p:cNvPr id="36" name="Straight Arrow Connector 35"/>
+          <p:cNvCxnSpPr>
+            <a:stCxn id="20" idx="2"/>
+            <a:endCxn id="16" idx="0"/>
+          </p:cNvCxnSpPr>
+          <p:nvPr/>
+        </p:nvCxnSpPr>
+        <p:spPr>
+          <a:xfrm>
+            <a:off x="6091295" y="4253948"/>
+            <a:ext cx="1" cy="700618"/>
+          </a:xfrm>
+          <a:prstGeom prst="straightConnector1">
+            <a:avLst/>
+          </a:prstGeom>
+          <a:ln w="12700">
+            <a:solidFill>
+              <a:schemeClr val="accent1">
+                <a:lumMod val="75000"/>
+              </a:schemeClr>
+            </a:solidFill>
+            <a:tailEnd type="triangle"/>
+          </a:ln>
+        </p:spPr>
+        <p:style>
+          <a:lnRef idx="1">
+            <a:schemeClr val="accent1"/>
+          </a:lnRef>
+          <a:fillRef idx="0">
+            <a:schemeClr val="accent1"/>
+          </a:fillRef>
+          <a:effectRef idx="0">
+            <a:schemeClr val="accent1"/>
+          </a:effectRef>
+          <a:fontRef idx="minor">
+            <a:schemeClr val="tx1"/>
+          </a:fontRef>
+        </p:style>
+      </p:cxnSp>
+      <p:sp>
+        <p:nvSpPr>
+          <p:cNvPr id="38" name="TextBox 37">
+            <a:extLst>
+              <a:ext uri="{FF2B5EF4-FFF2-40B4-BE49-F238E27FC236}">
+                <a16:creationId xmlns="" xmlns:a16="http://schemas.microsoft.com/office/drawing/2014/main" id="{6F958FF2-654B-4355-B1D6-41C87C9E460F}"/>
+              </a:ext>
+            </a:extLst>
+          </p:cNvPr>
+          <p:cNvSpPr txBox="1"/>
+          <p:nvPr/>
+        </p:nvSpPr>
+        <p:spPr>
+          <a:xfrm>
+            <a:off x="6126722" y="4452313"/>
+            <a:ext cx="3439971" cy="307777"/>
+          </a:xfrm>
+          <a:prstGeom prst="rect">
+            <a:avLst/>
+          </a:prstGeom>
+        </p:spPr>
+        <p:txBody>
+          <a:bodyPr rot="0" spcFirstLastPara="0" vertOverflow="overflow" horzOverflow="overflow" vert="horz" wrap="square" lIns="91440" tIns="45720" rIns="91440" bIns="45720" numCol="1" spcCol="0" rtlCol="0" fromWordArt="0" anchor="t" anchorCtr="0" forceAA="0" compatLnSpc="1">
+            <a:prstTxWarp prst="textNoShape">
+              <a:avLst/>
+            </a:prstTxWarp>
+            <a:spAutoFit/>
+          </a:bodyPr>
+          <a:lstStyle/>
+          <a:p>
+            <a:pPr algn="ctr"/>
+            <a:r>
+              <a:rPr lang="en-US" sz="1400" smtClean="0">
+                <a:solidFill>
+                  <a:schemeClr val="accent1">
+                    <a:lumMod val="75000"/>
+                  </a:schemeClr>
+                </a:solidFill>
+                <a:cs typeface="Calibri"/>
+              </a:rPr>
+              <a:t>EVENT_ENCRYPTED_SIGNATURE_RECEIVED</a:t>
+            </a:r>
+            <a:endParaRPr lang="en-US" sz="1400" dirty="0">
+              <a:solidFill>
+                <a:schemeClr val="accent1">
+                  <a:lumMod val="75000"/>
+                </a:schemeClr>
+              </a:solidFill>
+              <a:cs typeface="Calibri"/>
+            </a:endParaRPr>
+          </a:p>
+        </p:txBody>
+      </p:sp>
+      <p:sp>
+        <p:nvSpPr>
+          <p:cNvPr id="50" name="TextBox 49">
+            <a:extLst>
+              <a:ext uri="{FF2B5EF4-FFF2-40B4-BE49-F238E27FC236}">
+                <a16:creationId xmlns="" xmlns:a16="http://schemas.microsoft.com/office/drawing/2014/main" id="{6F958FF2-654B-4355-B1D6-41C87C9E460F}"/>
+              </a:ext>
+            </a:extLst>
+          </p:cNvPr>
+          <p:cNvSpPr txBox="1"/>
+          <p:nvPr/>
+        </p:nvSpPr>
+        <p:spPr>
+          <a:xfrm>
+            <a:off x="6126723" y="5560852"/>
+            <a:ext cx="2404802" cy="307777"/>
+          </a:xfrm>
+          <a:prstGeom prst="rect">
+            <a:avLst/>
+          </a:prstGeom>
+        </p:spPr>
+        <p:txBody>
+          <a:bodyPr rot="0" spcFirstLastPara="0" vertOverflow="overflow" horzOverflow="overflow" vert="horz" wrap="square" lIns="91440" tIns="45720" rIns="91440" bIns="45720" numCol="1" spcCol="0" rtlCol="0" fromWordArt="0" anchor="t" anchorCtr="0" forceAA="0" compatLnSpc="1">
+            <a:prstTxWarp prst="textNoShape">
+              <a:avLst/>
+            </a:prstTxWarp>
+            <a:spAutoFit/>
+          </a:bodyPr>
+          <a:lstStyle/>
+          <a:p>
+            <a:pPr algn="ctr"/>
+            <a:r>
+              <a:rPr lang="en-US" sz="1400" smtClean="0">
+                <a:solidFill>
+                  <a:schemeClr val="accent1">
+                    <a:lumMod val="75000"/>
+                  </a:schemeClr>
+                </a:solidFill>
+                <a:cs typeface="Calibri"/>
+              </a:rPr>
+              <a:t>EVENT_SIGNATURE_VERIFIED</a:t>
+            </a:r>
+            <a:endParaRPr lang="en-US" sz="1400" dirty="0">
+              <a:solidFill>
+                <a:schemeClr val="accent1">
+                  <a:lumMod val="75000"/>
+                </a:schemeClr>
+              </a:solidFill>
+              <a:cs typeface="Calibri"/>
+            </a:endParaRPr>
+          </a:p>
+        </p:txBody>
+      </p:sp>
+      <p:cxnSp>
+        <p:nvCxnSpPr>
+          <p:cNvPr id="51" name="Elbow Connector 50"/>
+          <p:cNvCxnSpPr>
+            <a:stCxn id="16" idx="1"/>
+            <a:endCxn id="3" idx="1"/>
+          </p:cNvCxnSpPr>
+          <p:nvPr/>
+        </p:nvCxnSpPr>
+        <p:spPr>
+          <a:xfrm rot="10800000" flipH="1">
+            <a:off x="4086578" y="2002152"/>
+            <a:ext cx="856074" cy="3165023"/>
+          </a:xfrm>
+          <a:prstGeom prst="bentConnector3">
+            <a:avLst>
+              <a:gd name="adj1" fmla="val -88171"/>
+            </a:avLst>
+          </a:prstGeom>
+          <a:ln w="12700">
+            <a:solidFill>
+              <a:schemeClr val="accent1">
+                <a:lumMod val="75000"/>
+              </a:schemeClr>
+            </a:solidFill>
+            <a:tailEnd type="triangle"/>
+          </a:ln>
+        </p:spPr>
+        <p:style>
+          <a:lnRef idx="1">
+            <a:schemeClr val="accent1"/>
+          </a:lnRef>
+          <a:fillRef idx="0">
+            <a:schemeClr val="accent1"/>
+          </a:fillRef>
+          <a:effectRef idx="0">
+            <a:schemeClr val="accent1"/>
+          </a:effectRef>
+          <a:fontRef idx="minor">
+            <a:schemeClr val="tx1"/>
+          </a:fontRef>
+        </p:style>
+      </p:cxnSp>
+      <p:sp>
+        <p:nvSpPr>
+          <p:cNvPr id="58" name="TextBox 57">
+            <a:extLst>
+              <a:ext uri="{FF2B5EF4-FFF2-40B4-BE49-F238E27FC236}">
+                <a16:creationId xmlns="" xmlns:a16="http://schemas.microsoft.com/office/drawing/2014/main" id="{22931BBA-07C1-4622-8ADE-C9E87C0864D4}"/>
+              </a:ext>
+            </a:extLst>
+          </p:cNvPr>
+          <p:cNvSpPr txBox="1"/>
+          <p:nvPr/>
+        </p:nvSpPr>
+        <p:spPr>
+          <a:xfrm>
+            <a:off x="480877" y="4452313"/>
+            <a:ext cx="2839829" cy="307777"/>
+          </a:xfrm>
+          <a:prstGeom prst="rect">
+            <a:avLst/>
+          </a:prstGeom>
+        </p:spPr>
+        <p:txBody>
+          <a:bodyPr rot="0" spcFirstLastPara="0" vertOverflow="overflow" horzOverflow="overflow" vert="horz" wrap="square" lIns="91440" tIns="45720" rIns="91440" bIns="45720" numCol="1" spcCol="0" rtlCol="0" fromWordArt="0" anchor="t" anchorCtr="0" forceAA="0" compatLnSpc="1">
+            <a:prstTxWarp prst="textNoShape">
+              <a:avLst/>
+            </a:prstTxWarp>
+            <a:spAutoFit/>
+          </a:bodyPr>
+          <a:lstStyle/>
+          <a:p>
+            <a:pPr algn="ctr"/>
+            <a:r>
+              <a:rPr lang="en-US" sz="1400" smtClean="0">
+                <a:solidFill>
+                  <a:schemeClr val="accent1">
+                    <a:lumMod val="75000"/>
+                  </a:schemeClr>
+                </a:solidFill>
+                <a:cs typeface="Calibri"/>
+              </a:rPr>
+              <a:t>EVENT_SIGNATURE_NOT_VERIFIED</a:t>
+            </a:r>
+            <a:endParaRPr lang="en-US" sz="1400" dirty="0">
+              <a:solidFill>
+                <a:schemeClr val="accent1">
+                  <a:lumMod val="75000"/>
+                </a:schemeClr>
+              </a:solidFill>
+              <a:cs typeface="Calibri"/>
+            </a:endParaRPr>
+          </a:p>
+        </p:txBody>
+      </p:sp>
+    </p:spTree>
+    <p:extLst>
+      <p:ext uri="{BB962C8B-B14F-4D97-AF65-F5344CB8AC3E}">
+        <p14:creationId xmlns:p14="http://schemas.microsoft.com/office/powerpoint/2010/main" val="1558927861"/>
       </p:ext>
     </p:extLst>
   </p:cSld>
@@ -9376,7 +9671,7 @@
           <p:cNvPr id="7" name="Title 1">
             <a:extLst>
               <a:ext uri="{FF2B5EF4-FFF2-40B4-BE49-F238E27FC236}">
-                <a16:creationId xmlns:a16="http://schemas.microsoft.com/office/drawing/2014/main" xmlns="" id="{F3F19207-56E3-41C1-B35F-1C329A479D6C}"/>
+                <a16:creationId xmlns="" xmlns:a16="http://schemas.microsoft.com/office/drawing/2014/main" id="{F3F19207-56E3-41C1-B35F-1C329A479D6C}"/>
               </a:ext>
             </a:extLst>
           </p:cNvPr>
@@ -9432,7 +9727,7 @@
           <p:cNvPr id="8" name="Straight Connector 7">
             <a:extLst>
               <a:ext uri="{FF2B5EF4-FFF2-40B4-BE49-F238E27FC236}">
-                <a16:creationId xmlns:a16="http://schemas.microsoft.com/office/drawing/2014/main" xmlns="" id="{F5AD3098-4B9E-4C8B-910B-1DD3F084C040}"/>
+                <a16:creationId xmlns="" xmlns:a16="http://schemas.microsoft.com/office/drawing/2014/main" id="{F5AD3098-4B9E-4C8B-910B-1DD3F084C040}"/>
               </a:ext>
             </a:extLst>
           </p:cNvPr>

</xml_diff>

<commit_message>
Add AES256 and SHA256 lib classes and pdate docs
</commit_message>
<xml_diff>
--- a/docs/SecureBLE.pptx
+++ b/docs/SecureBLE.pptx
@@ -11,8 +11,12 @@
     <p:sldId id="259" r:id="rId5"/>
     <p:sldId id="261" r:id="rId6"/>
     <p:sldId id="260" r:id="rId7"/>
-    <p:sldId id="262" r:id="rId8"/>
-    <p:sldId id="263" r:id="rId9"/>
+    <p:sldId id="265" r:id="rId8"/>
+    <p:sldId id="266" r:id="rId9"/>
+    <p:sldId id="264" r:id="rId10"/>
+    <p:sldId id="267" r:id="rId11"/>
+    <p:sldId id="262" r:id="rId12"/>
+    <p:sldId id="263" r:id="rId13"/>
   </p:sldIdLst>
   <p:sldSz cx="12192000" cy="6858000"/>
   <p:notesSz cx="6858000" cy="9144000"/>
@@ -764,7 +768,7 @@
           <a:p>
             <a:fld id="{0F0D3872-5191-4810-AACA-0D61B05C29C6}" type="datetimeFigureOut">
               <a:rPr lang="hr-HR" smtClean="0"/>
-              <a:t>5.1.2019.</a:t>
+              <a:t>22.1.2019.</a:t>
             </a:fld>
             <a:endParaRPr lang="hr-HR"/>
           </a:p>
@@ -934,7 +938,7 @@
           <a:p>
             <a:fld id="{0F0D3872-5191-4810-AACA-0D61B05C29C6}" type="datetimeFigureOut">
               <a:rPr lang="hr-HR" smtClean="0"/>
-              <a:t>5.1.2019.</a:t>
+              <a:t>22.1.2019.</a:t>
             </a:fld>
             <a:endParaRPr lang="hr-HR"/>
           </a:p>
@@ -1114,7 +1118,7 @@
           <a:p>
             <a:fld id="{0F0D3872-5191-4810-AACA-0D61B05C29C6}" type="datetimeFigureOut">
               <a:rPr lang="hr-HR" smtClean="0"/>
-              <a:t>5.1.2019.</a:t>
+              <a:t>22.1.2019.</a:t>
             </a:fld>
             <a:endParaRPr lang="hr-HR"/>
           </a:p>
@@ -1284,7 +1288,7 @@
           <a:p>
             <a:fld id="{0F0D3872-5191-4810-AACA-0D61B05C29C6}" type="datetimeFigureOut">
               <a:rPr lang="hr-HR" smtClean="0"/>
-              <a:t>5.1.2019.</a:t>
+              <a:t>22.1.2019.</a:t>
             </a:fld>
             <a:endParaRPr lang="hr-HR"/>
           </a:p>
@@ -1530,7 +1534,7 @@
           <a:p>
             <a:fld id="{0F0D3872-5191-4810-AACA-0D61B05C29C6}" type="datetimeFigureOut">
               <a:rPr lang="hr-HR" smtClean="0"/>
-              <a:t>5.1.2019.</a:t>
+              <a:t>22.1.2019.</a:t>
             </a:fld>
             <a:endParaRPr lang="hr-HR"/>
           </a:p>
@@ -1762,7 +1766,7 @@
           <a:p>
             <a:fld id="{0F0D3872-5191-4810-AACA-0D61B05C29C6}" type="datetimeFigureOut">
               <a:rPr lang="hr-HR" smtClean="0"/>
-              <a:t>5.1.2019.</a:t>
+              <a:t>22.1.2019.</a:t>
             </a:fld>
             <a:endParaRPr lang="hr-HR"/>
           </a:p>
@@ -2129,7 +2133,7 @@
           <a:p>
             <a:fld id="{0F0D3872-5191-4810-AACA-0D61B05C29C6}" type="datetimeFigureOut">
               <a:rPr lang="hr-HR" smtClean="0"/>
-              <a:t>5.1.2019.</a:t>
+              <a:t>22.1.2019.</a:t>
             </a:fld>
             <a:endParaRPr lang="hr-HR"/>
           </a:p>
@@ -2247,7 +2251,7 @@
           <a:p>
             <a:fld id="{0F0D3872-5191-4810-AACA-0D61B05C29C6}" type="datetimeFigureOut">
               <a:rPr lang="hr-HR" smtClean="0"/>
-              <a:t>5.1.2019.</a:t>
+              <a:t>22.1.2019.</a:t>
             </a:fld>
             <a:endParaRPr lang="hr-HR"/>
           </a:p>
@@ -2342,7 +2346,7 @@
           <a:p>
             <a:fld id="{0F0D3872-5191-4810-AACA-0D61B05C29C6}" type="datetimeFigureOut">
               <a:rPr lang="hr-HR" smtClean="0"/>
-              <a:t>5.1.2019.</a:t>
+              <a:t>22.1.2019.</a:t>
             </a:fld>
             <a:endParaRPr lang="hr-HR"/>
           </a:p>
@@ -2619,7 +2623,7 @@
           <a:p>
             <a:fld id="{0F0D3872-5191-4810-AACA-0D61B05C29C6}" type="datetimeFigureOut">
               <a:rPr lang="hr-HR" smtClean="0"/>
-              <a:t>5.1.2019.</a:t>
+              <a:t>22.1.2019.</a:t>
             </a:fld>
             <a:endParaRPr lang="hr-HR"/>
           </a:p>
@@ -2872,7 +2876,7 @@
           <a:p>
             <a:fld id="{0F0D3872-5191-4810-AACA-0D61B05C29C6}" type="datetimeFigureOut">
               <a:rPr lang="hr-HR" smtClean="0"/>
-              <a:t>5.1.2019.</a:t>
+              <a:t>22.1.2019.</a:t>
             </a:fld>
             <a:endParaRPr lang="hr-HR"/>
           </a:p>
@@ -3085,7 +3089,7 @@
           <a:p>
             <a:fld id="{0F0D3872-5191-4810-AACA-0D61B05C29C6}" type="datetimeFigureOut">
               <a:rPr lang="hr-HR" smtClean="0"/>
-              <a:t>5.1.2019.</a:t>
+              <a:t>22.1.2019.</a:t>
             </a:fld>
             <a:endParaRPr lang="hr-HR"/>
           </a:p>
@@ -3502,8 +3506,8 @@
         </p:nvSpPr>
         <p:spPr>
           <a:xfrm>
-            <a:off x="2173857" y="2544791"/>
-            <a:ext cx="7942053" cy="1034182"/>
+            <a:off x="2940170" y="2656935"/>
+            <a:ext cx="6211018" cy="1034182"/>
           </a:xfrm>
         </p:spPr>
         <p:txBody>
@@ -3513,29 +3517,35 @@
           <a:lstStyle/>
           <a:p>
             <a:r>
-              <a:rPr lang="en-US" sz="8000">
-                <a:ea typeface="FZLanTingHeiS-UL-GB" panose="02000000000000000000" pitchFamily="2" charset="-122"/>
+              <a:rPr lang="en-US" sz="6600" b="1">
+                <a:latin typeface="Arial" panose="020B0604020202020204" pitchFamily="34" charset="0"/>
+                <a:ea typeface="Adobe Gothic Std B" panose="020B0800000000000000" pitchFamily="34" charset="-128"/>
+                <a:cs typeface="Arial" panose="020B0604020202020204" pitchFamily="34" charset="0"/>
               </a:rPr>
               <a:t>Secure </a:t>
             </a:r>
             <a:r>
-              <a:rPr lang="en-US" sz="8000" b="1">
+              <a:rPr lang="en-US" sz="6600" b="1">
                 <a:solidFill>
                   <a:schemeClr val="accent1">
                     <a:lumMod val="75000"/>
                   </a:schemeClr>
                 </a:solidFill>
-                <a:ea typeface="FZLanTingHeiS-UL-GB" panose="02000000000000000000" pitchFamily="2" charset="-122"/>
+                <a:latin typeface="Arial" panose="020B0604020202020204" pitchFamily="34" charset="0"/>
+                <a:ea typeface="Adobe Gothic Std B" panose="020B0800000000000000" pitchFamily="34" charset="-128"/>
+                <a:cs typeface="Arial" panose="020B0604020202020204" pitchFamily="34" charset="0"/>
               </a:rPr>
               <a:t>BLE</a:t>
             </a:r>
-            <a:endParaRPr lang="hr-HR" sz="8000" b="1">
+            <a:endParaRPr lang="hr-HR" sz="6600" b="1">
               <a:solidFill>
                 <a:schemeClr val="accent1">
                   <a:lumMod val="75000"/>
                 </a:schemeClr>
               </a:solidFill>
-              <a:ea typeface="FZLanTingHeiS-UL-GB" panose="02000000000000000000" pitchFamily="2" charset="-122"/>
+              <a:latin typeface="Arial" panose="020B0604020202020204" pitchFamily="34" charset="0"/>
+              <a:ea typeface="Adobe Gothic Std B" panose="020B0800000000000000" pitchFamily="34" charset="-128"/>
+              <a:cs typeface="Arial" panose="020B0604020202020204" pitchFamily="34" charset="0"/>
             </a:endParaRPr>
           </a:p>
         </p:txBody>
@@ -3550,8 +3560,8 @@
         </p:nvSpPr>
         <p:spPr>
           <a:xfrm>
-            <a:off x="4251384" y="3890513"/>
-            <a:ext cx="3786997" cy="1181818"/>
+            <a:off x="9211573" y="5520906"/>
+            <a:ext cx="2796397" cy="940278"/>
           </a:xfrm>
           <a:prstGeom prst="rect">
             <a:avLst/>
@@ -3587,14 +3597,18 @@
               </a:spcAft>
             </a:pPr>
             <a:r>
-              <a:rPr lang="en-US" sz="3600" spc="300" dirty="0">
-                <a:ea typeface="FZLanTingHeiS-UL-GB" panose="02000000000000000000" pitchFamily="2" charset="-122"/>
+              <a:rPr lang="en-US" sz="2400" spc="300" dirty="0">
+                <a:latin typeface="Arial" panose="020B0604020202020204" pitchFamily="34" charset="0"/>
+                <a:ea typeface="Adobe Gothic Std B" panose="020B0800000000000000" pitchFamily="34" charset="-128"/>
+                <a:cs typeface="Arial" panose="020B0604020202020204" pitchFamily="34" charset="0"/>
               </a:rPr>
               <a:t>Ana </a:t>
             </a:r>
             <a:r>
-              <a:rPr lang="en-US" sz="3600" spc="300" dirty="0" err="1">
-                <a:ea typeface="FZLanTingHeiS-UL-GB" panose="02000000000000000000" pitchFamily="2" charset="-122"/>
+              <a:rPr lang="en-US" sz="2400" spc="300" dirty="0" err="1">
+                <a:latin typeface="Arial" panose="020B0604020202020204" pitchFamily="34" charset="0"/>
+                <a:ea typeface="Adobe Gothic Std B" panose="020B0800000000000000" pitchFamily="34" charset="-128"/>
+                <a:cs typeface="Arial" panose="020B0604020202020204" pitchFamily="34" charset="0"/>
               </a:rPr>
               <a:t>Pandza</a:t>
             </a:r>
@@ -3606,15 +3620,13 @@
               </a:spcAft>
             </a:pPr>
             <a:r>
-              <a:rPr lang="en-US" sz="3600" spc="300" dirty="0">
-                <a:ea typeface="FZLanTingHeiS-UL-GB" panose="02000000000000000000" pitchFamily="2" charset="-122"/>
+              <a:rPr lang="en-US" sz="2400" spc="300" dirty="0">
+                <a:latin typeface="Arial" panose="020B0604020202020204" pitchFamily="34" charset="0"/>
+                <a:ea typeface="Adobe Gothic Std B" panose="020B0800000000000000" pitchFamily="34" charset="-128"/>
+                <a:cs typeface="Arial" panose="020B0604020202020204" pitchFamily="34" charset="0"/>
               </a:rPr>
               <a:t>Marin Peko</a:t>
             </a:r>
-            <a:endParaRPr lang="en-US" sz="3600" spc="300" dirty="0">
-              <a:ea typeface="FZLanTingHeiS-UL-GB" panose="02000000000000000000" pitchFamily="2" charset="-122"/>
-              <a:cs typeface="Calibri Light"/>
-            </a:endParaRPr>
           </a:p>
         </p:txBody>
       </p:sp>
@@ -3628,6 +3640,621 @@
   <p:clrMapOvr>
     <a:masterClrMapping/>
   </p:clrMapOvr>
+  <p:timing>
+    <p:tnLst>
+      <p:par>
+        <p:cTn id="1" dur="indefinite" restart="never" nodeType="tmRoot"/>
+      </p:par>
+    </p:tnLst>
+  </p:timing>
+</p:sld>
+</file>
+
+<file path=ppt/slides/slide10.xml><?xml version="1.0" encoding="utf-8"?>
+<p:sld xmlns:a="http://schemas.openxmlformats.org/drawingml/2006/main" xmlns:r="http://schemas.openxmlformats.org/officeDocument/2006/relationships" xmlns:p="http://schemas.openxmlformats.org/presentationml/2006/main">
+  <p:cSld>
+    <p:spTree>
+      <p:nvGrpSpPr>
+        <p:cNvPr id="1" name=""/>
+        <p:cNvGrpSpPr/>
+        <p:nvPr/>
+      </p:nvGrpSpPr>
+      <p:grpSpPr>
+        <a:xfrm>
+          <a:off x="0" y="0"/>
+          <a:ext cx="0" cy="0"/>
+          <a:chOff x="0" y="0"/>
+          <a:chExt cx="0" cy="0"/>
+        </a:xfrm>
+      </p:grpSpPr>
+      <p:sp>
+        <p:nvSpPr>
+          <p:cNvPr id="7" name="Title 1">
+            <a:extLst>
+              <a:ext uri="{FF2B5EF4-FFF2-40B4-BE49-F238E27FC236}">
+                <a16:creationId xmlns:a16="http://schemas.microsoft.com/office/drawing/2014/main" xmlns="" id="{F3F19207-56E3-41C1-B35F-1C329A479D6C}"/>
+              </a:ext>
+            </a:extLst>
+          </p:cNvPr>
+          <p:cNvSpPr txBox="1">
+            <a:spLocks/>
+          </p:cNvSpPr>
+          <p:nvPr/>
+        </p:nvSpPr>
+        <p:spPr>
+          <a:xfrm>
+            <a:off x="3431515" y="491705"/>
+            <a:ext cx="5328968" cy="940277"/>
+          </a:xfrm>
+          <a:prstGeom prst="rect">
+            <a:avLst/>
+          </a:prstGeom>
+        </p:spPr>
+        <p:txBody>
+          <a:bodyPr vert="horz" lIns="91440" tIns="45720" rIns="91440" bIns="45720" rtlCol="0" anchor="ctr">
+            <a:normAutofit/>
+          </a:bodyPr>
+          <a:lstStyle>
+            <a:lvl1pPr algn="l" defTabSz="914400" rtl="0" eaLnBrk="1" latinLnBrk="0" hangingPunct="1">
+              <a:lnSpc>
+                <a:spcPct val="90000"/>
+              </a:lnSpc>
+              <a:spcBef>
+                <a:spcPct val="0"/>
+              </a:spcBef>
+              <a:buNone/>
+              <a:defRPr sz="4400" kern="1200">
+                <a:solidFill>
+                  <a:schemeClr val="tx1"/>
+                </a:solidFill>
+                <a:latin typeface="+mj-lt"/>
+                <a:ea typeface="+mj-ea"/>
+                <a:cs typeface="+mj-cs"/>
+              </a:defRPr>
+            </a:lvl1pPr>
+          </a:lstStyle>
+          <a:p>
+            <a:pPr algn="ctr"/>
+            <a:r>
+              <a:rPr lang="en-US" sz="2800" smtClean="0">
+                <a:latin typeface="Arial" panose="020B0604020202020204" pitchFamily="34" charset="0"/>
+                <a:cs typeface="Arial" panose="020B0604020202020204" pitchFamily="34" charset="0"/>
+              </a:rPr>
+              <a:t>ANDROID APPLICATION</a:t>
+            </a:r>
+            <a:endParaRPr lang="en-US" sz="2800" dirty="0">
+              <a:latin typeface="Arial" panose="020B0604020202020204" pitchFamily="34" charset="0"/>
+              <a:cs typeface="Arial" panose="020B0604020202020204" pitchFamily="34" charset="0"/>
+            </a:endParaRPr>
+          </a:p>
+        </p:txBody>
+      </p:sp>
+      <p:cxnSp>
+        <p:nvCxnSpPr>
+          <p:cNvPr id="8" name="Straight Connector 7">
+            <a:extLst>
+              <a:ext uri="{FF2B5EF4-FFF2-40B4-BE49-F238E27FC236}">
+                <a16:creationId xmlns:a16="http://schemas.microsoft.com/office/drawing/2014/main" xmlns="" id="{F5AD3098-4B9E-4C8B-910B-1DD3F084C040}"/>
+              </a:ext>
+            </a:extLst>
+          </p:cNvPr>
+          <p:cNvCxnSpPr/>
+          <p:nvPr/>
+        </p:nvCxnSpPr>
+        <p:spPr>
+          <a:xfrm>
+            <a:off x="3385507" y="1431982"/>
+            <a:ext cx="5420984" cy="9943"/>
+          </a:xfrm>
+          <a:prstGeom prst="line">
+            <a:avLst/>
+          </a:prstGeom>
+          <a:ln w="28575">
+            <a:solidFill>
+              <a:schemeClr val="accent1">
+                <a:lumMod val="75000"/>
+              </a:schemeClr>
+            </a:solidFill>
+          </a:ln>
+        </p:spPr>
+        <p:style>
+          <a:lnRef idx="1">
+            <a:schemeClr val="accent1"/>
+          </a:lnRef>
+          <a:fillRef idx="0">
+            <a:schemeClr val="accent1"/>
+          </a:fillRef>
+          <a:effectRef idx="0">
+            <a:schemeClr val="accent1"/>
+          </a:effectRef>
+          <a:fontRef idx="minor">
+            <a:schemeClr val="tx1"/>
+          </a:fontRef>
+        </p:style>
+      </p:cxnSp>
+      <p:sp>
+        <p:nvSpPr>
+          <p:cNvPr id="5" name="Rectangle 4"/>
+          <p:cNvSpPr/>
+          <p:nvPr/>
+        </p:nvSpPr>
+        <p:spPr>
+          <a:xfrm>
+            <a:off x="2132347" y="2179474"/>
+            <a:ext cx="2149776" cy="1621771"/>
+          </a:xfrm>
+          <a:prstGeom prst="rect">
+            <a:avLst/>
+          </a:prstGeom>
+          <a:ln>
+            <a:noFill/>
+          </a:ln>
+        </p:spPr>
+        <p:style>
+          <a:lnRef idx="2">
+            <a:schemeClr val="accent1">
+              <a:shade val="50000"/>
+            </a:schemeClr>
+          </a:lnRef>
+          <a:fillRef idx="1">
+            <a:schemeClr val="accent1"/>
+          </a:fillRef>
+          <a:effectRef idx="0">
+            <a:schemeClr val="accent1"/>
+          </a:effectRef>
+          <a:fontRef idx="minor">
+            <a:schemeClr val="lt1"/>
+          </a:fontRef>
+        </p:style>
+        <p:txBody>
+          <a:bodyPr rtlCol="0" anchor="ctr"/>
+          <a:lstStyle/>
+          <a:p>
+            <a:pPr algn="ctr">
+              <a:lnSpc>
+                <a:spcPct val="150000"/>
+              </a:lnSpc>
+            </a:pPr>
+            <a:r>
+              <a:rPr lang="en-US" sz="2000" b="1" smtClean="0"/>
+              <a:t>C#</a:t>
+            </a:r>
+          </a:p>
+          <a:p>
+            <a:pPr algn="ctr">
+              <a:lnSpc>
+                <a:spcPct val="150000"/>
+              </a:lnSpc>
+            </a:pPr>
+            <a:r>
+              <a:rPr lang="en-US" sz="2000" b="1"/>
+              <a:t>Xamarin Forms</a:t>
+            </a:r>
+            <a:endParaRPr lang="en-US" sz="2000" b="1" smtClean="0"/>
+          </a:p>
+          <a:p>
+            <a:pPr algn="ctr">
+              <a:lnSpc>
+                <a:spcPct val="150000"/>
+              </a:lnSpc>
+            </a:pPr>
+            <a:r>
+              <a:rPr lang="en-US" sz="2000" b="1" smtClean="0"/>
+              <a:t>Visual Studio IDE</a:t>
+            </a:r>
+          </a:p>
+        </p:txBody>
+      </p:sp>
+      <p:sp>
+        <p:nvSpPr>
+          <p:cNvPr id="6" name="Rectangle 5"/>
+          <p:cNvSpPr/>
+          <p:nvPr/>
+        </p:nvSpPr>
+        <p:spPr>
+          <a:xfrm>
+            <a:off x="4843377" y="2179474"/>
+            <a:ext cx="5387557" cy="3096888"/>
+          </a:xfrm>
+          <a:prstGeom prst="rect">
+            <a:avLst/>
+          </a:prstGeom>
+          <a:solidFill>
+            <a:schemeClr val="accent1">
+              <a:lumMod val="50000"/>
+            </a:schemeClr>
+          </a:solidFill>
+          <a:ln>
+            <a:noFill/>
+          </a:ln>
+        </p:spPr>
+        <p:style>
+          <a:lnRef idx="2">
+            <a:schemeClr val="accent1">
+              <a:shade val="50000"/>
+            </a:schemeClr>
+          </a:lnRef>
+          <a:fillRef idx="1">
+            <a:schemeClr val="accent1"/>
+          </a:fillRef>
+          <a:effectRef idx="0">
+            <a:schemeClr val="accent1"/>
+          </a:effectRef>
+          <a:fontRef idx="minor">
+            <a:schemeClr val="lt1"/>
+          </a:fontRef>
+        </p:style>
+        <p:txBody>
+          <a:bodyPr rtlCol="0" anchor="ctr"/>
+          <a:lstStyle/>
+          <a:p>
+            <a:pPr lvl="1">
+              <a:lnSpc>
+                <a:spcPct val="150000"/>
+              </a:lnSpc>
+            </a:pPr>
+            <a:r>
+              <a:rPr lang="en-US" sz="2000" b="1" smtClean="0"/>
+              <a:t>User flow</a:t>
+            </a:r>
+          </a:p>
+          <a:p>
+            <a:pPr marL="914400" lvl="1" indent="-457200">
+              <a:lnSpc>
+                <a:spcPct val="150000"/>
+              </a:lnSpc>
+              <a:buFont typeface="+mj-lt"/>
+              <a:buAutoNum type="arabicPeriod"/>
+            </a:pPr>
+            <a:r>
+              <a:rPr lang="en-US" sz="2000" smtClean="0"/>
+              <a:t>enable Bluetooth</a:t>
+            </a:r>
+          </a:p>
+          <a:p>
+            <a:pPr marL="914400" lvl="1" indent="-457200">
+              <a:buFont typeface="+mj-lt"/>
+              <a:buAutoNum type="arabicPeriod"/>
+            </a:pPr>
+            <a:r>
+              <a:rPr lang="en-US" sz="2000" smtClean="0"/>
+              <a:t>scan for nearby devices</a:t>
+            </a:r>
+          </a:p>
+          <a:p>
+            <a:pPr marL="914400" lvl="1" indent="-457200">
+              <a:buFont typeface="+mj-lt"/>
+              <a:buAutoNum type="arabicPeriod"/>
+            </a:pPr>
+            <a:r>
+              <a:rPr lang="en-US" sz="2000"/>
+              <a:t>c</a:t>
+            </a:r>
+            <a:r>
+              <a:rPr lang="en-US" sz="2000" smtClean="0"/>
+              <a:t>hoose one of the devices</a:t>
+            </a:r>
+          </a:p>
+          <a:p>
+            <a:pPr marL="914400" lvl="1" indent="-457200">
+              <a:buFont typeface="+mj-lt"/>
+              <a:buAutoNum type="arabicPeriod"/>
+            </a:pPr>
+            <a:r>
+              <a:rPr lang="en-US" sz="2000" smtClean="0"/>
+              <a:t>services and characteristics are listed</a:t>
+            </a:r>
+          </a:p>
+          <a:p>
+            <a:pPr marL="914400" lvl="1" indent="-457200">
+              <a:buFont typeface="+mj-lt"/>
+              <a:buAutoNum type="arabicPeriod"/>
+            </a:pPr>
+            <a:r>
+              <a:rPr lang="en-US" sz="2000" smtClean="0"/>
+              <a:t>choose characteristic responsible for exchanging messages</a:t>
+            </a:r>
+          </a:p>
+        </p:txBody>
+      </p:sp>
+    </p:spTree>
+    <p:extLst>
+      <p:ext uri="{BB962C8B-B14F-4D97-AF65-F5344CB8AC3E}">
+        <p14:creationId xmlns:p14="http://schemas.microsoft.com/office/powerpoint/2010/main" val="3455527215"/>
+      </p:ext>
+    </p:extLst>
+  </p:cSld>
+  <p:clrMapOvr>
+    <a:masterClrMapping/>
+  </p:clrMapOvr>
+  <p:transition spd="slow">
+    <p:push dir="u"/>
+  </p:transition>
+  <p:timing>
+    <p:tnLst>
+      <p:par>
+        <p:cTn id="1" dur="indefinite" restart="never" nodeType="tmRoot"/>
+      </p:par>
+    </p:tnLst>
+  </p:timing>
+</p:sld>
+</file>
+
+<file path=ppt/slides/slide11.xml><?xml version="1.0" encoding="utf-8"?>
+<p:sld xmlns:a="http://schemas.openxmlformats.org/drawingml/2006/main" xmlns:r="http://schemas.openxmlformats.org/officeDocument/2006/relationships" xmlns:p="http://schemas.openxmlformats.org/presentationml/2006/main">
+  <p:cSld>
+    <p:bg>
+      <p:bgPr>
+        <a:solidFill>
+          <a:schemeClr val="accent1">
+            <a:lumMod val="75000"/>
+          </a:schemeClr>
+        </a:solidFill>
+        <a:effectLst/>
+      </p:bgPr>
+    </p:bg>
+    <p:spTree>
+      <p:nvGrpSpPr>
+        <p:cNvPr id="1" name=""/>
+        <p:cNvGrpSpPr/>
+        <p:nvPr/>
+      </p:nvGrpSpPr>
+      <p:grpSpPr>
+        <a:xfrm>
+          <a:off x="0" y="0"/>
+          <a:ext cx="0" cy="0"/>
+          <a:chOff x="0" y="0"/>
+          <a:chExt cx="0" cy="0"/>
+        </a:xfrm>
+      </p:grpSpPr>
+      <p:sp>
+        <p:nvSpPr>
+          <p:cNvPr id="4" name="TextBox 3"/>
+          <p:cNvSpPr txBox="1"/>
+          <p:nvPr/>
+        </p:nvSpPr>
+        <p:spPr>
+          <a:xfrm>
+            <a:off x="4467226" y="2771775"/>
+            <a:ext cx="3419474" cy="1015663"/>
+          </a:xfrm>
+          <a:prstGeom prst="rect">
+            <a:avLst/>
+          </a:prstGeom>
+          <a:noFill/>
+        </p:spPr>
+        <p:txBody>
+          <a:bodyPr wrap="square" rtlCol="0">
+            <a:spAutoFit/>
+          </a:bodyPr>
+          <a:lstStyle/>
+          <a:p>
+            <a:pPr algn="ctr"/>
+            <a:r>
+              <a:rPr lang="en-US" sz="6000" spc="200" smtClean="0">
+                <a:solidFill>
+                  <a:schemeClr val="bg1"/>
+                </a:solidFill>
+                <a:latin typeface="Arial" panose="020B0604020202020204" pitchFamily="34" charset="0"/>
+                <a:cs typeface="Arial" panose="020B0604020202020204" pitchFamily="34" charset="0"/>
+              </a:rPr>
+              <a:t>DEMO</a:t>
+            </a:r>
+            <a:endParaRPr lang="hr-HR" spc="200">
+              <a:solidFill>
+                <a:schemeClr val="bg1"/>
+              </a:solidFill>
+              <a:latin typeface="Arial" panose="020B0604020202020204" pitchFamily="34" charset="0"/>
+              <a:cs typeface="Arial" panose="020B0604020202020204" pitchFamily="34" charset="0"/>
+            </a:endParaRPr>
+          </a:p>
+        </p:txBody>
+      </p:sp>
+    </p:spTree>
+    <p:extLst>
+      <p:ext uri="{BB962C8B-B14F-4D97-AF65-F5344CB8AC3E}">
+        <p14:creationId xmlns:p14="http://schemas.microsoft.com/office/powerpoint/2010/main" val="1496470619"/>
+      </p:ext>
+    </p:extLst>
+  </p:cSld>
+  <p:clrMapOvr>
+    <a:masterClrMapping/>
+  </p:clrMapOvr>
+  <p:transition spd="slow">
+    <p:push dir="u"/>
+  </p:transition>
+  <p:timing>
+    <p:tnLst>
+      <p:par>
+        <p:cTn id="1" dur="indefinite" restart="never" nodeType="tmRoot"/>
+      </p:par>
+    </p:tnLst>
+  </p:timing>
+</p:sld>
+</file>
+
+<file path=ppt/slides/slide12.xml><?xml version="1.0" encoding="utf-8"?>
+<p:sld xmlns:a="http://schemas.openxmlformats.org/drawingml/2006/main" xmlns:r="http://schemas.openxmlformats.org/officeDocument/2006/relationships" xmlns:p="http://schemas.openxmlformats.org/presentationml/2006/main">
+  <p:cSld>
+    <p:spTree>
+      <p:nvGrpSpPr>
+        <p:cNvPr id="1" name=""/>
+        <p:cNvGrpSpPr/>
+        <p:nvPr/>
+      </p:nvGrpSpPr>
+      <p:grpSpPr>
+        <a:xfrm>
+          <a:off x="0" y="0"/>
+          <a:ext cx="0" cy="0"/>
+          <a:chOff x="0" y="0"/>
+          <a:chExt cx="0" cy="0"/>
+        </a:xfrm>
+      </p:grpSpPr>
+      <p:sp>
+        <p:nvSpPr>
+          <p:cNvPr id="7" name="Title 1">
+            <a:extLst>
+              <a:ext uri="{FF2B5EF4-FFF2-40B4-BE49-F238E27FC236}">
+                <a16:creationId xmlns:a16="http://schemas.microsoft.com/office/drawing/2014/main" xmlns="" id="{F3F19207-56E3-41C1-B35F-1C329A479D6C}"/>
+              </a:ext>
+            </a:extLst>
+          </p:cNvPr>
+          <p:cNvSpPr txBox="1">
+            <a:spLocks/>
+          </p:cNvSpPr>
+          <p:nvPr/>
+        </p:nvSpPr>
+        <p:spPr>
+          <a:xfrm>
+            <a:off x="3431515" y="491705"/>
+            <a:ext cx="5328968" cy="940277"/>
+          </a:xfrm>
+          <a:prstGeom prst="rect">
+            <a:avLst/>
+          </a:prstGeom>
+        </p:spPr>
+        <p:txBody>
+          <a:bodyPr vert="horz" lIns="91440" tIns="45720" rIns="91440" bIns="45720" rtlCol="0" anchor="ctr">
+            <a:normAutofit/>
+          </a:bodyPr>
+          <a:lstStyle>
+            <a:lvl1pPr algn="l" defTabSz="914400" rtl="0" eaLnBrk="1" latinLnBrk="0" hangingPunct="1">
+              <a:lnSpc>
+                <a:spcPct val="90000"/>
+              </a:lnSpc>
+              <a:spcBef>
+                <a:spcPct val="0"/>
+              </a:spcBef>
+              <a:buNone/>
+              <a:defRPr sz="4400" kern="1200">
+                <a:solidFill>
+                  <a:schemeClr val="tx1"/>
+                </a:solidFill>
+                <a:latin typeface="+mj-lt"/>
+                <a:ea typeface="+mj-ea"/>
+                <a:cs typeface="+mj-cs"/>
+              </a:defRPr>
+            </a:lvl1pPr>
+          </a:lstStyle>
+          <a:p>
+            <a:pPr algn="ctr"/>
+            <a:r>
+              <a:rPr lang="en-US" sz="2800" smtClean="0">
+                <a:latin typeface="Arial" panose="020B0604020202020204" pitchFamily="34" charset="0"/>
+                <a:cs typeface="Arial" panose="020B0604020202020204" pitchFamily="34" charset="0"/>
+              </a:rPr>
+              <a:t>Q &amp; A</a:t>
+            </a:r>
+            <a:endParaRPr lang="en-US" sz="3600" dirty="0">
+              <a:latin typeface="Arial" panose="020B0604020202020204" pitchFamily="34" charset="0"/>
+              <a:cs typeface="Arial" panose="020B0604020202020204" pitchFamily="34" charset="0"/>
+            </a:endParaRPr>
+          </a:p>
+        </p:txBody>
+      </p:sp>
+      <p:cxnSp>
+        <p:nvCxnSpPr>
+          <p:cNvPr id="8" name="Straight Connector 7">
+            <a:extLst>
+              <a:ext uri="{FF2B5EF4-FFF2-40B4-BE49-F238E27FC236}">
+                <a16:creationId xmlns:a16="http://schemas.microsoft.com/office/drawing/2014/main" xmlns="" id="{F5AD3098-4B9E-4C8B-910B-1DD3F084C040}"/>
+              </a:ext>
+            </a:extLst>
+          </p:cNvPr>
+          <p:cNvCxnSpPr/>
+          <p:nvPr/>
+        </p:nvCxnSpPr>
+        <p:spPr>
+          <a:xfrm>
+            <a:off x="3385507" y="1431982"/>
+            <a:ext cx="5420984" cy="9943"/>
+          </a:xfrm>
+          <a:prstGeom prst="line">
+            <a:avLst/>
+          </a:prstGeom>
+          <a:ln w="28575">
+            <a:solidFill>
+              <a:schemeClr val="accent1">
+                <a:lumMod val="75000"/>
+              </a:schemeClr>
+            </a:solidFill>
+          </a:ln>
+        </p:spPr>
+        <p:style>
+          <a:lnRef idx="1">
+            <a:schemeClr val="accent1"/>
+          </a:lnRef>
+          <a:fillRef idx="0">
+            <a:schemeClr val="accent1"/>
+          </a:fillRef>
+          <a:effectRef idx="0">
+            <a:schemeClr val="accent1"/>
+          </a:effectRef>
+          <a:fontRef idx="minor">
+            <a:schemeClr val="tx1"/>
+          </a:fontRef>
+        </p:style>
+      </p:cxnSp>
+      <p:sp>
+        <p:nvSpPr>
+          <p:cNvPr id="3" name="TextBox 2"/>
+          <p:cNvSpPr txBox="1"/>
+          <p:nvPr/>
+        </p:nvSpPr>
+        <p:spPr>
+          <a:xfrm>
+            <a:off x="5487836" y="2829465"/>
+            <a:ext cx="1216325" cy="1569660"/>
+          </a:xfrm>
+          <a:prstGeom prst="rect">
+            <a:avLst/>
+          </a:prstGeom>
+          <a:noFill/>
+        </p:spPr>
+        <p:txBody>
+          <a:bodyPr wrap="square" rtlCol="0">
+            <a:spAutoFit/>
+          </a:bodyPr>
+          <a:lstStyle/>
+          <a:p>
+            <a:pPr algn="ctr"/>
+            <a:r>
+              <a:rPr lang="en-US" sz="9600" smtClean="0">
+                <a:solidFill>
+                  <a:schemeClr val="accent1">
+                    <a:lumMod val="75000"/>
+                  </a:schemeClr>
+                </a:solidFill>
+                <a:latin typeface="Arial" panose="020B0604020202020204" pitchFamily="34" charset="0"/>
+                <a:cs typeface="Arial" panose="020B0604020202020204" pitchFamily="34" charset="0"/>
+              </a:rPr>
+              <a:t>?</a:t>
+            </a:r>
+            <a:endParaRPr lang="hr-HR" sz="9600">
+              <a:solidFill>
+                <a:schemeClr val="accent1">
+                  <a:lumMod val="75000"/>
+                </a:schemeClr>
+              </a:solidFill>
+              <a:latin typeface="Arial" panose="020B0604020202020204" pitchFamily="34" charset="0"/>
+              <a:cs typeface="Arial" panose="020B0604020202020204" pitchFamily="34" charset="0"/>
+            </a:endParaRPr>
+          </a:p>
+        </p:txBody>
+      </p:sp>
+    </p:spTree>
+    <p:extLst>
+      <p:ext uri="{BB962C8B-B14F-4D97-AF65-F5344CB8AC3E}">
+        <p14:creationId xmlns:p14="http://schemas.microsoft.com/office/powerpoint/2010/main" val="2041763398"/>
+      </p:ext>
+    </p:extLst>
+  </p:cSld>
+  <p:clrMapOvr>
+    <a:masterClrMapping/>
+  </p:clrMapOvr>
+  <p:transition spd="slow">
+    <p:push dir="u"/>
+  </p:transition>
   <p:timing>
     <p:tnLst>
       <p:par>
@@ -3672,15 +4299,23 @@
           </a:xfrm>
         </p:spPr>
         <p:txBody>
-          <a:bodyPr/>
+          <a:bodyPr>
+            <a:normAutofit/>
+          </a:bodyPr>
           <a:lstStyle/>
           <a:p>
             <a:pPr algn="ctr"/>
             <a:r>
-              <a:rPr lang="en-US" sz="3600"/>
+              <a:rPr lang="en-US" sz="2800">
+                <a:latin typeface="Arial" panose="020B0604020202020204" pitchFamily="34" charset="0"/>
+                <a:cs typeface="Arial" panose="020B0604020202020204" pitchFamily="34" charset="0"/>
+              </a:rPr>
               <a:t>GOALS</a:t>
             </a:r>
-            <a:endParaRPr lang="hr-HR"/>
+            <a:endParaRPr lang="hr-HR">
+              <a:latin typeface="Arial" panose="020B0604020202020204" pitchFamily="34" charset="0"/>
+              <a:cs typeface="Arial" panose="020B0604020202020204" pitchFamily="34" charset="0"/>
+            </a:endParaRPr>
           </a:p>
         </p:txBody>
       </p:sp>
@@ -3693,7 +4328,7 @@
         <p:spPr>
           <a:xfrm>
             <a:off x="3269410" y="2104845"/>
-            <a:ext cx="5635926" cy="1015663"/>
+            <a:ext cx="5635926" cy="923330"/>
           </a:xfrm>
           <a:prstGeom prst="rect">
             <a:avLst/>
@@ -3715,49 +4350,95 @@
           <a:p>
             <a:pPr algn="ctr"/>
             <a:r>
-              <a:rPr lang="en-US" sz="2000"/>
-              <a:t>Establishment of secure communication between Arduino microcontroller and smartphone device over </a:t>
-            </a:r>
-            <a:r>
-              <a:rPr lang="en-US" sz="2000">
+              <a:rPr lang="en-US">
+                <a:latin typeface="Arial" panose="020B0604020202020204" pitchFamily="34" charset="0"/>
+                <a:cs typeface="Arial" panose="020B0604020202020204" pitchFamily="34" charset="0"/>
+              </a:rPr>
+              <a:t>Establishment of secure communication between </a:t>
+            </a:r>
+            <a:r>
+              <a:rPr lang="en-US" smtClean="0">
+                <a:latin typeface="Arial" panose="020B0604020202020204" pitchFamily="34" charset="0"/>
+                <a:cs typeface="Arial" panose="020B0604020202020204" pitchFamily="34" charset="0"/>
+              </a:rPr>
+              <a:t>Arduino Uno </a:t>
+            </a:r>
+            <a:r>
+              <a:rPr lang="en-US">
+                <a:latin typeface="Arial" panose="020B0604020202020204" pitchFamily="34" charset="0"/>
+                <a:cs typeface="Arial" panose="020B0604020202020204" pitchFamily="34" charset="0"/>
+              </a:rPr>
+              <a:t>microcontroller and </a:t>
+            </a:r>
+            <a:r>
+              <a:rPr lang="en-US" smtClean="0">
+                <a:latin typeface="Arial" panose="020B0604020202020204" pitchFamily="34" charset="0"/>
+                <a:cs typeface="Arial" panose="020B0604020202020204" pitchFamily="34" charset="0"/>
+              </a:rPr>
+              <a:t>Android application </a:t>
+            </a:r>
+            <a:r>
+              <a:rPr lang="en-US">
+                <a:latin typeface="Arial" panose="020B0604020202020204" pitchFamily="34" charset="0"/>
+                <a:cs typeface="Arial" panose="020B0604020202020204" pitchFamily="34" charset="0"/>
+              </a:rPr>
+              <a:t>over </a:t>
+            </a:r>
+            <a:r>
+              <a:rPr lang="en-US">
                 <a:solidFill>
                   <a:schemeClr val="accent1">
                     <a:lumMod val="75000"/>
                   </a:schemeClr>
                 </a:solidFill>
+                <a:latin typeface="Arial" panose="020B0604020202020204" pitchFamily="34" charset="0"/>
+                <a:cs typeface="Arial" panose="020B0604020202020204" pitchFamily="34" charset="0"/>
               </a:rPr>
               <a:t>B</a:t>
             </a:r>
             <a:r>
-              <a:rPr lang="en-US" sz="2000"/>
+              <a:rPr lang="en-US">
+                <a:latin typeface="Arial" panose="020B0604020202020204" pitchFamily="34" charset="0"/>
+                <a:cs typeface="Arial" panose="020B0604020202020204" pitchFamily="34" charset="0"/>
+              </a:rPr>
               <a:t>luetooth </a:t>
             </a:r>
             <a:r>
-              <a:rPr lang="en-US" sz="2000">
+              <a:rPr lang="en-US">
                 <a:solidFill>
                   <a:schemeClr val="accent1">
                     <a:lumMod val="75000"/>
                   </a:schemeClr>
                 </a:solidFill>
+                <a:latin typeface="Arial" panose="020B0604020202020204" pitchFamily="34" charset="0"/>
+                <a:cs typeface="Arial" panose="020B0604020202020204" pitchFamily="34" charset="0"/>
               </a:rPr>
               <a:t>L</a:t>
             </a:r>
             <a:r>
-              <a:rPr lang="en-US" sz="2000"/>
+              <a:rPr lang="en-US">
+                <a:latin typeface="Arial" panose="020B0604020202020204" pitchFamily="34" charset="0"/>
+                <a:cs typeface="Arial" panose="020B0604020202020204" pitchFamily="34" charset="0"/>
+              </a:rPr>
               <a:t>ow </a:t>
             </a:r>
             <a:r>
-              <a:rPr lang="en-US" sz="2000">
+              <a:rPr lang="en-US">
                 <a:solidFill>
                   <a:schemeClr val="accent1">
                     <a:lumMod val="75000"/>
                   </a:schemeClr>
                 </a:solidFill>
+                <a:latin typeface="Arial" panose="020B0604020202020204" pitchFamily="34" charset="0"/>
+                <a:cs typeface="Arial" panose="020B0604020202020204" pitchFamily="34" charset="0"/>
               </a:rPr>
               <a:t>E</a:t>
             </a:r>
             <a:r>
-              <a:rPr lang="en-US" sz="2000"/>
+              <a:rPr lang="en-US">
+                <a:latin typeface="Arial" panose="020B0604020202020204" pitchFamily="34" charset="0"/>
+                <a:cs typeface="Arial" panose="020B0604020202020204" pitchFamily="34" charset="0"/>
+              </a:rPr>
               <a:t>nergy</a:t>
             </a:r>
           </a:p>
@@ -3771,8 +4452,8 @@
         </p:nvSpPr>
         <p:spPr>
           <a:xfrm>
-            <a:off x="3278036" y="3750239"/>
-            <a:ext cx="5635926" cy="707886"/>
+            <a:off x="3278036" y="3734850"/>
+            <a:ext cx="5635926" cy="646331"/>
           </a:xfrm>
           <a:prstGeom prst="rect">
             <a:avLst/>
@@ -3794,8 +4475,11 @@
           <a:p>
             <a:pPr algn="ctr"/>
             <a:r>
-              <a:rPr lang="en-US" sz="2000"/>
-              <a:t>Comparison of speed and efficiency on different versions of Arduino device</a:t>
+              <a:rPr lang="en-US">
+                <a:latin typeface="Arial" panose="020B0604020202020204" pitchFamily="34" charset="0"/>
+                <a:cs typeface="Arial" panose="020B0604020202020204" pitchFamily="34" charset="0"/>
+              </a:rPr>
+              <a:t>Speed and efficiency of cryptographic functions on Arduino Uno microcontroller</a:t>
             </a:r>
           </a:p>
         </p:txBody>
@@ -3809,7 +4493,7 @@
         <p:spPr>
           <a:xfrm>
             <a:off x="3278036" y="5087856"/>
-            <a:ext cx="5635926" cy="400110"/>
+            <a:ext cx="5635926" cy="369332"/>
           </a:xfrm>
           <a:prstGeom prst="rect">
             <a:avLst/>
@@ -3831,8 +4515,18 @@
           <a:p>
             <a:pPr algn="ctr"/>
             <a:r>
-              <a:rPr lang="en-US" sz="2000" dirty="0"/>
-              <a:t>Appliances in many real-world problems</a:t>
+              <a:rPr lang="en-US" smtClean="0">
+                <a:latin typeface="Arial" panose="020B0604020202020204" pitchFamily="34" charset="0"/>
+                <a:cs typeface="Arial" panose="020B0604020202020204" pitchFamily="34" charset="0"/>
+              </a:rPr>
+              <a:t>Applications </a:t>
+            </a:r>
+            <a:r>
+              <a:rPr lang="en-US" dirty="0">
+                <a:latin typeface="Arial" panose="020B0604020202020204" pitchFamily="34" charset="0"/>
+                <a:cs typeface="Arial" panose="020B0604020202020204" pitchFamily="34" charset="0"/>
+              </a:rPr>
+              <a:t>in many real-world problems</a:t>
             </a:r>
           </a:p>
         </p:txBody>
@@ -3938,10 +4632,16 @@
           <a:p>
             <a:pPr algn="ctr"/>
             <a:r>
-              <a:rPr lang="en-US" sz="3600"/>
+              <a:rPr lang="en-US" sz="2800">
+                <a:latin typeface="Arial" panose="020B0604020202020204" pitchFamily="34" charset="0"/>
+                <a:cs typeface="Arial" panose="020B0604020202020204" pitchFamily="34" charset="0"/>
+              </a:rPr>
               <a:t>SECURE COMMUNICATION</a:t>
             </a:r>
-            <a:endParaRPr lang="hr-HR" sz="3600"/>
+            <a:endParaRPr lang="hr-HR" sz="2800">
+              <a:latin typeface="Arial" panose="020B0604020202020204" pitchFamily="34" charset="0"/>
+              <a:cs typeface="Arial" panose="020B0604020202020204" pitchFamily="34" charset="0"/>
+            </a:endParaRPr>
           </a:p>
         </p:txBody>
       </p:sp>
@@ -4342,219 +5042,170 @@
       </p:pic>
       <p:sp>
         <p:nvSpPr>
-          <p:cNvPr id="4" name="TextBox 3">
-            <a:extLst>
-              <a:ext uri="{FF2B5EF4-FFF2-40B4-BE49-F238E27FC236}">
-                <a16:creationId xmlns:a16="http://schemas.microsoft.com/office/drawing/2014/main" xmlns="" id="{4746383C-EB29-4DB6-AF3A-1876F6A78DF2}"/>
-              </a:ext>
-            </a:extLst>
-          </p:cNvPr>
+          <p:cNvPr id="8" name="Left Brace 7"/>
+          <p:cNvSpPr/>
+          <p:nvPr/>
+        </p:nvSpPr>
+        <p:spPr>
+          <a:xfrm>
+            <a:off x="4595468" y="1992756"/>
+            <a:ext cx="327804" cy="1462063"/>
+          </a:xfrm>
+          <a:prstGeom prst="leftBrace">
+            <a:avLst/>
+          </a:prstGeom>
+          <a:ln w="19050"/>
+        </p:spPr>
+        <p:style>
+          <a:lnRef idx="1">
+            <a:schemeClr val="accent1"/>
+          </a:lnRef>
+          <a:fillRef idx="0">
+            <a:schemeClr val="accent1"/>
+          </a:fillRef>
+          <a:effectRef idx="0">
+            <a:schemeClr val="accent1"/>
+          </a:effectRef>
+          <a:fontRef idx="minor">
+            <a:schemeClr val="tx1"/>
+          </a:fontRef>
+        </p:style>
+        <p:txBody>
+          <a:bodyPr rtlCol="0" anchor="ctr"/>
+          <a:lstStyle/>
+          <a:p>
+            <a:pPr algn="ctr"/>
+            <a:endParaRPr lang="hr-HR"/>
+          </a:p>
+        </p:txBody>
+      </p:sp>
+      <p:sp>
+        <p:nvSpPr>
+          <p:cNvPr id="18" name="Left Brace 17"/>
+          <p:cNvSpPr/>
+          <p:nvPr/>
+        </p:nvSpPr>
+        <p:spPr>
+          <a:xfrm rot="10800000">
+            <a:off x="7196131" y="1992756"/>
+            <a:ext cx="327804" cy="1452120"/>
+          </a:xfrm>
+          <a:prstGeom prst="leftBrace">
+            <a:avLst/>
+          </a:prstGeom>
+          <a:ln w="19050"/>
+        </p:spPr>
+        <p:style>
+          <a:lnRef idx="1">
+            <a:schemeClr val="accent1"/>
+          </a:lnRef>
+          <a:fillRef idx="0">
+            <a:schemeClr val="accent1"/>
+          </a:fillRef>
+          <a:effectRef idx="0">
+            <a:schemeClr val="accent1"/>
+          </a:effectRef>
+          <a:fontRef idx="minor">
+            <a:schemeClr val="tx1"/>
+          </a:fontRef>
+        </p:style>
+        <p:txBody>
+          <a:bodyPr rtlCol="0" anchor="ctr"/>
+          <a:lstStyle/>
+          <a:p>
+            <a:pPr algn="ctr"/>
+            <a:endParaRPr lang="hr-HR"/>
+          </a:p>
+        </p:txBody>
+      </p:sp>
+      <p:sp>
+        <p:nvSpPr>
+          <p:cNvPr id="10" name="TextBox 9"/>
           <p:cNvSpPr txBox="1"/>
           <p:nvPr/>
         </p:nvSpPr>
         <p:spPr>
           <a:xfrm>
-            <a:off x="3887141" y="1953919"/>
-            <a:ext cx="4417718" cy="369332"/>
+            <a:off x="5427047" y="2219333"/>
+            <a:ext cx="1180644" cy="369332"/>
           </a:xfrm>
           <a:prstGeom prst="rect">
             <a:avLst/>
           </a:prstGeom>
+          <a:noFill/>
         </p:spPr>
         <p:txBody>
-          <a:bodyPr rot="0" spcFirstLastPara="0" vertOverflow="overflow" horzOverflow="overflow" vert="horz" wrap="square" lIns="91440" tIns="45720" rIns="91440" bIns="45720" numCol="1" spcCol="0" rtlCol="0" fromWordArt="0" anchor="t" anchorCtr="0" forceAA="0" compatLnSpc="1">
-            <a:prstTxWarp prst="textNoShape">
-              <a:avLst/>
-            </a:prstTxWarp>
+          <a:bodyPr wrap="none" rtlCol="0">
             <a:spAutoFit/>
           </a:bodyPr>
           <a:lstStyle/>
           <a:p>
-            <a:pPr algn="ctr"/>
-            <a:r>
-              <a:rPr lang="en-US" b="1" i="1">
-                <a:solidFill>
-                  <a:schemeClr val="tx1">
-                    <a:lumMod val="95000"/>
-                    <a:lumOff val="5000"/>
-                  </a:schemeClr>
-                </a:solidFill>
-              </a:rPr>
-              <a:t>$</a:t>
-            </a:r>
-            <a:r>
-              <a:rPr lang="en-US" i="1">
-                <a:solidFill>
-                  <a:schemeClr val="bg1">
-                    <a:lumMod val="65000"/>
-                  </a:schemeClr>
-                </a:solidFill>
-              </a:rPr>
-              <a:t>&lt;</a:t>
-            </a:r>
-            <a:r>
-              <a:rPr lang="en-US" i="1">
-                <a:solidFill>
-                  <a:schemeClr val="bg1">
-                    <a:lumMod val="65000"/>
-                  </a:schemeClr>
-                </a:solidFill>
-                <a:cs typeface="Calibri"/>
-              </a:rPr>
-              <a:t>MESSAGE_TYPE&gt;</a:t>
-            </a:r>
-            <a:r>
-              <a:rPr lang="en-US" b="1" i="1">
-                <a:solidFill>
-                  <a:schemeClr val="tx1">
-                    <a:lumMod val="95000"/>
-                    <a:lumOff val="5000"/>
-                  </a:schemeClr>
-                </a:solidFill>
-                <a:cs typeface="Calibri"/>
-              </a:rPr>
-              <a:t>=</a:t>
-            </a:r>
-            <a:r>
-              <a:rPr lang="en-US" i="1">
-                <a:solidFill>
-                  <a:schemeClr val="bg1">
-                    <a:lumMod val="65000"/>
-                  </a:schemeClr>
-                </a:solidFill>
-                <a:cs typeface="Calibri"/>
-              </a:rPr>
-              <a:t>&lt;MESSAGE_CONTENT&gt;</a:t>
-            </a:r>
-            <a:r>
-              <a:rPr lang="en-US" b="1" i="1">
-                <a:solidFill>
-                  <a:schemeClr val="tx1">
-                    <a:lumMod val="95000"/>
-                    <a:lumOff val="5000"/>
-                  </a:schemeClr>
-                </a:solidFill>
-                <a:cs typeface="Calibri"/>
-              </a:rPr>
-              <a:t>;</a:t>
-            </a:r>
-          </a:p>
-        </p:txBody>
-      </p:sp>
-      <p:sp>
-        <p:nvSpPr>
-          <p:cNvPr id="6" name="TextBox 5">
-            <a:extLst>
-              <a:ext uri="{FF2B5EF4-FFF2-40B4-BE49-F238E27FC236}">
-                <a16:creationId xmlns:a16="http://schemas.microsoft.com/office/drawing/2014/main" xmlns="" id="{DFB61460-4A0C-4662-B6D0-88F0BCEC799C}"/>
-              </a:ext>
-            </a:extLst>
-          </p:cNvPr>
-          <p:cNvSpPr txBox="1"/>
-          <p:nvPr/>
-        </p:nvSpPr>
-        <p:spPr>
-          <a:xfrm>
-            <a:off x="5288844" y="2772363"/>
-            <a:ext cx="1614312" cy="400110"/>
-          </a:xfrm>
-          <a:prstGeom prst="rect">
-            <a:avLst/>
-          </a:prstGeom>
-          <a:ln>
-            <a:solidFill>
-              <a:schemeClr val="accent1">
-                <a:lumMod val="75000"/>
-              </a:schemeClr>
-            </a:solidFill>
-          </a:ln>
-        </p:spPr>
-        <p:txBody>
-          <a:bodyPr rot="0" spcFirstLastPara="0" vertOverflow="overflow" horzOverflow="overflow" vert="horz" wrap="square" lIns="91440" tIns="45720" rIns="91440" bIns="45720" numCol="1" spcCol="0" rtlCol="0" fromWordArt="0" anchor="t" anchorCtr="0" forceAA="0" compatLnSpc="1">
-            <a:prstTxWarp prst="textNoShape">
-              <a:avLst/>
-            </a:prstTxWarp>
-            <a:spAutoFit/>
-          </a:bodyPr>
-          <a:lstStyle/>
-          <a:p>
-            <a:pPr algn="ctr"/>
-            <a:r>
-              <a:rPr lang="en-US" sz="2000">
+            <a:r>
+              <a:rPr lang="en-US" smtClean="0">
                 <a:solidFill>
                   <a:schemeClr val="accent1">
                     <a:lumMod val="75000"/>
                   </a:schemeClr>
                 </a:solidFill>
+                <a:latin typeface="Arial" panose="020B0604020202020204" pitchFamily="34" charset="0"/>
+                <a:cs typeface="Arial" panose="020B0604020202020204" pitchFamily="34" charset="0"/>
               </a:rPr>
               <a:t>PRIVACY</a:t>
             </a:r>
-            <a:endParaRPr lang="en-US" sz="2000">
+            <a:endParaRPr lang="hr-HR">
               <a:solidFill>
                 <a:schemeClr val="accent1">
                   <a:lumMod val="75000"/>
                 </a:schemeClr>
               </a:solidFill>
-              <a:cs typeface="Calibri"/>
+              <a:latin typeface="Arial" panose="020B0604020202020204" pitchFamily="34" charset="0"/>
+              <a:cs typeface="Arial" panose="020B0604020202020204" pitchFamily="34" charset="0"/>
             </a:endParaRPr>
           </a:p>
         </p:txBody>
       </p:sp>
       <p:sp>
         <p:nvSpPr>
-          <p:cNvPr id="17" name="TextBox 16">
-            <a:extLst>
-              <a:ext uri="{FF2B5EF4-FFF2-40B4-BE49-F238E27FC236}">
-                <a16:creationId xmlns:a16="http://schemas.microsoft.com/office/drawing/2014/main" xmlns="" id="{C2A2B99B-918D-4BD3-BB30-A333DBD034B9}"/>
-              </a:ext>
-            </a:extLst>
-          </p:cNvPr>
+          <p:cNvPr id="19" name="TextBox 18"/>
           <p:cNvSpPr txBox="1"/>
           <p:nvPr/>
         </p:nvSpPr>
         <p:spPr>
           <a:xfrm>
-            <a:off x="5016029" y="3327399"/>
-            <a:ext cx="2159941" cy="400110"/>
+            <a:off x="4968321" y="2832456"/>
+            <a:ext cx="2193742" cy="369332"/>
           </a:xfrm>
           <a:prstGeom prst="rect">
             <a:avLst/>
           </a:prstGeom>
-          <a:ln>
-            <a:solidFill>
-              <a:schemeClr val="accent1">
-                <a:lumMod val="75000"/>
-              </a:schemeClr>
-            </a:solidFill>
-          </a:ln>
+          <a:noFill/>
         </p:spPr>
         <p:txBody>
-          <a:bodyPr rot="0" spcFirstLastPara="0" vertOverflow="overflow" horzOverflow="overflow" vert="horz" wrap="square" lIns="91440" tIns="45720" rIns="91440" bIns="45720" numCol="1" spcCol="0" rtlCol="0" fromWordArt="0" anchor="t" anchorCtr="0" forceAA="0" compatLnSpc="1">
-            <a:prstTxWarp prst="textNoShape">
-              <a:avLst/>
-            </a:prstTxWarp>
+          <a:bodyPr wrap="none" rtlCol="0">
             <a:spAutoFit/>
           </a:bodyPr>
           <a:lstStyle/>
           <a:p>
-            <a:pPr algn="ctr"/>
-            <a:r>
-              <a:rPr lang="en-US" sz="2000">
+            <a:r>
+              <a:rPr lang="en-US" smtClean="0">
                 <a:solidFill>
                   <a:schemeClr val="accent1">
                     <a:lumMod val="75000"/>
                   </a:schemeClr>
                 </a:solidFill>
+                <a:latin typeface="Arial" panose="020B0604020202020204" pitchFamily="34" charset="0"/>
+                <a:cs typeface="Arial" panose="020B0604020202020204" pitchFamily="34" charset="0"/>
               </a:rPr>
               <a:t>AUTHENTICATION</a:t>
             </a:r>
-            <a:endParaRPr lang="en-US" sz="2000">
+            <a:endParaRPr lang="hr-HR">
               <a:solidFill>
                 <a:schemeClr val="accent1">
                   <a:lumMod val="75000"/>
                 </a:schemeClr>
               </a:solidFill>
-              <a:cs typeface="Calibri"/>
+              <a:latin typeface="Arial" panose="020B0604020202020204" pitchFamily="34" charset="0"/>
+              <a:cs typeface="Arial" panose="020B0604020202020204" pitchFamily="34" charset="0"/>
             </a:endParaRPr>
           </a:p>
         </p:txBody>
@@ -4623,10 +5274,16 @@
           <a:p>
             <a:pPr algn="ctr"/>
             <a:r>
-              <a:rPr lang="en-US" sz="3600" dirty="0"/>
+              <a:rPr lang="en-US" sz="2800" dirty="0">
+                <a:latin typeface="Arial" panose="020B0604020202020204" pitchFamily="34" charset="0"/>
+                <a:cs typeface="Arial" panose="020B0604020202020204" pitchFamily="34" charset="0"/>
+              </a:rPr>
               <a:t>PRIVACY</a:t>
             </a:r>
-            <a:endParaRPr lang="en-US" dirty="0"/>
+            <a:endParaRPr lang="en-US" dirty="0">
+              <a:latin typeface="Arial" panose="020B0604020202020204" pitchFamily="34" charset="0"/>
+              <a:cs typeface="Arial" panose="020B0604020202020204" pitchFamily="34" charset="0"/>
+            </a:endParaRPr>
           </a:p>
         </p:txBody>
       </p:sp>
@@ -4675,8 +5332,8 @@
         </p:nvSpPr>
         <p:spPr>
           <a:xfrm>
-            <a:off x="2677418" y="1661479"/>
-            <a:ext cx="6829755" cy="461665"/>
+            <a:off x="3086408" y="1661479"/>
+            <a:ext cx="6011774" cy="400110"/>
           </a:xfrm>
           <a:prstGeom prst="rect">
             <a:avLst/>
@@ -4691,62 +5348,85 @@
           <a:p>
             <a:pPr algn="ctr"/>
             <a:r>
-              <a:rPr lang="en-US" sz="2400" smtClean="0">
+              <a:rPr lang="en-US" sz="2000" smtClean="0">
                 <a:solidFill>
                   <a:schemeClr val="accent1">
                     <a:lumMod val="75000"/>
                   </a:schemeClr>
                 </a:solidFill>
+                <a:latin typeface="Arial" panose="020B0604020202020204" pitchFamily="34" charset="0"/>
+                <a:cs typeface="Arial" panose="020B0604020202020204" pitchFamily="34" charset="0"/>
               </a:rPr>
               <a:t>E</a:t>
             </a:r>
             <a:r>
-              <a:rPr lang="en-US" sz="2400" smtClean="0"/>
-              <a:t>lliptic - </a:t>
-            </a:r>
-            <a:r>
-              <a:rPr lang="en-US" sz="2400" smtClean="0">
+              <a:rPr lang="en-US" sz="2000" smtClean="0">
+                <a:latin typeface="Arial" panose="020B0604020202020204" pitchFamily="34" charset="0"/>
+                <a:cs typeface="Arial" panose="020B0604020202020204" pitchFamily="34" charset="0"/>
+              </a:rPr>
+              <a:t>lliptic-</a:t>
+            </a:r>
+            <a:r>
+              <a:rPr lang="en-US" sz="2000" smtClean="0">
                 <a:solidFill>
                   <a:schemeClr val="accent1">
                     <a:lumMod val="75000"/>
                   </a:schemeClr>
                 </a:solidFill>
+                <a:latin typeface="Arial" panose="020B0604020202020204" pitchFamily="34" charset="0"/>
+                <a:cs typeface="Arial" panose="020B0604020202020204" pitchFamily="34" charset="0"/>
               </a:rPr>
               <a:t>C</a:t>
             </a:r>
             <a:r>
-              <a:rPr lang="en-US" sz="2400" smtClean="0"/>
+              <a:rPr lang="en-US" sz="2000" smtClean="0">
+                <a:latin typeface="Arial" panose="020B0604020202020204" pitchFamily="34" charset="0"/>
+                <a:cs typeface="Arial" panose="020B0604020202020204" pitchFamily="34" charset="0"/>
+              </a:rPr>
               <a:t>urve </a:t>
             </a:r>
             <a:r>
-              <a:rPr lang="en-US" sz="2400" smtClean="0">
+              <a:rPr lang="en-US" sz="2000" smtClean="0">
                 <a:solidFill>
                   <a:schemeClr val="accent1">
                     <a:lumMod val="75000"/>
                   </a:schemeClr>
                 </a:solidFill>
+                <a:latin typeface="Arial" panose="020B0604020202020204" pitchFamily="34" charset="0"/>
+                <a:cs typeface="Arial" panose="020B0604020202020204" pitchFamily="34" charset="0"/>
               </a:rPr>
               <a:t>D</a:t>
             </a:r>
             <a:r>
-              <a:rPr lang="en-US" sz="2400" smtClean="0"/>
-              <a:t>iffie - </a:t>
-            </a:r>
-            <a:r>
-              <a:rPr lang="en-US" sz="2400" smtClean="0">
+              <a:rPr lang="en-US" sz="2000" smtClean="0">
+                <a:latin typeface="Arial" panose="020B0604020202020204" pitchFamily="34" charset="0"/>
+                <a:cs typeface="Arial" panose="020B0604020202020204" pitchFamily="34" charset="0"/>
+              </a:rPr>
+              <a:t>iffie-</a:t>
+            </a:r>
+            <a:r>
+              <a:rPr lang="en-US" sz="2000" smtClean="0">
                 <a:solidFill>
                   <a:schemeClr val="accent1">
                     <a:lumMod val="75000"/>
                   </a:schemeClr>
                 </a:solidFill>
+                <a:latin typeface="Arial" panose="020B0604020202020204" pitchFamily="34" charset="0"/>
+                <a:cs typeface="Arial" panose="020B0604020202020204" pitchFamily="34" charset="0"/>
               </a:rPr>
               <a:t>H</a:t>
             </a:r>
             <a:r>
-              <a:rPr lang="en-US" sz="2400" smtClean="0"/>
+              <a:rPr lang="en-US" sz="2000" smtClean="0">
+                <a:latin typeface="Arial" panose="020B0604020202020204" pitchFamily="34" charset="0"/>
+                <a:cs typeface="Arial" panose="020B0604020202020204" pitchFamily="34" charset="0"/>
+              </a:rPr>
               <a:t>ellman key exchange protocol</a:t>
             </a:r>
-            <a:endParaRPr lang="hr-HR" sz="2400"/>
+            <a:endParaRPr lang="hr-HR" sz="2000">
+              <a:latin typeface="Arial" panose="020B0604020202020204" pitchFamily="34" charset="0"/>
+              <a:cs typeface="Arial" panose="020B0604020202020204" pitchFamily="34" charset="0"/>
+            </a:endParaRPr>
           </a:p>
         </p:txBody>
       </p:sp>
@@ -6764,53 +7444,6 @@
           </a:p>
         </p:txBody>
       </p:sp>
-      <p:sp>
-        <p:nvSpPr>
-          <p:cNvPr id="26" name="Rounded Rectangle 25"/>
-          <p:cNvSpPr/>
-          <p:nvPr/>
-        </p:nvSpPr>
-        <p:spPr>
-          <a:xfrm rot="1800000">
-            <a:off x="9059817" y="641303"/>
-            <a:ext cx="1923691" cy="577970"/>
-          </a:xfrm>
-          <a:prstGeom prst="roundRect">
-            <a:avLst/>
-          </a:prstGeom>
-          <a:ln>
-            <a:noFill/>
-          </a:ln>
-        </p:spPr>
-        <p:style>
-          <a:lnRef idx="2">
-            <a:schemeClr val="accent1">
-              <a:shade val="50000"/>
-            </a:schemeClr>
-          </a:lnRef>
-          <a:fillRef idx="1">
-            <a:schemeClr val="accent1"/>
-          </a:fillRef>
-          <a:effectRef idx="0">
-            <a:schemeClr val="accent1"/>
-          </a:effectRef>
-          <a:fontRef idx="minor">
-            <a:schemeClr val="lt1"/>
-          </a:fontRef>
-        </p:style>
-        <p:txBody>
-          <a:bodyPr rtlCol="0" anchor="ctr"/>
-          <a:lstStyle/>
-          <a:p>
-            <a:pPr algn="ctr"/>
-            <a:r>
-              <a:rPr lang="en-US" b="1" smtClean="0"/>
-              <a:t>DONE</a:t>
-            </a:r>
-            <a:endParaRPr lang="hr-HR" b="1"/>
-          </a:p>
-        </p:txBody>
-      </p:sp>
     </p:spTree>
     <p:extLst>
       <p:ext uri="{BB962C8B-B14F-4D97-AF65-F5344CB8AC3E}">
@@ -6900,10 +7533,16 @@
           <a:p>
             <a:pPr algn="ctr"/>
             <a:r>
-              <a:rPr lang="en-US" sz="3600" smtClean="0"/>
+              <a:rPr lang="en-US" sz="2800" smtClean="0">
+                <a:latin typeface="Arial" panose="020B0604020202020204" pitchFamily="34" charset="0"/>
+                <a:cs typeface="Arial" panose="020B0604020202020204" pitchFamily="34" charset="0"/>
+              </a:rPr>
               <a:t>AUTHENTICATION</a:t>
             </a:r>
-            <a:endParaRPr lang="en-US" dirty="0"/>
+            <a:endParaRPr lang="en-US" sz="3600" dirty="0">
+              <a:latin typeface="Arial" panose="020B0604020202020204" pitchFamily="34" charset="0"/>
+              <a:cs typeface="Arial" panose="020B0604020202020204" pitchFamily="34" charset="0"/>
+            </a:endParaRPr>
           </a:p>
         </p:txBody>
       </p:sp>
@@ -6958,8 +7597,8 @@
         </p:nvSpPr>
         <p:spPr>
           <a:xfrm>
-            <a:off x="4360706" y="1661479"/>
-            <a:ext cx="3463192" cy="461665"/>
+            <a:off x="4518795" y="1661479"/>
+            <a:ext cx="3147015" cy="400110"/>
           </a:xfrm>
           <a:prstGeom prst="rect">
             <a:avLst/>
@@ -6974,48 +7613,66 @@
           <a:p>
             <a:pPr algn="ctr"/>
             <a:r>
-              <a:rPr lang="en-US" sz="2400" smtClean="0">
+              <a:rPr lang="en-US" sz="2000" smtClean="0">
                 <a:solidFill>
                   <a:schemeClr val="accent1">
                     <a:lumMod val="75000"/>
                   </a:schemeClr>
                 </a:solidFill>
+                <a:latin typeface="Arial" panose="020B0604020202020204" pitchFamily="34" charset="0"/>
+                <a:cs typeface="Arial" panose="020B0604020202020204" pitchFamily="34" charset="0"/>
               </a:rPr>
               <a:t>S</a:t>
             </a:r>
             <a:r>
-              <a:rPr lang="en-US" sz="2400" smtClean="0"/>
-              <a:t>tation </a:t>
-            </a:r>
-            <a:r>
-              <a:rPr lang="en-US" sz="2400" smtClean="0">
+              <a:rPr lang="en-US" sz="2000" smtClean="0">
+                <a:latin typeface="Arial" panose="020B0604020202020204" pitchFamily="34" charset="0"/>
+                <a:cs typeface="Arial" panose="020B0604020202020204" pitchFamily="34" charset="0"/>
+              </a:rPr>
+              <a:t>tation-</a:t>
+            </a:r>
+            <a:r>
+              <a:rPr lang="en-US" sz="2000" smtClean="0">
                 <a:solidFill>
                   <a:schemeClr val="accent1">
                     <a:lumMod val="75000"/>
                   </a:schemeClr>
                 </a:solidFill>
+                <a:latin typeface="Arial" panose="020B0604020202020204" pitchFamily="34" charset="0"/>
+                <a:cs typeface="Arial" panose="020B0604020202020204" pitchFamily="34" charset="0"/>
               </a:rPr>
               <a:t>t</a:t>
             </a:r>
             <a:r>
-              <a:rPr lang="en-US" sz="2400" smtClean="0"/>
-              <a:t>o </a:t>
-            </a:r>
-            <a:r>
-              <a:rPr lang="en-US" sz="2400" smtClean="0">
+              <a:rPr lang="en-US" sz="2000" smtClean="0">
+                <a:latin typeface="Arial" panose="020B0604020202020204" pitchFamily="34" charset="0"/>
+                <a:cs typeface="Arial" panose="020B0604020202020204" pitchFamily="34" charset="0"/>
+              </a:rPr>
+              <a:t>o-</a:t>
+            </a:r>
+            <a:r>
+              <a:rPr lang="en-US" sz="2000" smtClean="0">
                 <a:solidFill>
                   <a:schemeClr val="accent1">
                     <a:lumMod val="75000"/>
                   </a:schemeClr>
                 </a:solidFill>
+                <a:latin typeface="Arial" panose="020B0604020202020204" pitchFamily="34" charset="0"/>
+                <a:cs typeface="Arial" panose="020B0604020202020204" pitchFamily="34" charset="0"/>
               </a:rPr>
               <a:t>S</a:t>
             </a:r>
             <a:r>
-              <a:rPr lang="en-US" sz="2400" smtClean="0"/>
+              <a:rPr lang="en-US" sz="2000" smtClean="0">
+                <a:latin typeface="Arial" panose="020B0604020202020204" pitchFamily="34" charset="0"/>
+                <a:cs typeface="Arial" panose="020B0604020202020204" pitchFamily="34" charset="0"/>
+              </a:rPr>
               <a:t>tation protocol</a:t>
             </a:r>
-            <a:endParaRPr lang="hr-HR" sz="2400"/>
+            <a:endParaRPr lang="hr-HR" sz="2000">
+              <a:latin typeface="Arial" panose="020B0604020202020204" pitchFamily="34" charset="0"/>
+              <a:cs typeface="Arial" panose="020B0604020202020204" pitchFamily="34" charset="0"/>
+            </a:endParaRPr>
           </a:p>
         </p:txBody>
       </p:sp>
@@ -7472,8 +8129,8 @@
           </a:fontRef>
         </p:style>
       </p:cxnSp>
-      <mc:AlternateContent xmlns:mc="http://schemas.openxmlformats.org/markup-compatibility/2006">
-        <mc:Choice xmlns:a14="http://schemas.microsoft.com/office/drawing/2010/main" Requires="a14">
+      <mc:AlternateContent xmlns:mc="http://schemas.openxmlformats.org/markup-compatibility/2006" xmlns:a14="http://schemas.microsoft.com/office/drawing/2010/main">
+        <mc:Choice Requires="a14">
           <p:sp>
             <p:nvSpPr>
               <p:cNvPr id="46" name="TextBox 45"/>
@@ -7563,18 +8220,7 @@
                           </a:solidFill>
                           <a:latin typeface="Cambria Math" panose="02040503050406030204" pitchFamily="18" charset="0"/>
                         </a:rPr>
-                        <m:t>, </m:t>
-                      </m:r>
-                      <m:r>
-                        <a:rPr lang="en-US" b="0" i="1" smtClean="0">
-                          <a:solidFill>
-                            <a:schemeClr val="accent1">
-                              <a:lumMod val="75000"/>
-                            </a:schemeClr>
-                          </a:solidFill>
-                          <a:latin typeface="Cambria Math" panose="02040503050406030204" pitchFamily="18" charset="0"/>
-                        </a:rPr>
-                        <m:t>{ </m:t>
+                        <m:t>, { </m:t>
                       </m:r>
                       <m:sSub>
                         <m:sSubPr>
@@ -7770,7 +8416,7 @@
             </p:txBody>
           </p:sp>
         </mc:Choice>
-        <mc:Fallback>
+        <mc:Fallback xmlns="">
           <p:sp>
             <p:nvSpPr>
               <p:cNvPr id="46" name="TextBox 45"/>
@@ -8067,8 +8713,8 @@
           </a:fontRef>
         </p:style>
       </p:cxnSp>
-      <mc:AlternateContent xmlns:mc="http://schemas.openxmlformats.org/markup-compatibility/2006">
-        <mc:Choice xmlns:a14="http://schemas.microsoft.com/office/drawing/2010/main" Requires="a14">
+      <mc:AlternateContent xmlns:mc="http://schemas.openxmlformats.org/markup-compatibility/2006" xmlns:a14="http://schemas.microsoft.com/office/drawing/2010/main">
+        <mc:Choice Requires="a14">
           <p:sp>
             <p:nvSpPr>
               <p:cNvPr id="53" name="TextBox 52"/>
@@ -8303,7 +8949,7 @@
             </p:txBody>
           </p:sp>
         </mc:Choice>
-        <mc:Fallback>
+        <mc:Fallback xmlns="">
           <p:sp>
             <p:nvSpPr>
               <p:cNvPr id="53" name="TextBox 52"/>
@@ -8342,53 +8988,6 @@
           </p:sp>
         </mc:Fallback>
       </mc:AlternateContent>
-      <p:sp>
-        <p:nvSpPr>
-          <p:cNvPr id="14" name="Rounded Rectangle 13"/>
-          <p:cNvSpPr/>
-          <p:nvPr/>
-        </p:nvSpPr>
-        <p:spPr>
-          <a:xfrm rot="1800000">
-            <a:off x="9059817" y="641303"/>
-            <a:ext cx="1923691" cy="577970"/>
-          </a:xfrm>
-          <a:prstGeom prst="roundRect">
-            <a:avLst/>
-          </a:prstGeom>
-          <a:ln>
-            <a:noFill/>
-          </a:ln>
-        </p:spPr>
-        <p:style>
-          <a:lnRef idx="2">
-            <a:schemeClr val="accent1">
-              <a:shade val="50000"/>
-            </a:schemeClr>
-          </a:lnRef>
-          <a:fillRef idx="1">
-            <a:schemeClr val="accent1"/>
-          </a:fillRef>
-          <a:effectRef idx="0">
-            <a:schemeClr val="accent1"/>
-          </a:effectRef>
-          <a:fontRef idx="minor">
-            <a:schemeClr val="lt1"/>
-          </a:fontRef>
-        </p:style>
-        <p:txBody>
-          <a:bodyPr rtlCol="0" anchor="ctr"/>
-          <a:lstStyle/>
-          <a:p>
-            <a:pPr algn="ctr"/>
-            <a:r>
-              <a:rPr lang="en-US" b="1" smtClean="0"/>
-              <a:t>IN PROGRESS</a:t>
-            </a:r>
-            <a:endParaRPr lang="hr-HR" b="1"/>
-          </a:p>
-        </p:txBody>
-      </p:sp>
     </p:spTree>
     <p:extLst>
       <p:ext uri="{BB962C8B-B14F-4D97-AF65-F5344CB8AC3E}">
@@ -8893,10 +9492,16 @@
           <a:p>
             <a:pPr algn="ctr"/>
             <a:r>
-              <a:rPr lang="en-US" smtClean="0"/>
+              <a:rPr lang="en-US" sz="2800" smtClean="0">
+                <a:latin typeface="Arial" panose="020B0604020202020204" pitchFamily="34" charset="0"/>
+                <a:cs typeface="Arial" panose="020B0604020202020204" pitchFamily="34" charset="0"/>
+              </a:rPr>
               <a:t>STATE MACHINE</a:t>
             </a:r>
-            <a:endParaRPr lang="en-US" dirty="0"/>
+            <a:endParaRPr lang="en-US" sz="2800" dirty="0">
+              <a:latin typeface="Arial" panose="020B0604020202020204" pitchFamily="34" charset="0"/>
+              <a:cs typeface="Arial" panose="020B0604020202020204" pitchFamily="34" charset="0"/>
+            </a:endParaRPr>
           </a:p>
         </p:txBody>
       </p:sp>
@@ -9569,6 +10174,103 @@
           </a:p>
         </p:txBody>
       </p:sp>
+      <p:cxnSp>
+        <p:nvCxnSpPr>
+          <p:cNvPr id="26" name="Elbow Connector 25"/>
+          <p:cNvCxnSpPr>
+            <a:stCxn id="17" idx="1"/>
+            <a:endCxn id="17" idx="0"/>
+          </p:cNvCxnSpPr>
+          <p:nvPr/>
+        </p:nvCxnSpPr>
+        <p:spPr>
+          <a:xfrm rot="10800000" flipH="1">
+            <a:off x="4086578" y="6049701"/>
+            <a:ext cx="2004718" cy="212608"/>
+          </a:xfrm>
+          <a:prstGeom prst="bentConnector4">
+            <a:avLst>
+              <a:gd name="adj1" fmla="val -37933"/>
+              <a:gd name="adj2" fmla="val 282129"/>
+            </a:avLst>
+          </a:prstGeom>
+          <a:ln w="12700">
+            <a:solidFill>
+              <a:schemeClr val="accent1">
+                <a:lumMod val="75000"/>
+              </a:schemeClr>
+            </a:solidFill>
+            <a:tailEnd type="triangle"/>
+          </a:ln>
+        </p:spPr>
+        <p:style>
+          <a:lnRef idx="1">
+            <a:schemeClr val="accent1"/>
+          </a:lnRef>
+          <a:fillRef idx="0">
+            <a:schemeClr val="accent1"/>
+          </a:fillRef>
+          <a:effectRef idx="0">
+            <a:schemeClr val="accent1"/>
+          </a:effectRef>
+          <a:fontRef idx="minor">
+            <a:schemeClr val="tx1"/>
+          </a:fontRef>
+        </p:style>
+      </p:cxnSp>
+      <p:sp>
+        <p:nvSpPr>
+          <p:cNvPr id="32" name="TextBox 31">
+            <a:extLst>
+              <a:ext uri="{FF2B5EF4-FFF2-40B4-BE49-F238E27FC236}">
+                <a16:creationId xmlns:a16="http://schemas.microsoft.com/office/drawing/2014/main" xmlns="" id="{22931BBA-07C1-4622-8ADE-C9E87C0864D4}"/>
+              </a:ext>
+            </a:extLst>
+          </p:cNvPr>
+          <p:cNvSpPr txBox="1"/>
+          <p:nvPr/>
+        </p:nvSpPr>
+        <p:spPr>
+          <a:xfrm>
+            <a:off x="2006082" y="5728992"/>
+            <a:ext cx="1161551" cy="307777"/>
+          </a:xfrm>
+          <a:prstGeom prst="rect">
+            <a:avLst/>
+          </a:prstGeom>
+        </p:spPr>
+        <p:txBody>
+          <a:bodyPr rot="0" spcFirstLastPara="0" vertOverflow="overflow" horzOverflow="overflow" vert="horz" wrap="square" lIns="91440" tIns="45720" rIns="91440" bIns="45720" numCol="1" spcCol="0" rtlCol="0" fromWordArt="0" anchor="t" anchorCtr="0" forceAA="0" compatLnSpc="1">
+            <a:prstTxWarp prst="textNoShape">
+              <a:avLst/>
+            </a:prstTxWarp>
+            <a:spAutoFit/>
+          </a:bodyPr>
+          <a:lstStyle/>
+          <a:p>
+            <a:pPr algn="ctr"/>
+            <a:r>
+              <a:rPr lang="en-US" sz="1400" smtClean="0">
+                <a:solidFill>
+                  <a:schemeClr val="accent1">
+                    <a:lumMod val="75000"/>
+                  </a:schemeClr>
+                </a:solidFill>
+                <a:cs typeface="Calibri"/>
+              </a:rPr>
+              <a:t>EVENT_DATA</a:t>
+            </a:r>
+            <a:endParaRPr lang="en-US" sz="1400" dirty="0">
+              <a:solidFill>
+                <a:schemeClr val="accent1">
+                  <a:lumMod val="75000"/>
+                </a:schemeClr>
+              </a:solidFill>
+              <a:cs typeface="Calibri"/>
+            </a:endParaRPr>
+          </a:p>
+        </p:txBody>
+      </p:sp>
     </p:spTree>
     <p:extLst>
       <p:ext uri="{BB962C8B-B14F-4D97-AF65-F5344CB8AC3E}">
@@ -9595,16 +10297,6 @@
 <file path=ppt/slides/slide7.xml><?xml version="1.0" encoding="utf-8"?>
 <p:sld xmlns:a="http://schemas.openxmlformats.org/drawingml/2006/main" xmlns:r="http://schemas.openxmlformats.org/officeDocument/2006/relationships" xmlns:p="http://schemas.openxmlformats.org/presentationml/2006/main">
   <p:cSld>
-    <p:bg>
-      <p:bgPr>
-        <a:solidFill>
-          <a:schemeClr val="accent1">
-            <a:lumMod val="75000"/>
-          </a:schemeClr>
-        </a:solidFill>
-        <a:effectLst/>
-      </p:bgPr>
-    </p:bg>
     <p:spTree>
       <p:nvGrpSpPr>
         <p:cNvPr id="1" name=""/>
@@ -9621,14 +10313,119 @@
       </p:grpSpPr>
       <p:sp>
         <p:nvSpPr>
-          <p:cNvPr id="4" name="TextBox 3"/>
+          <p:cNvPr id="7" name="Title 1">
+            <a:extLst>
+              <a:ext uri="{FF2B5EF4-FFF2-40B4-BE49-F238E27FC236}">
+                <a16:creationId xmlns:a16="http://schemas.microsoft.com/office/drawing/2014/main" xmlns="" id="{F3F19207-56E3-41C1-B35F-1C329A479D6C}"/>
+              </a:ext>
+            </a:extLst>
+          </p:cNvPr>
+          <p:cNvSpPr txBox="1">
+            <a:spLocks/>
+          </p:cNvSpPr>
+          <p:nvPr/>
+        </p:nvSpPr>
+        <p:spPr>
+          <a:xfrm>
+            <a:off x="3431515" y="491705"/>
+            <a:ext cx="5328968" cy="940277"/>
+          </a:xfrm>
+          <a:prstGeom prst="rect">
+            <a:avLst/>
+          </a:prstGeom>
+        </p:spPr>
+        <p:txBody>
+          <a:bodyPr vert="horz" lIns="91440" tIns="45720" rIns="91440" bIns="45720" rtlCol="0" anchor="ctr">
+            <a:normAutofit/>
+          </a:bodyPr>
+          <a:lstStyle>
+            <a:lvl1pPr algn="l" defTabSz="914400" rtl="0" eaLnBrk="1" latinLnBrk="0" hangingPunct="1">
+              <a:lnSpc>
+                <a:spcPct val="90000"/>
+              </a:lnSpc>
+              <a:spcBef>
+                <a:spcPct val="0"/>
+              </a:spcBef>
+              <a:buNone/>
+              <a:defRPr sz="4400" kern="1200">
+                <a:solidFill>
+                  <a:schemeClr val="tx1"/>
+                </a:solidFill>
+                <a:latin typeface="+mj-lt"/>
+                <a:ea typeface="+mj-ea"/>
+                <a:cs typeface="+mj-cs"/>
+              </a:defRPr>
+            </a:lvl1pPr>
+          </a:lstStyle>
+          <a:p>
+            <a:pPr algn="ctr"/>
+            <a:r>
+              <a:rPr lang="en-US" sz="2800" smtClean="0">
+                <a:latin typeface="Arial" panose="020B0604020202020204" pitchFamily="34" charset="0"/>
+                <a:cs typeface="Arial" panose="020B0604020202020204" pitchFamily="34" charset="0"/>
+              </a:rPr>
+              <a:t>MESSAGES</a:t>
+            </a:r>
+            <a:endParaRPr lang="en-US" sz="2800" dirty="0">
+              <a:latin typeface="Arial" panose="020B0604020202020204" pitchFamily="34" charset="0"/>
+              <a:cs typeface="Arial" panose="020B0604020202020204" pitchFamily="34" charset="0"/>
+            </a:endParaRPr>
+          </a:p>
+        </p:txBody>
+      </p:sp>
+      <p:cxnSp>
+        <p:nvCxnSpPr>
+          <p:cNvPr id="8" name="Straight Connector 7">
+            <a:extLst>
+              <a:ext uri="{FF2B5EF4-FFF2-40B4-BE49-F238E27FC236}">
+                <a16:creationId xmlns:a16="http://schemas.microsoft.com/office/drawing/2014/main" xmlns="" id="{F5AD3098-4B9E-4C8B-910B-1DD3F084C040}"/>
+              </a:ext>
+            </a:extLst>
+          </p:cNvPr>
+          <p:cNvCxnSpPr/>
+          <p:nvPr/>
+        </p:nvCxnSpPr>
+        <p:spPr>
+          <a:xfrm>
+            <a:off x="3385507" y="1431982"/>
+            <a:ext cx="5420984" cy="9943"/>
+          </a:xfrm>
+          <a:prstGeom prst="line">
+            <a:avLst/>
+          </a:prstGeom>
+          <a:ln w="28575">
+            <a:solidFill>
+              <a:schemeClr val="accent1">
+                <a:lumMod val="75000"/>
+              </a:schemeClr>
+            </a:solidFill>
+          </a:ln>
+        </p:spPr>
+        <p:style>
+          <a:lnRef idx="1">
+            <a:schemeClr val="accent1"/>
+          </a:lnRef>
+          <a:fillRef idx="0">
+            <a:schemeClr val="accent1"/>
+          </a:fillRef>
+          <a:effectRef idx="0">
+            <a:schemeClr val="accent1"/>
+          </a:effectRef>
+          <a:fontRef idx="minor">
+            <a:schemeClr val="tx1"/>
+          </a:fontRef>
+        </p:style>
+      </p:cxnSp>
+      <p:sp>
+        <p:nvSpPr>
+          <p:cNvPr id="2" name="TextBox 1"/>
           <p:cNvSpPr txBox="1"/>
           <p:nvPr/>
         </p:nvSpPr>
         <p:spPr>
           <a:xfrm>
-            <a:off x="4467226" y="2771775"/>
-            <a:ext cx="3419474" cy="1107996"/>
+            <a:off x="3584813" y="1794294"/>
+            <a:ext cx="5022371" cy="338554"/>
           </a:xfrm>
           <a:prstGeom prst="rect">
             <a:avLst/>
@@ -9643,17 +10440,505 @@
           <a:p>
             <a:pPr algn="ctr"/>
             <a:r>
-              <a:rPr lang="en-US" sz="6600" spc="200" smtClean="0">
+              <a:rPr lang="en-US" sz="1600" b="1" i="1" smtClean="0">
+                <a:latin typeface="Arial" panose="020B0604020202020204" pitchFamily="34" charset="0"/>
+                <a:cs typeface="Arial" panose="020B0604020202020204" pitchFamily="34" charset="0"/>
+              </a:rPr>
+              <a:t>$</a:t>
+            </a:r>
+            <a:r>
+              <a:rPr lang="en-US" sz="1600" i="1" smtClean="0">
                 <a:solidFill>
-                  <a:schemeClr val="bg1"/>
+                  <a:schemeClr val="bg1">
+                    <a:lumMod val="75000"/>
+                  </a:schemeClr>
                 </a:solidFill>
+                <a:latin typeface="Arial" panose="020B0604020202020204" pitchFamily="34" charset="0"/>
+                <a:cs typeface="Arial" panose="020B0604020202020204" pitchFamily="34" charset="0"/>
               </a:rPr>
-              <a:t>DEMO</a:t>
-            </a:r>
-            <a:endParaRPr lang="hr-HR" spc="200">
-              <a:solidFill>
-                <a:schemeClr val="bg1"/>
-              </a:solidFill>
+              <a:t>&lt;MESSAGE_TYPE&gt;</a:t>
+            </a:r>
+            <a:r>
+              <a:rPr lang="en-US" sz="1600" b="1" i="1" smtClean="0">
+                <a:latin typeface="Arial" panose="020B0604020202020204" pitchFamily="34" charset="0"/>
+                <a:cs typeface="Arial" panose="020B0604020202020204" pitchFamily="34" charset="0"/>
+              </a:rPr>
+              <a:t>=</a:t>
+            </a:r>
+            <a:r>
+              <a:rPr lang="en-US" sz="1600" i="1">
+                <a:solidFill>
+                  <a:schemeClr val="bg1">
+                    <a:lumMod val="75000"/>
+                  </a:schemeClr>
+                </a:solidFill>
+                <a:latin typeface="Arial" panose="020B0604020202020204" pitchFamily="34" charset="0"/>
+                <a:cs typeface="Arial" panose="020B0604020202020204" pitchFamily="34" charset="0"/>
+              </a:rPr>
+              <a:t>&lt;MESSAGE_CONTENT&gt;</a:t>
+            </a:r>
+            <a:r>
+              <a:rPr lang="en-US" sz="1600" b="1" i="1" smtClean="0">
+                <a:latin typeface="Arial" panose="020B0604020202020204" pitchFamily="34" charset="0"/>
+                <a:cs typeface="Arial" panose="020B0604020202020204" pitchFamily="34" charset="0"/>
+              </a:rPr>
+              <a:t>;</a:t>
+            </a:r>
+            <a:endParaRPr lang="hr-HR" sz="1600" b="1" i="1">
+              <a:latin typeface="Arial" panose="020B0604020202020204" pitchFamily="34" charset="0"/>
+              <a:cs typeface="Arial" panose="020B0604020202020204" pitchFamily="34" charset="0"/>
+            </a:endParaRPr>
+          </a:p>
+        </p:txBody>
+      </p:sp>
+      <p:sp>
+        <p:nvSpPr>
+          <p:cNvPr id="4" name="Rectangle 3"/>
+          <p:cNvSpPr/>
+          <p:nvPr/>
+        </p:nvSpPr>
+        <p:spPr>
+          <a:xfrm>
+            <a:off x="1448509" y="2966359"/>
+            <a:ext cx="1452111" cy="534837"/>
+          </a:xfrm>
+          <a:prstGeom prst="rect">
+            <a:avLst/>
+          </a:prstGeom>
+          <a:ln>
+            <a:noFill/>
+          </a:ln>
+        </p:spPr>
+        <p:style>
+          <a:lnRef idx="2">
+            <a:schemeClr val="accent1">
+              <a:shade val="50000"/>
+            </a:schemeClr>
+          </a:lnRef>
+          <a:fillRef idx="1">
+            <a:schemeClr val="accent1"/>
+          </a:fillRef>
+          <a:effectRef idx="0">
+            <a:schemeClr val="accent1"/>
+          </a:effectRef>
+          <a:fontRef idx="minor">
+            <a:schemeClr val="lt1"/>
+          </a:fontRef>
+        </p:style>
+        <p:txBody>
+          <a:bodyPr rtlCol="0" anchor="ctr"/>
+          <a:lstStyle/>
+          <a:p>
+            <a:pPr algn="ctr"/>
+            <a:r>
+              <a:rPr lang="en-US" sz="1600" smtClean="0">
+                <a:latin typeface="Arial" panose="020B0604020202020204" pitchFamily="34" charset="0"/>
+                <a:cs typeface="Arial" panose="020B0604020202020204" pitchFamily="34" charset="0"/>
+              </a:rPr>
+              <a:t>CONNECT</a:t>
+            </a:r>
+            <a:endParaRPr lang="hr-HR">
+              <a:latin typeface="Arial" panose="020B0604020202020204" pitchFamily="34" charset="0"/>
+              <a:cs typeface="Arial" panose="020B0604020202020204" pitchFamily="34" charset="0"/>
+            </a:endParaRPr>
+          </a:p>
+        </p:txBody>
+      </p:sp>
+      <p:sp>
+        <p:nvSpPr>
+          <p:cNvPr id="33" name="Rectangle 32"/>
+          <p:cNvSpPr/>
+          <p:nvPr/>
+        </p:nvSpPr>
+        <p:spPr>
+          <a:xfrm>
+            <a:off x="3411030" y="2966358"/>
+            <a:ext cx="1452111" cy="534837"/>
+          </a:xfrm>
+          <a:prstGeom prst="rect">
+            <a:avLst/>
+          </a:prstGeom>
+          <a:solidFill>
+            <a:schemeClr val="accent1">
+              <a:lumMod val="60000"/>
+              <a:lumOff val="40000"/>
+            </a:schemeClr>
+          </a:solidFill>
+          <a:ln>
+            <a:noFill/>
+          </a:ln>
+        </p:spPr>
+        <p:style>
+          <a:lnRef idx="2">
+            <a:schemeClr val="accent1">
+              <a:shade val="50000"/>
+            </a:schemeClr>
+          </a:lnRef>
+          <a:fillRef idx="1">
+            <a:schemeClr val="accent1"/>
+          </a:fillRef>
+          <a:effectRef idx="0">
+            <a:schemeClr val="accent1"/>
+          </a:effectRef>
+          <a:fontRef idx="minor">
+            <a:schemeClr val="lt1"/>
+          </a:fontRef>
+        </p:style>
+        <p:txBody>
+          <a:bodyPr rtlCol="0" anchor="ctr"/>
+          <a:lstStyle/>
+          <a:p>
+            <a:pPr algn="ctr"/>
+            <a:r>
+              <a:rPr lang="en-US" sz="1600" smtClean="0">
+                <a:latin typeface="Arial" panose="020B0604020202020204" pitchFamily="34" charset="0"/>
+                <a:cs typeface="Arial" panose="020B0604020202020204" pitchFamily="34" charset="0"/>
+              </a:rPr>
+              <a:t>PU</a:t>
+            </a:r>
+            <a:endParaRPr lang="hr-HR">
+              <a:latin typeface="Arial" panose="020B0604020202020204" pitchFamily="34" charset="0"/>
+              <a:cs typeface="Arial" panose="020B0604020202020204" pitchFamily="34" charset="0"/>
+            </a:endParaRPr>
+          </a:p>
+        </p:txBody>
+      </p:sp>
+      <p:sp>
+        <p:nvSpPr>
+          <p:cNvPr id="39" name="Rectangle 38"/>
+          <p:cNvSpPr/>
+          <p:nvPr/>
+        </p:nvSpPr>
+        <p:spPr>
+          <a:xfrm>
+            <a:off x="5373551" y="2966358"/>
+            <a:ext cx="1452111" cy="534837"/>
+          </a:xfrm>
+          <a:prstGeom prst="rect">
+            <a:avLst/>
+          </a:prstGeom>
+          <a:solidFill>
+            <a:schemeClr val="accent1">
+              <a:lumMod val="50000"/>
+            </a:schemeClr>
+          </a:solidFill>
+          <a:ln>
+            <a:noFill/>
+          </a:ln>
+        </p:spPr>
+        <p:style>
+          <a:lnRef idx="2">
+            <a:schemeClr val="accent1">
+              <a:shade val="50000"/>
+            </a:schemeClr>
+          </a:lnRef>
+          <a:fillRef idx="1">
+            <a:schemeClr val="accent1"/>
+          </a:fillRef>
+          <a:effectRef idx="0">
+            <a:schemeClr val="accent1"/>
+          </a:effectRef>
+          <a:fontRef idx="minor">
+            <a:schemeClr val="lt1"/>
+          </a:fontRef>
+        </p:style>
+        <p:txBody>
+          <a:bodyPr rtlCol="0" anchor="ctr"/>
+          <a:lstStyle/>
+          <a:p>
+            <a:pPr algn="ctr"/>
+            <a:r>
+              <a:rPr lang="en-US" sz="1600" smtClean="0">
+                <a:latin typeface="Arial" panose="020B0604020202020204" pitchFamily="34" charset="0"/>
+                <a:cs typeface="Arial" panose="020B0604020202020204" pitchFamily="34" charset="0"/>
+              </a:rPr>
+              <a:t>FAILURE</a:t>
+            </a:r>
+            <a:endParaRPr lang="hr-HR">
+              <a:latin typeface="Arial" panose="020B0604020202020204" pitchFamily="34" charset="0"/>
+              <a:cs typeface="Arial" panose="020B0604020202020204" pitchFamily="34" charset="0"/>
+            </a:endParaRPr>
+          </a:p>
+        </p:txBody>
+      </p:sp>
+      <p:sp>
+        <p:nvSpPr>
+          <p:cNvPr id="40" name="Rectangle 39"/>
+          <p:cNvSpPr/>
+          <p:nvPr/>
+        </p:nvSpPr>
+        <p:spPr>
+          <a:xfrm>
+            <a:off x="2676333" y="4111924"/>
+            <a:ext cx="1672790" cy="534837"/>
+          </a:xfrm>
+          <a:prstGeom prst="rect">
+            <a:avLst/>
+          </a:prstGeom>
+          <a:ln>
+            <a:noFill/>
+          </a:ln>
+        </p:spPr>
+        <p:style>
+          <a:lnRef idx="2">
+            <a:schemeClr val="accent1">
+              <a:shade val="50000"/>
+            </a:schemeClr>
+          </a:lnRef>
+          <a:fillRef idx="1">
+            <a:schemeClr val="accent1"/>
+          </a:fillRef>
+          <a:effectRef idx="0">
+            <a:schemeClr val="accent1"/>
+          </a:effectRef>
+          <a:fontRef idx="minor">
+            <a:schemeClr val="lt1"/>
+          </a:fontRef>
+        </p:style>
+        <p:txBody>
+          <a:bodyPr rtlCol="0" anchor="ctr"/>
+          <a:lstStyle/>
+          <a:p>
+            <a:pPr algn="ctr"/>
+            <a:r>
+              <a:rPr lang="en-US" sz="1600" smtClean="0">
+                <a:latin typeface="Arial" panose="020B0604020202020204" pitchFamily="34" charset="0"/>
+                <a:cs typeface="Arial" panose="020B0604020202020204" pitchFamily="34" charset="0"/>
+              </a:rPr>
+              <a:t>SIGNVER</a:t>
+            </a:r>
+            <a:endParaRPr lang="hr-HR">
+              <a:latin typeface="Arial" panose="020B0604020202020204" pitchFamily="34" charset="0"/>
+              <a:cs typeface="Arial" panose="020B0604020202020204" pitchFamily="34" charset="0"/>
+            </a:endParaRPr>
+          </a:p>
+        </p:txBody>
+      </p:sp>
+      <p:sp>
+        <p:nvSpPr>
+          <p:cNvPr id="41" name="Rectangle 40"/>
+          <p:cNvSpPr/>
+          <p:nvPr/>
+        </p:nvSpPr>
+        <p:spPr>
+          <a:xfrm>
+            <a:off x="7336072" y="2966358"/>
+            <a:ext cx="1452111" cy="534837"/>
+          </a:xfrm>
+          <a:prstGeom prst="rect">
+            <a:avLst/>
+          </a:prstGeom>
+          <a:solidFill>
+            <a:schemeClr val="accent1">
+              <a:lumMod val="60000"/>
+              <a:lumOff val="40000"/>
+            </a:schemeClr>
+          </a:solidFill>
+          <a:ln>
+            <a:noFill/>
+          </a:ln>
+        </p:spPr>
+        <p:style>
+          <a:lnRef idx="2">
+            <a:schemeClr val="accent1">
+              <a:shade val="50000"/>
+            </a:schemeClr>
+          </a:lnRef>
+          <a:fillRef idx="1">
+            <a:schemeClr val="accent1"/>
+          </a:fillRef>
+          <a:effectRef idx="0">
+            <a:schemeClr val="accent1"/>
+          </a:effectRef>
+          <a:fontRef idx="minor">
+            <a:schemeClr val="lt1"/>
+          </a:fontRef>
+        </p:style>
+        <p:txBody>
+          <a:bodyPr rtlCol="0" anchor="ctr"/>
+          <a:lstStyle/>
+          <a:p>
+            <a:pPr algn="ctr"/>
+            <a:r>
+              <a:rPr lang="en-US" sz="1600" smtClean="0">
+                <a:latin typeface="Arial" panose="020B0604020202020204" pitchFamily="34" charset="0"/>
+                <a:cs typeface="Arial" panose="020B0604020202020204" pitchFamily="34" charset="0"/>
+              </a:rPr>
+              <a:t>SIG</a:t>
+            </a:r>
+            <a:endParaRPr lang="hr-HR">
+              <a:latin typeface="Arial" panose="020B0604020202020204" pitchFamily="34" charset="0"/>
+              <a:cs typeface="Arial" panose="020B0604020202020204" pitchFamily="34" charset="0"/>
+            </a:endParaRPr>
+          </a:p>
+        </p:txBody>
+      </p:sp>
+      <p:sp>
+        <p:nvSpPr>
+          <p:cNvPr id="43" name="Rectangle 42"/>
+          <p:cNvSpPr/>
+          <p:nvPr/>
+        </p:nvSpPr>
+        <p:spPr>
+          <a:xfrm>
+            <a:off x="5267133" y="4111924"/>
+            <a:ext cx="1672790" cy="534837"/>
+          </a:xfrm>
+          <a:prstGeom prst="rect">
+            <a:avLst/>
+          </a:prstGeom>
+          <a:solidFill>
+            <a:schemeClr val="accent1">
+              <a:lumMod val="50000"/>
+            </a:schemeClr>
+          </a:solidFill>
+          <a:ln>
+            <a:noFill/>
+          </a:ln>
+        </p:spPr>
+        <p:style>
+          <a:lnRef idx="2">
+            <a:schemeClr val="accent1">
+              <a:shade val="50000"/>
+            </a:schemeClr>
+          </a:lnRef>
+          <a:fillRef idx="1">
+            <a:schemeClr val="accent1"/>
+          </a:fillRef>
+          <a:effectRef idx="0">
+            <a:schemeClr val="accent1"/>
+          </a:effectRef>
+          <a:fontRef idx="minor">
+            <a:schemeClr val="lt1"/>
+          </a:fontRef>
+        </p:style>
+        <p:txBody>
+          <a:bodyPr rtlCol="0" anchor="ctr"/>
+          <a:lstStyle/>
+          <a:p>
+            <a:pPr algn="ctr"/>
+            <a:r>
+              <a:rPr lang="en-US" sz="1600" smtClean="0">
+                <a:latin typeface="Arial" panose="020B0604020202020204" pitchFamily="34" charset="0"/>
+                <a:cs typeface="Arial" panose="020B0604020202020204" pitchFamily="34" charset="0"/>
+              </a:rPr>
+              <a:t>DATA</a:t>
+            </a:r>
+            <a:endParaRPr lang="hr-HR">
+              <a:latin typeface="Arial" panose="020B0604020202020204" pitchFamily="34" charset="0"/>
+              <a:cs typeface="Arial" panose="020B0604020202020204" pitchFamily="34" charset="0"/>
+            </a:endParaRPr>
+          </a:p>
+        </p:txBody>
+      </p:sp>
+      <p:sp>
+        <p:nvSpPr>
+          <p:cNvPr id="45" name="Rectangle 44"/>
+          <p:cNvSpPr/>
+          <p:nvPr/>
+        </p:nvSpPr>
+        <p:spPr>
+          <a:xfrm>
+            <a:off x="9298593" y="2966358"/>
+            <a:ext cx="1452111" cy="534837"/>
+          </a:xfrm>
+          <a:prstGeom prst="rect">
+            <a:avLst/>
+          </a:prstGeom>
+          <a:ln>
+            <a:noFill/>
+          </a:ln>
+        </p:spPr>
+        <p:style>
+          <a:lnRef idx="2">
+            <a:schemeClr val="accent1">
+              <a:shade val="50000"/>
+            </a:schemeClr>
+          </a:lnRef>
+          <a:fillRef idx="1">
+            <a:schemeClr val="accent1"/>
+          </a:fillRef>
+          <a:effectRef idx="0">
+            <a:schemeClr val="accent1"/>
+          </a:effectRef>
+          <a:fontRef idx="minor">
+            <a:schemeClr val="lt1"/>
+          </a:fontRef>
+        </p:style>
+        <p:txBody>
+          <a:bodyPr rtlCol="0" anchor="ctr"/>
+          <a:lstStyle/>
+          <a:p>
+            <a:pPr algn="ctr"/>
+            <a:r>
+              <a:rPr lang="en-US" sz="1600" smtClean="0">
+                <a:latin typeface="Arial" panose="020B0604020202020204" pitchFamily="34" charset="0"/>
+                <a:cs typeface="Arial" panose="020B0604020202020204" pitchFamily="34" charset="0"/>
+              </a:rPr>
+              <a:t>SIGVER</a:t>
+            </a:r>
+            <a:endParaRPr lang="hr-HR">
+              <a:latin typeface="Arial" panose="020B0604020202020204" pitchFamily="34" charset="0"/>
+              <a:cs typeface="Arial" panose="020B0604020202020204" pitchFamily="34" charset="0"/>
+            </a:endParaRPr>
+          </a:p>
+        </p:txBody>
+      </p:sp>
+      <p:sp>
+        <p:nvSpPr>
+          <p:cNvPr id="46" name="Rectangle 45"/>
+          <p:cNvSpPr/>
+          <p:nvPr/>
+        </p:nvSpPr>
+        <p:spPr>
+          <a:xfrm>
+            <a:off x="7857933" y="4111923"/>
+            <a:ext cx="1672790" cy="534837"/>
+          </a:xfrm>
+          <a:prstGeom prst="rect">
+            <a:avLst/>
+          </a:prstGeom>
+          <a:solidFill>
+            <a:schemeClr val="accent1">
+              <a:lumMod val="60000"/>
+              <a:lumOff val="40000"/>
+            </a:schemeClr>
+          </a:solidFill>
+          <a:ln>
+            <a:noFill/>
+          </a:ln>
+        </p:spPr>
+        <p:style>
+          <a:lnRef idx="2">
+            <a:schemeClr val="accent1">
+              <a:shade val="50000"/>
+            </a:schemeClr>
+          </a:lnRef>
+          <a:fillRef idx="1">
+            <a:schemeClr val="accent1"/>
+          </a:fillRef>
+          <a:effectRef idx="0">
+            <a:schemeClr val="accent1"/>
+          </a:effectRef>
+          <a:fontRef idx="minor">
+            <a:schemeClr val="lt1"/>
+          </a:fontRef>
+        </p:style>
+        <p:txBody>
+          <a:bodyPr rtlCol="0" anchor="ctr"/>
+          <a:lstStyle/>
+          <a:p>
+            <a:pPr algn="ctr"/>
+            <a:r>
+              <a:rPr lang="en-US" sz="1600" smtClean="0">
+                <a:latin typeface="Arial" panose="020B0604020202020204" pitchFamily="34" charset="0"/>
+                <a:cs typeface="Arial" panose="020B0604020202020204" pitchFamily="34" charset="0"/>
+              </a:rPr>
+              <a:t>RESET</a:t>
+            </a:r>
+            <a:endParaRPr lang="hr-HR">
+              <a:latin typeface="Arial" panose="020B0604020202020204" pitchFamily="34" charset="0"/>
+              <a:cs typeface="Arial" panose="020B0604020202020204" pitchFamily="34" charset="0"/>
             </a:endParaRPr>
           </a:p>
         </p:txBody>
@@ -9661,7 +10946,7 @@
     </p:spTree>
     <p:extLst>
       <p:ext uri="{BB962C8B-B14F-4D97-AF65-F5344CB8AC3E}">
-        <p14:creationId xmlns:p14="http://schemas.microsoft.com/office/powerpoint/2010/main" val="1496470619"/>
+        <p14:creationId xmlns:p14="http://schemas.microsoft.com/office/powerpoint/2010/main" val="479682190"/>
       </p:ext>
     </p:extLst>
   </p:cSld>
@@ -9747,10 +11032,16 @@
           <a:p>
             <a:pPr algn="ctr"/>
             <a:r>
-              <a:rPr lang="en-US" sz="3600" smtClean="0"/>
-              <a:t>Q &amp; A</a:t>
-            </a:r>
-            <a:endParaRPr lang="en-US" dirty="0"/>
+              <a:rPr lang="en-US" sz="2800" smtClean="0">
+                <a:latin typeface="Arial" panose="020B0604020202020204" pitchFamily="34" charset="0"/>
+                <a:cs typeface="Arial" panose="020B0604020202020204" pitchFamily="34" charset="0"/>
+              </a:rPr>
+              <a:t>ARDUINO UNO</a:t>
+            </a:r>
+            <a:endParaRPr lang="en-US" sz="2800" dirty="0">
+              <a:latin typeface="Arial" panose="020B0604020202020204" pitchFamily="34" charset="0"/>
+              <a:cs typeface="Arial" panose="020B0604020202020204" pitchFamily="34" charset="0"/>
+            </a:endParaRPr>
           </a:p>
         </p:txBody>
       </p:sp>
@@ -9799,51 +11090,1033 @@
       </p:cxnSp>
       <p:sp>
         <p:nvSpPr>
-          <p:cNvPr id="3" name="TextBox 2"/>
-          <p:cNvSpPr txBox="1"/>
+          <p:cNvPr id="3" name="Rectangle 2"/>
+          <p:cNvSpPr/>
           <p:nvPr/>
         </p:nvSpPr>
         <p:spPr>
           <a:xfrm>
-            <a:off x="5487836" y="2829465"/>
-            <a:ext cx="1216325" cy="1569660"/>
+            <a:off x="1041997" y="2372259"/>
+            <a:ext cx="2149776" cy="1621771"/>
           </a:xfrm>
           <a:prstGeom prst="rect">
             <a:avLst/>
           </a:prstGeom>
-          <a:noFill/>
+          <a:ln>
+            <a:noFill/>
+          </a:ln>
         </p:spPr>
-        <p:txBody>
-          <a:bodyPr wrap="square" rtlCol="0">
-            <a:spAutoFit/>
-          </a:bodyPr>
+        <p:style>
+          <a:lnRef idx="2">
+            <a:schemeClr val="accent1">
+              <a:shade val="50000"/>
+            </a:schemeClr>
+          </a:lnRef>
+          <a:fillRef idx="1">
+            <a:schemeClr val="accent1"/>
+          </a:fillRef>
+          <a:effectRef idx="0">
+            <a:schemeClr val="accent1"/>
+          </a:effectRef>
+          <a:fontRef idx="minor">
+            <a:schemeClr val="lt1"/>
+          </a:fontRef>
+        </p:style>
+        <p:txBody>
+          <a:bodyPr rtlCol="0" anchor="ctr"/>
           <a:lstStyle/>
           <a:p>
+            <a:pPr algn="ctr">
+              <a:lnSpc>
+                <a:spcPct val="150000"/>
+              </a:lnSpc>
+            </a:pPr>
+            <a:r>
+              <a:rPr lang="en-US" sz="2000" b="1" smtClean="0"/>
+              <a:t>C / C++</a:t>
+            </a:r>
+          </a:p>
+          <a:p>
+            <a:pPr algn="ctr">
+              <a:lnSpc>
+                <a:spcPct val="150000"/>
+              </a:lnSpc>
+            </a:pPr>
+            <a:r>
+              <a:rPr lang="en-US" sz="2000" b="1" smtClean="0"/>
+              <a:t>Platformio IDE</a:t>
+            </a:r>
+          </a:p>
+          <a:p>
+            <a:pPr algn="ctr">
+              <a:lnSpc>
+                <a:spcPct val="150000"/>
+              </a:lnSpc>
+            </a:pPr>
+            <a:r>
+              <a:rPr lang="en-US" sz="2000" b="1" smtClean="0"/>
+              <a:t>VS Code</a:t>
+            </a:r>
+            <a:endParaRPr lang="hr-HR" sz="2000" b="1"/>
+          </a:p>
+        </p:txBody>
+      </p:sp>
+      <p:sp>
+        <p:nvSpPr>
+          <p:cNvPr id="14" name="Rectangle 13"/>
+          <p:cNvSpPr/>
+          <p:nvPr/>
+        </p:nvSpPr>
+        <p:spPr>
+          <a:xfrm>
+            <a:off x="3789332" y="2366261"/>
+            <a:ext cx="2268748" cy="3006025"/>
+          </a:xfrm>
+          <a:prstGeom prst="rect">
+            <a:avLst/>
+          </a:prstGeom>
+          <a:solidFill>
+            <a:schemeClr val="accent1">
+              <a:lumMod val="60000"/>
+              <a:lumOff val="40000"/>
+            </a:schemeClr>
+          </a:solidFill>
+          <a:ln>
+            <a:noFill/>
+          </a:ln>
+        </p:spPr>
+        <p:style>
+          <a:lnRef idx="2">
+            <a:schemeClr val="accent1">
+              <a:shade val="50000"/>
+            </a:schemeClr>
+          </a:lnRef>
+          <a:fillRef idx="1">
+            <a:schemeClr val="accent1"/>
+          </a:fillRef>
+          <a:effectRef idx="0">
+            <a:schemeClr val="accent1"/>
+          </a:effectRef>
+          <a:fontRef idx="minor">
+            <a:schemeClr val="lt1"/>
+          </a:fontRef>
+        </p:style>
+        <p:txBody>
+          <a:bodyPr rtlCol="0" anchor="ctr"/>
+          <a:lstStyle/>
+          <a:p>
             <a:pPr algn="ctr"/>
             <a:r>
-              <a:rPr lang="en-US" sz="9600" smtClean="0">
-                <a:solidFill>
-                  <a:schemeClr val="accent1">
-                    <a:lumMod val="75000"/>
-                  </a:schemeClr>
-                </a:solidFill>
-              </a:rPr>
-              <a:t>?</a:t>
-            </a:r>
-            <a:endParaRPr lang="hr-HR" sz="9600">
-              <a:solidFill>
-                <a:schemeClr val="accent1">
-                  <a:lumMod val="75000"/>
-                </a:schemeClr>
-              </a:solidFill>
-            </a:endParaRPr>
-          </a:p>
-        </p:txBody>
-      </p:sp>
+              <a:rPr lang="en-US" sz="2000" b="1" smtClean="0"/>
+              <a:t>Classes</a:t>
+            </a:r>
+            <a:endParaRPr lang="en-US" b="1" smtClean="0"/>
+          </a:p>
+          <a:p>
+            <a:pPr algn="ctr"/>
+            <a:endParaRPr lang="en-US" smtClean="0"/>
+          </a:p>
+          <a:p>
+            <a:pPr algn="ctr">
+              <a:lnSpc>
+                <a:spcPct val="150000"/>
+              </a:lnSpc>
+            </a:pPr>
+            <a:r>
+              <a:rPr lang="en-US" sz="2000" i="1" smtClean="0"/>
+              <a:t>MessageParser</a:t>
+            </a:r>
+          </a:p>
+          <a:p>
+            <a:pPr algn="ctr">
+              <a:lnSpc>
+                <a:spcPct val="150000"/>
+              </a:lnSpc>
+            </a:pPr>
+            <a:r>
+              <a:rPr lang="en-US" sz="2000" i="1" smtClean="0"/>
+              <a:t>StateMachine</a:t>
+            </a:r>
+          </a:p>
+          <a:p>
+            <a:pPr algn="ctr">
+              <a:lnSpc>
+                <a:spcPct val="150000"/>
+              </a:lnSpc>
+            </a:pPr>
+            <a:r>
+              <a:rPr lang="en-US" sz="2000" i="1" smtClean="0"/>
+              <a:t>ECDHKeyExchange</a:t>
+            </a:r>
+          </a:p>
+          <a:p>
+            <a:pPr algn="ctr">
+              <a:lnSpc>
+                <a:spcPct val="150000"/>
+              </a:lnSpc>
+            </a:pPr>
+            <a:r>
+              <a:rPr lang="en-US" sz="2000" i="1" smtClean="0"/>
+              <a:t>STS</a:t>
+            </a:r>
+            <a:endParaRPr lang="hr-HR" sz="2000" i="1"/>
+          </a:p>
+        </p:txBody>
+      </p:sp>
+      <p:graphicFrame>
+        <p:nvGraphicFramePr>
+          <p:cNvPr id="15" name="Table 14"/>
+          <p:cNvGraphicFramePr>
+            <a:graphicFrameLocks noGrp="1"/>
+          </p:cNvGraphicFramePr>
+          <p:nvPr>
+            <p:extLst>
+              <p:ext uri="{D42A27DB-BD31-4B8C-83A1-F6EECF244321}">
+                <p14:modId xmlns:p14="http://schemas.microsoft.com/office/powerpoint/2010/main" val="847025255"/>
+              </p:ext>
+            </p:extLst>
+          </p:nvPr>
+        </p:nvGraphicFramePr>
+        <p:xfrm>
+          <a:off x="6655639" y="2372259"/>
+          <a:ext cx="4550074" cy="3006025"/>
+        </p:xfrm>
+        <a:graphic>
+          <a:graphicData uri="http://schemas.openxmlformats.org/drawingml/2006/table">
+            <a:tbl>
+              <a:tblPr firstRow="1" bandRow="1">
+                <a:tableStyleId>{5C22544A-7EE6-4342-B048-85BDC9FD1C3A}</a:tableStyleId>
+              </a:tblPr>
+              <a:tblGrid>
+                <a:gridCol w="2275037"/>
+                <a:gridCol w="2275037"/>
+              </a:tblGrid>
+              <a:tr h="370840">
+                <a:tc gridSpan="2">
+                  <a:txBody>
+                    <a:bodyPr/>
+                    <a:lstStyle/>
+                    <a:p>
+                      <a:pPr algn="ctr"/>
+                      <a:r>
+                        <a:rPr lang="en-US" sz="1800" b="1" kern="1200" smtClean="0">
+                          <a:solidFill>
+                            <a:schemeClr val="lt1"/>
+                          </a:solidFill>
+                          <a:latin typeface="Arial" panose="020B0604020202020204" pitchFamily="34" charset="0"/>
+                          <a:ea typeface="+mn-ea"/>
+                          <a:cs typeface="Arial" panose="020B0604020202020204" pitchFamily="34" charset="0"/>
+                        </a:rPr>
+                        <a:t>Specifications</a:t>
+                      </a:r>
+                      <a:endParaRPr lang="hr-HR" sz="1800" b="1" kern="1200">
+                        <a:solidFill>
+                          <a:schemeClr val="lt1"/>
+                        </a:solidFill>
+                        <a:latin typeface="Arial" panose="020B0604020202020204" pitchFamily="34" charset="0"/>
+                        <a:ea typeface="+mn-ea"/>
+                        <a:cs typeface="Arial" panose="020B0604020202020204" pitchFamily="34" charset="0"/>
+                      </a:endParaRPr>
+                    </a:p>
+                  </a:txBody>
+                  <a:tcPr/>
+                </a:tc>
+                <a:tc hMerge="1">
+                  <a:txBody>
+                    <a:bodyPr/>
+                    <a:lstStyle/>
+                    <a:p>
+                      <a:pPr algn="ctr"/>
+                      <a:endParaRPr lang="hr-HR" sz="1800" b="1" kern="1200">
+                        <a:solidFill>
+                          <a:schemeClr val="lt1"/>
+                        </a:solidFill>
+                        <a:latin typeface="Arial" panose="020B0604020202020204" pitchFamily="34" charset="0"/>
+                        <a:ea typeface="+mn-ea"/>
+                        <a:cs typeface="Arial" panose="020B0604020202020204" pitchFamily="34" charset="0"/>
+                      </a:endParaRPr>
+                    </a:p>
+                  </a:txBody>
+                  <a:tcPr/>
+                </a:tc>
+              </a:tr>
+              <a:tr h="527037">
+                <a:tc>
+                  <a:txBody>
+                    <a:bodyPr/>
+                    <a:lstStyle/>
+                    <a:p>
+                      <a:pPr algn="ctr"/>
+                      <a:r>
+                        <a:rPr lang="en-US" sz="1600" smtClean="0">
+                          <a:latin typeface="Arial" panose="020B0604020202020204" pitchFamily="34" charset="0"/>
+                          <a:cs typeface="Arial" panose="020B0604020202020204" pitchFamily="34" charset="0"/>
+                        </a:rPr>
+                        <a:t>Microcontroller</a:t>
+                      </a:r>
+                      <a:endParaRPr lang="hr-HR" sz="1600">
+                        <a:latin typeface="Arial" panose="020B0604020202020204" pitchFamily="34" charset="0"/>
+                        <a:cs typeface="Arial" panose="020B0604020202020204" pitchFamily="34" charset="0"/>
+                      </a:endParaRPr>
+                    </a:p>
+                  </a:txBody>
+                  <a:tcPr anchor="ctr"/>
+                </a:tc>
+                <a:tc>
+                  <a:txBody>
+                    <a:bodyPr/>
+                    <a:lstStyle/>
+                    <a:p>
+                      <a:pPr algn="ctr"/>
+                      <a:r>
+                        <a:rPr lang="en-US" sz="1600" smtClean="0">
+                          <a:latin typeface="Arial" panose="020B0604020202020204" pitchFamily="34" charset="0"/>
+                          <a:cs typeface="Arial" panose="020B0604020202020204" pitchFamily="34" charset="0"/>
+                        </a:rPr>
+                        <a:t>ATmega328P</a:t>
+                      </a:r>
+                      <a:endParaRPr lang="hr-HR" sz="1600">
+                        <a:latin typeface="Arial" panose="020B0604020202020204" pitchFamily="34" charset="0"/>
+                        <a:cs typeface="Arial" panose="020B0604020202020204" pitchFamily="34" charset="0"/>
+                      </a:endParaRPr>
+                    </a:p>
+                  </a:txBody>
+                  <a:tcPr anchor="ctr"/>
+                </a:tc>
+              </a:tr>
+              <a:tr h="527037">
+                <a:tc>
+                  <a:txBody>
+                    <a:bodyPr/>
+                    <a:lstStyle/>
+                    <a:p>
+                      <a:pPr algn="ctr"/>
+                      <a:r>
+                        <a:rPr lang="en-US" sz="1600" smtClean="0">
+                          <a:latin typeface="Arial" panose="020B0604020202020204" pitchFamily="34" charset="0"/>
+                          <a:cs typeface="Arial" panose="020B0604020202020204" pitchFamily="34" charset="0"/>
+                        </a:rPr>
+                        <a:t>Flash</a:t>
+                      </a:r>
+                      <a:r>
+                        <a:rPr lang="en-US" sz="1600" baseline="0" smtClean="0">
+                          <a:latin typeface="Arial" panose="020B0604020202020204" pitchFamily="34" charset="0"/>
+                          <a:cs typeface="Arial" panose="020B0604020202020204" pitchFamily="34" charset="0"/>
+                        </a:rPr>
+                        <a:t> Memory</a:t>
+                      </a:r>
+                      <a:endParaRPr lang="hr-HR" sz="1600">
+                        <a:latin typeface="Arial" panose="020B0604020202020204" pitchFamily="34" charset="0"/>
+                        <a:cs typeface="Arial" panose="020B0604020202020204" pitchFamily="34" charset="0"/>
+                      </a:endParaRPr>
+                    </a:p>
+                  </a:txBody>
+                  <a:tcPr anchor="ctr"/>
+                </a:tc>
+                <a:tc>
+                  <a:txBody>
+                    <a:bodyPr/>
+                    <a:lstStyle/>
+                    <a:p>
+                      <a:pPr algn="ctr"/>
+                      <a:r>
+                        <a:rPr lang="en-US" sz="1600" smtClean="0">
+                          <a:latin typeface="Arial" panose="020B0604020202020204" pitchFamily="34" charset="0"/>
+                          <a:cs typeface="Arial" panose="020B0604020202020204" pitchFamily="34" charset="0"/>
+                        </a:rPr>
+                        <a:t>32</a:t>
+                      </a:r>
+                      <a:r>
+                        <a:rPr lang="en-US" sz="1600" baseline="0" smtClean="0">
+                          <a:latin typeface="Arial" panose="020B0604020202020204" pitchFamily="34" charset="0"/>
+                          <a:cs typeface="Arial" panose="020B0604020202020204" pitchFamily="34" charset="0"/>
+                        </a:rPr>
+                        <a:t> KB</a:t>
+                      </a:r>
+                      <a:endParaRPr lang="hr-HR" sz="1600">
+                        <a:latin typeface="Arial" panose="020B0604020202020204" pitchFamily="34" charset="0"/>
+                        <a:cs typeface="Arial" panose="020B0604020202020204" pitchFamily="34" charset="0"/>
+                      </a:endParaRPr>
+                    </a:p>
+                  </a:txBody>
+                  <a:tcPr anchor="ctr"/>
+                </a:tc>
+              </a:tr>
+              <a:tr h="527037">
+                <a:tc>
+                  <a:txBody>
+                    <a:bodyPr/>
+                    <a:lstStyle/>
+                    <a:p>
+                      <a:pPr algn="ctr"/>
+                      <a:r>
+                        <a:rPr lang="en-US" sz="1600" smtClean="0">
+                          <a:latin typeface="Arial" panose="020B0604020202020204" pitchFamily="34" charset="0"/>
+                          <a:cs typeface="Arial" panose="020B0604020202020204" pitchFamily="34" charset="0"/>
+                        </a:rPr>
+                        <a:t>SRAM</a:t>
+                      </a:r>
+                      <a:endParaRPr lang="hr-HR" sz="1600">
+                        <a:latin typeface="Arial" panose="020B0604020202020204" pitchFamily="34" charset="0"/>
+                        <a:cs typeface="Arial" panose="020B0604020202020204" pitchFamily="34" charset="0"/>
+                      </a:endParaRPr>
+                    </a:p>
+                  </a:txBody>
+                  <a:tcPr anchor="ctr"/>
+                </a:tc>
+                <a:tc>
+                  <a:txBody>
+                    <a:bodyPr/>
+                    <a:lstStyle/>
+                    <a:p>
+                      <a:pPr algn="ctr"/>
+                      <a:r>
+                        <a:rPr lang="en-US" sz="1600" smtClean="0">
+                          <a:latin typeface="Arial" panose="020B0604020202020204" pitchFamily="34" charset="0"/>
+                          <a:cs typeface="Arial" panose="020B0604020202020204" pitchFamily="34" charset="0"/>
+                        </a:rPr>
+                        <a:t>2</a:t>
+                      </a:r>
+                      <a:r>
+                        <a:rPr lang="en-US" sz="1600" baseline="0" smtClean="0">
+                          <a:latin typeface="Arial" panose="020B0604020202020204" pitchFamily="34" charset="0"/>
+                          <a:cs typeface="Arial" panose="020B0604020202020204" pitchFamily="34" charset="0"/>
+                        </a:rPr>
+                        <a:t> KB</a:t>
+                      </a:r>
+                      <a:endParaRPr lang="hr-HR" sz="1600">
+                        <a:latin typeface="Arial" panose="020B0604020202020204" pitchFamily="34" charset="0"/>
+                        <a:cs typeface="Arial" panose="020B0604020202020204" pitchFamily="34" charset="0"/>
+                      </a:endParaRPr>
+                    </a:p>
+                  </a:txBody>
+                  <a:tcPr anchor="ctr"/>
+                </a:tc>
+              </a:tr>
+              <a:tr h="527037">
+                <a:tc>
+                  <a:txBody>
+                    <a:bodyPr/>
+                    <a:lstStyle/>
+                    <a:p>
+                      <a:pPr algn="ctr"/>
+                      <a:r>
+                        <a:rPr lang="en-US" sz="1600" smtClean="0">
+                          <a:latin typeface="Arial" panose="020B0604020202020204" pitchFamily="34" charset="0"/>
+                          <a:cs typeface="Arial" panose="020B0604020202020204" pitchFamily="34" charset="0"/>
+                        </a:rPr>
+                        <a:t>EEPROM</a:t>
+                      </a:r>
+                      <a:endParaRPr lang="hr-HR" sz="1600">
+                        <a:latin typeface="Arial" panose="020B0604020202020204" pitchFamily="34" charset="0"/>
+                        <a:cs typeface="Arial" panose="020B0604020202020204" pitchFamily="34" charset="0"/>
+                      </a:endParaRPr>
+                    </a:p>
+                  </a:txBody>
+                  <a:tcPr anchor="ctr"/>
+                </a:tc>
+                <a:tc>
+                  <a:txBody>
+                    <a:bodyPr/>
+                    <a:lstStyle/>
+                    <a:p>
+                      <a:pPr algn="ctr"/>
+                      <a:r>
+                        <a:rPr lang="en-US" sz="1600" smtClean="0">
+                          <a:latin typeface="Arial" panose="020B0604020202020204" pitchFamily="34" charset="0"/>
+                          <a:cs typeface="Arial" panose="020B0604020202020204" pitchFamily="34" charset="0"/>
+                        </a:rPr>
+                        <a:t>1</a:t>
+                      </a:r>
+                      <a:r>
+                        <a:rPr lang="en-US" sz="1600" baseline="0" smtClean="0">
+                          <a:latin typeface="Arial" panose="020B0604020202020204" pitchFamily="34" charset="0"/>
+                          <a:cs typeface="Arial" panose="020B0604020202020204" pitchFamily="34" charset="0"/>
+                        </a:rPr>
+                        <a:t> KB</a:t>
+                      </a:r>
+                      <a:endParaRPr lang="hr-HR" sz="1600">
+                        <a:latin typeface="Arial" panose="020B0604020202020204" pitchFamily="34" charset="0"/>
+                        <a:cs typeface="Arial" panose="020B0604020202020204" pitchFamily="34" charset="0"/>
+                      </a:endParaRPr>
+                    </a:p>
+                  </a:txBody>
+                  <a:tcPr anchor="ctr"/>
+                </a:tc>
+              </a:tr>
+              <a:tr h="527037">
+                <a:tc>
+                  <a:txBody>
+                    <a:bodyPr/>
+                    <a:lstStyle/>
+                    <a:p>
+                      <a:pPr algn="ctr"/>
+                      <a:r>
+                        <a:rPr lang="en-US" sz="1600" smtClean="0">
+                          <a:latin typeface="Arial" panose="020B0604020202020204" pitchFamily="34" charset="0"/>
+                          <a:cs typeface="Arial" panose="020B0604020202020204" pitchFamily="34" charset="0"/>
+                        </a:rPr>
+                        <a:t>Clock Speed</a:t>
+                      </a:r>
+                      <a:endParaRPr lang="hr-HR" sz="1600">
+                        <a:latin typeface="Arial" panose="020B0604020202020204" pitchFamily="34" charset="0"/>
+                        <a:cs typeface="Arial" panose="020B0604020202020204" pitchFamily="34" charset="0"/>
+                      </a:endParaRPr>
+                    </a:p>
+                  </a:txBody>
+                  <a:tcPr anchor="ctr"/>
+                </a:tc>
+                <a:tc>
+                  <a:txBody>
+                    <a:bodyPr/>
+                    <a:lstStyle/>
+                    <a:p>
+                      <a:pPr algn="ctr"/>
+                      <a:r>
+                        <a:rPr lang="en-US" sz="1600" smtClean="0">
+                          <a:latin typeface="Arial" panose="020B0604020202020204" pitchFamily="34" charset="0"/>
+                          <a:cs typeface="Arial" panose="020B0604020202020204" pitchFamily="34" charset="0"/>
+                        </a:rPr>
+                        <a:t>16</a:t>
+                      </a:r>
+                      <a:r>
+                        <a:rPr lang="en-US" sz="1600" baseline="0" smtClean="0">
+                          <a:latin typeface="Arial" panose="020B0604020202020204" pitchFamily="34" charset="0"/>
+                          <a:cs typeface="Arial" panose="020B0604020202020204" pitchFamily="34" charset="0"/>
+                        </a:rPr>
+                        <a:t> MHz</a:t>
+                      </a:r>
+                      <a:endParaRPr lang="hr-HR" sz="1600">
+                        <a:latin typeface="Arial" panose="020B0604020202020204" pitchFamily="34" charset="0"/>
+                        <a:cs typeface="Arial" panose="020B0604020202020204" pitchFamily="34" charset="0"/>
+                      </a:endParaRPr>
+                    </a:p>
+                  </a:txBody>
+                  <a:tcPr anchor="ctr"/>
+                </a:tc>
+              </a:tr>
+            </a:tbl>
+          </a:graphicData>
+        </a:graphic>
+      </p:graphicFrame>
     </p:spTree>
     <p:extLst>
       <p:ext uri="{BB962C8B-B14F-4D97-AF65-F5344CB8AC3E}">
-        <p14:creationId xmlns:p14="http://schemas.microsoft.com/office/powerpoint/2010/main" val="2041763398"/>
+        <p14:creationId xmlns:p14="http://schemas.microsoft.com/office/powerpoint/2010/main" val="679849665"/>
+      </p:ext>
+    </p:extLst>
+  </p:cSld>
+  <p:clrMapOvr>
+    <a:masterClrMapping/>
+  </p:clrMapOvr>
+  <p:transition spd="slow">
+    <p:push dir="u"/>
+  </p:transition>
+  <p:timing>
+    <p:tnLst>
+      <p:par>
+        <p:cTn id="1" dur="indefinite" restart="never" nodeType="tmRoot"/>
+      </p:par>
+    </p:tnLst>
+  </p:timing>
+</p:sld>
+</file>
+
+<file path=ppt/slides/slide9.xml><?xml version="1.0" encoding="utf-8"?>
+<p:sld xmlns:a="http://schemas.openxmlformats.org/drawingml/2006/main" xmlns:r="http://schemas.openxmlformats.org/officeDocument/2006/relationships" xmlns:p="http://schemas.openxmlformats.org/presentationml/2006/main">
+  <p:cSld>
+    <p:spTree>
+      <p:nvGrpSpPr>
+        <p:cNvPr id="1" name=""/>
+        <p:cNvGrpSpPr/>
+        <p:nvPr/>
+      </p:nvGrpSpPr>
+      <p:grpSpPr>
+        <a:xfrm>
+          <a:off x="0" y="0"/>
+          <a:ext cx="0" cy="0"/>
+          <a:chOff x="0" y="0"/>
+          <a:chExt cx="0" cy="0"/>
+        </a:xfrm>
+      </p:grpSpPr>
+      <p:sp>
+        <p:nvSpPr>
+          <p:cNvPr id="7" name="Title 1">
+            <a:extLst>
+              <a:ext uri="{FF2B5EF4-FFF2-40B4-BE49-F238E27FC236}">
+                <a16:creationId xmlns:a16="http://schemas.microsoft.com/office/drawing/2014/main" xmlns="" id="{F3F19207-56E3-41C1-B35F-1C329A479D6C}"/>
+              </a:ext>
+            </a:extLst>
+          </p:cNvPr>
+          <p:cNvSpPr txBox="1">
+            <a:spLocks/>
+          </p:cNvSpPr>
+          <p:nvPr/>
+        </p:nvSpPr>
+        <p:spPr>
+          <a:xfrm>
+            <a:off x="3431515" y="491705"/>
+            <a:ext cx="5328968" cy="940277"/>
+          </a:xfrm>
+          <a:prstGeom prst="rect">
+            <a:avLst/>
+          </a:prstGeom>
+        </p:spPr>
+        <p:txBody>
+          <a:bodyPr vert="horz" lIns="91440" tIns="45720" rIns="91440" bIns="45720" rtlCol="0" anchor="ctr">
+            <a:normAutofit/>
+          </a:bodyPr>
+          <a:lstStyle>
+            <a:lvl1pPr algn="l" defTabSz="914400" rtl="0" eaLnBrk="1" latinLnBrk="0" hangingPunct="1">
+              <a:lnSpc>
+                <a:spcPct val="90000"/>
+              </a:lnSpc>
+              <a:spcBef>
+                <a:spcPct val="0"/>
+              </a:spcBef>
+              <a:buNone/>
+              <a:defRPr sz="4400" kern="1200">
+                <a:solidFill>
+                  <a:schemeClr val="tx1"/>
+                </a:solidFill>
+                <a:latin typeface="+mj-lt"/>
+                <a:ea typeface="+mj-ea"/>
+                <a:cs typeface="+mj-cs"/>
+              </a:defRPr>
+            </a:lvl1pPr>
+          </a:lstStyle>
+          <a:p>
+            <a:pPr algn="ctr"/>
+            <a:r>
+              <a:rPr lang="en-US" sz="2800" smtClean="0">
+                <a:latin typeface="Arial" panose="020B0604020202020204" pitchFamily="34" charset="0"/>
+                <a:cs typeface="Arial" panose="020B0604020202020204" pitchFamily="34" charset="0"/>
+              </a:rPr>
+              <a:t>PERFORMANCES</a:t>
+            </a:r>
+            <a:endParaRPr lang="en-US" sz="2800" dirty="0">
+              <a:latin typeface="Arial" panose="020B0604020202020204" pitchFamily="34" charset="0"/>
+              <a:cs typeface="Arial" panose="020B0604020202020204" pitchFamily="34" charset="0"/>
+            </a:endParaRPr>
+          </a:p>
+        </p:txBody>
+      </p:sp>
+      <p:cxnSp>
+        <p:nvCxnSpPr>
+          <p:cNvPr id="8" name="Straight Connector 7">
+            <a:extLst>
+              <a:ext uri="{FF2B5EF4-FFF2-40B4-BE49-F238E27FC236}">
+                <a16:creationId xmlns:a16="http://schemas.microsoft.com/office/drawing/2014/main" xmlns="" id="{F5AD3098-4B9E-4C8B-910B-1DD3F084C040}"/>
+              </a:ext>
+            </a:extLst>
+          </p:cNvPr>
+          <p:cNvCxnSpPr/>
+          <p:nvPr/>
+        </p:nvCxnSpPr>
+        <p:spPr>
+          <a:xfrm>
+            <a:off x="3385507" y="1431982"/>
+            <a:ext cx="5420984" cy="9943"/>
+          </a:xfrm>
+          <a:prstGeom prst="line">
+            <a:avLst/>
+          </a:prstGeom>
+          <a:ln w="28575">
+            <a:solidFill>
+              <a:schemeClr val="accent1">
+                <a:lumMod val="75000"/>
+              </a:schemeClr>
+            </a:solidFill>
+          </a:ln>
+        </p:spPr>
+        <p:style>
+          <a:lnRef idx="1">
+            <a:schemeClr val="accent1"/>
+          </a:lnRef>
+          <a:fillRef idx="0">
+            <a:schemeClr val="accent1"/>
+          </a:fillRef>
+          <a:effectRef idx="0">
+            <a:schemeClr val="accent1"/>
+          </a:effectRef>
+          <a:fontRef idx="minor">
+            <a:schemeClr val="tx1"/>
+          </a:fontRef>
+        </p:style>
+      </p:cxnSp>
+      <p:graphicFrame>
+        <p:nvGraphicFramePr>
+          <p:cNvPr id="2" name="Table 1"/>
+          <p:cNvGraphicFramePr>
+            <a:graphicFrameLocks noGrp="1"/>
+          </p:cNvGraphicFramePr>
+          <p:nvPr>
+            <p:extLst>
+              <p:ext uri="{D42A27DB-BD31-4B8C-83A1-F6EECF244321}">
+                <p14:modId xmlns:p14="http://schemas.microsoft.com/office/powerpoint/2010/main" val="3269731000"/>
+              </p:ext>
+            </p:extLst>
+          </p:nvPr>
+        </p:nvGraphicFramePr>
+        <p:xfrm>
+          <a:off x="2031999" y="2168904"/>
+          <a:ext cx="8128000" cy="3533062"/>
+        </p:xfrm>
+        <a:graphic>
+          <a:graphicData uri="http://schemas.openxmlformats.org/drawingml/2006/table">
+            <a:tbl>
+              <a:tblPr firstRow="1" bandRow="1">
+                <a:tableStyleId>{5C22544A-7EE6-4342-B048-85BDC9FD1C3A}</a:tableStyleId>
+              </a:tblPr>
+              <a:tblGrid>
+                <a:gridCol w="4064000"/>
+                <a:gridCol w="4064000"/>
+              </a:tblGrid>
+              <a:tr h="370840">
+                <a:tc>
+                  <a:txBody>
+                    <a:bodyPr/>
+                    <a:lstStyle/>
+                    <a:p>
+                      <a:pPr algn="ctr"/>
+                      <a:r>
+                        <a:rPr lang="en-US" smtClean="0">
+                          <a:latin typeface="Arial" panose="020B0604020202020204" pitchFamily="34" charset="0"/>
+                          <a:cs typeface="Arial" panose="020B0604020202020204" pitchFamily="34" charset="0"/>
+                        </a:rPr>
+                        <a:t>Operation</a:t>
+                      </a:r>
+                      <a:endParaRPr lang="hr-HR">
+                        <a:latin typeface="Arial" panose="020B0604020202020204" pitchFamily="34" charset="0"/>
+                        <a:cs typeface="Arial" panose="020B0604020202020204" pitchFamily="34" charset="0"/>
+                      </a:endParaRPr>
+                    </a:p>
+                  </a:txBody>
+                  <a:tcPr/>
+                </a:tc>
+                <a:tc>
+                  <a:txBody>
+                    <a:bodyPr/>
+                    <a:lstStyle/>
+                    <a:p>
+                      <a:pPr algn="ctr"/>
+                      <a:r>
+                        <a:rPr lang="en-US" sz="1800" b="1" kern="1200" smtClean="0">
+                          <a:solidFill>
+                            <a:schemeClr val="lt1"/>
+                          </a:solidFill>
+                          <a:latin typeface="Arial" panose="020B0604020202020204" pitchFamily="34" charset="0"/>
+                          <a:ea typeface="+mn-ea"/>
+                          <a:cs typeface="Arial" panose="020B0604020202020204" pitchFamily="34" charset="0"/>
+                        </a:rPr>
+                        <a:t>Time</a:t>
+                      </a:r>
+                      <a:endParaRPr lang="hr-HR" sz="1800" b="1" kern="1200">
+                        <a:solidFill>
+                          <a:schemeClr val="lt1"/>
+                        </a:solidFill>
+                        <a:latin typeface="Arial" panose="020B0604020202020204" pitchFamily="34" charset="0"/>
+                        <a:ea typeface="+mn-ea"/>
+                        <a:cs typeface="Arial" panose="020B0604020202020204" pitchFamily="34" charset="0"/>
+                      </a:endParaRPr>
+                    </a:p>
+                  </a:txBody>
+                  <a:tcPr/>
+                </a:tc>
+              </a:tr>
+              <a:tr h="527037">
+                <a:tc>
+                  <a:txBody>
+                    <a:bodyPr/>
+                    <a:lstStyle/>
+                    <a:p>
+                      <a:pPr algn="ctr"/>
+                      <a:r>
+                        <a:rPr lang="en-US" sz="1600" smtClean="0">
+                          <a:latin typeface="Arial" panose="020B0604020202020204" pitchFamily="34" charset="0"/>
+                          <a:cs typeface="Arial" panose="020B0604020202020204" pitchFamily="34" charset="0"/>
+                        </a:rPr>
+                        <a:t>Generating ECDH key pair</a:t>
+                      </a:r>
+                      <a:endParaRPr lang="hr-HR" sz="1600">
+                        <a:latin typeface="Arial" panose="020B0604020202020204" pitchFamily="34" charset="0"/>
+                        <a:cs typeface="Arial" panose="020B0604020202020204" pitchFamily="34" charset="0"/>
+                      </a:endParaRPr>
+                    </a:p>
+                  </a:txBody>
+                  <a:tcPr anchor="ctr"/>
+                </a:tc>
+                <a:tc>
+                  <a:txBody>
+                    <a:bodyPr/>
+                    <a:lstStyle/>
+                    <a:p>
+                      <a:pPr algn="ctr"/>
+                      <a:r>
+                        <a:rPr lang="en-US" sz="1600" smtClean="0">
+                          <a:latin typeface="Arial" panose="020B0604020202020204" pitchFamily="34" charset="0"/>
+                          <a:cs typeface="Arial" panose="020B0604020202020204" pitchFamily="34" charset="0"/>
+                        </a:rPr>
+                        <a:t>3259 ms</a:t>
+                      </a:r>
+                      <a:endParaRPr lang="hr-HR" sz="1600">
+                        <a:latin typeface="Arial" panose="020B0604020202020204" pitchFamily="34" charset="0"/>
+                        <a:cs typeface="Arial" panose="020B0604020202020204" pitchFamily="34" charset="0"/>
+                      </a:endParaRPr>
+                    </a:p>
+                  </a:txBody>
+                  <a:tcPr anchor="ctr"/>
+                </a:tc>
+              </a:tr>
+              <a:tr h="527037">
+                <a:tc>
+                  <a:txBody>
+                    <a:bodyPr/>
+                    <a:lstStyle/>
+                    <a:p>
+                      <a:pPr algn="ctr"/>
+                      <a:r>
+                        <a:rPr lang="en-US" sz="1600" smtClean="0">
+                          <a:latin typeface="Arial" panose="020B0604020202020204" pitchFamily="34" charset="0"/>
+                          <a:cs typeface="Arial" panose="020B0604020202020204" pitchFamily="34" charset="0"/>
+                        </a:rPr>
+                        <a:t>Generating shared secret</a:t>
+                      </a:r>
+                      <a:endParaRPr lang="hr-HR" sz="1600">
+                        <a:latin typeface="Arial" panose="020B0604020202020204" pitchFamily="34" charset="0"/>
+                        <a:cs typeface="Arial" panose="020B0604020202020204" pitchFamily="34" charset="0"/>
+                      </a:endParaRPr>
+                    </a:p>
+                  </a:txBody>
+                  <a:tcPr anchor="ctr"/>
+                </a:tc>
+                <a:tc>
+                  <a:txBody>
+                    <a:bodyPr/>
+                    <a:lstStyle/>
+                    <a:p>
+                      <a:pPr algn="ctr"/>
+                      <a:r>
+                        <a:rPr lang="en-US" sz="1600" smtClean="0">
+                          <a:latin typeface="Arial" panose="020B0604020202020204" pitchFamily="34" charset="0"/>
+                          <a:cs typeface="Arial" panose="020B0604020202020204" pitchFamily="34" charset="0"/>
+                        </a:rPr>
+                        <a:t>3241 ms</a:t>
+                      </a:r>
+                      <a:endParaRPr lang="hr-HR" sz="1600">
+                        <a:latin typeface="Arial" panose="020B0604020202020204" pitchFamily="34" charset="0"/>
+                        <a:cs typeface="Arial" panose="020B0604020202020204" pitchFamily="34" charset="0"/>
+                      </a:endParaRPr>
+                    </a:p>
+                  </a:txBody>
+                  <a:tcPr anchor="ctr"/>
+                </a:tc>
+              </a:tr>
+              <a:tr h="527037">
+                <a:tc>
+                  <a:txBody>
+                    <a:bodyPr/>
+                    <a:lstStyle/>
+                    <a:p>
+                      <a:pPr algn="ctr"/>
+                      <a:r>
+                        <a:rPr lang="en-US" sz="1600" smtClean="0">
+                          <a:latin typeface="Arial" panose="020B0604020202020204" pitchFamily="34" charset="0"/>
+                          <a:cs typeface="Arial" panose="020B0604020202020204" pitchFamily="34" charset="0"/>
+                        </a:rPr>
+                        <a:t>AES256</a:t>
+                      </a:r>
+                      <a:r>
+                        <a:rPr lang="en-US" sz="1600" baseline="0" smtClean="0">
+                          <a:latin typeface="Arial" panose="020B0604020202020204" pitchFamily="34" charset="0"/>
+                          <a:cs typeface="Arial" panose="020B0604020202020204" pitchFamily="34" charset="0"/>
+                        </a:rPr>
+                        <a:t> key setup</a:t>
+                      </a:r>
+                      <a:endParaRPr lang="hr-HR" sz="1600">
+                        <a:latin typeface="Arial" panose="020B0604020202020204" pitchFamily="34" charset="0"/>
+                        <a:cs typeface="Arial" panose="020B0604020202020204" pitchFamily="34" charset="0"/>
+                      </a:endParaRPr>
+                    </a:p>
+                  </a:txBody>
+                  <a:tcPr anchor="ctr"/>
+                </a:tc>
+                <a:tc>
+                  <a:txBody>
+                    <a:bodyPr/>
+                    <a:lstStyle/>
+                    <a:p>
+                      <a:pPr algn="ctr"/>
+                      <a:r>
+                        <a:rPr lang="en-US" sz="1600" smtClean="0">
+                          <a:latin typeface="Arial" panose="020B0604020202020204" pitchFamily="34" charset="0"/>
+                          <a:cs typeface="Arial" panose="020B0604020202020204" pitchFamily="34" charset="0"/>
+                        </a:rPr>
+                        <a:t>437 us</a:t>
+                      </a:r>
+                      <a:endParaRPr lang="hr-HR" sz="1600">
+                        <a:latin typeface="Arial" panose="020B0604020202020204" pitchFamily="34" charset="0"/>
+                        <a:cs typeface="Arial" panose="020B0604020202020204" pitchFamily="34" charset="0"/>
+                      </a:endParaRPr>
+                    </a:p>
+                  </a:txBody>
+                  <a:tcPr anchor="ctr"/>
+                </a:tc>
+              </a:tr>
+              <a:tr h="527037">
+                <a:tc>
+                  <a:txBody>
+                    <a:bodyPr/>
+                    <a:lstStyle/>
+                    <a:p>
+                      <a:pPr algn="ctr"/>
+                      <a:r>
+                        <a:rPr lang="en-US" sz="1600" smtClean="0">
+                          <a:latin typeface="Arial" panose="020B0604020202020204" pitchFamily="34" charset="0"/>
+                          <a:cs typeface="Arial" panose="020B0604020202020204" pitchFamily="34" charset="0"/>
+                        </a:rPr>
+                        <a:t>AES256 encryption</a:t>
+                      </a:r>
+                      <a:r>
+                        <a:rPr lang="en-US" sz="1600" baseline="0" smtClean="0">
+                          <a:latin typeface="Arial" panose="020B0604020202020204" pitchFamily="34" charset="0"/>
+                          <a:cs typeface="Arial" panose="020B0604020202020204" pitchFamily="34" charset="0"/>
+                        </a:rPr>
+                        <a:t> (per byte)</a:t>
+                      </a:r>
+                      <a:endParaRPr lang="hr-HR" sz="1600">
+                        <a:latin typeface="Arial" panose="020B0604020202020204" pitchFamily="34" charset="0"/>
+                        <a:cs typeface="Arial" panose="020B0604020202020204" pitchFamily="34" charset="0"/>
+                      </a:endParaRPr>
+                    </a:p>
+                  </a:txBody>
+                  <a:tcPr anchor="ctr"/>
+                </a:tc>
+                <a:tc>
+                  <a:txBody>
+                    <a:bodyPr/>
+                    <a:lstStyle/>
+                    <a:p>
+                      <a:pPr algn="ctr"/>
+                      <a:r>
+                        <a:rPr lang="en-US" sz="1600" smtClean="0">
+                          <a:latin typeface="Arial" panose="020B0604020202020204" pitchFamily="34" charset="0"/>
+                          <a:cs typeface="Arial" panose="020B0604020202020204" pitchFamily="34" charset="0"/>
+                        </a:rPr>
+                        <a:t>24 us</a:t>
+                      </a:r>
+                      <a:endParaRPr lang="hr-HR" sz="1600">
+                        <a:latin typeface="Arial" panose="020B0604020202020204" pitchFamily="34" charset="0"/>
+                        <a:cs typeface="Arial" panose="020B0604020202020204" pitchFamily="34" charset="0"/>
+                      </a:endParaRPr>
+                    </a:p>
+                  </a:txBody>
+                  <a:tcPr anchor="ctr"/>
+                </a:tc>
+              </a:tr>
+              <a:tr h="527037">
+                <a:tc>
+                  <a:txBody>
+                    <a:bodyPr/>
+                    <a:lstStyle/>
+                    <a:p>
+                      <a:pPr algn="ctr"/>
+                      <a:r>
+                        <a:rPr lang="en-US" sz="1600" smtClean="0">
+                          <a:latin typeface="Arial" panose="020B0604020202020204" pitchFamily="34" charset="0"/>
+                          <a:cs typeface="Arial" panose="020B0604020202020204" pitchFamily="34" charset="0"/>
+                        </a:rPr>
+                        <a:t>AES256 decryption</a:t>
+                      </a:r>
+                      <a:r>
+                        <a:rPr lang="en-US" sz="1600" baseline="0" smtClean="0">
+                          <a:latin typeface="Arial" panose="020B0604020202020204" pitchFamily="34" charset="0"/>
+                          <a:cs typeface="Arial" panose="020B0604020202020204" pitchFamily="34" charset="0"/>
+                        </a:rPr>
+                        <a:t> (per byte)</a:t>
+                      </a:r>
+                      <a:endParaRPr lang="hr-HR" sz="1600">
+                        <a:latin typeface="Arial" panose="020B0604020202020204" pitchFamily="34" charset="0"/>
+                        <a:cs typeface="Arial" panose="020B0604020202020204" pitchFamily="34" charset="0"/>
+                      </a:endParaRPr>
+                    </a:p>
+                  </a:txBody>
+                  <a:tcPr anchor="ctr"/>
+                </a:tc>
+                <a:tc>
+                  <a:txBody>
+                    <a:bodyPr/>
+                    <a:lstStyle/>
+                    <a:p>
+                      <a:pPr algn="ctr"/>
+                      <a:r>
+                        <a:rPr lang="en-US" sz="1600" smtClean="0">
+                          <a:latin typeface="Arial" panose="020B0604020202020204" pitchFamily="34" charset="0"/>
+                          <a:cs typeface="Arial" panose="020B0604020202020204" pitchFamily="34" charset="0"/>
+                        </a:rPr>
+                        <a:t>46 us</a:t>
+                      </a:r>
+                      <a:endParaRPr lang="hr-HR" sz="1600">
+                        <a:latin typeface="Arial" panose="020B0604020202020204" pitchFamily="34" charset="0"/>
+                        <a:cs typeface="Arial" panose="020B0604020202020204" pitchFamily="34" charset="0"/>
+                      </a:endParaRPr>
+                    </a:p>
+                  </a:txBody>
+                  <a:tcPr anchor="ctr"/>
+                </a:tc>
+              </a:tr>
+              <a:tr h="527037">
+                <a:tc>
+                  <a:txBody>
+                    <a:bodyPr/>
+                    <a:lstStyle/>
+                    <a:p>
+                      <a:pPr algn="ctr"/>
+                      <a:r>
+                        <a:rPr lang="en-US" sz="1600" smtClean="0">
+                          <a:latin typeface="Arial" panose="020B0604020202020204" pitchFamily="34" charset="0"/>
+                          <a:cs typeface="Arial" panose="020B0604020202020204" pitchFamily="34" charset="0"/>
+                        </a:rPr>
+                        <a:t>SHA256 hashing</a:t>
+                      </a:r>
+                      <a:endParaRPr lang="hr-HR" sz="1600">
+                        <a:latin typeface="Arial" panose="020B0604020202020204" pitchFamily="34" charset="0"/>
+                        <a:cs typeface="Arial" panose="020B0604020202020204" pitchFamily="34" charset="0"/>
+                      </a:endParaRPr>
+                    </a:p>
+                  </a:txBody>
+                  <a:tcPr anchor="ctr"/>
+                </a:tc>
+                <a:tc>
+                  <a:txBody>
+                    <a:bodyPr/>
+                    <a:lstStyle/>
+                    <a:p>
+                      <a:pPr algn="ctr"/>
+                      <a:r>
+                        <a:rPr lang="en-US" sz="1600" smtClean="0">
+                          <a:latin typeface="Arial" panose="020B0604020202020204" pitchFamily="34" charset="0"/>
+                          <a:cs typeface="Arial" panose="020B0604020202020204" pitchFamily="34" charset="0"/>
+                        </a:rPr>
+                        <a:t>2835 us</a:t>
+                      </a:r>
+                      <a:endParaRPr lang="hr-HR" sz="1600">
+                        <a:latin typeface="Arial" panose="020B0604020202020204" pitchFamily="34" charset="0"/>
+                        <a:cs typeface="Arial" panose="020B0604020202020204" pitchFamily="34" charset="0"/>
+                      </a:endParaRPr>
+                    </a:p>
+                  </a:txBody>
+                  <a:tcPr anchor="ctr"/>
+                </a:tc>
+              </a:tr>
+            </a:tbl>
+          </a:graphicData>
+        </a:graphic>
+      </p:graphicFrame>
+    </p:spTree>
+    <p:extLst>
+      <p:ext uri="{BB962C8B-B14F-4D97-AF65-F5344CB8AC3E}">
+        <p14:creationId xmlns:p14="http://schemas.microsoft.com/office/powerpoint/2010/main" val="2660209410"/>
       </p:ext>
     </p:extLst>
   </p:cSld>

</xml_diff>

<commit_message>
Add TODOs and dummy values
</commit_message>
<xml_diff>
--- a/docs/SecureBLE.pptx
+++ b/docs/SecureBLE.pptx
@@ -768,7 +768,7 @@
           <a:p>
             <a:fld id="{0F0D3872-5191-4810-AACA-0D61B05C29C6}" type="datetimeFigureOut">
               <a:rPr lang="hr-HR" smtClean="0"/>
-              <a:t>22.1.2019.</a:t>
+              <a:t>23.1.2019.</a:t>
             </a:fld>
             <a:endParaRPr lang="hr-HR"/>
           </a:p>
@@ -938,7 +938,7 @@
           <a:p>
             <a:fld id="{0F0D3872-5191-4810-AACA-0D61B05C29C6}" type="datetimeFigureOut">
               <a:rPr lang="hr-HR" smtClean="0"/>
-              <a:t>22.1.2019.</a:t>
+              <a:t>23.1.2019.</a:t>
             </a:fld>
             <a:endParaRPr lang="hr-HR"/>
           </a:p>
@@ -1118,7 +1118,7 @@
           <a:p>
             <a:fld id="{0F0D3872-5191-4810-AACA-0D61B05C29C6}" type="datetimeFigureOut">
               <a:rPr lang="hr-HR" smtClean="0"/>
-              <a:t>22.1.2019.</a:t>
+              <a:t>23.1.2019.</a:t>
             </a:fld>
             <a:endParaRPr lang="hr-HR"/>
           </a:p>
@@ -1288,7 +1288,7 @@
           <a:p>
             <a:fld id="{0F0D3872-5191-4810-AACA-0D61B05C29C6}" type="datetimeFigureOut">
               <a:rPr lang="hr-HR" smtClean="0"/>
-              <a:t>22.1.2019.</a:t>
+              <a:t>23.1.2019.</a:t>
             </a:fld>
             <a:endParaRPr lang="hr-HR"/>
           </a:p>
@@ -1534,7 +1534,7 @@
           <a:p>
             <a:fld id="{0F0D3872-5191-4810-AACA-0D61B05C29C6}" type="datetimeFigureOut">
               <a:rPr lang="hr-HR" smtClean="0"/>
-              <a:t>22.1.2019.</a:t>
+              <a:t>23.1.2019.</a:t>
             </a:fld>
             <a:endParaRPr lang="hr-HR"/>
           </a:p>
@@ -1766,7 +1766,7 @@
           <a:p>
             <a:fld id="{0F0D3872-5191-4810-AACA-0D61B05C29C6}" type="datetimeFigureOut">
               <a:rPr lang="hr-HR" smtClean="0"/>
-              <a:t>22.1.2019.</a:t>
+              <a:t>23.1.2019.</a:t>
             </a:fld>
             <a:endParaRPr lang="hr-HR"/>
           </a:p>
@@ -2133,7 +2133,7 @@
           <a:p>
             <a:fld id="{0F0D3872-5191-4810-AACA-0D61B05C29C6}" type="datetimeFigureOut">
               <a:rPr lang="hr-HR" smtClean="0"/>
-              <a:t>22.1.2019.</a:t>
+              <a:t>23.1.2019.</a:t>
             </a:fld>
             <a:endParaRPr lang="hr-HR"/>
           </a:p>
@@ -2251,7 +2251,7 @@
           <a:p>
             <a:fld id="{0F0D3872-5191-4810-AACA-0D61B05C29C6}" type="datetimeFigureOut">
               <a:rPr lang="hr-HR" smtClean="0"/>
-              <a:t>22.1.2019.</a:t>
+              <a:t>23.1.2019.</a:t>
             </a:fld>
             <a:endParaRPr lang="hr-HR"/>
           </a:p>
@@ -2346,7 +2346,7 @@
           <a:p>
             <a:fld id="{0F0D3872-5191-4810-AACA-0D61B05C29C6}" type="datetimeFigureOut">
               <a:rPr lang="hr-HR" smtClean="0"/>
-              <a:t>22.1.2019.</a:t>
+              <a:t>23.1.2019.</a:t>
             </a:fld>
             <a:endParaRPr lang="hr-HR"/>
           </a:p>
@@ -2623,7 +2623,7 @@
           <a:p>
             <a:fld id="{0F0D3872-5191-4810-AACA-0D61B05C29C6}" type="datetimeFigureOut">
               <a:rPr lang="hr-HR" smtClean="0"/>
-              <a:t>22.1.2019.</a:t>
+              <a:t>23.1.2019.</a:t>
             </a:fld>
             <a:endParaRPr lang="hr-HR"/>
           </a:p>
@@ -2876,7 +2876,7 @@
           <a:p>
             <a:fld id="{0F0D3872-5191-4810-AACA-0D61B05C29C6}" type="datetimeFigureOut">
               <a:rPr lang="hr-HR" smtClean="0"/>
-              <a:t>22.1.2019.</a:t>
+              <a:t>23.1.2019.</a:t>
             </a:fld>
             <a:endParaRPr lang="hr-HR"/>
           </a:p>
@@ -3089,7 +3089,7 @@
           <a:p>
             <a:fld id="{0F0D3872-5191-4810-AACA-0D61B05C29C6}" type="datetimeFigureOut">
               <a:rPr lang="hr-HR" smtClean="0"/>
-              <a:t>22.1.2019.</a:t>
+              <a:t>23.1.2019.</a:t>
             </a:fld>
             <a:endParaRPr lang="hr-HR"/>
           </a:p>
@@ -3672,7 +3672,7 @@
           <p:cNvPr id="7" name="Title 1">
             <a:extLst>
               <a:ext uri="{FF2B5EF4-FFF2-40B4-BE49-F238E27FC236}">
-                <a16:creationId xmlns:a16="http://schemas.microsoft.com/office/drawing/2014/main" xmlns="" id="{F3F19207-56E3-41C1-B35F-1C329A479D6C}"/>
+                <a16:creationId xmlns="" xmlns:a16="http://schemas.microsoft.com/office/drawing/2014/main" id="{F3F19207-56E3-41C1-B35F-1C329A479D6C}"/>
               </a:ext>
             </a:extLst>
           </p:cNvPr>
@@ -3734,7 +3734,7 @@
           <p:cNvPr id="8" name="Straight Connector 7">
             <a:extLst>
               <a:ext uri="{FF2B5EF4-FFF2-40B4-BE49-F238E27FC236}">
-                <a16:creationId xmlns:a16="http://schemas.microsoft.com/office/drawing/2014/main" xmlns="" id="{F5AD3098-4B9E-4C8B-910B-1DD3F084C040}"/>
+                <a16:creationId xmlns="" xmlns:a16="http://schemas.microsoft.com/office/drawing/2014/main" id="{F5AD3098-4B9E-4C8B-910B-1DD3F084C040}"/>
               </a:ext>
             </a:extLst>
           </p:cNvPr>
@@ -4095,7 +4095,7 @@
           <p:cNvPr id="7" name="Title 1">
             <a:extLst>
               <a:ext uri="{FF2B5EF4-FFF2-40B4-BE49-F238E27FC236}">
-                <a16:creationId xmlns:a16="http://schemas.microsoft.com/office/drawing/2014/main" xmlns="" id="{F3F19207-56E3-41C1-B35F-1C329A479D6C}"/>
+                <a16:creationId xmlns="" xmlns:a16="http://schemas.microsoft.com/office/drawing/2014/main" id="{F3F19207-56E3-41C1-B35F-1C329A479D6C}"/>
               </a:ext>
             </a:extLst>
           </p:cNvPr>
@@ -4157,7 +4157,7 @@
           <p:cNvPr id="8" name="Straight Connector 7">
             <a:extLst>
               <a:ext uri="{FF2B5EF4-FFF2-40B4-BE49-F238E27FC236}">
-                <a16:creationId xmlns:a16="http://schemas.microsoft.com/office/drawing/2014/main" xmlns="" id="{F5AD3098-4B9E-4C8B-910B-1DD3F084C040}"/>
+                <a16:creationId xmlns="" xmlns:a16="http://schemas.microsoft.com/office/drawing/2014/main" id="{F5AD3098-4B9E-4C8B-910B-1DD3F084C040}"/>
               </a:ext>
             </a:extLst>
           </p:cNvPr>
@@ -4687,7 +4687,7 @@
           <p:cNvPr id="5" name="Picture 5" descr="A close up of a logo&#10;&#10;Description generated with high confidence">
             <a:extLst>
               <a:ext uri="{FF2B5EF4-FFF2-40B4-BE49-F238E27FC236}">
-                <a16:creationId xmlns:a16="http://schemas.microsoft.com/office/drawing/2014/main" xmlns="" id="{8427AAF0-6F2C-4D3F-9F8C-420281031ECF}"/>
+                <a16:creationId xmlns="" xmlns:a16="http://schemas.microsoft.com/office/drawing/2014/main" id="{8427AAF0-6F2C-4D3F-9F8C-420281031ECF}"/>
               </a:ext>
             </a:extLst>
           </p:cNvPr>
@@ -4717,7 +4717,7 @@
           <p:cNvPr id="7" name="Picture 7">
             <a:extLst>
               <a:ext uri="{FF2B5EF4-FFF2-40B4-BE49-F238E27FC236}">
-                <a16:creationId xmlns:a16="http://schemas.microsoft.com/office/drawing/2014/main" xmlns="" id="{2FEE3424-9F51-4A3B-A6EF-8BB9144B9192}"/>
+                <a16:creationId xmlns="" xmlns:a16="http://schemas.microsoft.com/office/drawing/2014/main" id="{2FEE3424-9F51-4A3B-A6EF-8BB9144B9192}"/>
               </a:ext>
             </a:extLst>
           </p:cNvPr>
@@ -4747,7 +4747,7 @@
           <p:cNvPr id="13" name="Straight Arrow Connector 12">
             <a:extLst>
               <a:ext uri="{FF2B5EF4-FFF2-40B4-BE49-F238E27FC236}">
-                <a16:creationId xmlns:a16="http://schemas.microsoft.com/office/drawing/2014/main" xmlns="" id="{64C25ECC-DCCA-4CAD-8ECA-A99B71733BFD}"/>
+                <a16:creationId xmlns="" xmlns:a16="http://schemas.microsoft.com/office/drawing/2014/main" id="{64C25ECC-DCCA-4CAD-8ECA-A99B71733BFD}"/>
               </a:ext>
             </a:extLst>
           </p:cNvPr>
@@ -4783,7 +4783,7 @@
           <p:cNvPr id="14" name="Straight Arrow Connector 13">
             <a:extLst>
               <a:ext uri="{FF2B5EF4-FFF2-40B4-BE49-F238E27FC236}">
-                <a16:creationId xmlns:a16="http://schemas.microsoft.com/office/drawing/2014/main" xmlns="" id="{85DBE647-BED5-427F-BFC8-2D43A02663E2}"/>
+                <a16:creationId xmlns="" xmlns:a16="http://schemas.microsoft.com/office/drawing/2014/main" id="{85DBE647-BED5-427F-BFC8-2D43A02663E2}"/>
               </a:ext>
             </a:extLst>
           </p:cNvPr>
@@ -4821,7 +4821,7 @@
           <p:cNvPr id="3" name="Arc 2">
             <a:extLst>
               <a:ext uri="{FF2B5EF4-FFF2-40B4-BE49-F238E27FC236}">
-                <a16:creationId xmlns:a16="http://schemas.microsoft.com/office/drawing/2014/main" xmlns="" id="{55925465-D369-43E0-8FC2-B2E10857C791}"/>
+                <a16:creationId xmlns="" xmlns:a16="http://schemas.microsoft.com/office/drawing/2014/main" id="{55925465-D369-43E0-8FC2-B2E10857C791}"/>
               </a:ext>
             </a:extLst>
           </p:cNvPr>
@@ -4866,7 +4866,7 @@
           <p:cNvPr id="11" name="Arc 10">
             <a:extLst>
               <a:ext uri="{FF2B5EF4-FFF2-40B4-BE49-F238E27FC236}">
-                <a16:creationId xmlns:a16="http://schemas.microsoft.com/office/drawing/2014/main" xmlns="" id="{0A124C9F-7217-482D-A951-3035B2F7964F}"/>
+                <a16:creationId xmlns="" xmlns:a16="http://schemas.microsoft.com/office/drawing/2014/main" id="{0A124C9F-7217-482D-A951-3035B2F7964F}"/>
               </a:ext>
             </a:extLst>
           </p:cNvPr>
@@ -4911,7 +4911,7 @@
           <p:cNvPr id="16" name="Arc 15">
             <a:extLst>
               <a:ext uri="{FF2B5EF4-FFF2-40B4-BE49-F238E27FC236}">
-                <a16:creationId xmlns:a16="http://schemas.microsoft.com/office/drawing/2014/main" xmlns="" id="{785B7A92-35CA-4A04-B1E3-ECF4030ECB45}"/>
+                <a16:creationId xmlns="" xmlns:a16="http://schemas.microsoft.com/office/drawing/2014/main" id="{785B7A92-35CA-4A04-B1E3-ECF4030ECB45}"/>
               </a:ext>
             </a:extLst>
           </p:cNvPr>
@@ -4956,7 +4956,7 @@
           <p:cNvPr id="12" name="Oval 11">
             <a:extLst>
               <a:ext uri="{FF2B5EF4-FFF2-40B4-BE49-F238E27FC236}">
-                <a16:creationId xmlns:a16="http://schemas.microsoft.com/office/drawing/2014/main" xmlns="" id="{3C1CCF33-65C1-4E0C-B0DB-0A65F4CA9DBA}"/>
+                <a16:creationId xmlns="" xmlns:a16="http://schemas.microsoft.com/office/drawing/2014/main" id="{3C1CCF33-65C1-4E0C-B0DB-0A65F4CA9DBA}"/>
               </a:ext>
             </a:extLst>
           </p:cNvPr>
@@ -5015,7 +5015,7 @@
           <p:cNvPr id="15" name="Picture 15" descr="A circuit board&#10;&#10;Description generated with very high confidence">
             <a:extLst>
               <a:ext uri="{FF2B5EF4-FFF2-40B4-BE49-F238E27FC236}">
-                <a16:creationId xmlns:a16="http://schemas.microsoft.com/office/drawing/2014/main" xmlns="" id="{EA62634C-E70F-4AEF-AAF5-EE9DB7F9672B}"/>
+                <a16:creationId xmlns="" xmlns:a16="http://schemas.microsoft.com/office/drawing/2014/main" id="{EA62634C-E70F-4AEF-AAF5-EE9DB7F9672B}"/>
               </a:ext>
             </a:extLst>
           </p:cNvPr>
@@ -7489,7 +7489,7 @@
           <p:cNvPr id="7" name="Title 1">
             <a:extLst>
               <a:ext uri="{FF2B5EF4-FFF2-40B4-BE49-F238E27FC236}">
-                <a16:creationId xmlns:a16="http://schemas.microsoft.com/office/drawing/2014/main" xmlns="" id="{F3F19207-56E3-41C1-B35F-1C329A479D6C}"/>
+                <a16:creationId xmlns="" xmlns:a16="http://schemas.microsoft.com/office/drawing/2014/main" id="{F3F19207-56E3-41C1-B35F-1C329A479D6C}"/>
               </a:ext>
             </a:extLst>
           </p:cNvPr>
@@ -7551,7 +7551,7 @@
           <p:cNvPr id="8" name="Straight Connector 7">
             <a:extLst>
               <a:ext uri="{FF2B5EF4-FFF2-40B4-BE49-F238E27FC236}">
-                <a16:creationId xmlns:a16="http://schemas.microsoft.com/office/drawing/2014/main" xmlns="" id="{F5AD3098-4B9E-4C8B-910B-1DD3F084C040}"/>
+                <a16:creationId xmlns="" xmlns:a16="http://schemas.microsoft.com/office/drawing/2014/main" id="{F5AD3098-4B9E-4C8B-910B-1DD3F084C040}"/>
               </a:ext>
             </a:extLst>
           </p:cNvPr>
@@ -9033,7 +9033,7 @@
           <p:cNvPr id="3" name="Rectangle 2">
             <a:extLst>
               <a:ext uri="{FF2B5EF4-FFF2-40B4-BE49-F238E27FC236}">
-                <a16:creationId xmlns:a16="http://schemas.microsoft.com/office/drawing/2014/main" xmlns="" id="{2BE7543D-CCC8-4831-A846-606881F98C72}"/>
+                <a16:creationId xmlns="" xmlns:a16="http://schemas.microsoft.com/office/drawing/2014/main" id="{2BE7543D-CCC8-4831-A846-606881F98C72}"/>
               </a:ext>
             </a:extLst>
           </p:cNvPr>
@@ -9097,7 +9097,7 @@
           <p:cNvPr id="11" name="Rectangle 10">
             <a:extLst>
               <a:ext uri="{FF2B5EF4-FFF2-40B4-BE49-F238E27FC236}">
-                <a16:creationId xmlns:a16="http://schemas.microsoft.com/office/drawing/2014/main" xmlns="" id="{904D0617-3170-4DBA-BE06-1A63276F7156}"/>
+                <a16:creationId xmlns="" xmlns:a16="http://schemas.microsoft.com/office/drawing/2014/main" id="{904D0617-3170-4DBA-BE06-1A63276F7156}"/>
               </a:ext>
             </a:extLst>
           </p:cNvPr>
@@ -9154,7 +9154,7 @@
           <p:cNvPr id="16" name="Rectangle 15">
             <a:extLst>
               <a:ext uri="{FF2B5EF4-FFF2-40B4-BE49-F238E27FC236}">
-                <a16:creationId xmlns:a16="http://schemas.microsoft.com/office/drawing/2014/main" xmlns="" id="{39FE6B16-7C55-4C09-96DE-303A30E47EC7}"/>
+                <a16:creationId xmlns="" xmlns:a16="http://schemas.microsoft.com/office/drawing/2014/main" id="{39FE6B16-7C55-4C09-96DE-303A30E47EC7}"/>
               </a:ext>
             </a:extLst>
           </p:cNvPr>
@@ -9211,7 +9211,7 @@
           <p:cNvPr id="17" name="Rectangle 16">
             <a:extLst>
               <a:ext uri="{FF2B5EF4-FFF2-40B4-BE49-F238E27FC236}">
-                <a16:creationId xmlns:a16="http://schemas.microsoft.com/office/drawing/2014/main" xmlns="" id="{5F575371-9DFD-4915-8768-C90EE57FB26B}"/>
+                <a16:creationId xmlns="" xmlns:a16="http://schemas.microsoft.com/office/drawing/2014/main" id="{5F575371-9DFD-4915-8768-C90EE57FB26B}"/>
               </a:ext>
             </a:extLst>
           </p:cNvPr>
@@ -9268,7 +9268,7 @@
           <p:cNvPr id="21" name="TextBox 20">
             <a:extLst>
               <a:ext uri="{FF2B5EF4-FFF2-40B4-BE49-F238E27FC236}">
-                <a16:creationId xmlns:a16="http://schemas.microsoft.com/office/drawing/2014/main" xmlns="" id="{A4B2A663-4E21-4E52-85D3-648DF4AD88D1}"/>
+                <a16:creationId xmlns="" xmlns:a16="http://schemas.microsoft.com/office/drawing/2014/main" id="{A4B2A663-4E21-4E52-85D3-648DF4AD88D1}"/>
               </a:ext>
             </a:extLst>
           </p:cNvPr>
@@ -9313,7 +9313,7 @@
           <p:cNvPr id="22" name="TextBox 21">
             <a:extLst>
               <a:ext uri="{FF2B5EF4-FFF2-40B4-BE49-F238E27FC236}">
-                <a16:creationId xmlns:a16="http://schemas.microsoft.com/office/drawing/2014/main" xmlns="" id="{6F958FF2-654B-4355-B1D6-41C87C9E460F}"/>
+                <a16:creationId xmlns="" xmlns:a16="http://schemas.microsoft.com/office/drawing/2014/main" id="{6F958FF2-654B-4355-B1D6-41C87C9E460F}"/>
               </a:ext>
             </a:extLst>
           </p:cNvPr>
@@ -9358,7 +9358,7 @@
           <p:cNvPr id="29" name="TextBox 28">
             <a:extLst>
               <a:ext uri="{FF2B5EF4-FFF2-40B4-BE49-F238E27FC236}">
-                <a16:creationId xmlns:a16="http://schemas.microsoft.com/office/drawing/2014/main" xmlns="" id="{107FD947-D600-419E-B606-BAE6A5D5D7F6}"/>
+                <a16:creationId xmlns="" xmlns:a16="http://schemas.microsoft.com/office/drawing/2014/main" id="{107FD947-D600-419E-B606-BAE6A5D5D7F6}"/>
               </a:ext>
             </a:extLst>
           </p:cNvPr>
@@ -9403,7 +9403,7 @@
           <p:cNvPr id="34" name="TextBox 33">
             <a:extLst>
               <a:ext uri="{FF2B5EF4-FFF2-40B4-BE49-F238E27FC236}">
-                <a16:creationId xmlns:a16="http://schemas.microsoft.com/office/drawing/2014/main" xmlns="" id="{22931BBA-07C1-4622-8ADE-C9E87C0864D4}"/>
+                <a16:creationId xmlns="" xmlns:a16="http://schemas.microsoft.com/office/drawing/2014/main" id="{22931BBA-07C1-4622-8ADE-C9E87C0864D4}"/>
               </a:ext>
             </a:extLst>
           </p:cNvPr>
@@ -9448,7 +9448,7 @@
           <p:cNvPr id="7" name="Title 1">
             <a:extLst>
               <a:ext uri="{FF2B5EF4-FFF2-40B4-BE49-F238E27FC236}">
-                <a16:creationId xmlns:a16="http://schemas.microsoft.com/office/drawing/2014/main" xmlns="" id="{F3F19207-56E3-41C1-B35F-1C329A479D6C}"/>
+                <a16:creationId xmlns="" xmlns:a16="http://schemas.microsoft.com/office/drawing/2014/main" id="{F3F19207-56E3-41C1-B35F-1C329A479D6C}"/>
               </a:ext>
             </a:extLst>
           </p:cNvPr>
@@ -9510,7 +9510,7 @@
           <p:cNvPr id="8" name="Straight Connector 7">
             <a:extLst>
               <a:ext uri="{FF2B5EF4-FFF2-40B4-BE49-F238E27FC236}">
-                <a16:creationId xmlns:a16="http://schemas.microsoft.com/office/drawing/2014/main" xmlns="" id="{F5AD3098-4B9E-4C8B-910B-1DD3F084C040}"/>
+                <a16:creationId xmlns="" xmlns:a16="http://schemas.microsoft.com/office/drawing/2014/main" id="{F5AD3098-4B9E-4C8B-910B-1DD3F084C040}"/>
               </a:ext>
             </a:extLst>
           </p:cNvPr>
@@ -9840,7 +9840,7 @@
           <p:cNvPr id="20" name="Rectangle 19">
             <a:extLst>
               <a:ext uri="{FF2B5EF4-FFF2-40B4-BE49-F238E27FC236}">
-                <a16:creationId xmlns:a16="http://schemas.microsoft.com/office/drawing/2014/main" xmlns="" id="{39FE6B16-7C55-4C09-96DE-303A30E47EC7}"/>
+                <a16:creationId xmlns="" xmlns:a16="http://schemas.microsoft.com/office/drawing/2014/main" id="{39FE6B16-7C55-4C09-96DE-303A30E47EC7}"/>
               </a:ext>
             </a:extLst>
           </p:cNvPr>
@@ -9977,7 +9977,7 @@
           <p:cNvPr id="38" name="TextBox 37">
             <a:extLst>
               <a:ext uri="{FF2B5EF4-FFF2-40B4-BE49-F238E27FC236}">
-                <a16:creationId xmlns:a16="http://schemas.microsoft.com/office/drawing/2014/main" xmlns="" id="{6F958FF2-654B-4355-B1D6-41C87C9E460F}"/>
+                <a16:creationId xmlns="" xmlns:a16="http://schemas.microsoft.com/office/drawing/2014/main" id="{6F958FF2-654B-4355-B1D6-41C87C9E460F}"/>
               </a:ext>
             </a:extLst>
           </p:cNvPr>
@@ -10030,7 +10030,7 @@
           <p:cNvPr id="50" name="TextBox 49">
             <a:extLst>
               <a:ext uri="{FF2B5EF4-FFF2-40B4-BE49-F238E27FC236}">
-                <a16:creationId xmlns:a16="http://schemas.microsoft.com/office/drawing/2014/main" xmlns="" id="{6F958FF2-654B-4355-B1D6-41C87C9E460F}"/>
+                <a16:creationId xmlns="" xmlns:a16="http://schemas.microsoft.com/office/drawing/2014/main" id="{6F958FF2-654B-4355-B1D6-41C87C9E460F}"/>
               </a:ext>
             </a:extLst>
           </p:cNvPr>
@@ -10126,7 +10126,7 @@
           <p:cNvPr id="58" name="TextBox 57">
             <a:extLst>
               <a:ext uri="{FF2B5EF4-FFF2-40B4-BE49-F238E27FC236}">
-                <a16:creationId xmlns:a16="http://schemas.microsoft.com/office/drawing/2014/main" xmlns="" id="{22931BBA-07C1-4622-8ADE-C9E87C0864D4}"/>
+                <a16:creationId xmlns="" xmlns:a16="http://schemas.microsoft.com/office/drawing/2014/main" id="{22931BBA-07C1-4622-8ADE-C9E87C0864D4}"/>
               </a:ext>
             </a:extLst>
           </p:cNvPr>
@@ -10223,7 +10223,7 @@
           <p:cNvPr id="32" name="TextBox 31">
             <a:extLst>
               <a:ext uri="{FF2B5EF4-FFF2-40B4-BE49-F238E27FC236}">
-                <a16:creationId xmlns:a16="http://schemas.microsoft.com/office/drawing/2014/main" xmlns="" id="{22931BBA-07C1-4622-8ADE-C9E87C0864D4}"/>
+                <a16:creationId xmlns="" xmlns:a16="http://schemas.microsoft.com/office/drawing/2014/main" id="{22931BBA-07C1-4622-8ADE-C9E87C0864D4}"/>
               </a:ext>
             </a:extLst>
           </p:cNvPr>
@@ -10316,7 +10316,7 @@
           <p:cNvPr id="7" name="Title 1">
             <a:extLst>
               <a:ext uri="{FF2B5EF4-FFF2-40B4-BE49-F238E27FC236}">
-                <a16:creationId xmlns:a16="http://schemas.microsoft.com/office/drawing/2014/main" xmlns="" id="{F3F19207-56E3-41C1-B35F-1C329A479D6C}"/>
+                <a16:creationId xmlns="" xmlns:a16="http://schemas.microsoft.com/office/drawing/2014/main" id="{F3F19207-56E3-41C1-B35F-1C329A479D6C}"/>
               </a:ext>
             </a:extLst>
           </p:cNvPr>
@@ -10378,7 +10378,7 @@
           <p:cNvPr id="8" name="Straight Connector 7">
             <a:extLst>
               <a:ext uri="{FF2B5EF4-FFF2-40B4-BE49-F238E27FC236}">
-                <a16:creationId xmlns:a16="http://schemas.microsoft.com/office/drawing/2014/main" xmlns="" id="{F5AD3098-4B9E-4C8B-910B-1DD3F084C040}"/>
+                <a16:creationId xmlns="" xmlns:a16="http://schemas.microsoft.com/office/drawing/2014/main" id="{F5AD3098-4B9E-4C8B-910B-1DD3F084C040}"/>
               </a:ext>
             </a:extLst>
           </p:cNvPr>
@@ -10988,7 +10988,7 @@
           <p:cNvPr id="7" name="Title 1">
             <a:extLst>
               <a:ext uri="{FF2B5EF4-FFF2-40B4-BE49-F238E27FC236}">
-                <a16:creationId xmlns:a16="http://schemas.microsoft.com/office/drawing/2014/main" xmlns="" id="{F3F19207-56E3-41C1-B35F-1C329A479D6C}"/>
+                <a16:creationId xmlns="" xmlns:a16="http://schemas.microsoft.com/office/drawing/2014/main" id="{F3F19207-56E3-41C1-B35F-1C329A479D6C}"/>
               </a:ext>
             </a:extLst>
           </p:cNvPr>
@@ -11050,7 +11050,7 @@
           <p:cNvPr id="8" name="Straight Connector 7">
             <a:extLst>
               <a:ext uri="{FF2B5EF4-FFF2-40B4-BE49-F238E27FC236}">
-                <a16:creationId xmlns:a16="http://schemas.microsoft.com/office/drawing/2014/main" xmlns="" id="{F5AD3098-4B9E-4C8B-910B-1DD3F084C040}"/>
+                <a16:creationId xmlns="" xmlns:a16="http://schemas.microsoft.com/office/drawing/2014/main" id="{F5AD3098-4B9E-4C8B-910B-1DD3F084C040}"/>
               </a:ext>
             </a:extLst>
           </p:cNvPr>
@@ -11177,8 +11177,7 @@
           </a:prstGeom>
           <a:solidFill>
             <a:schemeClr val="accent1">
-              <a:lumMod val="60000"/>
-              <a:lumOff val="40000"/>
+              <a:lumMod val="50000"/>
             </a:schemeClr>
           </a:solidFill>
           <a:ln>
@@ -11644,7 +11643,7 @@
           <p:cNvPr id="7" name="Title 1">
             <a:extLst>
               <a:ext uri="{FF2B5EF4-FFF2-40B4-BE49-F238E27FC236}">
-                <a16:creationId xmlns:a16="http://schemas.microsoft.com/office/drawing/2014/main" xmlns="" id="{F3F19207-56E3-41C1-B35F-1C329A479D6C}"/>
+                <a16:creationId xmlns="" xmlns:a16="http://schemas.microsoft.com/office/drawing/2014/main" id="{F3F19207-56E3-41C1-B35F-1C329A479D6C}"/>
               </a:ext>
             </a:extLst>
           </p:cNvPr>
@@ -11706,7 +11705,7 @@
           <p:cNvPr id="8" name="Straight Connector 7">
             <a:extLst>
               <a:ext uri="{FF2B5EF4-FFF2-40B4-BE49-F238E27FC236}">
-                <a16:creationId xmlns:a16="http://schemas.microsoft.com/office/drawing/2014/main" xmlns="" id="{F5AD3098-4B9E-4C8B-910B-1DD3F084C040}"/>
+                <a16:creationId xmlns="" xmlns:a16="http://schemas.microsoft.com/office/drawing/2014/main" id="{F5AD3098-4B9E-4C8B-910B-1DD3F084C040}"/>
               </a:ext>
             </a:extLst>
           </p:cNvPr>

</xml_diff>